<commit_message>
ADD: first three pages of presentation
</commit_message>
<xml_diff>
--- a/Presentation/presentation.pptx
+++ b/Presentation/presentation.pptx
@@ -108,6 +108,11 @@
       </a:defRPr>
     </a:lvl9pPr>
   </p:defaultTextStyle>
+  <p:extLst>
+    <p:ext uri="{EFAFB233-063F-42B5-8137-9DF3F51BA10A}">
+      <p15:sldGuideLst xmlns:p15="http://schemas.microsoft.com/office/powerpoint/2012/main"/>
+    </p:ext>
+  </p:extLst>
 </p:presentation>
 </file>
 
@@ -3596,7 +3601,7 @@
                 <a:latin typeface="Times New Roman" panose="02020603050405020304" pitchFamily="18" charset="0"/>
                 <a:cs typeface="Times New Roman" panose="02020603050405020304" pitchFamily="18" charset="0"/>
               </a:rPr>
-              <a:t>Разработать и описать метод распознавания усталости пользователя, находящегося на автоматизированном рабочем месте.</a:t>
+              <a:t>Описать значимость и проблематику методов распознавания усталости на автоматизированном рабочем месте по характеристикам и действиям пользователя.</a:t>
             </a:r>
           </a:p>
           <a:p>
@@ -3610,6 +3615,30 @@
               </a:rPr>
               <a:t>Для достижения поставленной цели потребуется:</a:t>
             </a:r>
+          </a:p>
+          <a:p>
+            <a:pPr marL="514350" indent="-514350" algn="just">
+              <a:buFont typeface="+mj-lt"/>
+              <a:buAutoNum type="arabicParenR"/>
+            </a:pPr>
+            <a:r>
+              <a:rPr lang="ru-RU" sz="2400" dirty="0">
+                <a:latin typeface="Times New Roman" panose="02020603050405020304" pitchFamily="18" charset="0"/>
+                <a:cs typeface="Times New Roman" panose="02020603050405020304" pitchFamily="18" charset="0"/>
+              </a:rPr>
+              <a:t>описать термины предметной области и обозначить проблему</a:t>
+            </a:r>
+            <a:r>
+              <a:rPr lang="en-US" sz="2400" dirty="0">
+                <a:latin typeface="Times New Roman" panose="02020603050405020304" pitchFamily="18" charset="0"/>
+                <a:cs typeface="Times New Roman" panose="02020603050405020304" pitchFamily="18" charset="0"/>
+              </a:rPr>
+              <a:t>;</a:t>
+            </a:r>
+            <a:endParaRPr lang="ru-RU" sz="2400" dirty="0">
+              <a:latin typeface="Times New Roman" panose="02020603050405020304" pitchFamily="18" charset="0"/>
+              <a:cs typeface="Times New Roman" panose="02020603050405020304" pitchFamily="18" charset="0"/>
+            </a:endParaRPr>
           </a:p>
           <a:p>
             <a:pPr marL="514350" indent="-514350" algn="just">

</xml_diff>

<commit_message>
FIX: GOST style on title slide
</commit_message>
<xml_diff>
--- a/Presentation/presentation.pptx
+++ b/Presentation/presentation.pptx
@@ -263,7 +263,7 @@
           <a:p>
             <a:fld id="{A0EE6EE7-36DE-4D2C-AF3C-F3A52CFDA6D2}" type="datetimeFigureOut">
               <a:rPr lang="ru-RU" smtClean="0"/>
-              <a:t>12.11.2021</a:t>
+              <a:t>05.12.2021</a:t>
             </a:fld>
             <a:endParaRPr lang="ru-RU"/>
           </a:p>
@@ -461,7 +461,7 @@
           <a:p>
             <a:fld id="{A0EE6EE7-36DE-4D2C-AF3C-F3A52CFDA6D2}" type="datetimeFigureOut">
               <a:rPr lang="ru-RU" smtClean="0"/>
-              <a:t>12.11.2021</a:t>
+              <a:t>05.12.2021</a:t>
             </a:fld>
             <a:endParaRPr lang="ru-RU"/>
           </a:p>
@@ -669,7 +669,7 @@
           <a:p>
             <a:fld id="{A0EE6EE7-36DE-4D2C-AF3C-F3A52CFDA6D2}" type="datetimeFigureOut">
               <a:rPr lang="ru-RU" smtClean="0"/>
-              <a:t>12.11.2021</a:t>
+              <a:t>05.12.2021</a:t>
             </a:fld>
             <a:endParaRPr lang="ru-RU"/>
           </a:p>
@@ -867,7 +867,7 @@
           <a:p>
             <a:fld id="{A0EE6EE7-36DE-4D2C-AF3C-F3A52CFDA6D2}" type="datetimeFigureOut">
               <a:rPr lang="ru-RU" smtClean="0"/>
-              <a:t>12.11.2021</a:t>
+              <a:t>05.12.2021</a:t>
             </a:fld>
             <a:endParaRPr lang="ru-RU"/>
           </a:p>
@@ -1142,7 +1142,7 @@
           <a:p>
             <a:fld id="{A0EE6EE7-36DE-4D2C-AF3C-F3A52CFDA6D2}" type="datetimeFigureOut">
               <a:rPr lang="ru-RU" smtClean="0"/>
-              <a:t>12.11.2021</a:t>
+              <a:t>05.12.2021</a:t>
             </a:fld>
             <a:endParaRPr lang="ru-RU"/>
           </a:p>
@@ -1407,7 +1407,7 @@
           <a:p>
             <a:fld id="{A0EE6EE7-36DE-4D2C-AF3C-F3A52CFDA6D2}" type="datetimeFigureOut">
               <a:rPr lang="ru-RU" smtClean="0"/>
-              <a:t>12.11.2021</a:t>
+              <a:t>05.12.2021</a:t>
             </a:fld>
             <a:endParaRPr lang="ru-RU"/>
           </a:p>
@@ -1819,7 +1819,7 @@
           <a:p>
             <a:fld id="{A0EE6EE7-36DE-4D2C-AF3C-F3A52CFDA6D2}" type="datetimeFigureOut">
               <a:rPr lang="ru-RU" smtClean="0"/>
-              <a:t>12.11.2021</a:t>
+              <a:t>05.12.2021</a:t>
             </a:fld>
             <a:endParaRPr lang="ru-RU"/>
           </a:p>
@@ -1960,7 +1960,7 @@
           <a:p>
             <a:fld id="{A0EE6EE7-36DE-4D2C-AF3C-F3A52CFDA6D2}" type="datetimeFigureOut">
               <a:rPr lang="ru-RU" smtClean="0"/>
-              <a:t>12.11.2021</a:t>
+              <a:t>05.12.2021</a:t>
             </a:fld>
             <a:endParaRPr lang="ru-RU"/>
           </a:p>
@@ -2073,7 +2073,7 @@
           <a:p>
             <a:fld id="{A0EE6EE7-36DE-4D2C-AF3C-F3A52CFDA6D2}" type="datetimeFigureOut">
               <a:rPr lang="ru-RU" smtClean="0"/>
-              <a:t>12.11.2021</a:t>
+              <a:t>05.12.2021</a:t>
             </a:fld>
             <a:endParaRPr lang="ru-RU"/>
           </a:p>
@@ -2384,7 +2384,7 @@
           <a:p>
             <a:fld id="{A0EE6EE7-36DE-4D2C-AF3C-F3A52CFDA6D2}" type="datetimeFigureOut">
               <a:rPr lang="ru-RU" smtClean="0"/>
-              <a:t>12.11.2021</a:t>
+              <a:t>05.12.2021</a:t>
             </a:fld>
             <a:endParaRPr lang="ru-RU"/>
           </a:p>
@@ -2672,7 +2672,7 @@
           <a:p>
             <a:fld id="{A0EE6EE7-36DE-4D2C-AF3C-F3A52CFDA6D2}" type="datetimeFigureOut">
               <a:rPr lang="ru-RU" smtClean="0"/>
-              <a:t>12.11.2021</a:t>
+              <a:t>05.12.2021</a:t>
             </a:fld>
             <a:endParaRPr lang="ru-RU"/>
           </a:p>
@@ -2913,7 +2913,7 @@
           <a:p>
             <a:fld id="{A0EE6EE7-36DE-4D2C-AF3C-F3A52CFDA6D2}" type="datetimeFigureOut">
               <a:rPr lang="ru-RU" smtClean="0"/>
-              <a:t>12.11.2021</a:t>
+              <a:t>05.12.2021</a:t>
             </a:fld>
             <a:endParaRPr lang="ru-RU"/>
           </a:p>
@@ -3391,7 +3391,9 @@
           </a:xfrm>
         </p:spPr>
         <p:txBody>
-          <a:bodyPr anchor="ctr"/>
+          <a:bodyPr anchor="ctr">
+            <a:normAutofit lnSpcReduction="10000"/>
+          </a:bodyPr>
           <a:lstStyle/>
           <a:p>
             <a:r>
@@ -3399,7 +3401,16 @@
                 <a:latin typeface="Times New Roman" panose="02020603050405020304" pitchFamily="18" charset="0"/>
                 <a:cs typeface="Times New Roman" panose="02020603050405020304" pitchFamily="18" charset="0"/>
               </a:rPr>
-              <a:t>Студент: Дмитрий Васильевич Якуба, ИУ7-73Б</a:t>
+              <a:t>Студент: Дмитрий Васильевич Якуба</a:t>
+            </a:r>
+          </a:p>
+          <a:p>
+            <a:r>
+              <a:rPr lang="ru-RU" dirty="0">
+                <a:latin typeface="Times New Roman" panose="02020603050405020304" pitchFamily="18" charset="0"/>
+                <a:cs typeface="Times New Roman" panose="02020603050405020304" pitchFamily="18" charset="0"/>
+              </a:rPr>
+              <a:t>Группа: ИУ7-73Б</a:t>
             </a:r>
             <a:endParaRPr lang="en-US" dirty="0">
               <a:latin typeface="Times New Roman" panose="02020603050405020304" pitchFamily="18" charset="0"/>
@@ -3412,7 +3423,16 @@
                 <a:latin typeface="Times New Roman" panose="02020603050405020304" pitchFamily="18" charset="0"/>
                 <a:cs typeface="Times New Roman" panose="02020603050405020304" pitchFamily="18" charset="0"/>
               </a:rPr>
-              <a:t>Руководитель научно-исследовательской работы: Юрий Владимирович Строганов</a:t>
+              <a:t>Руководитель: старший преподаватель кафедры ИУ7 </a:t>
+            </a:r>
+          </a:p>
+          <a:p>
+            <a:r>
+              <a:rPr lang="ru-RU" dirty="0">
+                <a:latin typeface="Times New Roman" panose="02020603050405020304" pitchFamily="18" charset="0"/>
+                <a:cs typeface="Times New Roman" panose="02020603050405020304" pitchFamily="18" charset="0"/>
+              </a:rPr>
+              <a:t>Юрий Владимирович Строганов</a:t>
             </a:r>
           </a:p>
         </p:txBody>
@@ -3459,46 +3479,6 @@
                 <a:cs typeface="Times New Roman" panose="02020603050405020304" pitchFamily="18" charset="0"/>
               </a:rPr>
             </a:br>
-            <a:endParaRPr lang="ru-RU" dirty="0"/>
-          </a:p>
-        </p:txBody>
-      </p:sp>
-      <p:sp>
-        <p:nvSpPr>
-          <p:cNvPr id="7" name="TextBox 6">
-            <a:extLst>
-              <a:ext uri="{FF2B5EF4-FFF2-40B4-BE49-F238E27FC236}">
-                <a16:creationId xmlns:a16="http://schemas.microsoft.com/office/drawing/2014/main" id="{CAB68F3C-E215-44CE-9C93-2C0FAEC2131A}"/>
-              </a:ext>
-            </a:extLst>
-          </p:cNvPr>
-          <p:cNvSpPr txBox="1"/>
-          <p:nvPr/>
-        </p:nvSpPr>
-        <p:spPr>
-          <a:xfrm>
-            <a:off x="3048663" y="6281935"/>
-            <a:ext cx="6094674" cy="369332"/>
-          </a:xfrm>
-          <a:prstGeom prst="rect">
-            <a:avLst/>
-          </a:prstGeom>
-          <a:noFill/>
-        </p:spPr>
-        <p:txBody>
-          <a:bodyPr wrap="square">
-            <a:spAutoFit/>
-          </a:bodyPr>
-          <a:lstStyle/>
-          <a:p>
-            <a:pPr algn="ctr"/>
-            <a:r>
-              <a:rPr lang="ru-RU" sz="1800" dirty="0">
-                <a:latin typeface="Times New Roman" panose="02020603050405020304" pitchFamily="18" charset="0"/>
-                <a:cs typeface="Times New Roman" panose="02020603050405020304" pitchFamily="18" charset="0"/>
-              </a:rPr>
-              <a:t>МОСКВА, 2021 ГОД</a:t>
-            </a:r>
             <a:endParaRPr lang="ru-RU" dirty="0"/>
           </a:p>
         </p:txBody>
@@ -3601,7 +3581,7 @@
                 <a:latin typeface="Times New Roman" panose="02020603050405020304" pitchFamily="18" charset="0"/>
                 <a:cs typeface="Times New Roman" panose="02020603050405020304" pitchFamily="18" charset="0"/>
               </a:rPr>
-              <a:t>Описать значимость и проблематику методов распознавания усталости на автоматизированном рабочем месте по характеристикам и действиям пользователя.</a:t>
+              <a:t>Описать значимость и проблематику методов распознавания усталости на автоматизированном рабочем месте (АРМ) по характеристикам и действиям пользователя.</a:t>
             </a:r>
           </a:p>
           <a:p>
@@ -3714,7 +3694,7 @@
                 <a:latin typeface="Times New Roman" panose="02020603050405020304" pitchFamily="18" charset="0"/>
                 <a:cs typeface="Times New Roman" panose="02020603050405020304" pitchFamily="18" charset="0"/>
               </a:rPr>
-              <a:t>описать работу системы распознавания усталости пользователя АРМ.</a:t>
+              <a:t>описать работу системы распознавания усталости (СРУ) пользователя АРМ.</a:t>
             </a:r>
           </a:p>
         </p:txBody>
@@ -3839,7 +3819,7 @@
                 <a:latin typeface="Times New Roman" panose="02020603050405020304" pitchFamily="18" charset="0"/>
                 <a:cs typeface="Times New Roman" panose="02020603050405020304" pitchFamily="18" charset="0"/>
               </a:rPr>
-              <a:t>Усталостью является затруднение в инициировании и поддержании активности вследствие отсутствия энергии, которое сопровождается желанием отдохнуть.</a:t>
+              <a:t>Усталостью называется затруднение в инициировании и поддержании активности вследствие отсутствия энергии, которое сопровождается желанием отдохнуть.</a:t>
             </a:r>
           </a:p>
           <a:p>

</xml_diff>

<commit_message>
FIX: fixes in text
</commit_message>
<xml_diff>
--- a/Presentation/presentation.pptx
+++ b/Presentation/presentation.pptx
@@ -8,8 +8,10 @@
     <p:sldId id="256" r:id="rId2"/>
     <p:sldId id="257" r:id="rId3"/>
     <p:sldId id="266" r:id="rId4"/>
-    <p:sldId id="270" r:id="rId5"/>
-    <p:sldId id="269" r:id="rId6"/>
+    <p:sldId id="269" r:id="rId5"/>
+    <p:sldId id="270" r:id="rId6"/>
+    <p:sldId id="273" r:id="rId7"/>
+    <p:sldId id="272" r:id="rId8"/>
   </p:sldIdLst>
   <p:sldSz cx="12192000" cy="6858000"/>
   <p:notesSz cx="6858000" cy="9144000"/>
@@ -263,7 +265,7 @@
           <a:p>
             <a:fld id="{A0EE6EE7-36DE-4D2C-AF3C-F3A52CFDA6D2}" type="datetimeFigureOut">
               <a:rPr lang="ru-RU" smtClean="0"/>
-              <a:t>05.12.2021</a:t>
+              <a:t>09.12.2021</a:t>
             </a:fld>
             <a:endParaRPr lang="ru-RU"/>
           </a:p>
@@ -461,7 +463,7 @@
           <a:p>
             <a:fld id="{A0EE6EE7-36DE-4D2C-AF3C-F3A52CFDA6D2}" type="datetimeFigureOut">
               <a:rPr lang="ru-RU" smtClean="0"/>
-              <a:t>05.12.2021</a:t>
+              <a:t>09.12.2021</a:t>
             </a:fld>
             <a:endParaRPr lang="ru-RU"/>
           </a:p>
@@ -669,7 +671,7 @@
           <a:p>
             <a:fld id="{A0EE6EE7-36DE-4D2C-AF3C-F3A52CFDA6D2}" type="datetimeFigureOut">
               <a:rPr lang="ru-RU" smtClean="0"/>
-              <a:t>05.12.2021</a:t>
+              <a:t>09.12.2021</a:t>
             </a:fld>
             <a:endParaRPr lang="ru-RU"/>
           </a:p>
@@ -867,7 +869,7 @@
           <a:p>
             <a:fld id="{A0EE6EE7-36DE-4D2C-AF3C-F3A52CFDA6D2}" type="datetimeFigureOut">
               <a:rPr lang="ru-RU" smtClean="0"/>
-              <a:t>05.12.2021</a:t>
+              <a:t>09.12.2021</a:t>
             </a:fld>
             <a:endParaRPr lang="ru-RU"/>
           </a:p>
@@ -1142,7 +1144,7 @@
           <a:p>
             <a:fld id="{A0EE6EE7-36DE-4D2C-AF3C-F3A52CFDA6D2}" type="datetimeFigureOut">
               <a:rPr lang="ru-RU" smtClean="0"/>
-              <a:t>05.12.2021</a:t>
+              <a:t>09.12.2021</a:t>
             </a:fld>
             <a:endParaRPr lang="ru-RU"/>
           </a:p>
@@ -1407,7 +1409,7 @@
           <a:p>
             <a:fld id="{A0EE6EE7-36DE-4D2C-AF3C-F3A52CFDA6D2}" type="datetimeFigureOut">
               <a:rPr lang="ru-RU" smtClean="0"/>
-              <a:t>05.12.2021</a:t>
+              <a:t>09.12.2021</a:t>
             </a:fld>
             <a:endParaRPr lang="ru-RU"/>
           </a:p>
@@ -1819,7 +1821,7 @@
           <a:p>
             <a:fld id="{A0EE6EE7-36DE-4D2C-AF3C-F3A52CFDA6D2}" type="datetimeFigureOut">
               <a:rPr lang="ru-RU" smtClean="0"/>
-              <a:t>05.12.2021</a:t>
+              <a:t>09.12.2021</a:t>
             </a:fld>
             <a:endParaRPr lang="ru-RU"/>
           </a:p>
@@ -1960,7 +1962,7 @@
           <a:p>
             <a:fld id="{A0EE6EE7-36DE-4D2C-AF3C-F3A52CFDA6D2}" type="datetimeFigureOut">
               <a:rPr lang="ru-RU" smtClean="0"/>
-              <a:t>05.12.2021</a:t>
+              <a:t>09.12.2021</a:t>
             </a:fld>
             <a:endParaRPr lang="ru-RU"/>
           </a:p>
@@ -2073,7 +2075,7 @@
           <a:p>
             <a:fld id="{A0EE6EE7-36DE-4D2C-AF3C-F3A52CFDA6D2}" type="datetimeFigureOut">
               <a:rPr lang="ru-RU" smtClean="0"/>
-              <a:t>05.12.2021</a:t>
+              <a:t>09.12.2021</a:t>
             </a:fld>
             <a:endParaRPr lang="ru-RU"/>
           </a:p>
@@ -2384,7 +2386,7 @@
           <a:p>
             <a:fld id="{A0EE6EE7-36DE-4D2C-AF3C-F3A52CFDA6D2}" type="datetimeFigureOut">
               <a:rPr lang="ru-RU" smtClean="0"/>
-              <a:t>05.12.2021</a:t>
+              <a:t>09.12.2021</a:t>
             </a:fld>
             <a:endParaRPr lang="ru-RU"/>
           </a:p>
@@ -2672,7 +2674,7 @@
           <a:p>
             <a:fld id="{A0EE6EE7-36DE-4D2C-AF3C-F3A52CFDA6D2}" type="datetimeFigureOut">
               <a:rPr lang="ru-RU" smtClean="0"/>
-              <a:t>05.12.2021</a:t>
+              <a:t>09.12.2021</a:t>
             </a:fld>
             <a:endParaRPr lang="ru-RU"/>
           </a:p>
@@ -2913,7 +2915,7 @@
           <a:p>
             <a:fld id="{A0EE6EE7-36DE-4D2C-AF3C-F3A52CFDA6D2}" type="datetimeFigureOut">
               <a:rPr lang="ru-RU" smtClean="0"/>
-              <a:t>05.12.2021</a:t>
+              <a:t>09.12.2021</a:t>
             </a:fld>
             <a:endParaRPr lang="ru-RU"/>
           </a:p>
@@ -3577,11 +3579,25 @@
               <a:buNone/>
             </a:pPr>
             <a:r>
+              <a:rPr lang="ru-RU" sz="2400" b="1" dirty="0">
+                <a:latin typeface="Times New Roman" panose="02020603050405020304" pitchFamily="18" charset="0"/>
+                <a:cs typeface="Times New Roman" panose="02020603050405020304" pitchFamily="18" charset="0"/>
+              </a:rPr>
+              <a:t>Цель </a:t>
+            </a:r>
+            <a:r>
               <a:rPr lang="ru-RU" sz="2400" dirty="0">
                 <a:latin typeface="Times New Roman" panose="02020603050405020304" pitchFamily="18" charset="0"/>
                 <a:cs typeface="Times New Roman" panose="02020603050405020304" pitchFamily="18" charset="0"/>
               </a:rPr>
-              <a:t>Описать значимость и проблематику методов распознавания усталости на автоматизированном рабочем месте (АРМ) по характеристикам и действиям пользователя.</a:t>
+              <a:t>– описать проблематику стресса на рабочем месте и метод распознавания усталости пользователя на автоматизированном рабочем месте (АРМ) с использованием доступных технологий определения усталости, построенных на анализе отдельных характеристик и действий.</a:t>
+            </a:r>
+            <a:r>
+              <a:rPr lang="ru-RU" sz="2400" b="1" dirty="0">
+                <a:latin typeface="Times New Roman" panose="02020603050405020304" pitchFamily="18" charset="0"/>
+                <a:cs typeface="Times New Roman" panose="02020603050405020304" pitchFamily="18" charset="0"/>
+              </a:rPr>
+              <a:t> </a:t>
             </a:r>
           </a:p>
           <a:p>
@@ -3589,31 +3605,11 @@
               <a:buNone/>
             </a:pPr>
             <a:r>
-              <a:rPr lang="ru-RU" sz="2400" dirty="0">
-                <a:latin typeface="Times New Roman" panose="02020603050405020304" pitchFamily="18" charset="0"/>
-                <a:cs typeface="Times New Roman" panose="02020603050405020304" pitchFamily="18" charset="0"/>
-              </a:rPr>
-              <a:t>Для достижения поставленной цели потребуется:</a:t>
-            </a:r>
-          </a:p>
-          <a:p>
-            <a:pPr marL="514350" indent="-514350" algn="just">
-              <a:buFont typeface="+mj-lt"/>
-              <a:buAutoNum type="arabicParenR"/>
-            </a:pPr>
-            <a:r>
-              <a:rPr lang="ru-RU" sz="2400" dirty="0">
-                <a:latin typeface="Times New Roman" panose="02020603050405020304" pitchFamily="18" charset="0"/>
-                <a:cs typeface="Times New Roman" panose="02020603050405020304" pitchFamily="18" charset="0"/>
-              </a:rPr>
-              <a:t>описать термины предметной области и обозначить проблему</a:t>
-            </a:r>
-            <a:r>
-              <a:rPr lang="en-US" sz="2400" dirty="0">
-                <a:latin typeface="Times New Roman" panose="02020603050405020304" pitchFamily="18" charset="0"/>
-                <a:cs typeface="Times New Roman" panose="02020603050405020304" pitchFamily="18" charset="0"/>
-              </a:rPr>
-              <a:t>;</a:t>
+              <a:rPr lang="ru-RU" sz="2400" b="1" dirty="0">
+                <a:latin typeface="Times New Roman" panose="02020603050405020304" pitchFamily="18" charset="0"/>
+                <a:cs typeface="Times New Roman" panose="02020603050405020304" pitchFamily="18" charset="0"/>
+              </a:rPr>
+              <a:t>Задачи:</a:t>
             </a:r>
             <a:endParaRPr lang="ru-RU" sz="2400" dirty="0">
               <a:latin typeface="Times New Roman" panose="02020603050405020304" pitchFamily="18" charset="0"/>
@@ -3621,36 +3617,13 @@
             </a:endParaRPr>
           </a:p>
           <a:p>
-            <a:pPr marL="514350" indent="-514350" algn="just">
-              <a:buFont typeface="+mj-lt"/>
-              <a:buAutoNum type="arabicParenR"/>
-            </a:pPr>
+            <a:pPr algn="just"/>
             <a:r>
               <a:rPr lang="ru-RU" sz="2400" dirty="0">
                 <a:latin typeface="Times New Roman" panose="02020603050405020304" pitchFamily="18" charset="0"/>
                 <a:cs typeface="Times New Roman" panose="02020603050405020304" pitchFamily="18" charset="0"/>
               </a:rPr>
-              <a:t>провести анализ существующих методов определения усталости человека</a:t>
-            </a:r>
-            <a:r>
-              <a:rPr lang="en-US" sz="2400" dirty="0">
-                <a:latin typeface="Times New Roman" panose="02020603050405020304" pitchFamily="18" charset="0"/>
-                <a:cs typeface="Times New Roman" panose="02020603050405020304" pitchFamily="18" charset="0"/>
-              </a:rPr>
-              <a:t>;</a:t>
-            </a:r>
-          </a:p>
-          <a:p>
-            <a:pPr marL="514350" indent="-514350" algn="just">
-              <a:buFont typeface="+mj-lt"/>
-              <a:buAutoNum type="arabicParenR"/>
-            </a:pPr>
-            <a:r>
-              <a:rPr lang="ru-RU" sz="2400" dirty="0">
-                <a:latin typeface="Times New Roman" panose="02020603050405020304" pitchFamily="18" charset="0"/>
-                <a:cs typeface="Times New Roman" panose="02020603050405020304" pitchFamily="18" charset="0"/>
-              </a:rPr>
-              <a:t>провести анализ действий и характеристик, позволяющих определить усталость пользователя АРМ</a:t>
+              <a:t>описать термины предметной области и обозначить проблему</a:t>
             </a:r>
             <a:r>
               <a:rPr lang="en-US" sz="2400" dirty="0">
@@ -3665,15 +3638,50 @@
             </a:endParaRPr>
           </a:p>
           <a:p>
-            <a:pPr marL="514350" indent="-514350" algn="just">
-              <a:buFont typeface="+mj-lt"/>
-              <a:buAutoNum type="arabicParenR"/>
-            </a:pPr>
+            <a:pPr algn="just"/>
             <a:r>
               <a:rPr lang="ru-RU" sz="2400" dirty="0">
                 <a:latin typeface="Times New Roman" panose="02020603050405020304" pitchFamily="18" charset="0"/>
                 <a:cs typeface="Times New Roman" panose="02020603050405020304" pitchFamily="18" charset="0"/>
               </a:rPr>
+              <a:t>провести анализ существующих методов определения усталости</a:t>
+            </a:r>
+            <a:r>
+              <a:rPr lang="en-US" sz="2400" dirty="0">
+                <a:latin typeface="Times New Roman" panose="02020603050405020304" pitchFamily="18" charset="0"/>
+                <a:cs typeface="Times New Roman" panose="02020603050405020304" pitchFamily="18" charset="0"/>
+              </a:rPr>
+              <a:t>;</a:t>
+            </a:r>
+          </a:p>
+          <a:p>
+            <a:pPr algn="just"/>
+            <a:r>
+              <a:rPr lang="ru-RU" sz="2400" dirty="0">
+                <a:latin typeface="Times New Roman" panose="02020603050405020304" pitchFamily="18" charset="0"/>
+                <a:cs typeface="Times New Roman" panose="02020603050405020304" pitchFamily="18" charset="0"/>
+              </a:rPr>
+              <a:t>провести анализ действий и характеристик, позволяющих определить усталость пользователя АРМ</a:t>
+            </a:r>
+            <a:r>
+              <a:rPr lang="en-US" sz="2400" dirty="0">
+                <a:latin typeface="Times New Roman" panose="02020603050405020304" pitchFamily="18" charset="0"/>
+                <a:cs typeface="Times New Roman" panose="02020603050405020304" pitchFamily="18" charset="0"/>
+              </a:rPr>
+              <a:t>;</a:t>
+            </a:r>
+            <a:endParaRPr lang="ru-RU" sz="2400" dirty="0">
+              <a:latin typeface="Times New Roman" panose="02020603050405020304" pitchFamily="18" charset="0"/>
+              <a:cs typeface="Times New Roman" panose="02020603050405020304" pitchFamily="18" charset="0"/>
+            </a:endParaRPr>
+          </a:p>
+          <a:p>
+            <a:pPr algn="just"/>
+            <a:r>
+              <a:rPr lang="ru-RU" sz="2400" dirty="0">
+                <a:latin typeface="Times New Roman" panose="02020603050405020304" pitchFamily="18" charset="0"/>
+                <a:cs typeface="Times New Roman" panose="02020603050405020304" pitchFamily="18" charset="0"/>
+              </a:rPr>
               <a:t>определить методы снятия выделенных действий и характеристик</a:t>
             </a:r>
             <a:r>
@@ -3685,10 +3693,7 @@
             </a:r>
           </a:p>
           <a:p>
-            <a:pPr marL="514350" indent="-514350" algn="just">
-              <a:buFont typeface="+mj-lt"/>
-              <a:buAutoNum type="arabicParenR"/>
-            </a:pPr>
+            <a:pPr algn="just"/>
             <a:r>
               <a:rPr lang="ru-RU" sz="2400" dirty="0">
                 <a:latin typeface="Times New Roman" panose="02020603050405020304" pitchFamily="18" charset="0"/>
@@ -3808,7 +3813,9 @@
         </p:nvSpPr>
         <p:spPr/>
         <p:txBody>
-          <a:bodyPr/>
+          <a:bodyPr>
+            <a:normAutofit fontScale="92500" lnSpcReduction="10000"/>
+          </a:bodyPr>
           <a:lstStyle/>
           <a:p>
             <a:pPr marL="0" indent="0" algn="just">
@@ -3819,8 +3826,19 @@
                 <a:latin typeface="Times New Roman" panose="02020603050405020304" pitchFamily="18" charset="0"/>
                 <a:cs typeface="Times New Roman" panose="02020603050405020304" pitchFamily="18" charset="0"/>
               </a:rPr>
-              <a:t>Усталостью называется затруднение в инициировании и поддержании активности вследствие отсутствия энергии, которое сопровождается желанием отдохнуть.</a:t>
-            </a:r>
+              <a:t>Усталость – ощущение физической усталости и отсутствия энергии, которое нарушает повседневную физическую и социальную жизнь, не связанное с умственным переутомлением, депрессией, сонливостью, нарушением двигательных функций. </a:t>
+            </a:r>
+            <a:r>
+              <a:rPr lang="en-US" dirty="0">
+                <a:latin typeface="Times New Roman" panose="02020603050405020304" pitchFamily="18" charset="0"/>
+                <a:cs typeface="Times New Roman" panose="02020603050405020304" pitchFamily="18" charset="0"/>
+              </a:rPr>
+              <a:t>[1]</a:t>
+            </a:r>
+            <a:endParaRPr lang="ru-RU" dirty="0">
+              <a:latin typeface="Times New Roman" panose="02020603050405020304" pitchFamily="18" charset="0"/>
+              <a:cs typeface="Times New Roman" panose="02020603050405020304" pitchFamily="18" charset="0"/>
+            </a:endParaRPr>
           </a:p>
           <a:p>
             <a:pPr marL="0" indent="0" algn="just">
@@ -3831,8 +3849,47 @@
                 <a:latin typeface="Times New Roman" panose="02020603050405020304" pitchFamily="18" charset="0"/>
                 <a:cs typeface="Times New Roman" panose="02020603050405020304" pitchFamily="18" charset="0"/>
               </a:rPr>
-              <a:t>Синдром хронической усталости – заболевание, характеризующееся необъяснимым чувством выраженной слабости, длящейся более 6 месяц.</a:t>
-            </a:r>
+              <a:t>Синдром хронической усталости (СХУ) </a:t>
+            </a:r>
+            <a:r>
+              <a:rPr lang="en-US" dirty="0">
+                <a:latin typeface="Times New Roman" panose="02020603050405020304" pitchFamily="18" charset="0"/>
+                <a:cs typeface="Times New Roman" panose="02020603050405020304" pitchFamily="18" charset="0"/>
+              </a:rPr>
+              <a:t>–</a:t>
+            </a:r>
+            <a:r>
+              <a:rPr lang="ru-RU" dirty="0">
+                <a:latin typeface="Times New Roman" panose="02020603050405020304" pitchFamily="18" charset="0"/>
+                <a:cs typeface="Times New Roman" panose="02020603050405020304" pitchFamily="18" charset="0"/>
+              </a:rPr>
+              <a:t> это </a:t>
+            </a:r>
+            <a:r>
+              <a:rPr lang="ru-RU" dirty="0" err="1">
+                <a:latin typeface="Times New Roman" panose="02020603050405020304" pitchFamily="18" charset="0"/>
+                <a:cs typeface="Times New Roman" panose="02020603050405020304" pitchFamily="18" charset="0"/>
+              </a:rPr>
+              <a:t>инвалидизирующее</a:t>
+            </a:r>
+            <a:r>
+              <a:rPr lang="ru-RU" dirty="0">
+                <a:latin typeface="Times New Roman" panose="02020603050405020304" pitchFamily="18" charset="0"/>
+                <a:cs typeface="Times New Roman" panose="02020603050405020304" pitchFamily="18" charset="0"/>
+              </a:rPr>
+              <a:t> клиническое состояние, которое характеризуется стойкой усталостью после физических нагрузок, и сопровождающееся симптомами, связанными с когнитивной, иммунологической, эндокринологической и автономной дисфункцией.  </a:t>
+            </a:r>
+            <a:r>
+              <a:rPr lang="en-US" dirty="0">
+                <a:latin typeface="Times New Roman" panose="02020603050405020304" pitchFamily="18" charset="0"/>
+                <a:cs typeface="Times New Roman" panose="02020603050405020304" pitchFamily="18" charset="0"/>
+              </a:rPr>
+              <a:t>[2]</a:t>
+            </a:r>
+            <a:endParaRPr lang="ru-RU" dirty="0">
+              <a:latin typeface="Times New Roman" panose="02020603050405020304" pitchFamily="18" charset="0"/>
+              <a:cs typeface="Times New Roman" panose="02020603050405020304" pitchFamily="18" charset="0"/>
+            </a:endParaRPr>
           </a:p>
           <a:p>
             <a:pPr marL="0" indent="0" algn="just">
@@ -3843,8 +3900,33 @@
                 <a:latin typeface="Times New Roman" panose="02020603050405020304" pitchFamily="18" charset="0"/>
                 <a:cs typeface="Times New Roman" panose="02020603050405020304" pitchFamily="18" charset="0"/>
               </a:rPr>
-              <a:t>Стресс – это состояние организма, характеризующееся эмоциональным и физическим напряжением, вызванным воздействием различных неблагоприятных факторов.</a:t>
-            </a:r>
+              <a:t>Стресс </a:t>
+            </a:r>
+            <a:r>
+              <a:rPr lang="en-US" dirty="0">
+                <a:latin typeface="Times New Roman" panose="02020603050405020304" pitchFamily="18" charset="0"/>
+                <a:cs typeface="Times New Roman" panose="02020603050405020304" pitchFamily="18" charset="0"/>
+              </a:rPr>
+              <a:t>–</a:t>
+            </a:r>
+            <a:r>
+              <a:rPr lang="ru-RU" dirty="0">
+                <a:latin typeface="Times New Roman" panose="02020603050405020304" pitchFamily="18" charset="0"/>
+                <a:cs typeface="Times New Roman" panose="02020603050405020304" pitchFamily="18" charset="0"/>
+              </a:rPr>
+              <a:t> это реакция человеческого организма на неблагоприятные воздействия внешней среды, которая носит психофизиологический характер. </a:t>
+            </a:r>
+            <a:r>
+              <a:rPr lang="en-US" dirty="0">
+                <a:latin typeface="Times New Roman" panose="02020603050405020304" pitchFamily="18" charset="0"/>
+                <a:cs typeface="Times New Roman" panose="02020603050405020304" pitchFamily="18" charset="0"/>
+              </a:rPr>
+              <a:t>[3]</a:t>
+            </a:r>
+            <a:endParaRPr lang="ru-RU" dirty="0">
+              <a:latin typeface="Times New Roman" panose="02020603050405020304" pitchFamily="18" charset="0"/>
+              <a:cs typeface="Times New Roman" panose="02020603050405020304" pitchFamily="18" charset="0"/>
+            </a:endParaRPr>
           </a:p>
         </p:txBody>
       </p:sp>
@@ -3912,7 +3994,7 @@
           <p:cNvPr id="2" name="Заголовок 1">
             <a:extLst>
               <a:ext uri="{FF2B5EF4-FFF2-40B4-BE49-F238E27FC236}">
-                <a16:creationId xmlns:a16="http://schemas.microsoft.com/office/drawing/2014/main" id="{A8A78197-F0E5-482A-9DF3-DA7661662131}"/>
+                <a16:creationId xmlns:a16="http://schemas.microsoft.com/office/drawing/2014/main" id="{49B0E010-6F7E-45E0-ADC8-2BF59398400B}"/>
               </a:ext>
             </a:extLst>
           </p:cNvPr>
@@ -3923,12 +4005,7 @@
             <p:ph type="title"/>
           </p:nvPr>
         </p:nvSpPr>
-        <p:spPr>
-          <a:xfrm>
-            <a:off x="838200" y="0"/>
-            <a:ext cx="10515600" cy="1325563"/>
-          </a:xfrm>
-        </p:spPr>
+        <p:spPr/>
         <p:txBody>
           <a:bodyPr/>
           <a:lstStyle/>
@@ -3939,7 +4016,7 @@
                 <a:latin typeface="Times New Roman" panose="02020603050405020304" pitchFamily="18" charset="0"/>
                 <a:cs typeface="Times New Roman" panose="02020603050405020304" pitchFamily="18" charset="0"/>
               </a:rPr>
-              <a:t>Стресс на рабочем месте</a:t>
+              <a:t>Стадии стрессовой реакции</a:t>
             </a:r>
           </a:p>
         </p:txBody>
@@ -3949,7 +4026,7 @@
           <p:cNvPr id="4" name="Номер слайда 3">
             <a:extLst>
               <a:ext uri="{FF2B5EF4-FFF2-40B4-BE49-F238E27FC236}">
-                <a16:creationId xmlns:a16="http://schemas.microsoft.com/office/drawing/2014/main" id="{91DF3383-A895-4B0B-9937-2AAF01F676C3}"/>
+                <a16:creationId xmlns:a16="http://schemas.microsoft.com/office/drawing/2014/main" id="{B53C015B-F70F-4212-9519-6C44C1671A13}"/>
               </a:ext>
             </a:extLst>
           </p:cNvPr>
@@ -3969,720 +4046,10 @@
               <a:rPr lang="ru-RU" smtClean="0"/>
               <a:t>4</a:t>
             </a:fld>
-            <a:endParaRPr lang="ru-RU" dirty="0"/>
-          </a:p>
-        </p:txBody>
-      </p:sp>
-      <p:graphicFrame>
-        <p:nvGraphicFramePr>
-          <p:cNvPr id="5" name="Таблица 5">
-            <a:extLst>
-              <a:ext uri="{FF2B5EF4-FFF2-40B4-BE49-F238E27FC236}">
-                <a16:creationId xmlns:a16="http://schemas.microsoft.com/office/drawing/2014/main" id="{02B8C3A1-0097-46F3-BF8F-AC58662B1ABF}"/>
-              </a:ext>
-            </a:extLst>
-          </p:cNvPr>
-          <p:cNvGraphicFramePr>
-            <a:graphicFrameLocks noGrp="1"/>
-          </p:cNvGraphicFramePr>
-          <p:nvPr/>
-        </p:nvGraphicFramePr>
-        <p:xfrm>
-          <a:off x="0" y="1032718"/>
-          <a:ext cx="12192000" cy="5323630"/>
-        </p:xfrm>
-        <a:graphic>
-          <a:graphicData uri="http://schemas.openxmlformats.org/drawingml/2006/table">
-            <a:tbl>
-              <a:tblPr firstRow="1" bandRow="1">
-                <a:tableStyleId>{073A0DAA-6AF3-43AB-8588-CEC1D06C72B9}</a:tableStyleId>
-              </a:tblPr>
-              <a:tblGrid>
-                <a:gridCol w="3775910">
-                  <a:extLst>
-                    <a:ext uri="{9D8B030D-6E8A-4147-A177-3AD203B41FA5}">
-                      <a16:colId xmlns:a16="http://schemas.microsoft.com/office/drawing/2014/main" val="1383018408"/>
-                    </a:ext>
-                  </a:extLst>
-                </a:gridCol>
-                <a:gridCol w="8416090">
-                  <a:extLst>
-                    <a:ext uri="{9D8B030D-6E8A-4147-A177-3AD203B41FA5}">
-                      <a16:colId xmlns:a16="http://schemas.microsoft.com/office/drawing/2014/main" val="1099064396"/>
-                    </a:ext>
-                  </a:extLst>
-                </a:gridCol>
-              </a:tblGrid>
-              <a:tr h="368620">
-                <a:tc>
-                  <a:txBody>
-                    <a:bodyPr/>
-                    <a:lstStyle/>
-                    <a:p>
-                      <a:pPr algn="just"/>
-                      <a:r>
-                        <a:rPr lang="ru-RU" sz="1400" b="1" dirty="0">
-                          <a:effectLst/>
-                          <a:latin typeface="Times New Roman" panose="02020603050405020304" pitchFamily="18" charset="0"/>
-                          <a:cs typeface="Times New Roman" panose="02020603050405020304" pitchFamily="18" charset="0"/>
-                        </a:rPr>
-                        <a:t>Источник</a:t>
-                      </a:r>
-                    </a:p>
-                  </a:txBody>
-                  <a:tcPr/>
-                </a:tc>
-                <a:tc>
-                  <a:txBody>
-                    <a:bodyPr/>
-                    <a:lstStyle/>
-                    <a:p>
-                      <a:pPr algn="just"/>
-                      <a:r>
-                        <a:rPr lang="ru-RU" sz="1400" b="1" dirty="0">
-                          <a:effectLst/>
-                          <a:latin typeface="Times New Roman" panose="02020603050405020304" pitchFamily="18" charset="0"/>
-                          <a:cs typeface="Times New Roman" panose="02020603050405020304" pitchFamily="18" charset="0"/>
-                        </a:rPr>
-                        <a:t>Примеры</a:t>
-                      </a:r>
-                    </a:p>
-                  </a:txBody>
-                  <a:tcPr/>
-                </a:tc>
-                <a:extLst>
-                  <a:ext uri="{0D108BD9-81ED-4DB2-BD59-A6C34878D82A}">
-                    <a16:rowId xmlns:a16="http://schemas.microsoft.com/office/drawing/2014/main" val="3018537188"/>
-                  </a:ext>
-                </a:extLst>
-              </a:tr>
-              <a:tr h="781951">
-                <a:tc>
-                  <a:txBody>
-                    <a:bodyPr/>
-                    <a:lstStyle/>
-                    <a:p>
-                      <a:pPr algn="just"/>
-                      <a:r>
-                        <a:rPr lang="ru-RU" sz="1400" b="0" dirty="0">
-                          <a:effectLst/>
-                          <a:latin typeface="Times New Roman" panose="02020603050405020304" pitchFamily="18" charset="0"/>
-                          <a:cs typeface="Times New Roman" panose="02020603050405020304" pitchFamily="18" charset="0"/>
-                        </a:rPr>
-                        <a:t>Режим трудовой деятельности</a:t>
-                      </a:r>
-                    </a:p>
-                  </a:txBody>
-                  <a:tcPr/>
-                </a:tc>
-                <a:tc>
-                  <a:txBody>
-                    <a:bodyPr/>
-                    <a:lstStyle/>
-                    <a:p>
-                      <a:pPr marL="285750" indent="-285750" algn="just">
-                        <a:buFont typeface="Arial" panose="020B0604020202020204" pitchFamily="34" charset="0"/>
-                        <a:buChar char="•"/>
-                      </a:pPr>
-                      <a:r>
-                        <a:rPr lang="ru-RU" sz="1400" b="0" dirty="0">
-                          <a:effectLst/>
-                          <a:latin typeface="Times New Roman" panose="02020603050405020304" pitchFamily="18" charset="0"/>
-                          <a:cs typeface="Times New Roman" panose="02020603050405020304" pitchFamily="18" charset="0"/>
-                        </a:rPr>
-                        <a:t>плохие условия труда,</a:t>
-                      </a:r>
-                    </a:p>
-                    <a:p>
-                      <a:pPr marL="285750" indent="-285750" algn="just">
-                        <a:buFont typeface="Arial" panose="020B0604020202020204" pitchFamily="34" charset="0"/>
-                        <a:buChar char="•"/>
-                      </a:pPr>
-                      <a:r>
-                        <a:rPr lang="ru-RU" sz="1400" b="0" dirty="0">
-                          <a:effectLst/>
-                          <a:latin typeface="Times New Roman" panose="02020603050405020304" pitchFamily="18" charset="0"/>
-                          <a:cs typeface="Times New Roman" panose="02020603050405020304" pitchFamily="18" charset="0"/>
-                        </a:rPr>
-                        <a:t>слишком интенсивный режим деятельности,</a:t>
-                      </a:r>
-                    </a:p>
-                    <a:p>
-                      <a:pPr marL="285750" indent="-285750" algn="just">
-                        <a:buFont typeface="Arial" panose="020B0604020202020204" pitchFamily="34" charset="0"/>
-                        <a:buChar char="•"/>
-                      </a:pPr>
-                      <a:r>
-                        <a:rPr lang="ru-RU" sz="1400" b="0" dirty="0">
-                          <a:effectLst/>
-                          <a:latin typeface="Times New Roman" panose="02020603050405020304" pitchFamily="18" charset="0"/>
-                          <a:cs typeface="Times New Roman" panose="02020603050405020304" pitchFamily="18" charset="0"/>
-                        </a:rPr>
-                        <a:t>нехватка времени.</a:t>
-                      </a:r>
-                    </a:p>
-                  </a:txBody>
-                  <a:tcPr/>
-                </a:tc>
-                <a:extLst>
-                  <a:ext uri="{0D108BD9-81ED-4DB2-BD59-A6C34878D82A}">
-                    <a16:rowId xmlns:a16="http://schemas.microsoft.com/office/drawing/2014/main" val="3262333981"/>
-                  </a:ext>
-                </a:extLst>
-              </a:tr>
-              <a:tr h="1010020">
-                <a:tc>
-                  <a:txBody>
-                    <a:bodyPr/>
-                    <a:lstStyle/>
-                    <a:p>
-                      <a:pPr algn="just"/>
-                      <a:r>
-                        <a:rPr lang="ru-RU" sz="1400" b="0" dirty="0">
-                          <a:effectLst/>
-                          <a:latin typeface="Times New Roman" panose="02020603050405020304" pitchFamily="18" charset="0"/>
-                          <a:cs typeface="Times New Roman" panose="02020603050405020304" pitchFamily="18" charset="0"/>
-                        </a:rPr>
-                        <a:t>Роль работника в организации</a:t>
-                      </a:r>
-                    </a:p>
-                  </a:txBody>
-                  <a:tcPr/>
-                </a:tc>
-                <a:tc>
-                  <a:txBody>
-                    <a:bodyPr/>
-                    <a:lstStyle/>
-                    <a:p>
-                      <a:pPr marL="285750" indent="-285750" algn="just">
-                        <a:buFont typeface="Arial" panose="020B0604020202020204" pitchFamily="34" charset="0"/>
-                        <a:buChar char="•"/>
-                      </a:pPr>
-                      <a:r>
-                        <a:rPr lang="ru-RU" sz="1400" b="0" dirty="0">
-                          <a:effectLst/>
-                          <a:latin typeface="Times New Roman" panose="02020603050405020304" pitchFamily="18" charset="0"/>
-                          <a:cs typeface="Times New Roman" panose="02020603050405020304" pitchFamily="18" charset="0"/>
-                        </a:rPr>
-                        <a:t>ролевые конфликты,</a:t>
-                      </a:r>
-                    </a:p>
-                    <a:p>
-                      <a:pPr marL="285750" indent="-285750" algn="just">
-                        <a:buFont typeface="Arial" panose="020B0604020202020204" pitchFamily="34" charset="0"/>
-                        <a:buChar char="•"/>
-                      </a:pPr>
-                      <a:r>
-                        <a:rPr lang="ru-RU" sz="1400" b="0" dirty="0">
-                          <a:effectLst/>
-                          <a:latin typeface="Times New Roman" panose="02020603050405020304" pitchFamily="18" charset="0"/>
-                          <a:cs typeface="Times New Roman" panose="02020603050405020304" pitchFamily="18" charset="0"/>
-                        </a:rPr>
-                        <a:t>повышенная ответственность,</a:t>
-                      </a:r>
-                    </a:p>
-                    <a:p>
-                      <a:pPr marL="285750" indent="-285750" algn="just">
-                        <a:buFont typeface="Arial" panose="020B0604020202020204" pitchFamily="34" charset="0"/>
-                        <a:buChar char="•"/>
-                      </a:pPr>
-                      <a:r>
-                        <a:rPr lang="ru-RU" sz="1400" b="0" dirty="0">
-                          <a:effectLst/>
-                          <a:latin typeface="Times New Roman" panose="02020603050405020304" pitchFamily="18" charset="0"/>
-                          <a:cs typeface="Times New Roman" panose="02020603050405020304" pitchFamily="18" charset="0"/>
-                        </a:rPr>
-                        <a:t>недостаток полномочий,</a:t>
-                      </a:r>
-                    </a:p>
-                    <a:p>
-                      <a:pPr marL="285750" indent="-285750" algn="just">
-                        <a:buFont typeface="Arial" panose="020B0604020202020204" pitchFamily="34" charset="0"/>
-                        <a:buChar char="•"/>
-                      </a:pPr>
-                      <a:r>
-                        <a:rPr lang="ru-RU" sz="1400" b="0" dirty="0">
-                          <a:effectLst/>
-                          <a:latin typeface="Times New Roman" panose="02020603050405020304" pitchFamily="18" charset="0"/>
-                          <a:cs typeface="Times New Roman" panose="02020603050405020304" pitchFamily="18" charset="0"/>
-                        </a:rPr>
-                        <a:t>ролевая неопределённость.</a:t>
-                      </a:r>
-                    </a:p>
-                  </a:txBody>
-                  <a:tcPr/>
-                </a:tc>
-                <a:extLst>
-                  <a:ext uri="{0D108BD9-81ED-4DB2-BD59-A6C34878D82A}">
-                    <a16:rowId xmlns:a16="http://schemas.microsoft.com/office/drawing/2014/main" val="3055950571"/>
-                  </a:ext>
-                </a:extLst>
-              </a:tr>
-              <a:tr h="589117">
-                <a:tc>
-                  <a:txBody>
-                    <a:bodyPr/>
-                    <a:lstStyle/>
-                    <a:p>
-                      <a:pPr algn="just"/>
-                      <a:r>
-                        <a:rPr lang="ru-RU" sz="1400" b="0" dirty="0">
-                          <a:effectLst/>
-                          <a:latin typeface="Times New Roman" panose="02020603050405020304" pitchFamily="18" charset="0"/>
-                          <a:cs typeface="Times New Roman" panose="02020603050405020304" pitchFamily="18" charset="0"/>
-                        </a:rPr>
-                        <a:t>Коммуникативные факторы</a:t>
-                      </a:r>
-                    </a:p>
-                  </a:txBody>
-                  <a:tcPr/>
-                </a:tc>
-                <a:tc>
-                  <a:txBody>
-                    <a:bodyPr/>
-                    <a:lstStyle/>
-                    <a:p>
-                      <a:pPr marL="285750" indent="-285750" algn="just">
-                        <a:buFont typeface="Arial" panose="020B0604020202020204" pitchFamily="34" charset="0"/>
-                        <a:buChar char="•"/>
-                      </a:pPr>
-                      <a:r>
-                        <a:rPr lang="ru-RU" sz="1400" b="0" dirty="0">
-                          <a:effectLst/>
-                          <a:latin typeface="Times New Roman" panose="02020603050405020304" pitchFamily="18" charset="0"/>
-                          <a:cs typeface="Times New Roman" panose="02020603050405020304" pitchFamily="18" charset="0"/>
-                        </a:rPr>
-                        <a:t>взаимоотношения с руководством, подчинёнными или коллегами,</a:t>
-                      </a:r>
-                    </a:p>
-                    <a:p>
-                      <a:pPr marL="285750" indent="-285750" algn="just">
-                        <a:buFont typeface="Arial" panose="020B0604020202020204" pitchFamily="34" charset="0"/>
-                        <a:buChar char="•"/>
-                      </a:pPr>
-                      <a:r>
-                        <a:rPr lang="ru-RU" sz="1400" b="0" dirty="0">
-                          <a:effectLst/>
-                          <a:latin typeface="Times New Roman" panose="02020603050405020304" pitchFamily="18" charset="0"/>
-                          <a:cs typeface="Times New Roman" panose="02020603050405020304" pitchFamily="18" charset="0"/>
-                        </a:rPr>
-                        <a:t>трудности делегирования полномочий.</a:t>
-                      </a:r>
-                    </a:p>
-                  </a:txBody>
-                  <a:tcPr/>
-                </a:tc>
-                <a:extLst>
-                  <a:ext uri="{0D108BD9-81ED-4DB2-BD59-A6C34878D82A}">
-                    <a16:rowId xmlns:a16="http://schemas.microsoft.com/office/drawing/2014/main" val="4046169263"/>
-                  </a:ext>
-                </a:extLst>
-              </a:tr>
-              <a:tr h="1010020">
-                <a:tc>
-                  <a:txBody>
-                    <a:bodyPr/>
-                    <a:lstStyle/>
-                    <a:p>
-                      <a:pPr algn="just"/>
-                      <a:r>
-                        <a:rPr lang="ru-RU" sz="1400" b="0" dirty="0">
-                          <a:effectLst/>
-                          <a:latin typeface="Times New Roman" panose="02020603050405020304" pitchFamily="18" charset="0"/>
-                          <a:cs typeface="Times New Roman" panose="02020603050405020304" pitchFamily="18" charset="0"/>
-                        </a:rPr>
-                        <a:t>Трудности построения деловой карьеры</a:t>
-                      </a:r>
-                    </a:p>
-                  </a:txBody>
-                  <a:tcPr/>
-                </a:tc>
-                <a:tc>
-                  <a:txBody>
-                    <a:bodyPr/>
-                    <a:lstStyle/>
-                    <a:p>
-                      <a:pPr marL="285750" indent="-285750" algn="just">
-                        <a:buFont typeface="Arial" panose="020B0604020202020204" pitchFamily="34" charset="0"/>
-                        <a:buChar char="•"/>
-                      </a:pPr>
-                      <a:r>
-                        <a:rPr lang="ru-RU" sz="1400" b="0" dirty="0">
-                          <a:effectLst/>
-                          <a:latin typeface="Times New Roman" panose="02020603050405020304" pitchFamily="18" charset="0"/>
-                          <a:cs typeface="Times New Roman" panose="02020603050405020304" pitchFamily="18" charset="0"/>
-                        </a:rPr>
-                        <a:t>неадекватный уровень притязаний,</a:t>
-                      </a:r>
-                    </a:p>
-                    <a:p>
-                      <a:pPr marL="285750" indent="-285750" algn="just">
-                        <a:buFont typeface="Arial" panose="020B0604020202020204" pitchFamily="34" charset="0"/>
-                        <a:buChar char="•"/>
-                      </a:pPr>
-                      <a:r>
-                        <a:rPr lang="ru-RU" sz="1400" b="0" dirty="0">
-                          <a:effectLst/>
-                          <a:latin typeface="Times New Roman" panose="02020603050405020304" pitchFamily="18" charset="0"/>
-                          <a:cs typeface="Times New Roman" panose="02020603050405020304" pitchFamily="18" charset="0"/>
-                        </a:rPr>
-                        <a:t>профессиональная неуспешность,</a:t>
-                      </a:r>
-                    </a:p>
-                    <a:p>
-                      <a:pPr marL="285750" indent="-285750" algn="just">
-                        <a:buFont typeface="Arial" panose="020B0604020202020204" pitchFamily="34" charset="0"/>
-                        <a:buChar char="•"/>
-                      </a:pPr>
-                      <a:r>
-                        <a:rPr lang="ru-RU" sz="1400" b="0" dirty="0">
-                          <a:effectLst/>
-                          <a:latin typeface="Times New Roman" panose="02020603050405020304" pitchFamily="18" charset="0"/>
-                          <a:cs typeface="Times New Roman" panose="02020603050405020304" pitchFamily="18" charset="0"/>
-                        </a:rPr>
-                        <a:t>слишком медленный или слишком быстрый карьерный рост,</a:t>
-                      </a:r>
-                    </a:p>
-                    <a:p>
-                      <a:pPr marL="285750" indent="-285750" algn="just">
-                        <a:buFont typeface="Arial" panose="020B0604020202020204" pitchFamily="34" charset="0"/>
-                        <a:buChar char="•"/>
-                      </a:pPr>
-                      <a:r>
-                        <a:rPr lang="ru-RU" sz="1400" b="0" dirty="0">
-                          <a:effectLst/>
-                          <a:latin typeface="Times New Roman" panose="02020603050405020304" pitchFamily="18" charset="0"/>
-                          <a:cs typeface="Times New Roman" panose="02020603050405020304" pitchFamily="18" charset="0"/>
-                        </a:rPr>
-                        <a:t>страх перед увольнением.</a:t>
-                      </a:r>
-                    </a:p>
-                  </a:txBody>
-                  <a:tcPr/>
-                </a:tc>
-                <a:extLst>
-                  <a:ext uri="{0D108BD9-81ED-4DB2-BD59-A6C34878D82A}">
-                    <a16:rowId xmlns:a16="http://schemas.microsoft.com/office/drawing/2014/main" val="532886314"/>
-                  </a:ext>
-                </a:extLst>
-              </a:tr>
-              <a:tr h="781951">
-                <a:tc>
-                  <a:txBody>
-                    <a:bodyPr/>
-                    <a:lstStyle/>
-                    <a:p>
-                      <a:pPr algn="just"/>
-                      <a:r>
-                        <a:rPr lang="ru-RU" sz="1400" b="0" dirty="0">
-                          <a:effectLst/>
-                          <a:latin typeface="Times New Roman" panose="02020603050405020304" pitchFamily="18" charset="0"/>
-                          <a:cs typeface="Times New Roman" panose="02020603050405020304" pitchFamily="18" charset="0"/>
-                        </a:rPr>
-                        <a:t>Факторы, связанные с организационной культурой и психологическим климатом</a:t>
-                      </a:r>
-                    </a:p>
-                  </a:txBody>
-                  <a:tcPr/>
-                </a:tc>
-                <a:tc>
-                  <a:txBody>
-                    <a:bodyPr/>
-                    <a:lstStyle/>
-                    <a:p>
-                      <a:pPr marL="285750" indent="-285750" algn="just">
-                        <a:buFont typeface="Arial" panose="020B0604020202020204" pitchFamily="34" charset="0"/>
-                        <a:buChar char="•"/>
-                      </a:pPr>
-                      <a:r>
-                        <a:rPr lang="ru-RU" sz="1400" b="0" dirty="0">
-                          <a:effectLst/>
-                          <a:latin typeface="Times New Roman" panose="02020603050405020304" pitchFamily="18" charset="0"/>
-                          <a:cs typeface="Times New Roman" panose="02020603050405020304" pitchFamily="18" charset="0"/>
-                        </a:rPr>
-                        <a:t>несоответствие установок и ожиданий работника корпоративной культуре предприятия,</a:t>
-                      </a:r>
-                    </a:p>
-                    <a:p>
-                      <a:pPr marL="285750" indent="-285750" algn="just">
-                        <a:buFont typeface="Arial" panose="020B0604020202020204" pitchFamily="34" charset="0"/>
-                        <a:buChar char="•"/>
-                      </a:pPr>
-                      <a:r>
-                        <a:rPr lang="ru-RU" sz="1400" b="0" dirty="0">
-                          <a:effectLst/>
-                          <a:latin typeface="Times New Roman" panose="02020603050405020304" pitchFamily="18" charset="0"/>
-                          <a:cs typeface="Times New Roman" panose="02020603050405020304" pitchFamily="18" charset="0"/>
-                        </a:rPr>
-                        <a:t>ограничение индивидуальной свободы,</a:t>
-                      </a:r>
-                    </a:p>
-                    <a:p>
-                      <a:pPr marL="285750" indent="-285750" algn="just">
-                        <a:buFont typeface="Arial" panose="020B0604020202020204" pitchFamily="34" charset="0"/>
-                        <a:buChar char="•"/>
-                      </a:pPr>
-                      <a:r>
-                        <a:rPr lang="ru-RU" sz="1400" b="0" dirty="0">
-                          <a:effectLst/>
-                          <a:latin typeface="Times New Roman" panose="02020603050405020304" pitchFamily="18" charset="0"/>
-                          <a:cs typeface="Times New Roman" panose="02020603050405020304" pitchFamily="18" charset="0"/>
-                        </a:rPr>
-                        <a:t>интриги.</a:t>
-                      </a:r>
-                    </a:p>
-                  </a:txBody>
-                  <a:tcPr/>
-                </a:tc>
-                <a:extLst>
-                  <a:ext uri="{0D108BD9-81ED-4DB2-BD59-A6C34878D82A}">
-                    <a16:rowId xmlns:a16="http://schemas.microsoft.com/office/drawing/2014/main" val="41138885"/>
-                  </a:ext>
-                </a:extLst>
-              </a:tr>
-              <a:tr h="781951">
-                <a:tc>
-                  <a:txBody>
-                    <a:bodyPr/>
-                    <a:lstStyle/>
-                    <a:p>
-                      <a:pPr algn="just"/>
-                      <a:r>
-                        <a:rPr lang="ru-RU" sz="1400" b="0" dirty="0" err="1">
-                          <a:effectLst/>
-                          <a:latin typeface="Times New Roman" panose="02020603050405020304" pitchFamily="18" charset="0"/>
-                          <a:cs typeface="Times New Roman" panose="02020603050405020304" pitchFamily="18" charset="0"/>
-                        </a:rPr>
-                        <a:t>Внеорганизационные</a:t>
-                      </a:r>
-                      <a:r>
-                        <a:rPr lang="ru-RU" sz="1400" b="0" dirty="0">
-                          <a:effectLst/>
-                          <a:latin typeface="Times New Roman" panose="02020603050405020304" pitchFamily="18" charset="0"/>
-                          <a:cs typeface="Times New Roman" panose="02020603050405020304" pitchFamily="18" charset="0"/>
-                        </a:rPr>
-                        <a:t> источники стрессов</a:t>
-                      </a:r>
-                    </a:p>
-                  </a:txBody>
-                  <a:tcPr/>
-                </a:tc>
-                <a:tc>
-                  <a:txBody>
-                    <a:bodyPr/>
-                    <a:lstStyle/>
-                    <a:p>
-                      <a:pPr marL="285750" indent="-285750" algn="just">
-                        <a:buFont typeface="Arial" panose="020B0604020202020204" pitchFamily="34" charset="0"/>
-                        <a:buChar char="•"/>
-                      </a:pPr>
-                      <a:r>
-                        <a:rPr lang="ru-RU" sz="1400" b="0" dirty="0">
-                          <a:effectLst/>
-                          <a:latin typeface="Times New Roman" panose="02020603050405020304" pitchFamily="18" charset="0"/>
-                          <a:cs typeface="Times New Roman" panose="02020603050405020304" pitchFamily="18" charset="0"/>
-                        </a:rPr>
-                        <a:t>проблемы в семейной жизни из-за </a:t>
-                      </a:r>
-                      <a:r>
-                        <a:rPr lang="ru-RU" sz="1400" b="0" dirty="0" err="1">
-                          <a:effectLst/>
-                          <a:latin typeface="Times New Roman" panose="02020603050405020304" pitchFamily="18" charset="0"/>
-                          <a:cs typeface="Times New Roman" panose="02020603050405020304" pitchFamily="18" charset="0"/>
-                        </a:rPr>
-                        <a:t>сверхнормальных</a:t>
-                      </a:r>
-                      <a:r>
-                        <a:rPr lang="ru-RU" sz="1400" b="0" dirty="0">
-                          <a:effectLst/>
-                          <a:latin typeface="Times New Roman" panose="02020603050405020304" pitchFamily="18" charset="0"/>
-                          <a:cs typeface="Times New Roman" panose="02020603050405020304" pitchFamily="18" charset="0"/>
-                        </a:rPr>
-                        <a:t> нагрузок на работе,</a:t>
-                      </a:r>
-                    </a:p>
-                    <a:p>
-                      <a:pPr marL="285750" indent="-285750" algn="just">
-                        <a:buFont typeface="Arial" panose="020B0604020202020204" pitchFamily="34" charset="0"/>
-                        <a:buChar char="•"/>
-                      </a:pPr>
-                      <a:r>
-                        <a:rPr lang="ru-RU" sz="1400" b="0" dirty="0">
-                          <a:effectLst/>
-                          <a:latin typeface="Times New Roman" panose="02020603050405020304" pitchFamily="18" charset="0"/>
-                          <a:cs typeface="Times New Roman" panose="02020603050405020304" pitchFamily="18" charset="0"/>
-                        </a:rPr>
-                        <a:t>неумение разделить профессиональную и семейную ролевую стратегию поведения,</a:t>
-                      </a:r>
-                    </a:p>
-                    <a:p>
-                      <a:pPr marL="285750" indent="-285750" algn="just">
-                        <a:buFont typeface="Arial" panose="020B0604020202020204" pitchFamily="34" charset="0"/>
-                        <a:buChar char="•"/>
-                      </a:pPr>
-                      <a:r>
-                        <a:rPr lang="ru-RU" sz="1400" b="0" dirty="0">
-                          <a:effectLst/>
-                          <a:latin typeface="Times New Roman" panose="02020603050405020304" pitchFamily="18" charset="0"/>
-                          <a:cs typeface="Times New Roman" panose="02020603050405020304" pitchFamily="18" charset="0"/>
-                        </a:rPr>
-                        <a:t>семейные конфликты, связанные с притязанием обоих супругов на карьерное продвижение.</a:t>
-                      </a:r>
-                    </a:p>
-                  </a:txBody>
-                  <a:tcPr/>
-                </a:tc>
-                <a:extLst>
-                  <a:ext uri="{0D108BD9-81ED-4DB2-BD59-A6C34878D82A}">
-                    <a16:rowId xmlns:a16="http://schemas.microsoft.com/office/drawing/2014/main" val="244553789"/>
-                  </a:ext>
-                </a:extLst>
-              </a:tr>
-            </a:tbl>
-          </a:graphicData>
-        </a:graphic>
-      </p:graphicFrame>
-    </p:spTree>
-    <p:extLst>
-      <p:ext uri="{BB962C8B-B14F-4D97-AF65-F5344CB8AC3E}">
-        <p14:creationId xmlns:p14="http://schemas.microsoft.com/office/powerpoint/2010/main" val="2237866845"/>
-      </p:ext>
-    </p:extLst>
-  </p:cSld>
-  <p:clrMapOvr>
-    <a:masterClrMapping/>
-  </p:clrMapOvr>
-</p:sld>
-</file>
-
-<file path=ppt/slides/slide5.xml><?xml version="1.0" encoding="utf-8"?>
-<p:sld xmlns:a="http://schemas.openxmlformats.org/drawingml/2006/main" xmlns:r="http://schemas.openxmlformats.org/officeDocument/2006/relationships" xmlns:p="http://schemas.openxmlformats.org/presentationml/2006/main">
-  <p:cSld>
-    <p:spTree>
-      <p:nvGrpSpPr>
-        <p:cNvPr id="1" name=""/>
-        <p:cNvGrpSpPr/>
-        <p:nvPr/>
-      </p:nvGrpSpPr>
-      <p:grpSpPr>
-        <a:xfrm>
-          <a:off x="0" y="0"/>
-          <a:ext cx="0" cy="0"/>
-          <a:chOff x="0" y="0"/>
-          <a:chExt cx="0" cy="0"/>
-        </a:xfrm>
-      </p:grpSpPr>
-      <p:sp>
-        <p:nvSpPr>
-          <p:cNvPr id="2" name="Заголовок 1">
-            <a:extLst>
-              <a:ext uri="{FF2B5EF4-FFF2-40B4-BE49-F238E27FC236}">
-                <a16:creationId xmlns:a16="http://schemas.microsoft.com/office/drawing/2014/main" id="{49B0E010-6F7E-45E0-ADC8-2BF59398400B}"/>
-              </a:ext>
-            </a:extLst>
-          </p:cNvPr>
-          <p:cNvSpPr>
-            <a:spLocks noGrp="1"/>
-          </p:cNvSpPr>
-          <p:nvPr>
-            <p:ph type="title"/>
-          </p:nvPr>
-        </p:nvSpPr>
-        <p:spPr/>
-        <p:txBody>
-          <a:bodyPr/>
-          <a:lstStyle/>
-          <a:p>
-            <a:pPr algn="ctr"/>
-            <a:r>
-              <a:rPr lang="ru-RU" dirty="0">
-                <a:latin typeface="Times New Roman" panose="02020603050405020304" pitchFamily="18" charset="0"/>
-                <a:cs typeface="Times New Roman" panose="02020603050405020304" pitchFamily="18" charset="0"/>
-              </a:rPr>
-              <a:t>Стадии стрессовой реакции</a:t>
-            </a:r>
-          </a:p>
-        </p:txBody>
-      </p:sp>
-      <p:sp>
-        <p:nvSpPr>
-          <p:cNvPr id="4" name="Номер слайда 3">
-            <a:extLst>
-              <a:ext uri="{FF2B5EF4-FFF2-40B4-BE49-F238E27FC236}">
-                <a16:creationId xmlns:a16="http://schemas.microsoft.com/office/drawing/2014/main" id="{B53C015B-F70F-4212-9519-6C44C1671A13}"/>
-              </a:ext>
-            </a:extLst>
-          </p:cNvPr>
-          <p:cNvSpPr>
-            <a:spLocks noGrp="1"/>
-          </p:cNvSpPr>
-          <p:nvPr>
-            <p:ph type="sldNum" sz="quarter" idx="12"/>
-          </p:nvPr>
-        </p:nvSpPr>
-        <p:spPr/>
-        <p:txBody>
-          <a:bodyPr/>
-          <a:lstStyle/>
-          <a:p>
-            <a:fld id="{356812A1-C132-42AC-87BC-7262BD3AB593}" type="slidenum">
-              <a:rPr lang="ru-RU" smtClean="0"/>
-              <a:t>5</a:t>
-            </a:fld>
             <a:endParaRPr lang="ru-RU"/>
           </a:p>
         </p:txBody>
       </p:sp>
-      <p:pic>
-        <p:nvPicPr>
-          <p:cNvPr id="5" name="Объект 5">
-            <a:extLst>
-              <a:ext uri="{FF2B5EF4-FFF2-40B4-BE49-F238E27FC236}">
-                <a16:creationId xmlns:a16="http://schemas.microsoft.com/office/drawing/2014/main" id="{5DAC97B0-0338-4D8A-A51F-9EA7962FCC3C}"/>
-              </a:ext>
-            </a:extLst>
-          </p:cNvPr>
-          <p:cNvPicPr>
-            <a:picLocks noChangeAspect="1"/>
-          </p:cNvPicPr>
-          <p:nvPr/>
-        </p:nvPicPr>
-        <p:blipFill>
-          <a:blip r:embed="rId2">
-            <a:extLst>
-              <a:ext uri="{28A0092B-C50C-407E-A947-70E740481C1C}">
-                <a14:useLocalDpi xmlns:a14="http://schemas.microsoft.com/office/drawing/2010/main" val="0"/>
-              </a:ext>
-            </a:extLst>
-          </a:blip>
-          <a:stretch>
-            <a:fillRect/>
-          </a:stretch>
-        </p:blipFill>
-        <p:spPr>
-          <a:xfrm>
-            <a:off x="5900523" y="1792264"/>
-            <a:ext cx="6153593" cy="3380869"/>
-          </a:xfrm>
-          <a:prstGeom prst="rect">
-            <a:avLst/>
-          </a:prstGeom>
-          <a:ln w="38100" cap="sq">
-            <a:solidFill>
-              <a:srgbClr val="000000"/>
-            </a:solidFill>
-            <a:prstDash val="solid"/>
-            <a:miter lim="800000"/>
-          </a:ln>
-          <a:effectLst>
-            <a:outerShdw blurRad="50800" dist="38100" dir="2700000" algn="tl" rotWithShape="0">
-              <a:srgbClr val="000000">
-                <a:alpha val="43000"/>
-              </a:srgbClr>
-            </a:outerShdw>
-          </a:effectLst>
-        </p:spPr>
-      </p:pic>
       <p:sp>
         <p:nvSpPr>
           <p:cNvPr id="7" name="TextBox 6">
@@ -4736,11 +4103,17 @@
           <p:cNvGraphicFramePr>
             <a:graphicFrameLocks noGrp="1"/>
           </p:cNvGraphicFramePr>
-          <p:nvPr/>
+          <p:nvPr>
+            <p:extLst>
+              <p:ext uri="{D42A27DB-BD31-4B8C-83A1-F6EECF244321}">
+                <p14:modId xmlns:p14="http://schemas.microsoft.com/office/powerpoint/2010/main" val="4268190939"/>
+              </p:ext>
+            </p:extLst>
+          </p:nvPr>
         </p:nvGraphicFramePr>
         <p:xfrm>
-          <a:off x="490551" y="1544093"/>
-          <a:ext cx="5178730" cy="3781302"/>
+          <a:off x="461976" y="1544093"/>
+          <a:ext cx="4805349" cy="3564975"/>
         </p:xfrm>
         <a:graphic>
           <a:graphicData uri="http://schemas.openxmlformats.org/drawingml/2006/table">
@@ -4749,14 +4122,14 @@
                 <a:tableStyleId>{073A0DAA-6AF3-43AB-8588-CEC1D06C72B9}</a:tableStyleId>
               </a:tblPr>
               <a:tblGrid>
-                <a:gridCol w="2589365">
+                <a:gridCol w="1886955">
                   <a:extLst>
                     <a:ext uri="{9D8B030D-6E8A-4147-A177-3AD203B41FA5}">
                       <a16:colId xmlns:a16="http://schemas.microsoft.com/office/drawing/2014/main" val="3130025223"/>
                     </a:ext>
                   </a:extLst>
                 </a:gridCol>
-                <a:gridCol w="2589365">
+                <a:gridCol w="2918394">
                   <a:extLst>
                     <a:ext uri="{9D8B030D-6E8A-4147-A177-3AD203B41FA5}">
                       <a16:colId xmlns:a16="http://schemas.microsoft.com/office/drawing/2014/main" val="1185311801"/>
@@ -4924,10 +4297,1106 @@
           </a:graphicData>
         </a:graphic>
       </p:graphicFrame>
+      <p:graphicFrame>
+        <p:nvGraphicFramePr>
+          <p:cNvPr id="3" name="Объект 2">
+            <a:extLst>
+              <a:ext uri="{FF2B5EF4-FFF2-40B4-BE49-F238E27FC236}">
+                <a16:creationId xmlns:a16="http://schemas.microsoft.com/office/drawing/2014/main" id="{A46241E1-1E7C-4E6C-958C-1241E3057328}"/>
+              </a:ext>
+            </a:extLst>
+          </p:cNvPr>
+          <p:cNvGraphicFramePr>
+            <a:graphicFrameLocks noChangeAspect="1"/>
+          </p:cNvGraphicFramePr>
+          <p:nvPr>
+            <p:extLst>
+              <p:ext uri="{D42A27DB-BD31-4B8C-83A1-F6EECF244321}">
+                <p14:modId xmlns:p14="http://schemas.microsoft.com/office/powerpoint/2010/main" val="3036634021"/>
+              </p:ext>
+            </p:extLst>
+          </p:nvPr>
+        </p:nvGraphicFramePr>
+        <p:xfrm>
+          <a:off x="5378537" y="2305050"/>
+          <a:ext cx="6574211" cy="2123012"/>
+        </p:xfrm>
+        <a:graphic>
+          <a:graphicData uri="http://schemas.openxmlformats.org/presentationml/2006/ole">
+            <mc:AlternateContent xmlns:mc="http://schemas.openxmlformats.org/markup-compatibility/2006">
+              <mc:Choice xmlns:v="urn:schemas-microsoft-com:vml" Requires="v">
+                <p:oleObj spid="_x0000_s1028" r:id="rId3" imgW="8494920" imgH="2742840" progId="">
+                  <p:embed/>
+                </p:oleObj>
+              </mc:Choice>
+              <mc:Fallback>
+                <p:oleObj r:id="rId3" imgW="8494920" imgH="2742840" progId="">
+                  <p:embed/>
+                  <p:pic>
+                    <p:nvPicPr>
+                      <p:cNvPr id="0" name=""/>
+                      <p:cNvPicPr/>
+                      <p:nvPr/>
+                    </p:nvPicPr>
+                    <p:blipFill>
+                      <a:blip r:embed="rId4"/>
+                      <a:stretch>
+                        <a:fillRect/>
+                      </a:stretch>
+                    </p:blipFill>
+                    <p:spPr>
+                      <a:xfrm>
+                        <a:off x="5378537" y="2305050"/>
+                        <a:ext cx="6574211" cy="2123012"/>
+                      </a:xfrm>
+                      <a:prstGeom prst="rect">
+                        <a:avLst/>
+                      </a:prstGeom>
+                      <a:ln>
+                        <a:solidFill>
+                          <a:schemeClr val="tx1"/>
+                        </a:solidFill>
+                      </a:ln>
+                    </p:spPr>
+                  </p:pic>
+                </p:oleObj>
+              </mc:Fallback>
+            </mc:AlternateContent>
+          </a:graphicData>
+        </a:graphic>
+      </p:graphicFrame>
     </p:spTree>
     <p:extLst>
       <p:ext uri="{BB962C8B-B14F-4D97-AF65-F5344CB8AC3E}">
         <p14:creationId xmlns:p14="http://schemas.microsoft.com/office/powerpoint/2010/main" val="364675581"/>
+      </p:ext>
+    </p:extLst>
+  </p:cSld>
+  <p:clrMapOvr>
+    <a:masterClrMapping/>
+  </p:clrMapOvr>
+</p:sld>
+</file>
+
+<file path=ppt/slides/slide5.xml><?xml version="1.0" encoding="utf-8"?>
+<p:sld xmlns:a="http://schemas.openxmlformats.org/drawingml/2006/main" xmlns:r="http://schemas.openxmlformats.org/officeDocument/2006/relationships" xmlns:p="http://schemas.openxmlformats.org/presentationml/2006/main">
+  <p:cSld>
+    <p:spTree>
+      <p:nvGrpSpPr>
+        <p:cNvPr id="1" name=""/>
+        <p:cNvGrpSpPr/>
+        <p:nvPr/>
+      </p:nvGrpSpPr>
+      <p:grpSpPr>
+        <a:xfrm>
+          <a:off x="0" y="0"/>
+          <a:ext cx="0" cy="0"/>
+          <a:chOff x="0" y="0"/>
+          <a:chExt cx="0" cy="0"/>
+        </a:xfrm>
+      </p:grpSpPr>
+      <p:sp>
+        <p:nvSpPr>
+          <p:cNvPr id="2" name="Заголовок 1">
+            <a:extLst>
+              <a:ext uri="{FF2B5EF4-FFF2-40B4-BE49-F238E27FC236}">
+                <a16:creationId xmlns:a16="http://schemas.microsoft.com/office/drawing/2014/main" id="{A8A78197-F0E5-482A-9DF3-DA7661662131}"/>
+              </a:ext>
+            </a:extLst>
+          </p:cNvPr>
+          <p:cNvSpPr>
+            <a:spLocks noGrp="1"/>
+          </p:cNvSpPr>
+          <p:nvPr>
+            <p:ph type="title"/>
+          </p:nvPr>
+        </p:nvSpPr>
+        <p:spPr>
+          <a:xfrm>
+            <a:off x="838200" y="0"/>
+            <a:ext cx="10515600" cy="1325563"/>
+          </a:xfrm>
+        </p:spPr>
+        <p:txBody>
+          <a:bodyPr/>
+          <a:lstStyle/>
+          <a:p>
+            <a:pPr algn="ctr"/>
+            <a:r>
+              <a:rPr lang="ru-RU" dirty="0">
+                <a:latin typeface="Times New Roman" panose="02020603050405020304" pitchFamily="18" charset="0"/>
+                <a:cs typeface="Times New Roman" panose="02020603050405020304" pitchFamily="18" charset="0"/>
+              </a:rPr>
+              <a:t>Причины стресса на рабочем месте</a:t>
+            </a:r>
+          </a:p>
+        </p:txBody>
+      </p:sp>
+      <p:sp>
+        <p:nvSpPr>
+          <p:cNvPr id="4" name="Номер слайда 3">
+            <a:extLst>
+              <a:ext uri="{FF2B5EF4-FFF2-40B4-BE49-F238E27FC236}">
+                <a16:creationId xmlns:a16="http://schemas.microsoft.com/office/drawing/2014/main" id="{91DF3383-A895-4B0B-9937-2AAF01F676C3}"/>
+              </a:ext>
+            </a:extLst>
+          </p:cNvPr>
+          <p:cNvSpPr>
+            <a:spLocks noGrp="1"/>
+          </p:cNvSpPr>
+          <p:nvPr>
+            <p:ph type="sldNum" sz="quarter" idx="12"/>
+          </p:nvPr>
+        </p:nvSpPr>
+        <p:spPr/>
+        <p:txBody>
+          <a:bodyPr/>
+          <a:lstStyle/>
+          <a:p>
+            <a:fld id="{356812A1-C132-42AC-87BC-7262BD3AB593}" type="slidenum">
+              <a:rPr lang="ru-RU" smtClean="0"/>
+              <a:t>5</a:t>
+            </a:fld>
+            <a:endParaRPr lang="ru-RU" dirty="0"/>
+          </a:p>
+        </p:txBody>
+      </p:sp>
+      <p:graphicFrame>
+        <p:nvGraphicFramePr>
+          <p:cNvPr id="5" name="Таблица 5">
+            <a:extLst>
+              <a:ext uri="{FF2B5EF4-FFF2-40B4-BE49-F238E27FC236}">
+                <a16:creationId xmlns:a16="http://schemas.microsoft.com/office/drawing/2014/main" id="{02B8C3A1-0097-46F3-BF8F-AC58662B1ABF}"/>
+              </a:ext>
+            </a:extLst>
+          </p:cNvPr>
+          <p:cNvGraphicFramePr>
+            <a:graphicFrameLocks noGrp="1"/>
+          </p:cNvGraphicFramePr>
+          <p:nvPr>
+            <p:extLst>
+              <p:ext uri="{D42A27DB-BD31-4B8C-83A1-F6EECF244321}">
+                <p14:modId xmlns:p14="http://schemas.microsoft.com/office/powerpoint/2010/main" val="965137632"/>
+              </p:ext>
+            </p:extLst>
+          </p:nvPr>
+        </p:nvGraphicFramePr>
+        <p:xfrm>
+          <a:off x="0" y="1032718"/>
+          <a:ext cx="12192000" cy="5351250"/>
+        </p:xfrm>
+        <a:graphic>
+          <a:graphicData uri="http://schemas.openxmlformats.org/drawingml/2006/table">
+            <a:tbl>
+              <a:tblPr firstRow="1" bandRow="1">
+                <a:tableStyleId>{073A0DAA-6AF3-43AB-8588-CEC1D06C72B9}</a:tableStyleId>
+              </a:tblPr>
+              <a:tblGrid>
+                <a:gridCol w="5867400">
+                  <a:extLst>
+                    <a:ext uri="{9D8B030D-6E8A-4147-A177-3AD203B41FA5}">
+                      <a16:colId xmlns:a16="http://schemas.microsoft.com/office/drawing/2014/main" val="1383018408"/>
+                    </a:ext>
+                  </a:extLst>
+                </a:gridCol>
+                <a:gridCol w="6324600">
+                  <a:extLst>
+                    <a:ext uri="{9D8B030D-6E8A-4147-A177-3AD203B41FA5}">
+                      <a16:colId xmlns:a16="http://schemas.microsoft.com/office/drawing/2014/main" val="1099064396"/>
+                    </a:ext>
+                  </a:extLst>
+                </a:gridCol>
+              </a:tblGrid>
+              <a:tr h="368620">
+                <a:tc>
+                  <a:txBody>
+                    <a:bodyPr/>
+                    <a:lstStyle/>
+                    <a:p>
+                      <a:pPr algn="just"/>
+                      <a:r>
+                        <a:rPr lang="ru-RU" sz="2000" b="1" dirty="0">
+                          <a:effectLst/>
+                          <a:latin typeface="Times New Roman" panose="02020603050405020304" pitchFamily="18" charset="0"/>
+                          <a:cs typeface="Times New Roman" panose="02020603050405020304" pitchFamily="18" charset="0"/>
+                        </a:rPr>
+                        <a:t>Причина</a:t>
+                      </a:r>
+                    </a:p>
+                  </a:txBody>
+                  <a:tcPr/>
+                </a:tc>
+                <a:tc>
+                  <a:txBody>
+                    <a:bodyPr/>
+                    <a:lstStyle/>
+                    <a:p>
+                      <a:pPr algn="just"/>
+                      <a:r>
+                        <a:rPr lang="ru-RU" sz="2000" b="1" dirty="0">
+                          <a:effectLst/>
+                          <a:latin typeface="Times New Roman" panose="02020603050405020304" pitchFamily="18" charset="0"/>
+                          <a:cs typeface="Times New Roman" panose="02020603050405020304" pitchFamily="18" charset="0"/>
+                        </a:rPr>
+                        <a:t>Пример</a:t>
+                      </a:r>
+                    </a:p>
+                  </a:txBody>
+                  <a:tcPr/>
+                </a:tc>
+                <a:extLst>
+                  <a:ext uri="{0D108BD9-81ED-4DB2-BD59-A6C34878D82A}">
+                    <a16:rowId xmlns:a16="http://schemas.microsoft.com/office/drawing/2014/main" val="3018537188"/>
+                  </a:ext>
+                </a:extLst>
+              </a:tr>
+              <a:tr h="781951">
+                <a:tc>
+                  <a:txBody>
+                    <a:bodyPr/>
+                    <a:lstStyle/>
+                    <a:p>
+                      <a:pPr algn="just"/>
+                      <a:r>
+                        <a:rPr lang="ru-RU" sz="2000" b="0" dirty="0">
+                          <a:effectLst/>
+                          <a:latin typeface="Times New Roman" panose="02020603050405020304" pitchFamily="18" charset="0"/>
+                          <a:cs typeface="Times New Roman" panose="02020603050405020304" pitchFamily="18" charset="0"/>
+                        </a:rPr>
+                        <a:t>Режим трудовой деятельности</a:t>
+                      </a:r>
+                    </a:p>
+                  </a:txBody>
+                  <a:tcPr>
+                    <a:solidFill>
+                      <a:schemeClr val="accent6">
+                        <a:lumMod val="40000"/>
+                        <a:lumOff val="60000"/>
+                      </a:schemeClr>
+                    </a:solidFill>
+                  </a:tcPr>
+                </a:tc>
+                <a:tc>
+                  <a:txBody>
+                    <a:bodyPr/>
+                    <a:lstStyle/>
+                    <a:p>
+                      <a:pPr marL="0" indent="0" algn="just">
+                        <a:buFont typeface="Arial" panose="020B0604020202020204" pitchFamily="34" charset="0"/>
+                        <a:buNone/>
+                      </a:pPr>
+                      <a:r>
+                        <a:rPr lang="ru-RU" sz="2000" b="0" dirty="0">
+                          <a:effectLst/>
+                          <a:latin typeface="Times New Roman" panose="02020603050405020304" pitchFamily="18" charset="0"/>
+                          <a:cs typeface="Times New Roman" panose="02020603050405020304" pitchFamily="18" charset="0"/>
+                        </a:rPr>
+                        <a:t>Большая рабочая нагрузка</a:t>
+                      </a:r>
+                    </a:p>
+                  </a:txBody>
+                  <a:tcPr>
+                    <a:solidFill>
+                      <a:schemeClr val="accent2">
+                        <a:lumMod val="40000"/>
+                        <a:lumOff val="60000"/>
+                      </a:schemeClr>
+                    </a:solidFill>
+                  </a:tcPr>
+                </a:tc>
+                <a:extLst>
+                  <a:ext uri="{0D108BD9-81ED-4DB2-BD59-A6C34878D82A}">
+                    <a16:rowId xmlns:a16="http://schemas.microsoft.com/office/drawing/2014/main" val="3262333981"/>
+                  </a:ext>
+                </a:extLst>
+              </a:tr>
+              <a:tr h="1010020">
+                <a:tc>
+                  <a:txBody>
+                    <a:bodyPr/>
+                    <a:lstStyle/>
+                    <a:p>
+                      <a:pPr algn="just"/>
+                      <a:r>
+                        <a:rPr lang="ru-RU" sz="2000" b="0" dirty="0">
+                          <a:effectLst/>
+                          <a:latin typeface="Times New Roman" panose="02020603050405020304" pitchFamily="18" charset="0"/>
+                          <a:cs typeface="Times New Roman" panose="02020603050405020304" pitchFamily="18" charset="0"/>
+                        </a:rPr>
+                        <a:t>Нерациональная организация труда и рабочего места</a:t>
+                      </a:r>
+                    </a:p>
+                  </a:txBody>
+                  <a:tcPr>
+                    <a:solidFill>
+                      <a:schemeClr val="accent6">
+                        <a:lumMod val="40000"/>
+                        <a:lumOff val="60000"/>
+                      </a:schemeClr>
+                    </a:solidFill>
+                  </a:tcPr>
+                </a:tc>
+                <a:tc>
+                  <a:txBody>
+                    <a:bodyPr/>
+                    <a:lstStyle/>
+                    <a:p>
+                      <a:pPr marL="0" indent="0" algn="just">
+                        <a:buFont typeface="Arial" panose="020B0604020202020204" pitchFamily="34" charset="0"/>
+                        <a:buNone/>
+                      </a:pPr>
+                      <a:r>
+                        <a:rPr lang="ru-RU" sz="2000" b="0" dirty="0">
+                          <a:effectLst/>
+                          <a:latin typeface="Times New Roman" panose="02020603050405020304" pitchFamily="18" charset="0"/>
+                          <a:cs typeface="Times New Roman" panose="02020603050405020304" pitchFamily="18" charset="0"/>
+                        </a:rPr>
+                        <a:t>Неоднозначные требования к выполняемой работе</a:t>
+                      </a:r>
+                    </a:p>
+                  </a:txBody>
+                  <a:tcPr>
+                    <a:solidFill>
+                      <a:schemeClr val="accent2">
+                        <a:lumMod val="40000"/>
+                        <a:lumOff val="60000"/>
+                      </a:schemeClr>
+                    </a:solidFill>
+                  </a:tcPr>
+                </a:tc>
+                <a:extLst>
+                  <a:ext uri="{0D108BD9-81ED-4DB2-BD59-A6C34878D82A}">
+                    <a16:rowId xmlns:a16="http://schemas.microsoft.com/office/drawing/2014/main" val="3055950571"/>
+                  </a:ext>
+                </a:extLst>
+              </a:tr>
+              <a:tr h="589117">
+                <a:tc>
+                  <a:txBody>
+                    <a:bodyPr/>
+                    <a:lstStyle/>
+                    <a:p>
+                      <a:pPr algn="just"/>
+                      <a:r>
+                        <a:rPr lang="ru-RU" sz="2000" b="0" dirty="0">
+                          <a:effectLst/>
+                          <a:latin typeface="Times New Roman" panose="02020603050405020304" pitchFamily="18" charset="0"/>
+                          <a:cs typeface="Times New Roman" panose="02020603050405020304" pitchFamily="18" charset="0"/>
+                        </a:rPr>
+                        <a:t>Неудовлетворительные условия труда</a:t>
+                      </a:r>
+                    </a:p>
+                  </a:txBody>
+                  <a:tcPr>
+                    <a:solidFill>
+                      <a:schemeClr val="accent6">
+                        <a:lumMod val="40000"/>
+                        <a:lumOff val="60000"/>
+                      </a:schemeClr>
+                    </a:solidFill>
+                  </a:tcPr>
+                </a:tc>
+                <a:tc>
+                  <a:txBody>
+                    <a:bodyPr/>
+                    <a:lstStyle/>
+                    <a:p>
+                      <a:pPr marL="0" indent="0" algn="just">
+                        <a:buFont typeface="Arial" panose="020B0604020202020204" pitchFamily="34" charset="0"/>
+                        <a:buNone/>
+                      </a:pPr>
+                      <a:r>
+                        <a:rPr lang="ru-RU" sz="2000" b="0" dirty="0">
+                          <a:effectLst/>
+                          <a:latin typeface="Times New Roman" panose="02020603050405020304" pitchFamily="18" charset="0"/>
+                          <a:cs typeface="Times New Roman" panose="02020603050405020304" pitchFamily="18" charset="0"/>
+                        </a:rPr>
+                        <a:t>Монотонная и однообразная работа</a:t>
+                      </a:r>
+                    </a:p>
+                  </a:txBody>
+                  <a:tcPr>
+                    <a:solidFill>
+                      <a:schemeClr val="accent2">
+                        <a:lumMod val="40000"/>
+                        <a:lumOff val="60000"/>
+                      </a:schemeClr>
+                    </a:solidFill>
+                  </a:tcPr>
+                </a:tc>
+                <a:extLst>
+                  <a:ext uri="{0D108BD9-81ED-4DB2-BD59-A6C34878D82A}">
+                    <a16:rowId xmlns:a16="http://schemas.microsoft.com/office/drawing/2014/main" val="4046169263"/>
+                  </a:ext>
+                </a:extLst>
+              </a:tr>
+              <a:tr h="1010020">
+                <a:tc>
+                  <a:txBody>
+                    <a:bodyPr/>
+                    <a:lstStyle/>
+                    <a:p>
+                      <a:pPr algn="just"/>
+                      <a:r>
+                        <a:rPr lang="ru-RU" sz="2000" b="0" dirty="0">
+                          <a:effectLst/>
+                          <a:latin typeface="Times New Roman" panose="02020603050405020304" pitchFamily="18" charset="0"/>
+                          <a:cs typeface="Times New Roman" panose="02020603050405020304" pitchFamily="18" charset="0"/>
+                        </a:rPr>
+                        <a:t>Отсутствие эффективной системы мотивации и стимулирования</a:t>
+                      </a:r>
+                    </a:p>
+                  </a:txBody>
+                  <a:tcPr>
+                    <a:solidFill>
+                      <a:schemeClr val="accent6">
+                        <a:lumMod val="40000"/>
+                        <a:lumOff val="60000"/>
+                      </a:schemeClr>
+                    </a:solidFill>
+                  </a:tcPr>
+                </a:tc>
+                <a:tc>
+                  <a:txBody>
+                    <a:bodyPr/>
+                    <a:lstStyle/>
+                    <a:p>
+                      <a:pPr marL="0" indent="0" algn="just">
+                        <a:buFont typeface="Arial" panose="020B0604020202020204" pitchFamily="34" charset="0"/>
+                        <a:buNone/>
+                      </a:pPr>
+                      <a:r>
+                        <a:rPr lang="ru-RU" sz="2000" b="0" dirty="0">
+                          <a:effectLst/>
+                          <a:latin typeface="Times New Roman" panose="02020603050405020304" pitchFamily="18" charset="0"/>
+                          <a:cs typeface="Times New Roman" panose="02020603050405020304" pitchFamily="18" charset="0"/>
+                        </a:rPr>
+                        <a:t>Недостаточное вознаграждение за труд</a:t>
+                      </a:r>
+                    </a:p>
+                  </a:txBody>
+                  <a:tcPr>
+                    <a:solidFill>
+                      <a:schemeClr val="accent2">
+                        <a:lumMod val="40000"/>
+                        <a:lumOff val="60000"/>
+                      </a:schemeClr>
+                    </a:solidFill>
+                  </a:tcPr>
+                </a:tc>
+                <a:extLst>
+                  <a:ext uri="{0D108BD9-81ED-4DB2-BD59-A6C34878D82A}">
+                    <a16:rowId xmlns:a16="http://schemas.microsoft.com/office/drawing/2014/main" val="532886314"/>
+                  </a:ext>
+                </a:extLst>
+              </a:tr>
+              <a:tr h="781951">
+                <a:tc>
+                  <a:txBody>
+                    <a:bodyPr/>
+                    <a:lstStyle/>
+                    <a:p>
+                      <a:pPr algn="just"/>
+                      <a:r>
+                        <a:rPr lang="ru-RU" sz="2000" b="0" dirty="0">
+                          <a:effectLst/>
+                          <a:latin typeface="Times New Roman" panose="02020603050405020304" pitchFamily="18" charset="0"/>
+                          <a:cs typeface="Times New Roman" panose="02020603050405020304" pitchFamily="18" charset="0"/>
+                        </a:rPr>
+                        <a:t>Неэффективный стиль управления</a:t>
+                      </a:r>
+                    </a:p>
+                  </a:txBody>
+                  <a:tcPr>
+                    <a:solidFill>
+                      <a:schemeClr val="accent6">
+                        <a:lumMod val="40000"/>
+                        <a:lumOff val="60000"/>
+                      </a:schemeClr>
+                    </a:solidFill>
+                  </a:tcPr>
+                </a:tc>
+                <a:tc>
+                  <a:txBody>
+                    <a:bodyPr/>
+                    <a:lstStyle/>
+                    <a:p>
+                      <a:pPr marL="0" indent="0" algn="just">
+                        <a:buFont typeface="Arial" panose="020B0604020202020204" pitchFamily="34" charset="0"/>
+                        <a:buNone/>
+                      </a:pPr>
+                      <a:r>
+                        <a:rPr lang="ru-RU" sz="2000" b="0" dirty="0">
+                          <a:effectLst/>
+                          <a:latin typeface="Times New Roman" panose="02020603050405020304" pitchFamily="18" charset="0"/>
+                          <a:cs typeface="Times New Roman" panose="02020603050405020304" pitchFamily="18" charset="0"/>
+                        </a:rPr>
+                        <a:t>Некомпетентность руководителей</a:t>
+                      </a:r>
+                    </a:p>
+                  </a:txBody>
+                  <a:tcPr>
+                    <a:solidFill>
+                      <a:schemeClr val="accent2">
+                        <a:lumMod val="40000"/>
+                        <a:lumOff val="60000"/>
+                      </a:schemeClr>
+                    </a:solidFill>
+                  </a:tcPr>
+                </a:tc>
+                <a:extLst>
+                  <a:ext uri="{0D108BD9-81ED-4DB2-BD59-A6C34878D82A}">
+                    <a16:rowId xmlns:a16="http://schemas.microsoft.com/office/drawing/2014/main" val="41138885"/>
+                  </a:ext>
+                </a:extLst>
+              </a:tr>
+              <a:tr h="781951">
+                <a:tc>
+                  <a:txBody>
+                    <a:bodyPr/>
+                    <a:lstStyle/>
+                    <a:p>
+                      <a:pPr algn="just"/>
+                      <a:r>
+                        <a:rPr lang="ru-RU" sz="2000" b="0" dirty="0">
+                          <a:effectLst/>
+                          <a:latin typeface="Times New Roman" panose="02020603050405020304" pitchFamily="18" charset="0"/>
+                          <a:cs typeface="Times New Roman" panose="02020603050405020304" pitchFamily="18" charset="0"/>
+                        </a:rPr>
+                        <a:t>Неудовлетворительная социально-психологическая атмосфера</a:t>
+                      </a:r>
+                    </a:p>
+                  </a:txBody>
+                  <a:tcPr>
+                    <a:solidFill>
+                      <a:schemeClr val="accent6">
+                        <a:lumMod val="40000"/>
+                        <a:lumOff val="60000"/>
+                      </a:schemeClr>
+                    </a:solidFill>
+                  </a:tcPr>
+                </a:tc>
+                <a:tc>
+                  <a:txBody>
+                    <a:bodyPr/>
+                    <a:lstStyle/>
+                    <a:p>
+                      <a:pPr marL="0" indent="0" algn="just">
+                        <a:buFont typeface="Arial" panose="020B0604020202020204" pitchFamily="34" charset="0"/>
+                        <a:buNone/>
+                      </a:pPr>
+                      <a:r>
+                        <a:rPr lang="ru-RU" sz="2000" b="0" dirty="0">
+                          <a:effectLst/>
+                          <a:latin typeface="Times New Roman" panose="02020603050405020304" pitchFamily="18" charset="0"/>
+                          <a:cs typeface="Times New Roman" panose="02020603050405020304" pitchFamily="18" charset="0"/>
+                        </a:rPr>
+                        <a:t>Неблагоприятный социально-психологический климат в коллективе</a:t>
+                      </a:r>
+                    </a:p>
+                  </a:txBody>
+                  <a:tcPr>
+                    <a:solidFill>
+                      <a:schemeClr val="accent2">
+                        <a:lumMod val="40000"/>
+                        <a:lumOff val="60000"/>
+                      </a:schemeClr>
+                    </a:solidFill>
+                  </a:tcPr>
+                </a:tc>
+                <a:extLst>
+                  <a:ext uri="{0D108BD9-81ED-4DB2-BD59-A6C34878D82A}">
+                    <a16:rowId xmlns:a16="http://schemas.microsoft.com/office/drawing/2014/main" val="244553789"/>
+                  </a:ext>
+                </a:extLst>
+              </a:tr>
+            </a:tbl>
+          </a:graphicData>
+        </a:graphic>
+      </p:graphicFrame>
+    </p:spTree>
+    <p:extLst>
+      <p:ext uri="{BB962C8B-B14F-4D97-AF65-F5344CB8AC3E}">
+        <p14:creationId xmlns:p14="http://schemas.microsoft.com/office/powerpoint/2010/main" val="2237866845"/>
+      </p:ext>
+    </p:extLst>
+  </p:cSld>
+  <p:clrMapOvr>
+    <a:masterClrMapping/>
+  </p:clrMapOvr>
+</p:sld>
+</file>
+
+<file path=ppt/slides/slide6.xml><?xml version="1.0" encoding="utf-8"?>
+<p:sld xmlns:a="http://schemas.openxmlformats.org/drawingml/2006/main" xmlns:r="http://schemas.openxmlformats.org/officeDocument/2006/relationships" xmlns:p="http://schemas.openxmlformats.org/presentationml/2006/main">
+  <p:cSld>
+    <p:spTree>
+      <p:nvGrpSpPr>
+        <p:cNvPr id="1" name=""/>
+        <p:cNvGrpSpPr/>
+        <p:nvPr/>
+      </p:nvGrpSpPr>
+      <p:grpSpPr>
+        <a:xfrm>
+          <a:off x="0" y="0"/>
+          <a:ext cx="0" cy="0"/>
+          <a:chOff x="0" y="0"/>
+          <a:chExt cx="0" cy="0"/>
+        </a:xfrm>
+      </p:grpSpPr>
+      <p:sp>
+        <p:nvSpPr>
+          <p:cNvPr id="2" name="Заголовок 1">
+            <a:extLst>
+              <a:ext uri="{FF2B5EF4-FFF2-40B4-BE49-F238E27FC236}">
+                <a16:creationId xmlns:a16="http://schemas.microsoft.com/office/drawing/2014/main" id="{A8A78197-F0E5-482A-9DF3-DA7661662131}"/>
+              </a:ext>
+            </a:extLst>
+          </p:cNvPr>
+          <p:cNvSpPr>
+            <a:spLocks noGrp="1"/>
+          </p:cNvSpPr>
+          <p:nvPr>
+            <p:ph type="title"/>
+          </p:nvPr>
+        </p:nvSpPr>
+        <p:spPr>
+          <a:xfrm>
+            <a:off x="838200" y="0"/>
+            <a:ext cx="10515600" cy="1325563"/>
+          </a:xfrm>
+        </p:spPr>
+        <p:txBody>
+          <a:bodyPr/>
+          <a:lstStyle/>
+          <a:p>
+            <a:pPr algn="ctr"/>
+            <a:r>
+              <a:rPr lang="ru-RU" dirty="0">
+                <a:latin typeface="Times New Roman" panose="02020603050405020304" pitchFamily="18" charset="0"/>
+                <a:cs typeface="Times New Roman" panose="02020603050405020304" pitchFamily="18" charset="0"/>
+              </a:rPr>
+              <a:t>Последствия стресса</a:t>
+            </a:r>
+          </a:p>
+        </p:txBody>
+      </p:sp>
+      <p:sp>
+        <p:nvSpPr>
+          <p:cNvPr id="6" name="Объект 2">
+            <a:extLst>
+              <a:ext uri="{FF2B5EF4-FFF2-40B4-BE49-F238E27FC236}">
+                <a16:creationId xmlns:a16="http://schemas.microsoft.com/office/drawing/2014/main" id="{6D24A5E1-8270-4877-AF66-EC2D6888AE6B}"/>
+              </a:ext>
+            </a:extLst>
+          </p:cNvPr>
+          <p:cNvSpPr>
+            <a:spLocks noGrp="1"/>
+          </p:cNvSpPr>
+          <p:nvPr>
+            <p:ph idx="1"/>
+          </p:nvPr>
+        </p:nvSpPr>
+        <p:spPr>
+          <a:xfrm>
+            <a:off x="838200" y="1325563"/>
+            <a:ext cx="10515600" cy="5117570"/>
+          </a:xfrm>
+        </p:spPr>
+        <p:txBody>
+          <a:bodyPr>
+            <a:normAutofit fontScale="92500"/>
+          </a:bodyPr>
+          <a:lstStyle/>
+          <a:p>
+            <a:pPr algn="just"/>
+            <a:r>
+              <a:rPr lang="ru-RU" dirty="0">
+                <a:latin typeface="Times New Roman" panose="02020603050405020304" pitchFamily="18" charset="0"/>
+                <a:cs typeface="Times New Roman" panose="02020603050405020304" pitchFamily="18" charset="0"/>
+              </a:rPr>
+              <a:t>низкая эффективность работы</a:t>
+            </a:r>
+            <a:r>
+              <a:rPr lang="en-US" dirty="0">
+                <a:latin typeface="Times New Roman" panose="02020603050405020304" pitchFamily="18" charset="0"/>
+                <a:cs typeface="Times New Roman" panose="02020603050405020304" pitchFamily="18" charset="0"/>
+              </a:rPr>
+              <a:t>;</a:t>
+            </a:r>
+            <a:endParaRPr lang="ru-RU" dirty="0">
+              <a:latin typeface="Times New Roman" panose="02020603050405020304" pitchFamily="18" charset="0"/>
+              <a:cs typeface="Times New Roman" panose="02020603050405020304" pitchFamily="18" charset="0"/>
+            </a:endParaRPr>
+          </a:p>
+          <a:p>
+            <a:pPr algn="just"/>
+            <a:r>
+              <a:rPr lang="ru-RU" dirty="0">
+                <a:latin typeface="Times New Roman" panose="02020603050405020304" pitchFamily="18" charset="0"/>
+                <a:cs typeface="Times New Roman" panose="02020603050405020304" pitchFamily="18" charset="0"/>
+              </a:rPr>
+              <a:t>апатичность</a:t>
+            </a:r>
+            <a:r>
+              <a:rPr lang="en-US" dirty="0">
+                <a:latin typeface="Times New Roman" panose="02020603050405020304" pitchFamily="18" charset="0"/>
+                <a:cs typeface="Times New Roman" panose="02020603050405020304" pitchFamily="18" charset="0"/>
+              </a:rPr>
+              <a:t>;</a:t>
+            </a:r>
+          </a:p>
+          <a:p>
+            <a:pPr algn="just"/>
+            <a:r>
+              <a:rPr lang="ru-RU" dirty="0">
+                <a:latin typeface="Times New Roman" panose="02020603050405020304" pitchFamily="18" charset="0"/>
+                <a:cs typeface="Times New Roman" panose="02020603050405020304" pitchFamily="18" charset="0"/>
+              </a:rPr>
+              <a:t>консерватизм</a:t>
+            </a:r>
+            <a:r>
+              <a:rPr lang="en-US" dirty="0">
+                <a:latin typeface="Times New Roman" panose="02020603050405020304" pitchFamily="18" charset="0"/>
+                <a:cs typeface="Times New Roman" panose="02020603050405020304" pitchFamily="18" charset="0"/>
+              </a:rPr>
+              <a:t>;</a:t>
+            </a:r>
+          </a:p>
+          <a:p>
+            <a:pPr algn="just"/>
+            <a:r>
+              <a:rPr lang="ru-RU" dirty="0">
+                <a:latin typeface="Times New Roman" panose="02020603050405020304" pitchFamily="18" charset="0"/>
+                <a:cs typeface="Times New Roman" panose="02020603050405020304" pitchFamily="18" charset="0"/>
+              </a:rPr>
+              <a:t>пессимистичность</a:t>
+            </a:r>
+            <a:r>
+              <a:rPr lang="en-US" dirty="0">
+                <a:latin typeface="Times New Roman" panose="02020603050405020304" pitchFamily="18" charset="0"/>
+                <a:cs typeface="Times New Roman" panose="02020603050405020304" pitchFamily="18" charset="0"/>
+              </a:rPr>
+              <a:t>;</a:t>
+            </a:r>
+          </a:p>
+          <a:p>
+            <a:pPr algn="just"/>
+            <a:r>
+              <a:rPr lang="ru-RU" dirty="0">
+                <a:latin typeface="Times New Roman" panose="02020603050405020304" pitchFamily="18" charset="0"/>
+                <a:cs typeface="Times New Roman" panose="02020603050405020304" pitchFamily="18" charset="0"/>
+              </a:rPr>
+              <a:t>избегание коммуникаций</a:t>
+            </a:r>
+            <a:r>
+              <a:rPr lang="en-US" dirty="0">
+                <a:latin typeface="Times New Roman" panose="02020603050405020304" pitchFamily="18" charset="0"/>
+                <a:cs typeface="Times New Roman" panose="02020603050405020304" pitchFamily="18" charset="0"/>
+              </a:rPr>
+              <a:t>;</a:t>
+            </a:r>
+          </a:p>
+          <a:p>
+            <a:pPr algn="just"/>
+            <a:r>
+              <a:rPr lang="ru-RU" dirty="0">
+                <a:latin typeface="Times New Roman" panose="02020603050405020304" pitchFamily="18" charset="0"/>
+                <a:cs typeface="Times New Roman" panose="02020603050405020304" pitchFamily="18" charset="0"/>
+              </a:rPr>
+              <a:t>физическое истощение и болезненность.</a:t>
+            </a:r>
+          </a:p>
+          <a:p>
+            <a:pPr algn="just"/>
+            <a:endParaRPr lang="ru-RU" dirty="0">
+              <a:latin typeface="Times New Roman" panose="02020603050405020304" pitchFamily="18" charset="0"/>
+              <a:cs typeface="Times New Roman" panose="02020603050405020304" pitchFamily="18" charset="0"/>
+            </a:endParaRPr>
+          </a:p>
+          <a:p>
+            <a:pPr algn="just"/>
+            <a:endParaRPr lang="ru-RU" dirty="0">
+              <a:latin typeface="Times New Roman" panose="02020603050405020304" pitchFamily="18" charset="0"/>
+              <a:cs typeface="Times New Roman" panose="02020603050405020304" pitchFamily="18" charset="0"/>
+            </a:endParaRPr>
+          </a:p>
+          <a:p>
+            <a:pPr marL="0" indent="0" algn="just">
+              <a:buNone/>
+            </a:pPr>
+            <a:r>
+              <a:rPr lang="ru-RU" dirty="0">
+                <a:latin typeface="Times New Roman" panose="02020603050405020304" pitchFamily="18" charset="0"/>
+                <a:cs typeface="Times New Roman" panose="02020603050405020304" pitchFamily="18" charset="0"/>
+              </a:rPr>
+              <a:t>Последствия стресса носят как физиологический, так и психологический характер. Предупреждение наступления стадии истощения может позволить сохранить здоровье и работоспособность трудящихся.</a:t>
+            </a:r>
+          </a:p>
+        </p:txBody>
+      </p:sp>
+    </p:spTree>
+    <p:extLst>
+      <p:ext uri="{BB962C8B-B14F-4D97-AF65-F5344CB8AC3E}">
+        <p14:creationId xmlns:p14="http://schemas.microsoft.com/office/powerpoint/2010/main" val="1721109683"/>
+      </p:ext>
+    </p:extLst>
+  </p:cSld>
+  <p:clrMapOvr>
+    <a:masterClrMapping/>
+  </p:clrMapOvr>
+</p:sld>
+</file>
+
+<file path=ppt/slides/slide7.xml><?xml version="1.0" encoding="utf-8"?>
+<p:sld xmlns:a="http://schemas.openxmlformats.org/drawingml/2006/main" xmlns:r="http://schemas.openxmlformats.org/officeDocument/2006/relationships" xmlns:p="http://schemas.openxmlformats.org/presentationml/2006/main">
+  <p:cSld>
+    <p:spTree>
+      <p:nvGrpSpPr>
+        <p:cNvPr id="1" name=""/>
+        <p:cNvGrpSpPr/>
+        <p:nvPr/>
+      </p:nvGrpSpPr>
+      <p:grpSpPr>
+        <a:xfrm>
+          <a:off x="0" y="0"/>
+          <a:ext cx="0" cy="0"/>
+          <a:chOff x="0" y="0"/>
+          <a:chExt cx="0" cy="0"/>
+        </a:xfrm>
+      </p:grpSpPr>
+      <p:sp>
+        <p:nvSpPr>
+          <p:cNvPr id="2" name="Заголовок 1">
+            <a:extLst>
+              <a:ext uri="{FF2B5EF4-FFF2-40B4-BE49-F238E27FC236}">
+                <a16:creationId xmlns:a16="http://schemas.microsoft.com/office/drawing/2014/main" id="{4657FF81-6D4A-4638-BC86-A0828019E589}"/>
+              </a:ext>
+            </a:extLst>
+          </p:cNvPr>
+          <p:cNvSpPr>
+            <a:spLocks noGrp="1"/>
+          </p:cNvSpPr>
+          <p:nvPr>
+            <p:ph type="title"/>
+          </p:nvPr>
+        </p:nvSpPr>
+        <p:spPr/>
+        <p:txBody>
+          <a:bodyPr/>
+          <a:lstStyle/>
+          <a:p>
+            <a:pPr algn="ctr"/>
+            <a:r>
+              <a:rPr lang="ru-RU" dirty="0">
+                <a:latin typeface="Times New Roman" panose="02020603050405020304" pitchFamily="18" charset="0"/>
+                <a:cs typeface="Times New Roman" panose="02020603050405020304" pitchFamily="18" charset="0"/>
+              </a:rPr>
+              <a:t>Список использованных источников</a:t>
+            </a:r>
+          </a:p>
+        </p:txBody>
+      </p:sp>
+      <p:sp>
+        <p:nvSpPr>
+          <p:cNvPr id="3" name="Объект 2">
+            <a:extLst>
+              <a:ext uri="{FF2B5EF4-FFF2-40B4-BE49-F238E27FC236}">
+                <a16:creationId xmlns:a16="http://schemas.microsoft.com/office/drawing/2014/main" id="{FDD43540-1B9B-4A74-801C-CD9551E40431}"/>
+              </a:ext>
+            </a:extLst>
+          </p:cNvPr>
+          <p:cNvSpPr>
+            <a:spLocks noGrp="1"/>
+          </p:cNvSpPr>
+          <p:nvPr>
+            <p:ph idx="1"/>
+          </p:nvPr>
+        </p:nvSpPr>
+        <p:spPr>
+          <a:xfrm>
+            <a:off x="838200" y="1690688"/>
+            <a:ext cx="10515600" cy="4802187"/>
+          </a:xfrm>
+        </p:spPr>
+        <p:txBody>
+          <a:bodyPr anchor="ctr">
+            <a:normAutofit/>
+          </a:bodyPr>
+          <a:lstStyle/>
+          <a:p>
+            <a:pPr marL="342900" indent="-342900" algn="l">
+              <a:buFont typeface="+mj-lt"/>
+              <a:buAutoNum type="arabicPeriod"/>
+            </a:pPr>
+            <a:r>
+              <a:rPr lang="ru-RU" sz="2400" b="0" i="0" u="none" strike="noStrike" baseline="0" dirty="0">
+                <a:latin typeface="Times New Roman" panose="02020603050405020304" pitchFamily="18" charset="0"/>
+                <a:cs typeface="Times New Roman" panose="02020603050405020304" pitchFamily="18" charset="0"/>
+              </a:rPr>
+              <a:t>Т.В. </a:t>
+            </a:r>
+            <a:r>
+              <a:rPr lang="ru-RU" sz="2400" b="0" i="0" u="none" strike="noStrike" baseline="0" dirty="0" err="1">
+                <a:latin typeface="Times New Roman" panose="02020603050405020304" pitchFamily="18" charset="0"/>
+                <a:cs typeface="Times New Roman" panose="02020603050405020304" pitchFamily="18" charset="0"/>
+              </a:rPr>
+              <a:t>Байдина</a:t>
+            </a:r>
+            <a:r>
+              <a:rPr lang="ru-RU" sz="2400" b="0" i="0" u="none" strike="noStrike" baseline="0" dirty="0">
+                <a:latin typeface="Times New Roman" panose="02020603050405020304" pitchFamily="18" charset="0"/>
+                <a:cs typeface="Times New Roman" panose="02020603050405020304" pitchFamily="18" charset="0"/>
+              </a:rPr>
+              <a:t> Т.И. Колесова Б.В. Малинина. Усталость как симптом неврологических заболеваний // Пермский медицинский журнал. 2021. </a:t>
+            </a:r>
+            <a:r>
+              <a:rPr lang="ru-RU" sz="2400" dirty="0">
+                <a:latin typeface="Times New Roman" panose="02020603050405020304" pitchFamily="18" charset="0"/>
+                <a:cs typeface="Times New Roman" panose="02020603050405020304" pitchFamily="18" charset="0"/>
+              </a:rPr>
+              <a:t>Т</a:t>
+            </a:r>
+            <a:r>
+              <a:rPr lang="ru-RU" sz="2400" b="0" i="0" u="none" strike="noStrike" baseline="0" dirty="0">
+                <a:latin typeface="Times New Roman" panose="02020603050405020304" pitchFamily="18" charset="0"/>
+                <a:cs typeface="Times New Roman" panose="02020603050405020304" pitchFamily="18" charset="0"/>
+              </a:rPr>
+              <a:t>. 38, № 2. С. 37–44.</a:t>
+            </a:r>
+            <a:endParaRPr lang="en-US" sz="2400" b="0" i="0" u="none" strike="noStrike" baseline="0" dirty="0">
+              <a:latin typeface="Times New Roman" panose="02020603050405020304" pitchFamily="18" charset="0"/>
+              <a:cs typeface="Times New Roman" panose="02020603050405020304" pitchFamily="18" charset="0"/>
+            </a:endParaRPr>
+          </a:p>
+          <a:p>
+            <a:pPr marL="342900" indent="-342900" algn="l">
+              <a:buFont typeface="+mj-lt"/>
+              <a:buAutoNum type="arabicPeriod"/>
+            </a:pPr>
+            <a:r>
+              <a:rPr lang="ru-RU" sz="2400" dirty="0">
+                <a:latin typeface="Times New Roman" panose="02020603050405020304" pitchFamily="18" charset="0"/>
+                <a:cs typeface="Times New Roman" panose="02020603050405020304" pitchFamily="18" charset="0"/>
+              </a:rPr>
+              <a:t>Н.В. </a:t>
+            </a:r>
+            <a:r>
+              <a:rPr lang="ru-RU" sz="2400" dirty="0" err="1">
+                <a:latin typeface="Times New Roman" panose="02020603050405020304" pitchFamily="18" charset="0"/>
+                <a:cs typeface="Times New Roman" panose="02020603050405020304" pitchFamily="18" charset="0"/>
+              </a:rPr>
+              <a:t>Пизова</a:t>
+            </a:r>
+            <a:r>
+              <a:rPr lang="ru-RU" sz="2400" dirty="0">
+                <a:latin typeface="Times New Roman" panose="02020603050405020304" pitchFamily="18" charset="0"/>
+                <a:cs typeface="Times New Roman" panose="02020603050405020304" pitchFamily="18" charset="0"/>
+              </a:rPr>
+              <a:t> А.В. </a:t>
+            </a:r>
+            <a:r>
+              <a:rPr lang="ru-RU" sz="2400" dirty="0" err="1">
+                <a:latin typeface="Times New Roman" panose="02020603050405020304" pitchFamily="18" charset="0"/>
+                <a:cs typeface="Times New Roman" panose="02020603050405020304" pitchFamily="18" charset="0"/>
+              </a:rPr>
+              <a:t>Пизов</a:t>
+            </a:r>
+            <a:r>
+              <a:rPr lang="ru-RU" sz="2400" dirty="0">
+                <a:latin typeface="Times New Roman" panose="02020603050405020304" pitchFamily="18" charset="0"/>
+                <a:cs typeface="Times New Roman" panose="02020603050405020304" pitchFamily="18" charset="0"/>
+              </a:rPr>
+              <a:t>. Когнитивные нарушения и синдром хронической усталости // Нервные болезни. 2021. № 3. С. 10–16.</a:t>
+            </a:r>
+            <a:endParaRPr lang="en-US" sz="2400" dirty="0">
+              <a:latin typeface="Times New Roman" panose="02020603050405020304" pitchFamily="18" charset="0"/>
+              <a:cs typeface="Times New Roman" panose="02020603050405020304" pitchFamily="18" charset="0"/>
+            </a:endParaRPr>
+          </a:p>
+          <a:p>
+            <a:pPr marL="342900" indent="-342900" algn="l">
+              <a:buFont typeface="+mj-lt"/>
+              <a:buAutoNum type="arabicPeriod"/>
+            </a:pPr>
+            <a:r>
+              <a:rPr lang="ru-RU" sz="2400" dirty="0" err="1">
+                <a:latin typeface="Times New Roman" panose="02020603050405020304" pitchFamily="18" charset="0"/>
+                <a:cs typeface="Times New Roman" panose="02020603050405020304" pitchFamily="18" charset="0"/>
+              </a:rPr>
+              <a:t>Долбышев</a:t>
+            </a:r>
+            <a:r>
+              <a:rPr lang="ru-RU" sz="2400" dirty="0">
+                <a:latin typeface="Times New Roman" panose="02020603050405020304" pitchFamily="18" charset="0"/>
+                <a:cs typeface="Times New Roman" panose="02020603050405020304" pitchFamily="18" charset="0"/>
+              </a:rPr>
+              <a:t> А.В. Нейрофизиологические механизмы стресса // </a:t>
+            </a:r>
+            <a:r>
+              <a:rPr lang="ru-RU" sz="2400" dirty="0" err="1">
+                <a:latin typeface="Times New Roman" panose="02020603050405020304" pitchFamily="18" charset="0"/>
+                <a:cs typeface="Times New Roman" panose="02020603050405020304" pitchFamily="18" charset="0"/>
+              </a:rPr>
+              <a:t>StudNet</a:t>
+            </a:r>
+            <a:r>
+              <a:rPr lang="ru-RU" sz="2400" dirty="0">
+                <a:latin typeface="Times New Roman" panose="02020603050405020304" pitchFamily="18" charset="0"/>
+                <a:cs typeface="Times New Roman" panose="02020603050405020304" pitchFamily="18" charset="0"/>
+              </a:rPr>
+              <a:t>.</a:t>
+            </a:r>
+            <a:r>
+              <a:rPr lang="en-US" sz="2400" dirty="0">
+                <a:latin typeface="Times New Roman" panose="02020603050405020304" pitchFamily="18" charset="0"/>
+                <a:cs typeface="Times New Roman" panose="02020603050405020304" pitchFamily="18" charset="0"/>
+              </a:rPr>
+              <a:t> </a:t>
+            </a:r>
+            <a:r>
+              <a:rPr lang="ru-RU" sz="2400" dirty="0">
+                <a:latin typeface="Times New Roman" panose="02020603050405020304" pitchFamily="18" charset="0"/>
+                <a:cs typeface="Times New Roman" panose="02020603050405020304" pitchFamily="18" charset="0"/>
+              </a:rPr>
+              <a:t>2020. № 7. С. 163–167.</a:t>
+            </a:r>
+          </a:p>
+        </p:txBody>
+      </p:sp>
+      <p:sp>
+        <p:nvSpPr>
+          <p:cNvPr id="5" name="Номер слайда 4">
+            <a:extLst>
+              <a:ext uri="{FF2B5EF4-FFF2-40B4-BE49-F238E27FC236}">
+                <a16:creationId xmlns:a16="http://schemas.microsoft.com/office/drawing/2014/main" id="{911599AE-B3EE-4F75-82FB-BC55E4531C36}"/>
+              </a:ext>
+            </a:extLst>
+          </p:cNvPr>
+          <p:cNvSpPr>
+            <a:spLocks noGrp="1"/>
+          </p:cNvSpPr>
+          <p:nvPr>
+            <p:ph type="sldNum" sz="quarter" idx="12"/>
+          </p:nvPr>
+        </p:nvSpPr>
+        <p:spPr/>
+        <p:txBody>
+          <a:bodyPr/>
+          <a:lstStyle/>
+          <a:p>
+            <a:fld id="{356812A1-C132-42AC-87BC-7262BD3AB593}" type="slidenum">
+              <a:rPr lang="ru-RU" smtClean="0"/>
+              <a:t>7</a:t>
+            </a:fld>
+            <a:endParaRPr lang="ru-RU"/>
+          </a:p>
+        </p:txBody>
+      </p:sp>
+    </p:spTree>
+    <p:extLst>
+      <p:ext uri="{BB962C8B-B14F-4D97-AF65-F5344CB8AC3E}">
+        <p14:creationId xmlns:p14="http://schemas.microsoft.com/office/powerpoint/2010/main" val="2765727373"/>
       </p:ext>
     </p:extLst>
   </p:cSld>

</xml_diff>

<commit_message>
FIX: example for work
</commit_message>
<xml_diff>
--- a/Presentation/presentation.pptx
+++ b/Presentation/presentation.pptx
@@ -265,7 +265,7 @@
           <a:p>
             <a:fld id="{A0EE6EE7-36DE-4D2C-AF3C-F3A52CFDA6D2}" type="datetimeFigureOut">
               <a:rPr lang="ru-RU" smtClean="0"/>
-              <a:t>09.12.2021</a:t>
+              <a:t>11.12.2021</a:t>
             </a:fld>
             <a:endParaRPr lang="ru-RU"/>
           </a:p>
@@ -463,7 +463,7 @@
           <a:p>
             <a:fld id="{A0EE6EE7-36DE-4D2C-AF3C-F3A52CFDA6D2}" type="datetimeFigureOut">
               <a:rPr lang="ru-RU" smtClean="0"/>
-              <a:t>09.12.2021</a:t>
+              <a:t>11.12.2021</a:t>
             </a:fld>
             <a:endParaRPr lang="ru-RU"/>
           </a:p>
@@ -671,7 +671,7 @@
           <a:p>
             <a:fld id="{A0EE6EE7-36DE-4D2C-AF3C-F3A52CFDA6D2}" type="datetimeFigureOut">
               <a:rPr lang="ru-RU" smtClean="0"/>
-              <a:t>09.12.2021</a:t>
+              <a:t>11.12.2021</a:t>
             </a:fld>
             <a:endParaRPr lang="ru-RU"/>
           </a:p>
@@ -869,7 +869,7 @@
           <a:p>
             <a:fld id="{A0EE6EE7-36DE-4D2C-AF3C-F3A52CFDA6D2}" type="datetimeFigureOut">
               <a:rPr lang="ru-RU" smtClean="0"/>
-              <a:t>09.12.2021</a:t>
+              <a:t>11.12.2021</a:t>
             </a:fld>
             <a:endParaRPr lang="ru-RU"/>
           </a:p>
@@ -1144,7 +1144,7 @@
           <a:p>
             <a:fld id="{A0EE6EE7-36DE-4D2C-AF3C-F3A52CFDA6D2}" type="datetimeFigureOut">
               <a:rPr lang="ru-RU" smtClean="0"/>
-              <a:t>09.12.2021</a:t>
+              <a:t>11.12.2021</a:t>
             </a:fld>
             <a:endParaRPr lang="ru-RU"/>
           </a:p>
@@ -1409,7 +1409,7 @@
           <a:p>
             <a:fld id="{A0EE6EE7-36DE-4D2C-AF3C-F3A52CFDA6D2}" type="datetimeFigureOut">
               <a:rPr lang="ru-RU" smtClean="0"/>
-              <a:t>09.12.2021</a:t>
+              <a:t>11.12.2021</a:t>
             </a:fld>
             <a:endParaRPr lang="ru-RU"/>
           </a:p>
@@ -1821,7 +1821,7 @@
           <a:p>
             <a:fld id="{A0EE6EE7-36DE-4D2C-AF3C-F3A52CFDA6D2}" type="datetimeFigureOut">
               <a:rPr lang="ru-RU" smtClean="0"/>
-              <a:t>09.12.2021</a:t>
+              <a:t>11.12.2021</a:t>
             </a:fld>
             <a:endParaRPr lang="ru-RU"/>
           </a:p>
@@ -1962,7 +1962,7 @@
           <a:p>
             <a:fld id="{A0EE6EE7-36DE-4D2C-AF3C-F3A52CFDA6D2}" type="datetimeFigureOut">
               <a:rPr lang="ru-RU" smtClean="0"/>
-              <a:t>09.12.2021</a:t>
+              <a:t>11.12.2021</a:t>
             </a:fld>
             <a:endParaRPr lang="ru-RU"/>
           </a:p>
@@ -2075,7 +2075,7 @@
           <a:p>
             <a:fld id="{A0EE6EE7-36DE-4D2C-AF3C-F3A52CFDA6D2}" type="datetimeFigureOut">
               <a:rPr lang="ru-RU" smtClean="0"/>
-              <a:t>09.12.2021</a:t>
+              <a:t>11.12.2021</a:t>
             </a:fld>
             <a:endParaRPr lang="ru-RU"/>
           </a:p>
@@ -2386,7 +2386,7 @@
           <a:p>
             <a:fld id="{A0EE6EE7-36DE-4D2C-AF3C-F3A52CFDA6D2}" type="datetimeFigureOut">
               <a:rPr lang="ru-RU" smtClean="0"/>
-              <a:t>09.12.2021</a:t>
+              <a:t>11.12.2021</a:t>
             </a:fld>
             <a:endParaRPr lang="ru-RU"/>
           </a:p>
@@ -2674,7 +2674,7 @@
           <a:p>
             <a:fld id="{A0EE6EE7-36DE-4D2C-AF3C-F3A52CFDA6D2}" type="datetimeFigureOut">
               <a:rPr lang="ru-RU" smtClean="0"/>
-              <a:t>09.12.2021</a:t>
+              <a:t>11.12.2021</a:t>
             </a:fld>
             <a:endParaRPr lang="ru-RU"/>
           </a:p>
@@ -2915,7 +2915,7 @@
           <a:p>
             <a:fld id="{A0EE6EE7-36DE-4D2C-AF3C-F3A52CFDA6D2}" type="datetimeFigureOut">
               <a:rPr lang="ru-RU" smtClean="0"/>
-              <a:t>09.12.2021</a:t>
+              <a:t>11.12.2021</a:t>
             </a:fld>
             <a:endParaRPr lang="ru-RU"/>
           </a:p>
@@ -4325,7 +4325,7 @@
           <a:graphicData uri="http://schemas.openxmlformats.org/presentationml/2006/ole">
             <mc:AlternateContent xmlns:mc="http://schemas.openxmlformats.org/markup-compatibility/2006">
               <mc:Choice xmlns:v="urn:schemas-microsoft-com:vml" Requires="v">
-                <p:oleObj spid="_x0000_s1028" r:id="rId3" imgW="8494920" imgH="2742840" progId="">
+                <p:oleObj spid="_x0000_s1029" r:id="rId3" imgW="8494920" imgH="2742840" progId="">
                   <p:embed/>
                 </p:oleObj>
               </mc:Choice>
@@ -4476,7 +4476,7 @@
           <p:nvPr>
             <p:extLst>
               <p:ext uri="{D42A27DB-BD31-4B8C-83A1-F6EECF244321}">
-                <p14:modId xmlns:p14="http://schemas.microsoft.com/office/powerpoint/2010/main" val="965137632"/>
+                <p14:modId xmlns:p14="http://schemas.microsoft.com/office/powerpoint/2010/main" val="1706527686"/>
               </p:ext>
             </p:extLst>
           </p:nvPr>
@@ -4591,8 +4591,21 @@
                           <a:latin typeface="Times New Roman" panose="02020603050405020304" pitchFamily="18" charset="0"/>
                           <a:cs typeface="Times New Roman" panose="02020603050405020304" pitchFamily="18" charset="0"/>
                         </a:rPr>
-                        <a:t>Большая рабочая нагрузка</a:t>
+                        <a:t>Ненормированный рабочий день и </a:t>
                       </a:r>
+                      <a:r>
+                        <a:rPr lang="ru-RU" sz="2000" b="0">
+                          <a:effectLst/>
+                          <a:latin typeface="Times New Roman" panose="02020603050405020304" pitchFamily="18" charset="0"/>
+                          <a:cs typeface="Times New Roman" panose="02020603050405020304" pitchFamily="18" charset="0"/>
+                        </a:rPr>
+                        <a:t>отсутствие перерывов</a:t>
+                      </a:r>
+                      <a:endParaRPr lang="ru-RU" sz="2000" b="0" dirty="0">
+                        <a:effectLst/>
+                        <a:latin typeface="Times New Roman" panose="02020603050405020304" pitchFamily="18" charset="0"/>
+                        <a:cs typeface="Times New Roman" panose="02020603050405020304" pitchFamily="18" charset="0"/>
+                      </a:endParaRPr>
                     </a:p>
                   </a:txBody>
                   <a:tcPr>

</xml_diff>

<commit_message>
ADD: VKR presentation starts
</commit_message>
<xml_diff>
--- a/Presentation/presentation.pptx
+++ b/Presentation/presentation.pptx
@@ -8,10 +8,9 @@
     <p:sldId id="256" r:id="rId2"/>
     <p:sldId id="257" r:id="rId3"/>
     <p:sldId id="266" r:id="rId4"/>
-    <p:sldId id="269" r:id="rId5"/>
-    <p:sldId id="270" r:id="rId6"/>
-    <p:sldId id="273" r:id="rId7"/>
-    <p:sldId id="272" r:id="rId8"/>
+    <p:sldId id="273" r:id="rId5"/>
+    <p:sldId id="274" r:id="rId6"/>
+    <p:sldId id="272" r:id="rId7"/>
   </p:sldIdLst>
   <p:sldSz cx="12192000" cy="6858000"/>
   <p:notesSz cx="6858000" cy="9144000"/>
@@ -118,6 +117,987 @@
 </p:presentation>
 </file>
 
+<file path=ppt/charts/chart1.xml><?xml version="1.0" encoding="utf-8"?>
+<c:chartSpace xmlns:c="http://schemas.openxmlformats.org/drawingml/2006/chart" xmlns:a="http://schemas.openxmlformats.org/drawingml/2006/main" xmlns:r="http://schemas.openxmlformats.org/officeDocument/2006/relationships" xmlns:c16r2="http://schemas.microsoft.com/office/drawing/2015/06/chart">
+  <c:date1904 val="0"/>
+  <c:lang val="ru-RU"/>
+  <c:roundedCorners val="0"/>
+  <mc:AlternateContent xmlns:mc="http://schemas.openxmlformats.org/markup-compatibility/2006">
+    <mc:Choice xmlns:c14="http://schemas.microsoft.com/office/drawing/2007/8/2/chart" Requires="c14">
+      <c14:style val="102"/>
+    </mc:Choice>
+    <mc:Fallback>
+      <c:style val="2"/>
+    </mc:Fallback>
+  </mc:AlternateContent>
+  <c:chart>
+    <c:title>
+      <c:tx>
+        <c:rich>
+          <a:bodyPr rot="0" spcFirstLastPara="1" vertOverflow="ellipsis" vert="horz" wrap="square" anchor="ctr" anchorCtr="1"/>
+          <a:lstStyle/>
+          <a:p>
+            <a:pPr>
+              <a:defRPr sz="1862" b="1" i="0" u="none" strike="noStrike" kern="1200" cap="all" spc="50" baseline="0">
+                <a:solidFill>
+                  <a:schemeClr val="tx1">
+                    <a:lumMod val="65000"/>
+                    <a:lumOff val="35000"/>
+                  </a:schemeClr>
+                </a:solidFill>
+                <a:latin typeface="+mn-lt"/>
+                <a:ea typeface="+mn-ea"/>
+                <a:cs typeface="+mn-cs"/>
+              </a:defRPr>
+            </a:pPr>
+            <a:r>
+              <a:rPr lang="ru-RU"/>
+              <a:t>Причины стресса на рабочем месте </a:t>
+            </a:r>
+            <a:r>
+              <a:rPr lang="en-US"/>
+              <a:t>[1]</a:t>
+            </a:r>
+            <a:endParaRPr lang="ru-RU"/>
+          </a:p>
+        </c:rich>
+      </c:tx>
+      <c:overlay val="0"/>
+      <c:spPr>
+        <a:noFill/>
+        <a:ln>
+          <a:noFill/>
+        </a:ln>
+        <a:effectLst/>
+      </c:spPr>
+      <c:txPr>
+        <a:bodyPr rot="0" spcFirstLastPara="1" vertOverflow="ellipsis" vert="horz" wrap="square" anchor="ctr" anchorCtr="1"/>
+        <a:lstStyle/>
+        <a:p>
+          <a:pPr>
+            <a:defRPr sz="1862" b="1" i="0" u="none" strike="noStrike" kern="1200" cap="all" spc="50" baseline="0">
+              <a:solidFill>
+                <a:schemeClr val="tx1">
+                  <a:lumMod val="65000"/>
+                  <a:lumOff val="35000"/>
+                </a:schemeClr>
+              </a:solidFill>
+              <a:latin typeface="+mn-lt"/>
+              <a:ea typeface="+mn-ea"/>
+              <a:cs typeface="+mn-cs"/>
+            </a:defRPr>
+          </a:pPr>
+          <a:endParaRPr lang="ru-RU"/>
+        </a:p>
+      </c:txPr>
+    </c:title>
+    <c:autoTitleDeleted val="0"/>
+    <c:plotArea>
+      <c:layout/>
+      <c:pieChart>
+        <c:varyColors val="1"/>
+        <c:ser>
+          <c:idx val="0"/>
+          <c:order val="0"/>
+          <c:tx>
+            <c:strRef>
+              <c:f>Лист1!$B$1</c:f>
+              <c:strCache>
+                <c:ptCount val="1"/>
+                <c:pt idx="0">
+                  <c:v>Процент респондентов</c:v>
+                </c:pt>
+              </c:strCache>
+            </c:strRef>
+          </c:tx>
+          <c:dPt>
+            <c:idx val="0"/>
+            <c:bubble3D val="0"/>
+            <c:spPr>
+              <a:solidFill>
+                <a:schemeClr val="accent1"/>
+              </a:solidFill>
+              <a:ln>
+                <a:noFill/>
+              </a:ln>
+              <a:effectLst/>
+              <a:scene3d>
+                <a:camera prst="orthographicFront"/>
+                <a:lightRig rig="brightRoom" dir="t"/>
+              </a:scene3d>
+              <a:sp3d prstMaterial="flat">
+                <a:bevelT w="50800" h="101600" prst="angle"/>
+                <a:contourClr>
+                  <a:srgbClr val="000000"/>
+                </a:contourClr>
+              </a:sp3d>
+            </c:spPr>
+            <c:extLst>
+              <c:ext xmlns:c16="http://schemas.microsoft.com/office/drawing/2014/chart" uri="{C3380CC4-5D6E-409C-BE32-E72D297353CC}">
+                <c16:uniqueId val="{00000001-375B-453A-B91D-9C2D525E6137}"/>
+              </c:ext>
+            </c:extLst>
+          </c:dPt>
+          <c:dPt>
+            <c:idx val="1"/>
+            <c:bubble3D val="0"/>
+            <c:spPr>
+              <a:solidFill>
+                <a:schemeClr val="accent2"/>
+              </a:solidFill>
+              <a:ln>
+                <a:noFill/>
+              </a:ln>
+              <a:effectLst/>
+              <a:scene3d>
+                <a:camera prst="orthographicFront"/>
+                <a:lightRig rig="brightRoom" dir="t"/>
+              </a:scene3d>
+              <a:sp3d prstMaterial="flat">
+                <a:bevelT w="50800" h="101600" prst="angle"/>
+                <a:contourClr>
+                  <a:srgbClr val="000000"/>
+                </a:contourClr>
+              </a:sp3d>
+            </c:spPr>
+            <c:extLst>
+              <c:ext xmlns:c16="http://schemas.microsoft.com/office/drawing/2014/chart" uri="{C3380CC4-5D6E-409C-BE32-E72D297353CC}">
+                <c16:uniqueId val="{00000003-375B-453A-B91D-9C2D525E6137}"/>
+              </c:ext>
+            </c:extLst>
+          </c:dPt>
+          <c:dPt>
+            <c:idx val="2"/>
+            <c:bubble3D val="0"/>
+            <c:spPr>
+              <a:solidFill>
+                <a:schemeClr val="accent3"/>
+              </a:solidFill>
+              <a:ln>
+                <a:noFill/>
+              </a:ln>
+              <a:effectLst/>
+              <a:scene3d>
+                <a:camera prst="orthographicFront"/>
+                <a:lightRig rig="brightRoom" dir="t"/>
+              </a:scene3d>
+              <a:sp3d prstMaterial="flat">
+                <a:bevelT w="50800" h="101600" prst="angle"/>
+                <a:contourClr>
+                  <a:srgbClr val="000000"/>
+                </a:contourClr>
+              </a:sp3d>
+            </c:spPr>
+            <c:extLst>
+              <c:ext xmlns:c16="http://schemas.microsoft.com/office/drawing/2014/chart" uri="{C3380CC4-5D6E-409C-BE32-E72D297353CC}">
+                <c16:uniqueId val="{00000005-375B-453A-B91D-9C2D525E6137}"/>
+              </c:ext>
+            </c:extLst>
+          </c:dPt>
+          <c:dPt>
+            <c:idx val="3"/>
+            <c:bubble3D val="0"/>
+            <c:spPr>
+              <a:solidFill>
+                <a:schemeClr val="accent4"/>
+              </a:solidFill>
+              <a:ln>
+                <a:noFill/>
+              </a:ln>
+              <a:effectLst/>
+              <a:scene3d>
+                <a:camera prst="orthographicFront"/>
+                <a:lightRig rig="brightRoom" dir="t"/>
+              </a:scene3d>
+              <a:sp3d prstMaterial="flat">
+                <a:bevelT w="50800" h="101600" prst="angle"/>
+                <a:contourClr>
+                  <a:srgbClr val="000000"/>
+                </a:contourClr>
+              </a:sp3d>
+            </c:spPr>
+            <c:extLst>
+              <c:ext xmlns:c16="http://schemas.microsoft.com/office/drawing/2014/chart" uri="{C3380CC4-5D6E-409C-BE32-E72D297353CC}">
+                <c16:uniqueId val="{00000007-375B-453A-B91D-9C2D525E6137}"/>
+              </c:ext>
+            </c:extLst>
+          </c:dPt>
+          <c:dPt>
+            <c:idx val="4"/>
+            <c:bubble3D val="0"/>
+            <c:spPr>
+              <a:solidFill>
+                <a:schemeClr val="accent5"/>
+              </a:solidFill>
+              <a:ln>
+                <a:noFill/>
+              </a:ln>
+              <a:effectLst/>
+              <a:scene3d>
+                <a:camera prst="orthographicFront"/>
+                <a:lightRig rig="brightRoom" dir="t"/>
+              </a:scene3d>
+              <a:sp3d prstMaterial="flat">
+                <a:bevelT w="50800" h="101600" prst="angle"/>
+                <a:contourClr>
+                  <a:srgbClr val="000000"/>
+                </a:contourClr>
+              </a:sp3d>
+            </c:spPr>
+            <c:extLst>
+              <c:ext xmlns:c16="http://schemas.microsoft.com/office/drawing/2014/chart" uri="{C3380CC4-5D6E-409C-BE32-E72D297353CC}">
+                <c16:uniqueId val="{00000009-375B-453A-B91D-9C2D525E6137}"/>
+              </c:ext>
+            </c:extLst>
+          </c:dPt>
+          <c:dLbls>
+            <c:spPr>
+              <a:noFill/>
+              <a:ln>
+                <a:noFill/>
+              </a:ln>
+              <a:effectLst/>
+            </c:spPr>
+            <c:txPr>
+              <a:bodyPr rot="0" spcFirstLastPara="1" vertOverflow="ellipsis" vert="horz" wrap="square" lIns="38100" tIns="19050" rIns="38100" bIns="19050" anchor="ctr" anchorCtr="1">
+                <a:spAutoFit/>
+              </a:bodyPr>
+              <a:lstStyle/>
+              <a:p>
+                <a:pPr>
+                  <a:defRPr sz="1197" b="1" i="0" u="none" strike="noStrike" kern="1200" baseline="0">
+                    <a:solidFill>
+                      <a:schemeClr val="lt1"/>
+                    </a:solidFill>
+                    <a:latin typeface="+mn-lt"/>
+                    <a:ea typeface="+mn-ea"/>
+                    <a:cs typeface="+mn-cs"/>
+                  </a:defRPr>
+                </a:pPr>
+                <a:endParaRPr lang="ru-RU"/>
+              </a:p>
+            </c:txPr>
+            <c:dLblPos val="inEnd"/>
+            <c:showLegendKey val="0"/>
+            <c:showVal val="0"/>
+            <c:showCatName val="0"/>
+            <c:showSerName val="0"/>
+            <c:showPercent val="1"/>
+            <c:showBubbleSize val="0"/>
+            <c:showLeaderLines val="1"/>
+            <c:leaderLines>
+              <c:spPr>
+                <a:ln w="9525" cap="flat" cmpd="sng" algn="ctr">
+                  <a:solidFill>
+                    <a:schemeClr val="tx1">
+                      <a:lumMod val="35000"/>
+                      <a:lumOff val="65000"/>
+                    </a:schemeClr>
+                  </a:solidFill>
+                  <a:round/>
+                </a:ln>
+                <a:effectLst/>
+              </c:spPr>
+            </c:leaderLines>
+            <c:extLst>
+              <c:ext xmlns:c15="http://schemas.microsoft.com/office/drawing/2012/chart" uri="{CE6537A1-D6FC-4f65-9D91-7224C49458BB}"/>
+            </c:extLst>
+          </c:dLbls>
+          <c:cat>
+            <c:strRef>
+              <c:f>Лист1!$A$2:$A$6</c:f>
+              <c:strCache>
+                <c:ptCount val="5"/>
+                <c:pt idx="0">
+                  <c:v>Рабочая нагрузка</c:v>
+                </c:pt>
+                <c:pt idx="1">
+                  <c:v>Недостаток поддержки</c:v>
+                </c:pt>
+                <c:pt idx="2">
+                  <c:v>Жестокое обращение</c:v>
+                </c:pt>
+                <c:pt idx="3">
+                  <c:v>Перемены в рабочем процессе</c:v>
+                </c:pt>
+                <c:pt idx="4">
+                  <c:v>Другое</c:v>
+                </c:pt>
+              </c:strCache>
+            </c:strRef>
+          </c:cat>
+          <c:val>
+            <c:numRef>
+              <c:f>Лист1!$B$2:$B$6</c:f>
+              <c:numCache>
+                <c:formatCode>General</c:formatCode>
+                <c:ptCount val="5"/>
+                <c:pt idx="0">
+                  <c:v>44</c:v>
+                </c:pt>
+                <c:pt idx="1">
+                  <c:v>14</c:v>
+                </c:pt>
+                <c:pt idx="2">
+                  <c:v>13</c:v>
+                </c:pt>
+                <c:pt idx="3">
+                  <c:v>8</c:v>
+                </c:pt>
+                <c:pt idx="4">
+                  <c:v>21</c:v>
+                </c:pt>
+              </c:numCache>
+            </c:numRef>
+          </c:val>
+          <c:extLst>
+            <c:ext xmlns:c16="http://schemas.microsoft.com/office/drawing/2014/chart" uri="{C3380CC4-5D6E-409C-BE32-E72D297353CC}">
+              <c16:uniqueId val="{00000000-4016-4918-ADEF-42B6DCD3708F}"/>
+            </c:ext>
+          </c:extLst>
+        </c:ser>
+        <c:dLbls>
+          <c:dLblPos val="inEnd"/>
+          <c:showLegendKey val="0"/>
+          <c:showVal val="0"/>
+          <c:showCatName val="0"/>
+          <c:showSerName val="0"/>
+          <c:showPercent val="1"/>
+          <c:showBubbleSize val="0"/>
+          <c:showLeaderLines val="1"/>
+        </c:dLbls>
+        <c:firstSliceAng val="0"/>
+      </c:pieChart>
+      <c:spPr>
+        <a:noFill/>
+        <a:ln>
+          <a:noFill/>
+        </a:ln>
+        <a:effectLst/>
+      </c:spPr>
+    </c:plotArea>
+    <c:legend>
+      <c:legendPos val="t"/>
+      <c:overlay val="0"/>
+      <c:spPr>
+        <a:noFill/>
+        <a:ln>
+          <a:noFill/>
+        </a:ln>
+        <a:effectLst/>
+      </c:spPr>
+      <c:txPr>
+        <a:bodyPr rot="0" spcFirstLastPara="1" vertOverflow="ellipsis" vert="horz" wrap="square" anchor="ctr" anchorCtr="1"/>
+        <a:lstStyle/>
+        <a:p>
+          <a:pPr>
+            <a:defRPr sz="1197" b="0" i="0" u="none" strike="noStrike" kern="1200" baseline="0">
+              <a:solidFill>
+                <a:schemeClr val="tx1">
+                  <a:lumMod val="65000"/>
+                  <a:lumOff val="35000"/>
+                </a:schemeClr>
+              </a:solidFill>
+              <a:latin typeface="+mn-lt"/>
+              <a:ea typeface="+mn-ea"/>
+              <a:cs typeface="+mn-cs"/>
+            </a:defRPr>
+          </a:pPr>
+          <a:endParaRPr lang="ru-RU"/>
+        </a:p>
+      </c:txPr>
+    </c:legend>
+    <c:plotVisOnly val="1"/>
+    <c:dispBlanksAs val="gap"/>
+    <c:extLst>
+      <c:ext xmlns:c16r3="http://schemas.microsoft.com/office/drawing/2017/03/chart" uri="{56B9EC1D-385E-4148-901F-78D8002777C0}">
+        <c16r3:dataDisplayOptions16>
+          <c16r3:dispNaAsBlank val="1"/>
+        </c16r3:dataDisplayOptions16>
+      </c:ext>
+    </c:extLst>
+    <c:showDLblsOverMax val="0"/>
+  </c:chart>
+  <c:spPr>
+    <a:noFill/>
+    <a:ln>
+      <a:noFill/>
+    </a:ln>
+    <a:effectLst/>
+  </c:spPr>
+  <c:txPr>
+    <a:bodyPr/>
+    <a:lstStyle/>
+    <a:p>
+      <a:pPr>
+        <a:defRPr/>
+      </a:pPr>
+      <a:endParaRPr lang="ru-RU"/>
+    </a:p>
+  </c:txPr>
+  <c:externalData r:id="rId3">
+    <c:autoUpdate val="0"/>
+  </c:externalData>
+</c:chartSpace>
+</file>
+
+<file path=ppt/charts/colors1.xml><?xml version="1.0" encoding="utf-8"?>
+<cs:colorStyle xmlns:cs="http://schemas.microsoft.com/office/drawing/2012/chartStyle" xmlns:a="http://schemas.openxmlformats.org/drawingml/2006/main" meth="cycle" id="10">
+  <a:schemeClr val="accent1"/>
+  <a:schemeClr val="accent2"/>
+  <a:schemeClr val="accent3"/>
+  <a:schemeClr val="accent4"/>
+  <a:schemeClr val="accent5"/>
+  <a:schemeClr val="accent6"/>
+  <cs:variation/>
+  <cs:variation>
+    <a:lumMod val="60000"/>
+  </cs:variation>
+  <cs:variation>
+    <a:lumMod val="80000"/>
+    <a:lumOff val="20000"/>
+  </cs:variation>
+  <cs:variation>
+    <a:lumMod val="80000"/>
+  </cs:variation>
+  <cs:variation>
+    <a:lumMod val="60000"/>
+    <a:lumOff val="40000"/>
+  </cs:variation>
+  <cs:variation>
+    <a:lumMod val="50000"/>
+  </cs:variation>
+  <cs:variation>
+    <a:lumMod val="70000"/>
+    <a:lumOff val="30000"/>
+  </cs:variation>
+  <cs:variation>
+    <a:lumMod val="70000"/>
+  </cs:variation>
+  <cs:variation>
+    <a:lumMod val="50000"/>
+    <a:lumOff val="50000"/>
+  </cs:variation>
+</cs:colorStyle>
+</file>
+
+<file path=ppt/charts/style1.xml><?xml version="1.0" encoding="utf-8"?>
+<cs:chartStyle xmlns:cs="http://schemas.microsoft.com/office/drawing/2012/chartStyle" xmlns:a="http://schemas.openxmlformats.org/drawingml/2006/main" id="258">
+  <cs:axisTitle>
+    <cs:lnRef idx="0"/>
+    <cs:fillRef idx="0"/>
+    <cs:effectRef idx="0"/>
+    <cs:fontRef idx="minor">
+      <a:schemeClr val="tx1">
+        <a:lumMod val="65000"/>
+        <a:lumOff val="35000"/>
+      </a:schemeClr>
+    </cs:fontRef>
+    <cs:defRPr sz="1197" kern="1200"/>
+  </cs:axisTitle>
+  <cs:categoryAxis>
+    <cs:lnRef idx="0"/>
+    <cs:fillRef idx="0"/>
+    <cs:effectRef idx="0"/>
+    <cs:fontRef idx="minor">
+      <a:schemeClr val="tx1">
+        <a:lumMod val="65000"/>
+        <a:lumOff val="35000"/>
+      </a:schemeClr>
+    </cs:fontRef>
+    <cs:defRPr sz="1197" kern="1200"/>
+  </cs:categoryAxis>
+  <cs:chartArea mods="allowNoFillOverride allowNoLineOverride">
+    <cs:lnRef idx="0"/>
+    <cs:fillRef idx="0"/>
+    <cs:effectRef idx="0"/>
+    <cs:fontRef idx="minor">
+      <a:schemeClr val="tx1"/>
+    </cs:fontRef>
+    <cs:spPr>
+      <a:solidFill>
+        <a:schemeClr val="bg1"/>
+      </a:solidFill>
+      <a:ln w="9525" cap="flat" cmpd="sng" algn="ctr">
+        <a:solidFill>
+          <a:schemeClr val="tx1">
+            <a:lumMod val="15000"/>
+            <a:lumOff val="85000"/>
+          </a:schemeClr>
+        </a:solidFill>
+        <a:round/>
+      </a:ln>
+    </cs:spPr>
+    <cs:defRPr sz="1197" kern="1200"/>
+  </cs:chartArea>
+  <cs:dataLabel>
+    <cs:lnRef idx="0"/>
+    <cs:fillRef idx="0"/>
+    <cs:effectRef idx="0"/>
+    <cs:fontRef idx="minor">
+      <a:schemeClr val="lt1"/>
+    </cs:fontRef>
+    <cs:defRPr sz="1197" b="1" kern="1200"/>
+  </cs:dataLabel>
+  <cs:dataLabelCallout>
+    <cs:lnRef idx="0"/>
+    <cs:fillRef idx="0"/>
+    <cs:effectRef idx="0"/>
+    <cs:fontRef idx="minor">
+      <a:schemeClr val="dk1">
+        <a:lumMod val="65000"/>
+        <a:lumOff val="35000"/>
+      </a:schemeClr>
+    </cs:fontRef>
+    <cs:spPr>
+      <a:solidFill>
+        <a:schemeClr val="lt1"/>
+      </a:solidFill>
+      <a:ln>
+        <a:solidFill>
+          <a:schemeClr val="dk1">
+            <a:lumMod val="25000"/>
+            <a:lumOff val="75000"/>
+          </a:schemeClr>
+        </a:solidFill>
+      </a:ln>
+    </cs:spPr>
+    <cs:defRPr sz="1197" kern="1200"/>
+    <cs:bodyPr rot="0" spcFirstLastPara="1" vertOverflow="clip" horzOverflow="clip" vert="horz" wrap="square" lIns="36576" tIns="18288" rIns="36576" bIns="18288" anchor="ctr" anchorCtr="1">
+      <a:spAutoFit/>
+    </cs:bodyPr>
+  </cs:dataLabelCallout>
+  <cs:dataPoint>
+    <cs:lnRef idx="0"/>
+    <cs:fillRef idx="0">
+      <cs:styleClr val="auto"/>
+    </cs:fillRef>
+    <cs:effectRef idx="0"/>
+    <cs:fontRef idx="minor">
+      <a:schemeClr val="tx1"/>
+    </cs:fontRef>
+    <cs:spPr>
+      <a:solidFill>
+        <a:schemeClr val="phClr"/>
+      </a:solidFill>
+      <a:scene3d>
+        <a:camera prst="orthographicFront"/>
+        <a:lightRig rig="brightRoom" dir="t"/>
+      </a:scene3d>
+      <a:sp3d prstMaterial="flat">
+        <a:bevelT w="50800" h="101600" prst="angle"/>
+        <a:contourClr>
+          <a:srgbClr val="000000"/>
+        </a:contourClr>
+      </a:sp3d>
+    </cs:spPr>
+  </cs:dataPoint>
+  <cs:dataPoint3D>
+    <cs:lnRef idx="0"/>
+    <cs:fillRef idx="0">
+      <cs:styleClr val="auto"/>
+    </cs:fillRef>
+    <cs:effectRef idx="0"/>
+    <cs:fontRef idx="minor">
+      <a:schemeClr val="tx1"/>
+    </cs:fontRef>
+    <cs:spPr>
+      <a:solidFill>
+        <a:schemeClr val="phClr"/>
+      </a:solidFill>
+      <a:ln w="19050">
+        <a:solidFill>
+          <a:schemeClr val="lt1"/>
+        </a:solidFill>
+      </a:ln>
+    </cs:spPr>
+  </cs:dataPoint3D>
+  <cs:dataPointLine>
+    <cs:lnRef idx="0">
+      <cs:styleClr val="auto"/>
+    </cs:lnRef>
+    <cs:fillRef idx="0"/>
+    <cs:effectRef idx="0"/>
+    <cs:fontRef idx="minor">
+      <a:schemeClr val="tx1"/>
+    </cs:fontRef>
+    <cs:spPr>
+      <a:ln w="28575" cap="rnd">
+        <a:solidFill>
+          <a:schemeClr val="phClr"/>
+        </a:solidFill>
+        <a:round/>
+      </a:ln>
+    </cs:spPr>
+  </cs:dataPointLine>
+  <cs:dataPointMarker>
+    <cs:lnRef idx="0"/>
+    <cs:fillRef idx="0">
+      <cs:styleClr val="auto"/>
+    </cs:fillRef>
+    <cs:effectRef idx="0"/>
+    <cs:fontRef idx="minor">
+      <a:schemeClr val="tx1"/>
+    </cs:fontRef>
+    <cs:spPr>
+      <a:solidFill>
+        <a:schemeClr val="phClr"/>
+      </a:solidFill>
+      <a:ln w="9525">
+        <a:solidFill>
+          <a:schemeClr val="lt1"/>
+        </a:solidFill>
+      </a:ln>
+    </cs:spPr>
+  </cs:dataPointMarker>
+  <cs:dataPointMarkerLayout symbol="circle" size="6"/>
+  <cs:dataPointWireframe>
+    <cs:lnRef idx="0">
+      <cs:styleClr val="auto"/>
+    </cs:lnRef>
+    <cs:fillRef idx="0"/>
+    <cs:effectRef idx="0"/>
+    <cs:fontRef idx="minor">
+      <a:schemeClr val="tx1"/>
+    </cs:fontRef>
+    <cs:spPr>
+      <a:ln w="9525" cap="rnd">
+        <a:solidFill>
+          <a:schemeClr val="phClr"/>
+        </a:solidFill>
+        <a:round/>
+      </a:ln>
+    </cs:spPr>
+  </cs:dataPointWireframe>
+  <cs:dataTable>
+    <cs:lnRef idx="0"/>
+    <cs:fillRef idx="0"/>
+    <cs:effectRef idx="0"/>
+    <cs:fontRef idx="minor">
+      <a:schemeClr val="tx1">
+        <a:lumMod val="65000"/>
+        <a:lumOff val="35000"/>
+      </a:schemeClr>
+    </cs:fontRef>
+    <cs:spPr>
+      <a:noFill/>
+      <a:ln w="9525" cap="flat" cmpd="sng" algn="ctr">
+        <a:solidFill>
+          <a:schemeClr val="tx1">
+            <a:lumMod val="15000"/>
+            <a:lumOff val="85000"/>
+          </a:schemeClr>
+        </a:solidFill>
+        <a:round/>
+      </a:ln>
+    </cs:spPr>
+    <cs:defRPr sz="1197" kern="1200"/>
+  </cs:dataTable>
+  <cs:downBar>
+    <cs:lnRef idx="0"/>
+    <cs:fillRef idx="0"/>
+    <cs:effectRef idx="0"/>
+    <cs:fontRef idx="minor">
+      <a:schemeClr val="tx1"/>
+    </cs:fontRef>
+    <cs:spPr>
+      <a:solidFill>
+        <a:schemeClr val="dk1">
+          <a:lumMod val="75000"/>
+          <a:lumOff val="25000"/>
+        </a:schemeClr>
+      </a:solidFill>
+      <a:ln w="9525" cap="flat" cmpd="sng" algn="ctr">
+        <a:solidFill>
+          <a:schemeClr val="tx1">
+            <a:lumMod val="65000"/>
+            <a:lumOff val="35000"/>
+          </a:schemeClr>
+        </a:solidFill>
+        <a:round/>
+      </a:ln>
+    </cs:spPr>
+  </cs:downBar>
+  <cs:dropLine>
+    <cs:lnRef idx="0"/>
+    <cs:fillRef idx="0"/>
+    <cs:effectRef idx="0"/>
+    <cs:fontRef idx="minor">
+      <a:schemeClr val="tx1"/>
+    </cs:fontRef>
+    <cs:spPr>
+      <a:ln w="9525" cap="flat" cmpd="sng" algn="ctr">
+        <a:solidFill>
+          <a:schemeClr val="tx1">
+            <a:lumMod val="35000"/>
+            <a:lumOff val="65000"/>
+          </a:schemeClr>
+        </a:solidFill>
+        <a:round/>
+      </a:ln>
+    </cs:spPr>
+  </cs:dropLine>
+  <cs:errorBar>
+    <cs:lnRef idx="0"/>
+    <cs:fillRef idx="0"/>
+    <cs:effectRef idx="0"/>
+    <cs:fontRef idx="minor">
+      <a:schemeClr val="tx1"/>
+    </cs:fontRef>
+    <cs:spPr>
+      <a:ln w="9525" cap="flat" cmpd="sng" algn="ctr">
+        <a:solidFill>
+          <a:schemeClr val="tx1">
+            <a:lumMod val="65000"/>
+            <a:lumOff val="35000"/>
+          </a:schemeClr>
+        </a:solidFill>
+        <a:round/>
+      </a:ln>
+    </cs:spPr>
+  </cs:errorBar>
+  <cs:floor>
+    <cs:lnRef idx="0"/>
+    <cs:fillRef idx="0"/>
+    <cs:effectRef idx="0"/>
+    <cs:fontRef idx="minor">
+      <a:schemeClr val="tx1"/>
+    </cs:fontRef>
+    <cs:spPr>
+      <a:noFill/>
+      <a:ln>
+        <a:noFill/>
+      </a:ln>
+    </cs:spPr>
+  </cs:floor>
+  <cs:gridlineMajor>
+    <cs:lnRef idx="0"/>
+    <cs:fillRef idx="0"/>
+    <cs:effectRef idx="0"/>
+    <cs:fontRef idx="minor">
+      <a:schemeClr val="tx1"/>
+    </cs:fontRef>
+    <cs:spPr>
+      <a:ln w="9525" cap="flat" cmpd="sng" algn="ctr">
+        <a:solidFill>
+          <a:schemeClr val="tx1">
+            <a:lumMod val="15000"/>
+            <a:lumOff val="85000"/>
+          </a:schemeClr>
+        </a:solidFill>
+        <a:round/>
+      </a:ln>
+    </cs:spPr>
+  </cs:gridlineMajor>
+  <cs:gridlineMinor>
+    <cs:lnRef idx="0"/>
+    <cs:fillRef idx="0"/>
+    <cs:effectRef idx="0"/>
+    <cs:fontRef idx="minor">
+      <a:schemeClr val="tx1"/>
+    </cs:fontRef>
+    <cs:spPr>
+      <a:ln w="9525" cap="flat" cmpd="sng" algn="ctr">
+        <a:solidFill>
+          <a:schemeClr val="tx1">
+            <a:lumMod val="5000"/>
+            <a:lumOff val="95000"/>
+          </a:schemeClr>
+        </a:solidFill>
+        <a:round/>
+      </a:ln>
+    </cs:spPr>
+  </cs:gridlineMinor>
+  <cs:hiLoLine>
+    <cs:lnRef idx="0"/>
+    <cs:fillRef idx="0"/>
+    <cs:effectRef idx="0"/>
+    <cs:fontRef idx="minor">
+      <a:schemeClr val="tx1"/>
+    </cs:fontRef>
+    <cs:spPr>
+      <a:ln w="9525" cap="flat" cmpd="sng" algn="ctr">
+        <a:solidFill>
+          <a:schemeClr val="tx1">
+            <a:lumMod val="50000"/>
+            <a:lumOff val="50000"/>
+          </a:schemeClr>
+        </a:solidFill>
+        <a:round/>
+      </a:ln>
+    </cs:spPr>
+  </cs:hiLoLine>
+  <cs:leaderLine>
+    <cs:lnRef idx="0"/>
+    <cs:fillRef idx="0"/>
+    <cs:effectRef idx="0"/>
+    <cs:fontRef idx="minor">
+      <a:schemeClr val="tx1"/>
+    </cs:fontRef>
+    <cs:spPr>
+      <a:ln w="9525" cap="flat" cmpd="sng" algn="ctr">
+        <a:solidFill>
+          <a:schemeClr val="tx1">
+            <a:lumMod val="35000"/>
+            <a:lumOff val="65000"/>
+          </a:schemeClr>
+        </a:solidFill>
+        <a:round/>
+      </a:ln>
+    </cs:spPr>
+  </cs:leaderLine>
+  <cs:legend>
+    <cs:lnRef idx="0"/>
+    <cs:fillRef idx="0"/>
+    <cs:effectRef idx="0"/>
+    <cs:fontRef idx="minor">
+      <a:schemeClr val="tx1">
+        <a:lumMod val="65000"/>
+        <a:lumOff val="35000"/>
+      </a:schemeClr>
+    </cs:fontRef>
+    <cs:defRPr sz="1197" kern="1200"/>
+  </cs:legend>
+  <cs:plotArea mods="allowNoFillOverride allowNoLineOverride">
+    <cs:lnRef idx="0"/>
+    <cs:fillRef idx="0"/>
+    <cs:effectRef idx="0"/>
+    <cs:fontRef idx="minor">
+      <a:schemeClr val="tx1"/>
+    </cs:fontRef>
+  </cs:plotArea>
+  <cs:plotArea3D mods="allowNoFillOverride allowNoLineOverride">
+    <cs:lnRef idx="0"/>
+    <cs:fillRef idx="0"/>
+    <cs:effectRef idx="0"/>
+    <cs:fontRef idx="minor">
+      <a:schemeClr val="tx1"/>
+    </cs:fontRef>
+  </cs:plotArea3D>
+  <cs:seriesAxis>
+    <cs:lnRef idx="0"/>
+    <cs:fillRef idx="0"/>
+    <cs:effectRef idx="0"/>
+    <cs:fontRef idx="minor">
+      <a:schemeClr val="tx1">
+        <a:lumMod val="65000"/>
+        <a:lumOff val="35000"/>
+      </a:schemeClr>
+    </cs:fontRef>
+    <cs:defRPr sz="1197" kern="1200"/>
+  </cs:seriesAxis>
+  <cs:seriesLine>
+    <cs:lnRef idx="0"/>
+    <cs:fillRef idx="0"/>
+    <cs:effectRef idx="0"/>
+    <cs:fontRef idx="minor">
+      <a:schemeClr val="tx1"/>
+    </cs:fontRef>
+    <cs:spPr>
+      <a:ln w="9525" cap="flat" cmpd="sng" algn="ctr">
+        <a:solidFill>
+          <a:schemeClr val="tx1">
+            <a:lumMod val="35000"/>
+            <a:lumOff val="65000"/>
+          </a:schemeClr>
+        </a:solidFill>
+        <a:round/>
+      </a:ln>
+    </cs:spPr>
+  </cs:seriesLine>
+  <cs:title>
+    <cs:lnRef idx="0"/>
+    <cs:fillRef idx="0"/>
+    <cs:effectRef idx="0"/>
+    <cs:fontRef idx="minor">
+      <a:schemeClr val="tx1">
+        <a:lumMod val="65000"/>
+        <a:lumOff val="35000"/>
+      </a:schemeClr>
+    </cs:fontRef>
+    <cs:defRPr sz="1862" b="1" i="0" kern="1200" cap="all" spc="50" baseline="0"/>
+  </cs:title>
+  <cs:trendline>
+    <cs:lnRef idx="0">
+      <cs:styleClr val="auto"/>
+    </cs:lnRef>
+    <cs:fillRef idx="0"/>
+    <cs:effectRef idx="0"/>
+    <cs:fontRef idx="minor">
+      <a:schemeClr val="tx1"/>
+    </cs:fontRef>
+    <cs:spPr>
+      <a:ln w="19050" cap="rnd">
+        <a:solidFill>
+          <a:schemeClr val="phClr"/>
+        </a:solidFill>
+        <a:prstDash val="sysDash"/>
+      </a:ln>
+    </cs:spPr>
+  </cs:trendline>
+  <cs:trendlineLabel>
+    <cs:lnRef idx="0"/>
+    <cs:fillRef idx="0"/>
+    <cs:effectRef idx="0"/>
+    <cs:fontRef idx="minor">
+      <a:schemeClr val="tx1">
+        <a:lumMod val="65000"/>
+        <a:lumOff val="35000"/>
+      </a:schemeClr>
+    </cs:fontRef>
+    <cs:defRPr sz="1197" kern="1200"/>
+  </cs:trendlineLabel>
+  <cs:upBar>
+    <cs:lnRef idx="0"/>
+    <cs:fillRef idx="0"/>
+    <cs:effectRef idx="0"/>
+    <cs:fontRef idx="minor">
+      <a:schemeClr val="tx1"/>
+    </cs:fontRef>
+    <cs:spPr>
+      <a:solidFill>
+        <a:schemeClr val="lt1"/>
+      </a:solidFill>
+      <a:ln w="9525" cap="flat" cmpd="sng" algn="ctr">
+        <a:solidFill>
+          <a:schemeClr val="tx1">
+            <a:lumMod val="65000"/>
+            <a:lumOff val="35000"/>
+          </a:schemeClr>
+        </a:solidFill>
+        <a:round/>
+      </a:ln>
+    </cs:spPr>
+  </cs:upBar>
+  <cs:valueAxis>
+    <cs:lnRef idx="0"/>
+    <cs:fillRef idx="0"/>
+    <cs:effectRef idx="0"/>
+    <cs:fontRef idx="minor">
+      <a:schemeClr val="tx1">
+        <a:lumMod val="65000"/>
+        <a:lumOff val="35000"/>
+      </a:schemeClr>
+    </cs:fontRef>
+    <cs:defRPr sz="1197" kern="1200"/>
+  </cs:valueAxis>
+  <cs:wall>
+    <cs:lnRef idx="0"/>
+    <cs:fillRef idx="0"/>
+    <cs:effectRef idx="0"/>
+    <cs:fontRef idx="minor">
+      <a:schemeClr val="tx1"/>
+    </cs:fontRef>
+    <cs:spPr>
+      <a:noFill/>
+      <a:ln>
+        <a:noFill/>
+      </a:ln>
+    </cs:spPr>
+  </cs:wall>
+</cs:chartStyle>
+</file>
+
 <file path=ppt/slideLayouts/slideLayout1.xml><?xml version="1.0" encoding="utf-8"?>
 <p:sldLayout xmlns:a="http://schemas.openxmlformats.org/drawingml/2006/main" xmlns:r="http://schemas.openxmlformats.org/officeDocument/2006/relationships" xmlns:p="http://schemas.openxmlformats.org/presentationml/2006/main" type="title" preserve="1">
   <p:cSld name="Титульный слайд">
@@ -265,7 +1245,7 @@
           <a:p>
             <a:fld id="{A0EE6EE7-36DE-4D2C-AF3C-F3A52CFDA6D2}" type="datetimeFigureOut">
               <a:rPr lang="ru-RU" smtClean="0"/>
-              <a:t>11.12.2021</a:t>
+              <a:t>02.04.2022</a:t>
             </a:fld>
             <a:endParaRPr lang="ru-RU"/>
           </a:p>
@@ -463,7 +1443,7 @@
           <a:p>
             <a:fld id="{A0EE6EE7-36DE-4D2C-AF3C-F3A52CFDA6D2}" type="datetimeFigureOut">
               <a:rPr lang="ru-RU" smtClean="0"/>
-              <a:t>11.12.2021</a:t>
+              <a:t>02.04.2022</a:t>
             </a:fld>
             <a:endParaRPr lang="ru-RU"/>
           </a:p>
@@ -671,7 +1651,7 @@
           <a:p>
             <a:fld id="{A0EE6EE7-36DE-4D2C-AF3C-F3A52CFDA6D2}" type="datetimeFigureOut">
               <a:rPr lang="ru-RU" smtClean="0"/>
-              <a:t>11.12.2021</a:t>
+              <a:t>02.04.2022</a:t>
             </a:fld>
             <a:endParaRPr lang="ru-RU"/>
           </a:p>
@@ -869,7 +1849,7 @@
           <a:p>
             <a:fld id="{A0EE6EE7-36DE-4D2C-AF3C-F3A52CFDA6D2}" type="datetimeFigureOut">
               <a:rPr lang="ru-RU" smtClean="0"/>
-              <a:t>11.12.2021</a:t>
+              <a:t>02.04.2022</a:t>
             </a:fld>
             <a:endParaRPr lang="ru-RU"/>
           </a:p>
@@ -1144,7 +2124,7 @@
           <a:p>
             <a:fld id="{A0EE6EE7-36DE-4D2C-AF3C-F3A52CFDA6D2}" type="datetimeFigureOut">
               <a:rPr lang="ru-RU" smtClean="0"/>
-              <a:t>11.12.2021</a:t>
+              <a:t>02.04.2022</a:t>
             </a:fld>
             <a:endParaRPr lang="ru-RU"/>
           </a:p>
@@ -1409,7 +2389,7 @@
           <a:p>
             <a:fld id="{A0EE6EE7-36DE-4D2C-AF3C-F3A52CFDA6D2}" type="datetimeFigureOut">
               <a:rPr lang="ru-RU" smtClean="0"/>
-              <a:t>11.12.2021</a:t>
+              <a:t>02.04.2022</a:t>
             </a:fld>
             <a:endParaRPr lang="ru-RU"/>
           </a:p>
@@ -1821,7 +2801,7 @@
           <a:p>
             <a:fld id="{A0EE6EE7-36DE-4D2C-AF3C-F3A52CFDA6D2}" type="datetimeFigureOut">
               <a:rPr lang="ru-RU" smtClean="0"/>
-              <a:t>11.12.2021</a:t>
+              <a:t>02.04.2022</a:t>
             </a:fld>
             <a:endParaRPr lang="ru-RU"/>
           </a:p>
@@ -1962,7 +2942,7 @@
           <a:p>
             <a:fld id="{A0EE6EE7-36DE-4D2C-AF3C-F3A52CFDA6D2}" type="datetimeFigureOut">
               <a:rPr lang="ru-RU" smtClean="0"/>
-              <a:t>11.12.2021</a:t>
+              <a:t>02.04.2022</a:t>
             </a:fld>
             <a:endParaRPr lang="ru-RU"/>
           </a:p>
@@ -2075,7 +3055,7 @@
           <a:p>
             <a:fld id="{A0EE6EE7-36DE-4D2C-AF3C-F3A52CFDA6D2}" type="datetimeFigureOut">
               <a:rPr lang="ru-RU" smtClean="0"/>
-              <a:t>11.12.2021</a:t>
+              <a:t>02.04.2022</a:t>
             </a:fld>
             <a:endParaRPr lang="ru-RU"/>
           </a:p>
@@ -2386,7 +3366,7 @@
           <a:p>
             <a:fld id="{A0EE6EE7-36DE-4D2C-AF3C-F3A52CFDA6D2}" type="datetimeFigureOut">
               <a:rPr lang="ru-RU" smtClean="0"/>
-              <a:t>11.12.2021</a:t>
+              <a:t>02.04.2022</a:t>
             </a:fld>
             <a:endParaRPr lang="ru-RU"/>
           </a:p>
@@ -2674,7 +3654,7 @@
           <a:p>
             <a:fld id="{A0EE6EE7-36DE-4D2C-AF3C-F3A52CFDA6D2}" type="datetimeFigureOut">
               <a:rPr lang="ru-RU" smtClean="0"/>
-              <a:t>11.12.2021</a:t>
+              <a:t>02.04.2022</a:t>
             </a:fld>
             <a:endParaRPr lang="ru-RU"/>
           </a:p>
@@ -2915,7 +3895,7 @@
           <a:p>
             <a:fld id="{A0EE6EE7-36DE-4D2C-AF3C-F3A52CFDA6D2}" type="datetimeFigureOut">
               <a:rPr lang="ru-RU" smtClean="0"/>
-              <a:t>11.12.2021</a:t>
+              <a:t>02.04.2022</a:t>
             </a:fld>
             <a:endParaRPr lang="ru-RU"/>
           </a:p>
@@ -3412,7 +4392,21 @@
                 <a:latin typeface="Times New Roman" panose="02020603050405020304" pitchFamily="18" charset="0"/>
                 <a:cs typeface="Times New Roman" panose="02020603050405020304" pitchFamily="18" charset="0"/>
               </a:rPr>
-              <a:t>Группа: ИУ7-73Б</a:t>
+              <a:t>Группа: ИУ7-</a:t>
+            </a:r>
+            <a:r>
+              <a:rPr lang="en-US" dirty="0">
+                <a:latin typeface="Times New Roman" panose="02020603050405020304" pitchFamily="18" charset="0"/>
+                <a:cs typeface="Times New Roman" panose="02020603050405020304" pitchFamily="18" charset="0"/>
+              </a:rPr>
+              <a:t>8</a:t>
+            </a:r>
+            <a:r>
+              <a:rPr lang="ru-RU" dirty="0">
+                <a:latin typeface="Times New Roman" panose="02020603050405020304" pitchFamily="18" charset="0"/>
+                <a:cs typeface="Times New Roman" panose="02020603050405020304" pitchFamily="18" charset="0"/>
+              </a:rPr>
+              <a:t>3Б</a:t>
             </a:r>
             <a:endParaRPr lang="en-US" dirty="0">
               <a:latin typeface="Times New Roman" panose="02020603050405020304" pitchFamily="18" charset="0"/>
@@ -3590,7 +4584,7 @@
                 <a:latin typeface="Times New Roman" panose="02020603050405020304" pitchFamily="18" charset="0"/>
                 <a:cs typeface="Times New Roman" panose="02020603050405020304" pitchFamily="18" charset="0"/>
               </a:rPr>
-              <a:t>– описать проблематику стресса на рабочем месте и метод распознавания усталости пользователя на автоматизированном рабочем месте (АРМ) с использованием доступных технологий определения усталости, построенных на анализе отдельных характеристик и действий.</a:t>
+              <a:t>– описать метод распознавания усталости пользователя на автоматизированном рабочем месте (АРМ) с использованием доступных технологий определения усталости, построенных на анализе отдельных характеристик и действий.</a:t>
             </a:r>
             <a:r>
               <a:rPr lang="ru-RU" sz="2400" b="1" dirty="0">
@@ -3623,7 +4617,24 @@
                 <a:latin typeface="Times New Roman" panose="02020603050405020304" pitchFamily="18" charset="0"/>
                 <a:cs typeface="Times New Roman" panose="02020603050405020304" pitchFamily="18" charset="0"/>
               </a:rPr>
-              <a:t>описать термины предметной области и обозначить проблему</a:t>
+              <a:t>провести анализ существующих методов определения усталости</a:t>
+            </a:r>
+            <a:r>
+              <a:rPr lang="en-US" sz="2400" dirty="0">
+                <a:latin typeface="Times New Roman" panose="02020603050405020304" pitchFamily="18" charset="0"/>
+                <a:cs typeface="Times New Roman" panose="02020603050405020304" pitchFamily="18" charset="0"/>
+              </a:rPr>
+              <a:t>;</a:t>
+            </a:r>
+          </a:p>
+          <a:p>
+            <a:pPr algn="just"/>
+            <a:r>
+              <a:rPr lang="ru-RU" sz="2400" dirty="0">
+                <a:latin typeface="Times New Roman" panose="02020603050405020304" pitchFamily="18" charset="0"/>
+                <a:cs typeface="Times New Roman" panose="02020603050405020304" pitchFamily="18" charset="0"/>
+              </a:rPr>
+              <a:t>провести анализ действий и характеристик, позволяющих определить усталость пользователя АРМ</a:t>
             </a:r>
             <a:r>
               <a:rPr lang="en-US" sz="2400" dirty="0">
@@ -3644,7 +4655,7 @@
                 <a:latin typeface="Times New Roman" panose="02020603050405020304" pitchFamily="18" charset="0"/>
                 <a:cs typeface="Times New Roman" panose="02020603050405020304" pitchFamily="18" charset="0"/>
               </a:rPr>
-              <a:t>провести анализ существующих методов определения усталости</a:t>
+              <a:t>определить методы снятия выделенных действий и характеристик</a:t>
             </a:r>
             <a:r>
               <a:rPr lang="en-US" sz="2400" dirty="0">
@@ -3661,46 +4672,19 @@
                 <a:latin typeface="Times New Roman" panose="02020603050405020304" pitchFamily="18" charset="0"/>
                 <a:cs typeface="Times New Roman" panose="02020603050405020304" pitchFamily="18" charset="0"/>
               </a:rPr>
-              <a:t>провести анализ действий и характеристик, позволяющих определить усталость пользователя АРМ</a:t>
+              <a:t>описать работу системы распознавания усталости (СРУ) пользователя АРМ</a:t>
             </a:r>
             <a:r>
               <a:rPr lang="en-US" sz="2400" dirty="0">
                 <a:latin typeface="Times New Roman" panose="02020603050405020304" pitchFamily="18" charset="0"/>
                 <a:cs typeface="Times New Roman" panose="02020603050405020304" pitchFamily="18" charset="0"/>
               </a:rPr>
-              <a:t>;</a:t>
+              <a:t>.</a:t>
             </a:r>
             <a:endParaRPr lang="ru-RU" sz="2400" dirty="0">
               <a:latin typeface="Times New Roman" panose="02020603050405020304" pitchFamily="18" charset="0"/>
               <a:cs typeface="Times New Roman" panose="02020603050405020304" pitchFamily="18" charset="0"/>
             </a:endParaRPr>
-          </a:p>
-          <a:p>
-            <a:pPr algn="just"/>
-            <a:r>
-              <a:rPr lang="ru-RU" sz="2400" dirty="0">
-                <a:latin typeface="Times New Roman" panose="02020603050405020304" pitchFamily="18" charset="0"/>
-                <a:cs typeface="Times New Roman" panose="02020603050405020304" pitchFamily="18" charset="0"/>
-              </a:rPr>
-              <a:t>определить методы снятия выделенных действий и характеристик</a:t>
-            </a:r>
-            <a:r>
-              <a:rPr lang="en-US" sz="2400" dirty="0">
-                <a:latin typeface="Times New Roman" panose="02020603050405020304" pitchFamily="18" charset="0"/>
-                <a:cs typeface="Times New Roman" panose="02020603050405020304" pitchFamily="18" charset="0"/>
-              </a:rPr>
-              <a:t>;</a:t>
-            </a:r>
-          </a:p>
-          <a:p>
-            <a:pPr algn="just"/>
-            <a:r>
-              <a:rPr lang="ru-RU" sz="2400" dirty="0">
-                <a:latin typeface="Times New Roman" panose="02020603050405020304" pitchFamily="18" charset="0"/>
-                <a:cs typeface="Times New Roman" panose="02020603050405020304" pitchFamily="18" charset="0"/>
-              </a:rPr>
-              <a:t>описать работу системы распознавания усталости (СРУ) пользователя АРМ.</a:t>
-            </a:r>
           </a:p>
         </p:txBody>
       </p:sp>
@@ -3790,7 +4774,7 @@
                 <a:latin typeface="Times New Roman" panose="02020603050405020304" pitchFamily="18" charset="0"/>
                 <a:cs typeface="Times New Roman" panose="02020603050405020304" pitchFamily="18" charset="0"/>
               </a:rPr>
-              <a:t>Термины предметной области</a:t>
+              <a:t>Актуальность</a:t>
             </a:r>
           </a:p>
         </p:txBody>
@@ -3811,7 +4795,12 @@
             <p:ph idx="1"/>
           </p:nvPr>
         </p:nvSpPr>
-        <p:spPr/>
+        <p:spPr>
+          <a:xfrm>
+            <a:off x="838200" y="1825625"/>
+            <a:ext cx="5257800" cy="4351338"/>
+          </a:xfrm>
+        </p:spPr>
         <p:txBody>
           <a:bodyPr>
             <a:normAutofit fontScale="92500" lnSpcReduction="10000"/>
@@ -3826,7 +4815,7 @@
                 <a:latin typeface="Times New Roman" panose="02020603050405020304" pitchFamily="18" charset="0"/>
                 <a:cs typeface="Times New Roman" panose="02020603050405020304" pitchFamily="18" charset="0"/>
               </a:rPr>
-              <a:t>Усталость – ощущение физической усталости и отсутствия энергии, которое нарушает повседневную физическую и социальную жизнь, не связанное с умственным переутомлением, депрессией, сонливостью, нарушением двигательных функций. </a:t>
+              <a:t>В 2018 году в результате опроса 600 тысяч человек в Великобритании </a:t>
             </a:r>
             <a:r>
               <a:rPr lang="en-US" dirty="0">
@@ -3835,10 +4824,27 @@
               </a:rPr>
               <a:t>[1]</a:t>
             </a:r>
-            <a:endParaRPr lang="ru-RU" dirty="0">
-              <a:latin typeface="Times New Roman" panose="02020603050405020304" pitchFamily="18" charset="0"/>
-              <a:cs typeface="Times New Roman" panose="02020603050405020304" pitchFamily="18" charset="0"/>
-            </a:endParaRPr>
+            <a:r>
+              <a:rPr lang="ru-RU" dirty="0">
+                <a:latin typeface="Times New Roman" panose="02020603050405020304" pitchFamily="18" charset="0"/>
+                <a:cs typeface="Times New Roman" panose="02020603050405020304" pitchFamily="18" charset="0"/>
+              </a:rPr>
+              <a:t> стало известно, что </a:t>
+            </a:r>
+            <a:r>
+              <a:rPr lang="en-US" dirty="0">
+                <a:latin typeface="Times New Roman" panose="02020603050405020304" pitchFamily="18" charset="0"/>
+                <a:cs typeface="Times New Roman" panose="02020603050405020304" pitchFamily="18" charset="0"/>
+              </a:rPr>
+              <a:t>595 </a:t>
+            </a:r>
+            <a:r>
+              <a:rPr lang="ru-RU" dirty="0">
+                <a:latin typeface="Times New Roman" panose="02020603050405020304" pitchFamily="18" charset="0"/>
+                <a:cs typeface="Times New Roman" panose="02020603050405020304" pitchFamily="18" charset="0"/>
+              </a:rPr>
+              <a:t>тысяч опрошенных испытывают тревогу и депрессивные состояния в связи с их работой, причем 239 тысяч опрошенных страдают от депрессии.</a:t>
+            </a:r>
           </a:p>
           <a:p>
             <a:pPr marL="0" indent="0" algn="just">
@@ -3849,84 +4855,22 @@
                 <a:latin typeface="Times New Roman" panose="02020603050405020304" pitchFamily="18" charset="0"/>
                 <a:cs typeface="Times New Roman" panose="02020603050405020304" pitchFamily="18" charset="0"/>
               </a:rPr>
-              <a:t>Синдром хронической усталости (СХУ) </a:t>
+              <a:t>Больше всего жалоб от респондентов поступило по причине высокой рабочей нагрузки (44%) </a:t>
             </a:r>
             <a:r>
               <a:rPr lang="en-US" dirty="0">
                 <a:latin typeface="Times New Roman" panose="02020603050405020304" pitchFamily="18" charset="0"/>
                 <a:cs typeface="Times New Roman" panose="02020603050405020304" pitchFamily="18" charset="0"/>
               </a:rPr>
-              <a:t>–</a:t>
+              <a:t>[1]</a:t>
             </a:r>
             <a:r>
               <a:rPr lang="ru-RU" dirty="0">
                 <a:latin typeface="Times New Roman" panose="02020603050405020304" pitchFamily="18" charset="0"/>
                 <a:cs typeface="Times New Roman" panose="02020603050405020304" pitchFamily="18" charset="0"/>
               </a:rPr>
-              <a:t> это </a:t>
-            </a:r>
-            <a:r>
-              <a:rPr lang="ru-RU" dirty="0" err="1">
-                <a:latin typeface="Times New Roman" panose="02020603050405020304" pitchFamily="18" charset="0"/>
-                <a:cs typeface="Times New Roman" panose="02020603050405020304" pitchFamily="18" charset="0"/>
-              </a:rPr>
-              <a:t>инвалидизирующее</a:t>
-            </a:r>
-            <a:r>
-              <a:rPr lang="ru-RU" dirty="0">
-                <a:latin typeface="Times New Roman" panose="02020603050405020304" pitchFamily="18" charset="0"/>
-                <a:cs typeface="Times New Roman" panose="02020603050405020304" pitchFamily="18" charset="0"/>
-              </a:rPr>
-              <a:t> клиническое состояние, которое характеризуется стойкой усталостью после физических нагрузок, и сопровождающееся симптомами, связанными с когнитивной, иммунологической, эндокринологической и автономной дисфункцией.  </a:t>
-            </a:r>
-            <a:r>
-              <a:rPr lang="en-US" dirty="0">
-                <a:latin typeface="Times New Roman" panose="02020603050405020304" pitchFamily="18" charset="0"/>
-                <a:cs typeface="Times New Roman" panose="02020603050405020304" pitchFamily="18" charset="0"/>
-              </a:rPr>
-              <a:t>[2]</a:t>
-            </a:r>
-            <a:endParaRPr lang="ru-RU" dirty="0">
-              <a:latin typeface="Times New Roman" panose="02020603050405020304" pitchFamily="18" charset="0"/>
-              <a:cs typeface="Times New Roman" panose="02020603050405020304" pitchFamily="18" charset="0"/>
-            </a:endParaRPr>
-          </a:p>
-          <a:p>
-            <a:pPr marL="0" indent="0" algn="just">
-              <a:buNone/>
-            </a:pPr>
-            <a:r>
-              <a:rPr lang="ru-RU" dirty="0">
-                <a:latin typeface="Times New Roman" panose="02020603050405020304" pitchFamily="18" charset="0"/>
-                <a:cs typeface="Times New Roman" panose="02020603050405020304" pitchFamily="18" charset="0"/>
-              </a:rPr>
-              <a:t>Стресс </a:t>
-            </a:r>
-            <a:r>
-              <a:rPr lang="en-US" dirty="0">
-                <a:latin typeface="Times New Roman" panose="02020603050405020304" pitchFamily="18" charset="0"/>
-                <a:cs typeface="Times New Roman" panose="02020603050405020304" pitchFamily="18" charset="0"/>
-              </a:rPr>
-              <a:t>–</a:t>
-            </a:r>
-            <a:r>
-              <a:rPr lang="ru-RU" dirty="0">
-                <a:latin typeface="Times New Roman" panose="02020603050405020304" pitchFamily="18" charset="0"/>
-                <a:cs typeface="Times New Roman" panose="02020603050405020304" pitchFamily="18" charset="0"/>
-              </a:rPr>
-              <a:t> это реакция человеческого организма на неблагоприятные воздействия внешней среды, которая носит психофизиологический характер. </a:t>
-            </a:r>
-            <a:r>
-              <a:rPr lang="en-US" dirty="0">
-                <a:latin typeface="Times New Roman" panose="02020603050405020304" pitchFamily="18" charset="0"/>
-                <a:cs typeface="Times New Roman" panose="02020603050405020304" pitchFamily="18" charset="0"/>
-              </a:rPr>
-              <a:t>[3]</a:t>
-            </a:r>
-            <a:endParaRPr lang="ru-RU" dirty="0">
-              <a:latin typeface="Times New Roman" panose="02020603050405020304" pitchFamily="18" charset="0"/>
-              <a:cs typeface="Times New Roman" panose="02020603050405020304" pitchFamily="18" charset="0"/>
-            </a:endParaRPr>
+              <a:t>.</a:t>
+            </a:r>
           </a:p>
         </p:txBody>
       </p:sp>
@@ -3959,6 +4903,34 @@
           </a:p>
         </p:txBody>
       </p:sp>
+      <p:graphicFrame>
+        <p:nvGraphicFramePr>
+          <p:cNvPr id="7" name="Диаграмма 6">
+            <a:extLst>
+              <a:ext uri="{FF2B5EF4-FFF2-40B4-BE49-F238E27FC236}">
+                <a16:creationId xmlns:a16="http://schemas.microsoft.com/office/drawing/2014/main" id="{47302104-2C21-4ADD-B382-2E1154D64C64}"/>
+              </a:ext>
+            </a:extLst>
+          </p:cNvPr>
+          <p:cNvGraphicFramePr/>
+          <p:nvPr>
+            <p:extLst>
+              <p:ext uri="{D42A27DB-BD31-4B8C-83A1-F6EECF244321}">
+                <p14:modId xmlns:p14="http://schemas.microsoft.com/office/powerpoint/2010/main" val="770538443"/>
+              </p:ext>
+            </p:extLst>
+          </p:nvPr>
+        </p:nvGraphicFramePr>
+        <p:xfrm>
+          <a:off x="6096000" y="1937279"/>
+          <a:ext cx="6039374" cy="4128030"/>
+        </p:xfrm>
+        <a:graphic>
+          <a:graphicData uri="http://schemas.openxmlformats.org/drawingml/2006/chart">
+            <c:chart xmlns:c="http://schemas.openxmlformats.org/drawingml/2006/chart" xmlns:r="http://schemas.openxmlformats.org/officeDocument/2006/relationships" r:id="rId2"/>
+          </a:graphicData>
+        </a:graphic>
+      </p:graphicFrame>
     </p:spTree>
     <p:extLst>
       <p:ext uri="{BB962C8B-B14F-4D97-AF65-F5344CB8AC3E}">
@@ -3994,7 +4966,7 @@
           <p:cNvPr id="2" name="Заголовок 1">
             <a:extLst>
               <a:ext uri="{FF2B5EF4-FFF2-40B4-BE49-F238E27FC236}">
-                <a16:creationId xmlns:a16="http://schemas.microsoft.com/office/drawing/2014/main" id="{49B0E010-6F7E-45E0-ADC8-2BF59398400B}"/>
+                <a16:creationId xmlns:a16="http://schemas.microsoft.com/office/drawing/2014/main" id="{A8A78197-F0E5-482A-9DF3-DA7661662131}"/>
               </a:ext>
             </a:extLst>
           </p:cNvPr>
@@ -4004,371 +4976,186 @@
           <p:nvPr>
             <p:ph type="title"/>
           </p:nvPr>
-        </p:nvSpPr>
-        <p:spPr/>
-        <p:txBody>
-          <a:bodyPr/>
-          <a:lstStyle/>
-          <a:p>
-            <a:pPr algn="ctr"/>
-            <a:r>
-              <a:rPr lang="ru-RU" dirty="0">
-                <a:latin typeface="Times New Roman" panose="02020603050405020304" pitchFamily="18" charset="0"/>
-                <a:cs typeface="Times New Roman" panose="02020603050405020304" pitchFamily="18" charset="0"/>
-              </a:rPr>
-              <a:t>Стадии стрессовой реакции</a:t>
-            </a:r>
-          </a:p>
-        </p:txBody>
-      </p:sp>
-      <p:sp>
-        <p:nvSpPr>
-          <p:cNvPr id="4" name="Номер слайда 3">
-            <a:extLst>
-              <a:ext uri="{FF2B5EF4-FFF2-40B4-BE49-F238E27FC236}">
-                <a16:creationId xmlns:a16="http://schemas.microsoft.com/office/drawing/2014/main" id="{B53C015B-F70F-4212-9519-6C44C1671A13}"/>
-              </a:ext>
-            </a:extLst>
-          </p:cNvPr>
-          <p:cNvSpPr>
-            <a:spLocks noGrp="1"/>
-          </p:cNvSpPr>
-          <p:nvPr>
-            <p:ph type="sldNum" sz="quarter" idx="12"/>
-          </p:nvPr>
-        </p:nvSpPr>
-        <p:spPr/>
-        <p:txBody>
-          <a:bodyPr/>
-          <a:lstStyle/>
-          <a:p>
-            <a:fld id="{356812A1-C132-42AC-87BC-7262BD3AB593}" type="slidenum">
-              <a:rPr lang="ru-RU" smtClean="0"/>
-              <a:t>4</a:t>
-            </a:fld>
-            <a:endParaRPr lang="ru-RU"/>
-          </a:p>
-        </p:txBody>
-      </p:sp>
-      <p:sp>
-        <p:nvSpPr>
-          <p:cNvPr id="7" name="TextBox 6">
-            <a:extLst>
-              <a:ext uri="{FF2B5EF4-FFF2-40B4-BE49-F238E27FC236}">
-                <a16:creationId xmlns:a16="http://schemas.microsoft.com/office/drawing/2014/main" id="{A25E994C-4103-425D-BAD1-0FF117284DB8}"/>
-              </a:ext>
-            </a:extLst>
-          </p:cNvPr>
-          <p:cNvSpPr txBox="1"/>
-          <p:nvPr/>
         </p:nvSpPr>
         <p:spPr>
           <a:xfrm>
-            <a:off x="838200" y="5402243"/>
-            <a:ext cx="10515600" cy="954107"/>
+            <a:off x="838200" y="0"/>
+            <a:ext cx="10515600" cy="1325563"/>
           </a:xfrm>
-          <a:prstGeom prst="rect">
-            <a:avLst/>
-          </a:prstGeom>
-          <a:noFill/>
         </p:spPr>
         <p:txBody>
-          <a:bodyPr wrap="square">
-            <a:spAutoFit/>
+          <a:bodyPr/>
+          <a:lstStyle/>
+          <a:p>
+            <a:pPr algn="ctr"/>
+            <a:r>
+              <a:rPr lang="ru-RU" dirty="0">
+                <a:latin typeface="Times New Roman" panose="02020603050405020304" pitchFamily="18" charset="0"/>
+                <a:cs typeface="Times New Roman" panose="02020603050405020304" pitchFamily="18" charset="0"/>
+              </a:rPr>
+              <a:t>Последствия стресса</a:t>
+            </a:r>
+          </a:p>
+        </p:txBody>
+      </p:sp>
+      <p:sp>
+        <p:nvSpPr>
+          <p:cNvPr id="6" name="Объект 2">
+            <a:extLst>
+              <a:ext uri="{FF2B5EF4-FFF2-40B4-BE49-F238E27FC236}">
+                <a16:creationId xmlns:a16="http://schemas.microsoft.com/office/drawing/2014/main" id="{6D24A5E1-8270-4877-AF66-EC2D6888AE6B}"/>
+              </a:ext>
+            </a:extLst>
+          </p:cNvPr>
+          <p:cNvSpPr>
+            <a:spLocks noGrp="1"/>
+          </p:cNvSpPr>
+          <p:nvPr>
+            <p:ph idx="1"/>
+          </p:nvPr>
+        </p:nvSpPr>
+        <p:spPr>
+          <a:xfrm>
+            <a:off x="838200" y="1325563"/>
+            <a:ext cx="10515600" cy="5117570"/>
+          </a:xfrm>
+        </p:spPr>
+        <p:txBody>
+          <a:bodyPr>
+            <a:normAutofit fontScale="92500"/>
           </a:bodyPr>
           <a:lstStyle/>
           <a:p>
+            <a:pPr algn="just"/>
+            <a:r>
+              <a:rPr lang="ru-RU" dirty="0">
+                <a:latin typeface="Times New Roman" panose="02020603050405020304" pitchFamily="18" charset="0"/>
+                <a:cs typeface="Times New Roman" panose="02020603050405020304" pitchFamily="18" charset="0"/>
+              </a:rPr>
+              <a:t>низкая эффективность работы</a:t>
+            </a:r>
+            <a:r>
+              <a:rPr lang="en-US" dirty="0">
+                <a:latin typeface="Times New Roman" panose="02020603050405020304" pitchFamily="18" charset="0"/>
+                <a:cs typeface="Times New Roman" panose="02020603050405020304" pitchFamily="18" charset="0"/>
+              </a:rPr>
+              <a:t>;</a:t>
+            </a:r>
+            <a:endParaRPr lang="ru-RU" dirty="0">
+              <a:latin typeface="Times New Roman" panose="02020603050405020304" pitchFamily="18" charset="0"/>
+              <a:cs typeface="Times New Roman" panose="02020603050405020304" pitchFamily="18" charset="0"/>
+            </a:endParaRPr>
+          </a:p>
+          <a:p>
+            <a:pPr algn="just"/>
+            <a:r>
+              <a:rPr lang="ru-RU" dirty="0">
+                <a:latin typeface="Times New Roman" panose="02020603050405020304" pitchFamily="18" charset="0"/>
+                <a:cs typeface="Times New Roman" panose="02020603050405020304" pitchFamily="18" charset="0"/>
+              </a:rPr>
+              <a:t>апатичность</a:t>
+            </a:r>
+            <a:r>
+              <a:rPr lang="en-US" dirty="0">
+                <a:latin typeface="Times New Roman" panose="02020603050405020304" pitchFamily="18" charset="0"/>
+                <a:cs typeface="Times New Roman" panose="02020603050405020304" pitchFamily="18" charset="0"/>
+              </a:rPr>
+              <a:t>;</a:t>
+            </a:r>
+          </a:p>
+          <a:p>
+            <a:pPr algn="just"/>
+            <a:r>
+              <a:rPr lang="ru-RU" dirty="0">
+                <a:latin typeface="Times New Roman" panose="02020603050405020304" pitchFamily="18" charset="0"/>
+                <a:cs typeface="Times New Roman" panose="02020603050405020304" pitchFamily="18" charset="0"/>
+              </a:rPr>
+              <a:t>консерватизм</a:t>
+            </a:r>
+            <a:r>
+              <a:rPr lang="en-US" dirty="0">
+                <a:latin typeface="Times New Roman" panose="02020603050405020304" pitchFamily="18" charset="0"/>
+                <a:cs typeface="Times New Roman" panose="02020603050405020304" pitchFamily="18" charset="0"/>
+              </a:rPr>
+              <a:t>;</a:t>
+            </a:r>
+          </a:p>
+          <a:p>
+            <a:pPr algn="just"/>
+            <a:r>
+              <a:rPr lang="ru-RU" dirty="0">
+                <a:latin typeface="Times New Roman" panose="02020603050405020304" pitchFamily="18" charset="0"/>
+                <a:cs typeface="Times New Roman" panose="02020603050405020304" pitchFamily="18" charset="0"/>
+              </a:rPr>
+              <a:t>пессимистичность</a:t>
+            </a:r>
+            <a:r>
+              <a:rPr lang="en-US" dirty="0">
+                <a:latin typeface="Times New Roman" panose="02020603050405020304" pitchFamily="18" charset="0"/>
+                <a:cs typeface="Times New Roman" panose="02020603050405020304" pitchFamily="18" charset="0"/>
+              </a:rPr>
+              <a:t>;</a:t>
+            </a:r>
+          </a:p>
+          <a:p>
+            <a:pPr algn="just"/>
+            <a:r>
+              <a:rPr lang="ru-RU" dirty="0">
+                <a:latin typeface="Times New Roman" panose="02020603050405020304" pitchFamily="18" charset="0"/>
+                <a:cs typeface="Times New Roman" panose="02020603050405020304" pitchFamily="18" charset="0"/>
+              </a:rPr>
+              <a:t>избегание коммуникаций</a:t>
+            </a:r>
+            <a:r>
+              <a:rPr lang="en-US" dirty="0">
+                <a:latin typeface="Times New Roman" panose="02020603050405020304" pitchFamily="18" charset="0"/>
+                <a:cs typeface="Times New Roman" panose="02020603050405020304" pitchFamily="18" charset="0"/>
+              </a:rPr>
+              <a:t>;</a:t>
+            </a:r>
+          </a:p>
+          <a:p>
+            <a:pPr algn="just"/>
+            <a:r>
+              <a:rPr lang="ru-RU" dirty="0">
+                <a:latin typeface="Times New Roman" panose="02020603050405020304" pitchFamily="18" charset="0"/>
+                <a:cs typeface="Times New Roman" panose="02020603050405020304" pitchFamily="18" charset="0"/>
+              </a:rPr>
+              <a:t>физическое истощение и болезненность.</a:t>
+            </a:r>
+          </a:p>
+          <a:p>
+            <a:pPr algn="just"/>
+            <a:endParaRPr lang="ru-RU" dirty="0">
+              <a:latin typeface="Times New Roman" panose="02020603050405020304" pitchFamily="18" charset="0"/>
+              <a:cs typeface="Times New Roman" panose="02020603050405020304" pitchFamily="18" charset="0"/>
+            </a:endParaRPr>
+          </a:p>
+          <a:p>
+            <a:pPr algn="just"/>
+            <a:endParaRPr lang="ru-RU" dirty="0">
+              <a:latin typeface="Times New Roman" panose="02020603050405020304" pitchFamily="18" charset="0"/>
+              <a:cs typeface="Times New Roman" panose="02020603050405020304" pitchFamily="18" charset="0"/>
+            </a:endParaRPr>
+          </a:p>
+          <a:p>
             <a:pPr marL="0" indent="0" algn="just">
               <a:buNone/>
             </a:pPr>
             <a:r>
-              <a:rPr lang="ru-RU" sz="2800" dirty="0">
-                <a:latin typeface="Times New Roman" panose="02020603050405020304" pitchFamily="18" charset="0"/>
-                <a:cs typeface="Times New Roman" panose="02020603050405020304" pitchFamily="18" charset="0"/>
-              </a:rPr>
-              <a:t>Важно выявить наступление стадии истощения для дальнейшего плодотворного функционирования организма</a:t>
-            </a:r>
-          </a:p>
-        </p:txBody>
-      </p:sp>
-      <p:graphicFrame>
-        <p:nvGraphicFramePr>
-          <p:cNvPr id="6" name="Таблица 7">
-            <a:extLst>
-              <a:ext uri="{FF2B5EF4-FFF2-40B4-BE49-F238E27FC236}">
-                <a16:creationId xmlns:a16="http://schemas.microsoft.com/office/drawing/2014/main" id="{D4C875E6-F6FB-4C23-B1C5-FFCC8F58B473}"/>
-              </a:ext>
-            </a:extLst>
-          </p:cNvPr>
-          <p:cNvGraphicFramePr>
-            <a:graphicFrameLocks noGrp="1"/>
-          </p:cNvGraphicFramePr>
-          <p:nvPr>
-            <p:extLst>
-              <p:ext uri="{D42A27DB-BD31-4B8C-83A1-F6EECF244321}">
-                <p14:modId xmlns:p14="http://schemas.microsoft.com/office/powerpoint/2010/main" val="4268190939"/>
-              </p:ext>
-            </p:extLst>
-          </p:nvPr>
-        </p:nvGraphicFramePr>
-        <p:xfrm>
-          <a:off x="461976" y="1544093"/>
-          <a:ext cx="4805349" cy="3564975"/>
-        </p:xfrm>
-        <a:graphic>
-          <a:graphicData uri="http://schemas.openxmlformats.org/drawingml/2006/table">
-            <a:tbl>
-              <a:tblPr firstRow="1" bandRow="1">
-                <a:tableStyleId>{073A0DAA-6AF3-43AB-8588-CEC1D06C72B9}</a:tableStyleId>
-              </a:tblPr>
-              <a:tblGrid>
-                <a:gridCol w="1886955">
-                  <a:extLst>
-                    <a:ext uri="{9D8B030D-6E8A-4147-A177-3AD203B41FA5}">
-                      <a16:colId xmlns:a16="http://schemas.microsoft.com/office/drawing/2014/main" val="3130025223"/>
-                    </a:ext>
-                  </a:extLst>
-                </a:gridCol>
-                <a:gridCol w="2918394">
-                  <a:extLst>
-                    <a:ext uri="{9D8B030D-6E8A-4147-A177-3AD203B41FA5}">
-                      <a16:colId xmlns:a16="http://schemas.microsoft.com/office/drawing/2014/main" val="1185311801"/>
-                    </a:ext>
-                  </a:extLst>
-                </a:gridCol>
-              </a:tblGrid>
-              <a:tr h="563370">
-                <a:tc>
-                  <a:txBody>
-                    <a:bodyPr/>
-                    <a:lstStyle/>
-                    <a:p>
-                      <a:r>
-                        <a:rPr lang="ru-RU" dirty="0">
-                          <a:latin typeface="Times New Roman" panose="02020603050405020304" pitchFamily="18" charset="0"/>
-                          <a:cs typeface="Times New Roman" panose="02020603050405020304" pitchFamily="18" charset="0"/>
-                        </a:rPr>
-                        <a:t>Стадия </a:t>
-                      </a:r>
-                    </a:p>
-                  </a:txBody>
-                  <a:tcPr/>
-                </a:tc>
-                <a:tc>
-                  <a:txBody>
-                    <a:bodyPr/>
-                    <a:lstStyle/>
-                    <a:p>
-                      <a:r>
-                        <a:rPr lang="ru-RU" dirty="0">
-                          <a:latin typeface="Times New Roman" panose="02020603050405020304" pitchFamily="18" charset="0"/>
-                          <a:cs typeface="Times New Roman" panose="02020603050405020304" pitchFamily="18" charset="0"/>
-                        </a:rPr>
-                        <a:t>Характеристика</a:t>
-                      </a:r>
-                    </a:p>
-                  </a:txBody>
-                  <a:tcPr/>
-                </a:tc>
-                <a:extLst>
-                  <a:ext uri="{0D108BD9-81ED-4DB2-BD59-A6C34878D82A}">
-                    <a16:rowId xmlns:a16="http://schemas.microsoft.com/office/drawing/2014/main" val="2239062112"/>
-                  </a:ext>
-                </a:extLst>
-              </a:tr>
-              <a:tr h="563370">
-                <a:tc>
-                  <a:txBody>
-                    <a:bodyPr/>
-                    <a:lstStyle/>
-                    <a:p>
-                      <a:r>
-                        <a:rPr lang="ru-RU" dirty="0">
-                          <a:latin typeface="Times New Roman" panose="02020603050405020304" pitchFamily="18" charset="0"/>
-                          <a:cs typeface="Times New Roman" panose="02020603050405020304" pitchFamily="18" charset="0"/>
-                        </a:rPr>
-                        <a:t>Стадия тревоги</a:t>
-                      </a:r>
-                    </a:p>
-                  </a:txBody>
-                  <a:tcPr/>
-                </a:tc>
-                <a:tc>
-                  <a:txBody>
-                    <a:bodyPr/>
-                    <a:lstStyle/>
-                    <a:p>
-                      <a:r>
-                        <a:rPr lang="ru-RU" dirty="0">
-                          <a:latin typeface="Times New Roman" panose="02020603050405020304" pitchFamily="18" charset="0"/>
-                          <a:cs typeface="Times New Roman" panose="02020603050405020304" pitchFamily="18" charset="0"/>
-                        </a:rPr>
-                        <a:t>Реакция организма на раздражители</a:t>
-                      </a:r>
-                    </a:p>
-                  </a:txBody>
-                  <a:tcPr/>
-                </a:tc>
-                <a:extLst>
-                  <a:ext uri="{0D108BD9-81ED-4DB2-BD59-A6C34878D82A}">
-                    <a16:rowId xmlns:a16="http://schemas.microsoft.com/office/drawing/2014/main" val="191967762"/>
-                  </a:ext>
-                </a:extLst>
-              </a:tr>
-              <a:tr h="1389132">
-                <a:tc>
-                  <a:txBody>
-                    <a:bodyPr/>
-                    <a:lstStyle/>
-                    <a:p>
-                      <a:r>
-                        <a:rPr lang="ru-RU" dirty="0">
-                          <a:latin typeface="Times New Roman" panose="02020603050405020304" pitchFamily="18" charset="0"/>
-                          <a:cs typeface="Times New Roman" panose="02020603050405020304" pitchFamily="18" charset="0"/>
-                        </a:rPr>
-                        <a:t>Стадия адаптации</a:t>
-                      </a:r>
-                    </a:p>
-                  </a:txBody>
-                  <a:tcPr/>
-                </a:tc>
-                <a:tc>
-                  <a:txBody>
-                    <a:bodyPr/>
-                    <a:lstStyle/>
-                    <a:p>
-                      <a:r>
-                        <a:rPr lang="ru-RU" dirty="0">
-                          <a:latin typeface="Times New Roman" panose="02020603050405020304" pitchFamily="18" charset="0"/>
-                          <a:cs typeface="Times New Roman" panose="02020603050405020304" pitchFamily="18" charset="0"/>
-                        </a:rPr>
-                        <a:t>Противодействие физиологическим изменениям, возникшим на предыдущей стадии</a:t>
-                      </a:r>
-                    </a:p>
-                  </a:txBody>
-                  <a:tcPr/>
-                </a:tc>
-                <a:extLst>
-                  <a:ext uri="{0D108BD9-81ED-4DB2-BD59-A6C34878D82A}">
-                    <a16:rowId xmlns:a16="http://schemas.microsoft.com/office/drawing/2014/main" val="296043579"/>
-                  </a:ext>
-                </a:extLst>
-              </a:tr>
-              <a:tr h="972393">
-                <a:tc>
-                  <a:txBody>
-                    <a:bodyPr/>
-                    <a:lstStyle/>
-                    <a:p>
-                      <a:r>
-                        <a:rPr lang="ru-RU" dirty="0">
-                          <a:latin typeface="Times New Roman" panose="02020603050405020304" pitchFamily="18" charset="0"/>
-                          <a:cs typeface="Times New Roman" panose="02020603050405020304" pitchFamily="18" charset="0"/>
-                        </a:rPr>
-                        <a:t>Стадия истощения</a:t>
-                      </a:r>
-                    </a:p>
-                  </a:txBody>
-                  <a:tcPr/>
-                </a:tc>
-                <a:tc>
-                  <a:txBody>
-                    <a:bodyPr/>
-                    <a:lstStyle/>
-                    <a:p>
-                      <a:r>
-                        <a:rPr lang="ru-RU" dirty="0">
-                          <a:latin typeface="Times New Roman" panose="02020603050405020304" pitchFamily="18" charset="0"/>
-                          <a:cs typeface="Times New Roman" panose="02020603050405020304" pitchFamily="18" charset="0"/>
-                        </a:rPr>
-                        <a:t>Организм начинает истощать собственную адаптивную способность</a:t>
-                      </a:r>
-                    </a:p>
-                  </a:txBody>
-                  <a:tcPr/>
-                </a:tc>
-                <a:extLst>
-                  <a:ext uri="{0D108BD9-81ED-4DB2-BD59-A6C34878D82A}">
-                    <a16:rowId xmlns:a16="http://schemas.microsoft.com/office/drawing/2014/main" val="1146600484"/>
-                  </a:ext>
-                </a:extLst>
-              </a:tr>
-            </a:tbl>
-          </a:graphicData>
-        </a:graphic>
-      </p:graphicFrame>
-      <p:graphicFrame>
-        <p:nvGraphicFramePr>
-          <p:cNvPr id="3" name="Объект 2">
-            <a:extLst>
-              <a:ext uri="{FF2B5EF4-FFF2-40B4-BE49-F238E27FC236}">
-                <a16:creationId xmlns:a16="http://schemas.microsoft.com/office/drawing/2014/main" id="{A46241E1-1E7C-4E6C-958C-1241E3057328}"/>
-              </a:ext>
-            </a:extLst>
-          </p:cNvPr>
-          <p:cNvGraphicFramePr>
-            <a:graphicFrameLocks noChangeAspect="1"/>
-          </p:cNvGraphicFramePr>
-          <p:nvPr>
-            <p:extLst>
-              <p:ext uri="{D42A27DB-BD31-4B8C-83A1-F6EECF244321}">
-                <p14:modId xmlns:p14="http://schemas.microsoft.com/office/powerpoint/2010/main" val="3036634021"/>
-              </p:ext>
-            </p:extLst>
-          </p:nvPr>
-        </p:nvGraphicFramePr>
-        <p:xfrm>
-          <a:off x="5378537" y="2305050"/>
-          <a:ext cx="6574211" cy="2123012"/>
-        </p:xfrm>
-        <a:graphic>
-          <a:graphicData uri="http://schemas.openxmlformats.org/presentationml/2006/ole">
-            <mc:AlternateContent xmlns:mc="http://schemas.openxmlformats.org/markup-compatibility/2006">
-              <mc:Choice xmlns:v="urn:schemas-microsoft-com:vml" Requires="v">
-                <p:oleObj spid="_x0000_s1029" r:id="rId3" imgW="8494920" imgH="2742840" progId="">
-                  <p:embed/>
-                </p:oleObj>
-              </mc:Choice>
-              <mc:Fallback>
-                <p:oleObj r:id="rId3" imgW="8494920" imgH="2742840" progId="">
-                  <p:embed/>
-                  <p:pic>
-                    <p:nvPicPr>
-                      <p:cNvPr id="0" name=""/>
-                      <p:cNvPicPr/>
-                      <p:nvPr/>
-                    </p:nvPicPr>
-                    <p:blipFill>
-                      <a:blip r:embed="rId4"/>
-                      <a:stretch>
-                        <a:fillRect/>
-                      </a:stretch>
-                    </p:blipFill>
-                    <p:spPr>
-                      <a:xfrm>
-                        <a:off x="5378537" y="2305050"/>
-                        <a:ext cx="6574211" cy="2123012"/>
-                      </a:xfrm>
-                      <a:prstGeom prst="rect">
-                        <a:avLst/>
-                      </a:prstGeom>
-                      <a:ln>
-                        <a:solidFill>
-                          <a:schemeClr val="tx1"/>
-                        </a:solidFill>
-                      </a:ln>
-                    </p:spPr>
-                  </p:pic>
-                </p:oleObj>
-              </mc:Fallback>
-            </mc:AlternateContent>
-          </a:graphicData>
-        </a:graphic>
-      </p:graphicFrame>
+              <a:rPr lang="ru-RU" dirty="0">
+                <a:latin typeface="Times New Roman" panose="02020603050405020304" pitchFamily="18" charset="0"/>
+                <a:cs typeface="Times New Roman" panose="02020603050405020304" pitchFamily="18" charset="0"/>
+              </a:rPr>
+              <a:t>Последствия стресса носят как физиологический, так и психологический характер. Предупреждение наступления стадии истощения может позволить сохранить здоровье и работоспособность трудящихся.</a:t>
+            </a:r>
+          </a:p>
+        </p:txBody>
+      </p:sp>
     </p:spTree>
     <p:extLst>
       <p:ext uri="{BB962C8B-B14F-4D97-AF65-F5344CB8AC3E}">
-        <p14:creationId xmlns:p14="http://schemas.microsoft.com/office/powerpoint/2010/main" val="364675581"/>
+        <p14:creationId xmlns:p14="http://schemas.microsoft.com/office/powerpoint/2010/main" val="1721109683"/>
       </p:ext>
     </p:extLst>
   </p:cSld>
@@ -4427,510 +5214,172 @@
                 <a:latin typeface="Times New Roman" panose="02020603050405020304" pitchFamily="18" charset="0"/>
                 <a:cs typeface="Times New Roman" panose="02020603050405020304" pitchFamily="18" charset="0"/>
               </a:rPr>
-              <a:t>Причины стресса на рабочем месте</a:t>
-            </a:r>
-          </a:p>
-        </p:txBody>
-      </p:sp>
-      <p:sp>
-        <p:nvSpPr>
-          <p:cNvPr id="4" name="Номер слайда 3">
-            <a:extLst>
-              <a:ext uri="{FF2B5EF4-FFF2-40B4-BE49-F238E27FC236}">
-                <a16:creationId xmlns:a16="http://schemas.microsoft.com/office/drawing/2014/main" id="{91DF3383-A895-4B0B-9937-2AAF01F676C3}"/>
-              </a:ext>
-            </a:extLst>
-          </p:cNvPr>
-          <p:cNvSpPr>
-            <a:spLocks noGrp="1"/>
-          </p:cNvSpPr>
-          <p:nvPr>
-            <p:ph type="sldNum" sz="quarter" idx="12"/>
-          </p:nvPr>
-        </p:nvSpPr>
-        <p:spPr/>
-        <p:txBody>
-          <a:bodyPr/>
-          <a:lstStyle/>
-          <a:p>
-            <a:fld id="{356812A1-C132-42AC-87BC-7262BD3AB593}" type="slidenum">
-              <a:rPr lang="ru-RU" smtClean="0"/>
-              <a:t>5</a:t>
-            </a:fld>
-            <a:endParaRPr lang="ru-RU" dirty="0"/>
-          </a:p>
-        </p:txBody>
-      </p:sp>
-      <p:graphicFrame>
-        <p:nvGraphicFramePr>
-          <p:cNvPr id="5" name="Таблица 5">
-            <a:extLst>
-              <a:ext uri="{FF2B5EF4-FFF2-40B4-BE49-F238E27FC236}">
-                <a16:creationId xmlns:a16="http://schemas.microsoft.com/office/drawing/2014/main" id="{02B8C3A1-0097-46F3-BF8F-AC58662B1ABF}"/>
-              </a:ext>
-            </a:extLst>
-          </p:cNvPr>
-          <p:cNvGraphicFramePr>
-            <a:graphicFrameLocks noGrp="1"/>
-          </p:cNvGraphicFramePr>
-          <p:nvPr>
-            <p:extLst>
-              <p:ext uri="{D42A27DB-BD31-4B8C-83A1-F6EECF244321}">
-                <p14:modId xmlns:p14="http://schemas.microsoft.com/office/powerpoint/2010/main" val="1706527686"/>
-              </p:ext>
-            </p:extLst>
-          </p:nvPr>
-        </p:nvGraphicFramePr>
-        <p:xfrm>
-          <a:off x="0" y="1032718"/>
-          <a:ext cx="12192000" cy="5351250"/>
-        </p:xfrm>
-        <a:graphic>
-          <a:graphicData uri="http://schemas.openxmlformats.org/drawingml/2006/table">
-            <a:tbl>
-              <a:tblPr firstRow="1" bandRow="1">
-                <a:tableStyleId>{073A0DAA-6AF3-43AB-8588-CEC1D06C72B9}</a:tableStyleId>
-              </a:tblPr>
-              <a:tblGrid>
-                <a:gridCol w="5867400">
-                  <a:extLst>
-                    <a:ext uri="{9D8B030D-6E8A-4147-A177-3AD203B41FA5}">
-                      <a16:colId xmlns:a16="http://schemas.microsoft.com/office/drawing/2014/main" val="1383018408"/>
-                    </a:ext>
-                  </a:extLst>
-                </a:gridCol>
-                <a:gridCol w="6324600">
-                  <a:extLst>
-                    <a:ext uri="{9D8B030D-6E8A-4147-A177-3AD203B41FA5}">
-                      <a16:colId xmlns:a16="http://schemas.microsoft.com/office/drawing/2014/main" val="1099064396"/>
-                    </a:ext>
-                  </a:extLst>
-                </a:gridCol>
-              </a:tblGrid>
-              <a:tr h="368620">
-                <a:tc>
-                  <a:txBody>
-                    <a:bodyPr/>
-                    <a:lstStyle/>
-                    <a:p>
-                      <a:pPr algn="just"/>
-                      <a:r>
-                        <a:rPr lang="ru-RU" sz="2000" b="1" dirty="0">
-                          <a:effectLst/>
-                          <a:latin typeface="Times New Roman" panose="02020603050405020304" pitchFamily="18" charset="0"/>
-                          <a:cs typeface="Times New Roman" panose="02020603050405020304" pitchFamily="18" charset="0"/>
-                        </a:rPr>
-                        <a:t>Причина</a:t>
-                      </a:r>
-                    </a:p>
-                  </a:txBody>
-                  <a:tcPr/>
-                </a:tc>
-                <a:tc>
-                  <a:txBody>
-                    <a:bodyPr/>
-                    <a:lstStyle/>
-                    <a:p>
-                      <a:pPr algn="just"/>
-                      <a:r>
-                        <a:rPr lang="ru-RU" sz="2000" b="1" dirty="0">
-                          <a:effectLst/>
-                          <a:latin typeface="Times New Roman" panose="02020603050405020304" pitchFamily="18" charset="0"/>
-                          <a:cs typeface="Times New Roman" panose="02020603050405020304" pitchFamily="18" charset="0"/>
-                        </a:rPr>
-                        <a:t>Пример</a:t>
-                      </a:r>
-                    </a:p>
-                  </a:txBody>
-                  <a:tcPr/>
-                </a:tc>
-                <a:extLst>
-                  <a:ext uri="{0D108BD9-81ED-4DB2-BD59-A6C34878D82A}">
-                    <a16:rowId xmlns:a16="http://schemas.microsoft.com/office/drawing/2014/main" val="3018537188"/>
-                  </a:ext>
-                </a:extLst>
-              </a:tr>
-              <a:tr h="781951">
-                <a:tc>
-                  <a:txBody>
-                    <a:bodyPr/>
-                    <a:lstStyle/>
-                    <a:p>
-                      <a:pPr algn="just"/>
-                      <a:r>
-                        <a:rPr lang="ru-RU" sz="2000" b="0" dirty="0">
-                          <a:effectLst/>
-                          <a:latin typeface="Times New Roman" panose="02020603050405020304" pitchFamily="18" charset="0"/>
-                          <a:cs typeface="Times New Roman" panose="02020603050405020304" pitchFamily="18" charset="0"/>
-                        </a:rPr>
-                        <a:t>Режим трудовой деятельности</a:t>
-                      </a:r>
-                    </a:p>
-                  </a:txBody>
-                  <a:tcPr>
-                    <a:solidFill>
-                      <a:schemeClr val="accent6">
-                        <a:lumMod val="40000"/>
-                        <a:lumOff val="60000"/>
-                      </a:schemeClr>
-                    </a:solidFill>
-                  </a:tcPr>
-                </a:tc>
-                <a:tc>
-                  <a:txBody>
-                    <a:bodyPr/>
-                    <a:lstStyle/>
-                    <a:p>
-                      <a:pPr marL="0" indent="0" algn="just">
-                        <a:buFont typeface="Arial" panose="020B0604020202020204" pitchFamily="34" charset="0"/>
-                        <a:buNone/>
-                      </a:pPr>
-                      <a:r>
-                        <a:rPr lang="ru-RU" sz="2000" b="0" dirty="0">
-                          <a:effectLst/>
-                          <a:latin typeface="Times New Roman" panose="02020603050405020304" pitchFamily="18" charset="0"/>
-                          <a:cs typeface="Times New Roman" panose="02020603050405020304" pitchFamily="18" charset="0"/>
-                        </a:rPr>
-                        <a:t>Ненормированный рабочий день и </a:t>
-                      </a:r>
-                      <a:r>
-                        <a:rPr lang="ru-RU" sz="2000" b="0">
-                          <a:effectLst/>
-                          <a:latin typeface="Times New Roman" panose="02020603050405020304" pitchFamily="18" charset="0"/>
-                          <a:cs typeface="Times New Roman" panose="02020603050405020304" pitchFamily="18" charset="0"/>
-                        </a:rPr>
-                        <a:t>отсутствие перерывов</a:t>
-                      </a:r>
-                      <a:endParaRPr lang="ru-RU" sz="2000" b="0" dirty="0">
-                        <a:effectLst/>
-                        <a:latin typeface="Times New Roman" panose="02020603050405020304" pitchFamily="18" charset="0"/>
-                        <a:cs typeface="Times New Roman" panose="02020603050405020304" pitchFamily="18" charset="0"/>
-                      </a:endParaRPr>
-                    </a:p>
-                  </a:txBody>
-                  <a:tcPr>
-                    <a:solidFill>
-                      <a:schemeClr val="accent2">
-                        <a:lumMod val="40000"/>
-                        <a:lumOff val="60000"/>
-                      </a:schemeClr>
-                    </a:solidFill>
-                  </a:tcPr>
-                </a:tc>
-                <a:extLst>
-                  <a:ext uri="{0D108BD9-81ED-4DB2-BD59-A6C34878D82A}">
-                    <a16:rowId xmlns:a16="http://schemas.microsoft.com/office/drawing/2014/main" val="3262333981"/>
-                  </a:ext>
-                </a:extLst>
-              </a:tr>
-              <a:tr h="1010020">
-                <a:tc>
-                  <a:txBody>
-                    <a:bodyPr/>
-                    <a:lstStyle/>
-                    <a:p>
-                      <a:pPr algn="just"/>
-                      <a:r>
-                        <a:rPr lang="ru-RU" sz="2000" b="0" dirty="0">
-                          <a:effectLst/>
-                          <a:latin typeface="Times New Roman" panose="02020603050405020304" pitchFamily="18" charset="0"/>
-                          <a:cs typeface="Times New Roman" panose="02020603050405020304" pitchFamily="18" charset="0"/>
-                        </a:rPr>
-                        <a:t>Нерациональная организация труда и рабочего места</a:t>
-                      </a:r>
-                    </a:p>
-                  </a:txBody>
-                  <a:tcPr>
-                    <a:solidFill>
-                      <a:schemeClr val="accent6">
-                        <a:lumMod val="40000"/>
-                        <a:lumOff val="60000"/>
-                      </a:schemeClr>
-                    </a:solidFill>
-                  </a:tcPr>
-                </a:tc>
-                <a:tc>
-                  <a:txBody>
-                    <a:bodyPr/>
-                    <a:lstStyle/>
-                    <a:p>
-                      <a:pPr marL="0" indent="0" algn="just">
-                        <a:buFont typeface="Arial" panose="020B0604020202020204" pitchFamily="34" charset="0"/>
-                        <a:buNone/>
-                      </a:pPr>
-                      <a:r>
-                        <a:rPr lang="ru-RU" sz="2000" b="0" dirty="0">
-                          <a:effectLst/>
-                          <a:latin typeface="Times New Roman" panose="02020603050405020304" pitchFamily="18" charset="0"/>
-                          <a:cs typeface="Times New Roman" panose="02020603050405020304" pitchFamily="18" charset="0"/>
-                        </a:rPr>
-                        <a:t>Неоднозначные требования к выполняемой работе</a:t>
-                      </a:r>
-                    </a:p>
-                  </a:txBody>
-                  <a:tcPr>
-                    <a:solidFill>
-                      <a:schemeClr val="accent2">
-                        <a:lumMod val="40000"/>
-                        <a:lumOff val="60000"/>
-                      </a:schemeClr>
-                    </a:solidFill>
-                  </a:tcPr>
-                </a:tc>
-                <a:extLst>
-                  <a:ext uri="{0D108BD9-81ED-4DB2-BD59-A6C34878D82A}">
-                    <a16:rowId xmlns:a16="http://schemas.microsoft.com/office/drawing/2014/main" val="3055950571"/>
-                  </a:ext>
-                </a:extLst>
-              </a:tr>
-              <a:tr h="589117">
-                <a:tc>
-                  <a:txBody>
-                    <a:bodyPr/>
-                    <a:lstStyle/>
-                    <a:p>
-                      <a:pPr algn="just"/>
-                      <a:r>
-                        <a:rPr lang="ru-RU" sz="2000" b="0" dirty="0">
-                          <a:effectLst/>
-                          <a:latin typeface="Times New Roman" panose="02020603050405020304" pitchFamily="18" charset="0"/>
-                          <a:cs typeface="Times New Roman" panose="02020603050405020304" pitchFamily="18" charset="0"/>
-                        </a:rPr>
-                        <a:t>Неудовлетворительные условия труда</a:t>
-                      </a:r>
-                    </a:p>
-                  </a:txBody>
-                  <a:tcPr>
-                    <a:solidFill>
-                      <a:schemeClr val="accent6">
-                        <a:lumMod val="40000"/>
-                        <a:lumOff val="60000"/>
-                      </a:schemeClr>
-                    </a:solidFill>
-                  </a:tcPr>
-                </a:tc>
-                <a:tc>
-                  <a:txBody>
-                    <a:bodyPr/>
-                    <a:lstStyle/>
-                    <a:p>
-                      <a:pPr marL="0" indent="0" algn="just">
-                        <a:buFont typeface="Arial" panose="020B0604020202020204" pitchFamily="34" charset="0"/>
-                        <a:buNone/>
-                      </a:pPr>
-                      <a:r>
-                        <a:rPr lang="ru-RU" sz="2000" b="0" dirty="0">
-                          <a:effectLst/>
-                          <a:latin typeface="Times New Roman" panose="02020603050405020304" pitchFamily="18" charset="0"/>
-                          <a:cs typeface="Times New Roman" panose="02020603050405020304" pitchFamily="18" charset="0"/>
-                        </a:rPr>
-                        <a:t>Монотонная и однообразная работа</a:t>
-                      </a:r>
-                    </a:p>
-                  </a:txBody>
-                  <a:tcPr>
-                    <a:solidFill>
-                      <a:schemeClr val="accent2">
-                        <a:lumMod val="40000"/>
-                        <a:lumOff val="60000"/>
-                      </a:schemeClr>
-                    </a:solidFill>
-                  </a:tcPr>
-                </a:tc>
-                <a:extLst>
-                  <a:ext uri="{0D108BD9-81ED-4DB2-BD59-A6C34878D82A}">
-                    <a16:rowId xmlns:a16="http://schemas.microsoft.com/office/drawing/2014/main" val="4046169263"/>
-                  </a:ext>
-                </a:extLst>
-              </a:tr>
-              <a:tr h="1010020">
-                <a:tc>
-                  <a:txBody>
-                    <a:bodyPr/>
-                    <a:lstStyle/>
-                    <a:p>
-                      <a:pPr algn="just"/>
-                      <a:r>
-                        <a:rPr lang="ru-RU" sz="2000" b="0" dirty="0">
-                          <a:effectLst/>
-                          <a:latin typeface="Times New Roman" panose="02020603050405020304" pitchFamily="18" charset="0"/>
-                          <a:cs typeface="Times New Roman" panose="02020603050405020304" pitchFamily="18" charset="0"/>
-                        </a:rPr>
-                        <a:t>Отсутствие эффективной системы мотивации и стимулирования</a:t>
-                      </a:r>
-                    </a:p>
-                  </a:txBody>
-                  <a:tcPr>
-                    <a:solidFill>
-                      <a:schemeClr val="accent6">
-                        <a:lumMod val="40000"/>
-                        <a:lumOff val="60000"/>
-                      </a:schemeClr>
-                    </a:solidFill>
-                  </a:tcPr>
-                </a:tc>
-                <a:tc>
-                  <a:txBody>
-                    <a:bodyPr/>
-                    <a:lstStyle/>
-                    <a:p>
-                      <a:pPr marL="0" indent="0" algn="just">
-                        <a:buFont typeface="Arial" panose="020B0604020202020204" pitchFamily="34" charset="0"/>
-                        <a:buNone/>
-                      </a:pPr>
-                      <a:r>
-                        <a:rPr lang="ru-RU" sz="2000" b="0" dirty="0">
-                          <a:effectLst/>
-                          <a:latin typeface="Times New Roman" panose="02020603050405020304" pitchFamily="18" charset="0"/>
-                          <a:cs typeface="Times New Roman" panose="02020603050405020304" pitchFamily="18" charset="0"/>
-                        </a:rPr>
-                        <a:t>Недостаточное вознаграждение за труд</a:t>
-                      </a:r>
-                    </a:p>
-                  </a:txBody>
-                  <a:tcPr>
-                    <a:solidFill>
-                      <a:schemeClr val="accent2">
-                        <a:lumMod val="40000"/>
-                        <a:lumOff val="60000"/>
-                      </a:schemeClr>
-                    </a:solidFill>
-                  </a:tcPr>
-                </a:tc>
-                <a:extLst>
-                  <a:ext uri="{0D108BD9-81ED-4DB2-BD59-A6C34878D82A}">
-                    <a16:rowId xmlns:a16="http://schemas.microsoft.com/office/drawing/2014/main" val="532886314"/>
-                  </a:ext>
-                </a:extLst>
-              </a:tr>
-              <a:tr h="781951">
-                <a:tc>
-                  <a:txBody>
-                    <a:bodyPr/>
-                    <a:lstStyle/>
-                    <a:p>
-                      <a:pPr algn="just"/>
-                      <a:r>
-                        <a:rPr lang="ru-RU" sz="2000" b="0" dirty="0">
-                          <a:effectLst/>
-                          <a:latin typeface="Times New Roman" panose="02020603050405020304" pitchFamily="18" charset="0"/>
-                          <a:cs typeface="Times New Roman" panose="02020603050405020304" pitchFamily="18" charset="0"/>
-                        </a:rPr>
-                        <a:t>Неэффективный стиль управления</a:t>
-                      </a:r>
-                    </a:p>
-                  </a:txBody>
-                  <a:tcPr>
-                    <a:solidFill>
-                      <a:schemeClr val="accent6">
-                        <a:lumMod val="40000"/>
-                        <a:lumOff val="60000"/>
-                      </a:schemeClr>
-                    </a:solidFill>
-                  </a:tcPr>
-                </a:tc>
-                <a:tc>
-                  <a:txBody>
-                    <a:bodyPr/>
-                    <a:lstStyle/>
-                    <a:p>
-                      <a:pPr marL="0" indent="0" algn="just">
-                        <a:buFont typeface="Arial" panose="020B0604020202020204" pitchFamily="34" charset="0"/>
-                        <a:buNone/>
-                      </a:pPr>
-                      <a:r>
-                        <a:rPr lang="ru-RU" sz="2000" b="0" dirty="0">
-                          <a:effectLst/>
-                          <a:latin typeface="Times New Roman" panose="02020603050405020304" pitchFamily="18" charset="0"/>
-                          <a:cs typeface="Times New Roman" panose="02020603050405020304" pitchFamily="18" charset="0"/>
-                        </a:rPr>
-                        <a:t>Некомпетентность руководителей</a:t>
-                      </a:r>
-                    </a:p>
-                  </a:txBody>
-                  <a:tcPr>
-                    <a:solidFill>
-                      <a:schemeClr val="accent2">
-                        <a:lumMod val="40000"/>
-                        <a:lumOff val="60000"/>
-                      </a:schemeClr>
-                    </a:solidFill>
-                  </a:tcPr>
-                </a:tc>
-                <a:extLst>
-                  <a:ext uri="{0D108BD9-81ED-4DB2-BD59-A6C34878D82A}">
-                    <a16:rowId xmlns:a16="http://schemas.microsoft.com/office/drawing/2014/main" val="41138885"/>
-                  </a:ext>
-                </a:extLst>
-              </a:tr>
-              <a:tr h="781951">
-                <a:tc>
-                  <a:txBody>
-                    <a:bodyPr/>
-                    <a:lstStyle/>
-                    <a:p>
-                      <a:pPr algn="just"/>
-                      <a:r>
-                        <a:rPr lang="ru-RU" sz="2000" b="0" dirty="0">
-                          <a:effectLst/>
-                          <a:latin typeface="Times New Roman" panose="02020603050405020304" pitchFamily="18" charset="0"/>
-                          <a:cs typeface="Times New Roman" panose="02020603050405020304" pitchFamily="18" charset="0"/>
-                        </a:rPr>
-                        <a:t>Неудовлетворительная социально-психологическая атмосфера</a:t>
-                      </a:r>
-                    </a:p>
-                  </a:txBody>
-                  <a:tcPr>
-                    <a:solidFill>
-                      <a:schemeClr val="accent6">
-                        <a:lumMod val="40000"/>
-                        <a:lumOff val="60000"/>
-                      </a:schemeClr>
-                    </a:solidFill>
-                  </a:tcPr>
-                </a:tc>
-                <a:tc>
-                  <a:txBody>
-                    <a:bodyPr/>
-                    <a:lstStyle/>
-                    <a:p>
-                      <a:pPr marL="0" indent="0" algn="just">
-                        <a:buFont typeface="Arial" panose="020B0604020202020204" pitchFamily="34" charset="0"/>
-                        <a:buNone/>
-                      </a:pPr>
-                      <a:r>
-                        <a:rPr lang="ru-RU" sz="2000" b="0" dirty="0">
-                          <a:effectLst/>
-                          <a:latin typeface="Times New Roman" panose="02020603050405020304" pitchFamily="18" charset="0"/>
-                          <a:cs typeface="Times New Roman" panose="02020603050405020304" pitchFamily="18" charset="0"/>
-                        </a:rPr>
-                        <a:t>Неблагоприятный социально-психологический климат в коллективе</a:t>
-                      </a:r>
-                    </a:p>
-                  </a:txBody>
-                  <a:tcPr>
-                    <a:solidFill>
-                      <a:schemeClr val="accent2">
-                        <a:lumMod val="40000"/>
-                        <a:lumOff val="60000"/>
-                      </a:schemeClr>
-                    </a:solidFill>
-                  </a:tcPr>
-                </a:tc>
-                <a:extLst>
-                  <a:ext uri="{0D108BD9-81ED-4DB2-BD59-A6C34878D82A}">
-                    <a16:rowId xmlns:a16="http://schemas.microsoft.com/office/drawing/2014/main" val="244553789"/>
-                  </a:ext>
-                </a:extLst>
-              </a:tr>
-            </a:tbl>
-          </a:graphicData>
-        </a:graphic>
-      </p:graphicFrame>
+              <a:t>Классификация методов распознавания усталости за АРМ</a:t>
+            </a:r>
+          </a:p>
+        </p:txBody>
+      </p:sp>
+      <p:sp>
+        <p:nvSpPr>
+          <p:cNvPr id="6" name="Объект 2">
+            <a:extLst>
+              <a:ext uri="{FF2B5EF4-FFF2-40B4-BE49-F238E27FC236}">
+                <a16:creationId xmlns:a16="http://schemas.microsoft.com/office/drawing/2014/main" id="{6D24A5E1-8270-4877-AF66-EC2D6888AE6B}"/>
+              </a:ext>
+            </a:extLst>
+          </p:cNvPr>
+          <p:cNvSpPr>
+            <a:spLocks noGrp="1"/>
+          </p:cNvSpPr>
+          <p:nvPr>
+            <p:ph idx="1"/>
+          </p:nvPr>
+        </p:nvSpPr>
+        <p:spPr>
+          <a:xfrm>
+            <a:off x="838200" y="1325563"/>
+            <a:ext cx="10515600" cy="5117570"/>
+          </a:xfrm>
+        </p:spPr>
+        <p:txBody>
+          <a:bodyPr>
+            <a:normAutofit/>
+          </a:bodyPr>
+          <a:lstStyle/>
+          <a:p>
+            <a:pPr algn="just"/>
+            <a:r>
+              <a:rPr lang="ru-RU" dirty="0">
+                <a:latin typeface="Times New Roman" panose="02020603050405020304" pitchFamily="18" charset="0"/>
+                <a:cs typeface="Times New Roman" panose="02020603050405020304" pitchFamily="18" charset="0"/>
+              </a:rPr>
+              <a:t>с использованием устройств ввода:</a:t>
+            </a:r>
+          </a:p>
+          <a:p>
+            <a:pPr lvl="1" algn="just"/>
+            <a:r>
+              <a:rPr lang="ru-RU" dirty="0">
+                <a:latin typeface="Times New Roman" panose="02020603050405020304" pitchFamily="18" charset="0"/>
+                <a:cs typeface="Times New Roman" panose="02020603050405020304" pitchFamily="18" charset="0"/>
+              </a:rPr>
+              <a:t>клавиатуры,</a:t>
+            </a:r>
+            <a:endParaRPr lang="en-US" dirty="0">
+              <a:latin typeface="Times New Roman" panose="02020603050405020304" pitchFamily="18" charset="0"/>
+              <a:cs typeface="Times New Roman" panose="02020603050405020304" pitchFamily="18" charset="0"/>
+            </a:endParaRPr>
+          </a:p>
+          <a:p>
+            <a:pPr lvl="1" algn="just"/>
+            <a:r>
+              <a:rPr lang="ru-RU" dirty="0">
+                <a:latin typeface="Times New Roman" panose="02020603050405020304" pitchFamily="18" charset="0"/>
+                <a:cs typeface="Times New Roman" panose="02020603050405020304" pitchFamily="18" charset="0"/>
+              </a:rPr>
+              <a:t>мыши,</a:t>
+            </a:r>
+            <a:endParaRPr lang="en-US" dirty="0">
+              <a:latin typeface="Times New Roman" panose="02020603050405020304" pitchFamily="18" charset="0"/>
+              <a:cs typeface="Times New Roman" panose="02020603050405020304" pitchFamily="18" charset="0"/>
+            </a:endParaRPr>
+          </a:p>
+          <a:p>
+            <a:pPr lvl="1" algn="just"/>
+            <a:r>
+              <a:rPr lang="ru-RU" dirty="0">
+                <a:latin typeface="Times New Roman" panose="02020603050405020304" pitchFamily="18" charset="0"/>
+                <a:cs typeface="Times New Roman" panose="02020603050405020304" pitchFamily="18" charset="0"/>
+              </a:rPr>
+              <a:t>веб-камеры,</a:t>
+            </a:r>
+            <a:endParaRPr lang="en-US" dirty="0">
+              <a:latin typeface="Times New Roman" panose="02020603050405020304" pitchFamily="18" charset="0"/>
+              <a:cs typeface="Times New Roman" panose="02020603050405020304" pitchFamily="18" charset="0"/>
+            </a:endParaRPr>
+          </a:p>
+          <a:p>
+            <a:pPr lvl="1" algn="just"/>
+            <a:r>
+              <a:rPr lang="ru-RU" dirty="0">
+                <a:latin typeface="Times New Roman" panose="02020603050405020304" pitchFamily="18" charset="0"/>
+                <a:cs typeface="Times New Roman" panose="02020603050405020304" pitchFamily="18" charset="0"/>
+              </a:rPr>
+              <a:t>микрофона</a:t>
+            </a:r>
+            <a:r>
+              <a:rPr lang="en-US" dirty="0">
+                <a:latin typeface="Times New Roman" panose="02020603050405020304" pitchFamily="18" charset="0"/>
+                <a:cs typeface="Times New Roman" panose="02020603050405020304" pitchFamily="18" charset="0"/>
+              </a:rPr>
+              <a:t>;</a:t>
+            </a:r>
+            <a:endParaRPr lang="ru-RU" dirty="0">
+              <a:latin typeface="Times New Roman" panose="02020603050405020304" pitchFamily="18" charset="0"/>
+              <a:cs typeface="Times New Roman" panose="02020603050405020304" pitchFamily="18" charset="0"/>
+            </a:endParaRPr>
+          </a:p>
+          <a:p>
+            <a:pPr algn="just"/>
+            <a:r>
+              <a:rPr lang="ru-RU" dirty="0">
+                <a:latin typeface="Times New Roman" panose="02020603050405020304" pitchFamily="18" charset="0"/>
+                <a:cs typeface="Times New Roman" panose="02020603050405020304" pitchFamily="18" charset="0"/>
+              </a:rPr>
+              <a:t>с использованием иных внешних устройств:</a:t>
+            </a:r>
+          </a:p>
+          <a:p>
+            <a:pPr lvl="1" algn="just"/>
+            <a:r>
+              <a:rPr lang="ru-RU" dirty="0">
+                <a:latin typeface="Times New Roman" panose="02020603050405020304" pitchFamily="18" charset="0"/>
+                <a:cs typeface="Times New Roman" panose="02020603050405020304" pitchFamily="18" charset="0"/>
+              </a:rPr>
+              <a:t>пульсометра</a:t>
+            </a:r>
+            <a:r>
+              <a:rPr lang="en-US" dirty="0">
+                <a:latin typeface="Times New Roman" panose="02020603050405020304" pitchFamily="18" charset="0"/>
+                <a:cs typeface="Times New Roman" panose="02020603050405020304" pitchFamily="18" charset="0"/>
+              </a:rPr>
+              <a:t>,</a:t>
+            </a:r>
+          </a:p>
+          <a:p>
+            <a:pPr lvl="1" algn="just"/>
+            <a:r>
+              <a:rPr lang="ru-RU">
+                <a:latin typeface="Times New Roman" panose="02020603050405020304" pitchFamily="18" charset="0"/>
+                <a:cs typeface="Times New Roman" panose="02020603050405020304" pitchFamily="18" charset="0"/>
+              </a:rPr>
+              <a:t>специальных </a:t>
+            </a:r>
+            <a:r>
+              <a:rPr lang="ru-RU" dirty="0">
+                <a:latin typeface="Times New Roman" panose="02020603050405020304" pitchFamily="18" charset="0"/>
+                <a:cs typeface="Times New Roman" panose="02020603050405020304" pitchFamily="18" charset="0"/>
+              </a:rPr>
+              <a:t>или специализированных устройств</a:t>
+            </a:r>
+            <a:r>
+              <a:rPr lang="en-US" dirty="0">
+                <a:latin typeface="Times New Roman" panose="02020603050405020304" pitchFamily="18" charset="0"/>
+                <a:cs typeface="Times New Roman" panose="02020603050405020304" pitchFamily="18" charset="0"/>
+              </a:rPr>
+              <a:t>;</a:t>
+            </a:r>
+            <a:endParaRPr lang="ru-RU" dirty="0">
+              <a:latin typeface="Times New Roman" panose="02020603050405020304" pitchFamily="18" charset="0"/>
+              <a:cs typeface="Times New Roman" panose="02020603050405020304" pitchFamily="18" charset="0"/>
+            </a:endParaRPr>
+          </a:p>
+        </p:txBody>
+      </p:sp>
     </p:spTree>
     <p:extLst>
       <p:ext uri="{BB962C8B-B14F-4D97-AF65-F5344CB8AC3E}">
-        <p14:creationId xmlns:p14="http://schemas.microsoft.com/office/powerpoint/2010/main" val="2237866845"/>
+        <p14:creationId xmlns:p14="http://schemas.microsoft.com/office/powerpoint/2010/main" val="3751860465"/>
       </p:ext>
     </p:extLst>
   </p:cSld>
@@ -4962,227 +5411,6 @@
           <p:cNvPr id="2" name="Заголовок 1">
             <a:extLst>
               <a:ext uri="{FF2B5EF4-FFF2-40B4-BE49-F238E27FC236}">
-                <a16:creationId xmlns:a16="http://schemas.microsoft.com/office/drawing/2014/main" id="{A8A78197-F0E5-482A-9DF3-DA7661662131}"/>
-              </a:ext>
-            </a:extLst>
-          </p:cNvPr>
-          <p:cNvSpPr>
-            <a:spLocks noGrp="1"/>
-          </p:cNvSpPr>
-          <p:nvPr>
-            <p:ph type="title"/>
-          </p:nvPr>
-        </p:nvSpPr>
-        <p:spPr>
-          <a:xfrm>
-            <a:off x="838200" y="0"/>
-            <a:ext cx="10515600" cy="1325563"/>
-          </a:xfrm>
-        </p:spPr>
-        <p:txBody>
-          <a:bodyPr/>
-          <a:lstStyle/>
-          <a:p>
-            <a:pPr algn="ctr"/>
-            <a:r>
-              <a:rPr lang="ru-RU" dirty="0">
-                <a:latin typeface="Times New Roman" panose="02020603050405020304" pitchFamily="18" charset="0"/>
-                <a:cs typeface="Times New Roman" panose="02020603050405020304" pitchFamily="18" charset="0"/>
-              </a:rPr>
-              <a:t>Последствия стресса</a:t>
-            </a:r>
-          </a:p>
-        </p:txBody>
-      </p:sp>
-      <p:sp>
-        <p:nvSpPr>
-          <p:cNvPr id="6" name="Объект 2">
-            <a:extLst>
-              <a:ext uri="{FF2B5EF4-FFF2-40B4-BE49-F238E27FC236}">
-                <a16:creationId xmlns:a16="http://schemas.microsoft.com/office/drawing/2014/main" id="{6D24A5E1-8270-4877-AF66-EC2D6888AE6B}"/>
-              </a:ext>
-            </a:extLst>
-          </p:cNvPr>
-          <p:cNvSpPr>
-            <a:spLocks noGrp="1"/>
-          </p:cNvSpPr>
-          <p:nvPr>
-            <p:ph idx="1"/>
-          </p:nvPr>
-        </p:nvSpPr>
-        <p:spPr>
-          <a:xfrm>
-            <a:off x="838200" y="1325563"/>
-            <a:ext cx="10515600" cy="5117570"/>
-          </a:xfrm>
-        </p:spPr>
-        <p:txBody>
-          <a:bodyPr>
-            <a:normAutofit fontScale="92500"/>
-          </a:bodyPr>
-          <a:lstStyle/>
-          <a:p>
-            <a:pPr algn="just"/>
-            <a:r>
-              <a:rPr lang="ru-RU" dirty="0">
-                <a:latin typeface="Times New Roman" panose="02020603050405020304" pitchFamily="18" charset="0"/>
-                <a:cs typeface="Times New Roman" panose="02020603050405020304" pitchFamily="18" charset="0"/>
-              </a:rPr>
-              <a:t>низкая эффективность работы</a:t>
-            </a:r>
-            <a:r>
-              <a:rPr lang="en-US" dirty="0">
-                <a:latin typeface="Times New Roman" panose="02020603050405020304" pitchFamily="18" charset="0"/>
-                <a:cs typeface="Times New Roman" panose="02020603050405020304" pitchFamily="18" charset="0"/>
-              </a:rPr>
-              <a:t>;</a:t>
-            </a:r>
-            <a:endParaRPr lang="ru-RU" dirty="0">
-              <a:latin typeface="Times New Roman" panose="02020603050405020304" pitchFamily="18" charset="0"/>
-              <a:cs typeface="Times New Roman" panose="02020603050405020304" pitchFamily="18" charset="0"/>
-            </a:endParaRPr>
-          </a:p>
-          <a:p>
-            <a:pPr algn="just"/>
-            <a:r>
-              <a:rPr lang="ru-RU" dirty="0">
-                <a:latin typeface="Times New Roman" panose="02020603050405020304" pitchFamily="18" charset="0"/>
-                <a:cs typeface="Times New Roman" panose="02020603050405020304" pitchFamily="18" charset="0"/>
-              </a:rPr>
-              <a:t>апатичность</a:t>
-            </a:r>
-            <a:r>
-              <a:rPr lang="en-US" dirty="0">
-                <a:latin typeface="Times New Roman" panose="02020603050405020304" pitchFamily="18" charset="0"/>
-                <a:cs typeface="Times New Roman" panose="02020603050405020304" pitchFamily="18" charset="0"/>
-              </a:rPr>
-              <a:t>;</a:t>
-            </a:r>
-          </a:p>
-          <a:p>
-            <a:pPr algn="just"/>
-            <a:r>
-              <a:rPr lang="ru-RU" dirty="0">
-                <a:latin typeface="Times New Roman" panose="02020603050405020304" pitchFamily="18" charset="0"/>
-                <a:cs typeface="Times New Roman" panose="02020603050405020304" pitchFamily="18" charset="0"/>
-              </a:rPr>
-              <a:t>консерватизм</a:t>
-            </a:r>
-            <a:r>
-              <a:rPr lang="en-US" dirty="0">
-                <a:latin typeface="Times New Roman" panose="02020603050405020304" pitchFamily="18" charset="0"/>
-                <a:cs typeface="Times New Roman" panose="02020603050405020304" pitchFamily="18" charset="0"/>
-              </a:rPr>
-              <a:t>;</a:t>
-            </a:r>
-          </a:p>
-          <a:p>
-            <a:pPr algn="just"/>
-            <a:r>
-              <a:rPr lang="ru-RU" dirty="0">
-                <a:latin typeface="Times New Roman" panose="02020603050405020304" pitchFamily="18" charset="0"/>
-                <a:cs typeface="Times New Roman" panose="02020603050405020304" pitchFamily="18" charset="0"/>
-              </a:rPr>
-              <a:t>пессимистичность</a:t>
-            </a:r>
-            <a:r>
-              <a:rPr lang="en-US" dirty="0">
-                <a:latin typeface="Times New Roman" panose="02020603050405020304" pitchFamily="18" charset="0"/>
-                <a:cs typeface="Times New Roman" panose="02020603050405020304" pitchFamily="18" charset="0"/>
-              </a:rPr>
-              <a:t>;</a:t>
-            </a:r>
-          </a:p>
-          <a:p>
-            <a:pPr algn="just"/>
-            <a:r>
-              <a:rPr lang="ru-RU" dirty="0">
-                <a:latin typeface="Times New Roman" panose="02020603050405020304" pitchFamily="18" charset="0"/>
-                <a:cs typeface="Times New Roman" panose="02020603050405020304" pitchFamily="18" charset="0"/>
-              </a:rPr>
-              <a:t>избегание коммуникаций</a:t>
-            </a:r>
-            <a:r>
-              <a:rPr lang="en-US" dirty="0">
-                <a:latin typeface="Times New Roman" panose="02020603050405020304" pitchFamily="18" charset="0"/>
-                <a:cs typeface="Times New Roman" panose="02020603050405020304" pitchFamily="18" charset="0"/>
-              </a:rPr>
-              <a:t>;</a:t>
-            </a:r>
-          </a:p>
-          <a:p>
-            <a:pPr algn="just"/>
-            <a:r>
-              <a:rPr lang="ru-RU" dirty="0">
-                <a:latin typeface="Times New Roman" panose="02020603050405020304" pitchFamily="18" charset="0"/>
-                <a:cs typeface="Times New Roman" panose="02020603050405020304" pitchFamily="18" charset="0"/>
-              </a:rPr>
-              <a:t>физическое истощение и болезненность.</a:t>
-            </a:r>
-          </a:p>
-          <a:p>
-            <a:pPr algn="just"/>
-            <a:endParaRPr lang="ru-RU" dirty="0">
-              <a:latin typeface="Times New Roman" panose="02020603050405020304" pitchFamily="18" charset="0"/>
-              <a:cs typeface="Times New Roman" panose="02020603050405020304" pitchFamily="18" charset="0"/>
-            </a:endParaRPr>
-          </a:p>
-          <a:p>
-            <a:pPr algn="just"/>
-            <a:endParaRPr lang="ru-RU" dirty="0">
-              <a:latin typeface="Times New Roman" panose="02020603050405020304" pitchFamily="18" charset="0"/>
-              <a:cs typeface="Times New Roman" panose="02020603050405020304" pitchFamily="18" charset="0"/>
-            </a:endParaRPr>
-          </a:p>
-          <a:p>
-            <a:pPr marL="0" indent="0" algn="just">
-              <a:buNone/>
-            </a:pPr>
-            <a:r>
-              <a:rPr lang="ru-RU" dirty="0">
-                <a:latin typeface="Times New Roman" panose="02020603050405020304" pitchFamily="18" charset="0"/>
-                <a:cs typeface="Times New Roman" panose="02020603050405020304" pitchFamily="18" charset="0"/>
-              </a:rPr>
-              <a:t>Последствия стресса носят как физиологический, так и психологический характер. Предупреждение наступления стадии истощения может позволить сохранить здоровье и работоспособность трудящихся.</a:t>
-            </a:r>
-          </a:p>
-        </p:txBody>
-      </p:sp>
-    </p:spTree>
-    <p:extLst>
-      <p:ext uri="{BB962C8B-B14F-4D97-AF65-F5344CB8AC3E}">
-        <p14:creationId xmlns:p14="http://schemas.microsoft.com/office/powerpoint/2010/main" val="1721109683"/>
-      </p:ext>
-    </p:extLst>
-  </p:cSld>
-  <p:clrMapOvr>
-    <a:masterClrMapping/>
-  </p:clrMapOvr>
-</p:sld>
-</file>
-
-<file path=ppt/slides/slide7.xml><?xml version="1.0" encoding="utf-8"?>
-<p:sld xmlns:a="http://schemas.openxmlformats.org/drawingml/2006/main" xmlns:r="http://schemas.openxmlformats.org/officeDocument/2006/relationships" xmlns:p="http://schemas.openxmlformats.org/presentationml/2006/main">
-  <p:cSld>
-    <p:spTree>
-      <p:nvGrpSpPr>
-        <p:cNvPr id="1" name=""/>
-        <p:cNvGrpSpPr/>
-        <p:nvPr/>
-      </p:nvGrpSpPr>
-      <p:grpSpPr>
-        <a:xfrm>
-          <a:off x="0" y="0"/>
-          <a:ext cx="0" cy="0"/>
-          <a:chOff x="0" y="0"/>
-          <a:chExt cx="0" cy="0"/>
-        </a:xfrm>
-      </p:grpSpPr>
-      <p:sp>
-        <p:nvSpPr>
-          <p:cNvPr id="2" name="Заголовок 1">
-            <a:extLst>
-              <a:ext uri="{FF2B5EF4-FFF2-40B4-BE49-F238E27FC236}">
                 <a16:creationId xmlns:a16="http://schemas.microsoft.com/office/drawing/2014/main" id="{4657FF81-6D4A-4638-BC86-A0828019E589}"/>
               </a:ext>
             </a:extLst>
@@ -5238,141 +5466,66 @@
           </a:bodyPr>
           <a:lstStyle/>
           <a:p>
-            <a:pPr marL="342900" indent="-342900" algn="l">
+            <a:pPr marL="342900" indent="-342900" algn="just">
               <a:buFont typeface="+mj-lt"/>
               <a:buAutoNum type="arabicPeriod"/>
             </a:pPr>
             <a:r>
-              <a:rPr lang="ru-RU" sz="2400" b="0" i="0" u="none" strike="noStrike" baseline="0" dirty="0">
-                <a:latin typeface="Times New Roman" panose="02020603050405020304" pitchFamily="18" charset="0"/>
-                <a:cs typeface="Times New Roman" panose="02020603050405020304" pitchFamily="18" charset="0"/>
-              </a:rPr>
-              <a:t>Т.В. </a:t>
-            </a:r>
-            <a:r>
-              <a:rPr lang="ru-RU" sz="2400" b="0" i="0" u="none" strike="noStrike" baseline="0" dirty="0" err="1">
-                <a:latin typeface="Times New Roman" panose="02020603050405020304" pitchFamily="18" charset="0"/>
-                <a:cs typeface="Times New Roman" panose="02020603050405020304" pitchFamily="18" charset="0"/>
-              </a:rPr>
-              <a:t>Байдина</a:t>
-            </a:r>
-            <a:r>
-              <a:rPr lang="ru-RU" sz="2400" b="0" i="0" u="none" strike="noStrike" baseline="0" dirty="0">
-                <a:latin typeface="Times New Roman" panose="02020603050405020304" pitchFamily="18" charset="0"/>
-                <a:cs typeface="Times New Roman" panose="02020603050405020304" pitchFamily="18" charset="0"/>
-              </a:rPr>
-              <a:t> Т.И. Колесова Б.В. Малинина. Усталость как симптом неврологических заболеваний // Пермский медицинский журнал. 2021. </a:t>
+              <a:rPr lang="en-US" sz="2400" dirty="0">
+                <a:latin typeface="Times New Roman" panose="02020603050405020304" pitchFamily="18" charset="0"/>
+                <a:cs typeface="Times New Roman" panose="02020603050405020304" pitchFamily="18" charset="0"/>
+              </a:rPr>
+              <a:t>Health and safety at work – Summary statistics for Great Britain 2018 [</a:t>
             </a:r>
             <a:r>
               <a:rPr lang="ru-RU" sz="2400" dirty="0">
                 <a:latin typeface="Times New Roman" panose="02020603050405020304" pitchFamily="18" charset="0"/>
                 <a:cs typeface="Times New Roman" panose="02020603050405020304" pitchFamily="18" charset="0"/>
               </a:rPr>
-              <a:t>Т</a:t>
-            </a:r>
-            <a:r>
-              <a:rPr lang="ru-RU" sz="2400" b="0" i="0" u="none" strike="noStrike" baseline="0" dirty="0">
-                <a:latin typeface="Times New Roman" panose="02020603050405020304" pitchFamily="18" charset="0"/>
-                <a:cs typeface="Times New Roman" panose="02020603050405020304" pitchFamily="18" charset="0"/>
-              </a:rPr>
-              <a:t>. 38, № 2. С. 37–44.</a:t>
-            </a:r>
-            <a:endParaRPr lang="en-US" sz="2400" b="0" i="0" u="none" strike="noStrike" baseline="0" dirty="0">
-              <a:latin typeface="Times New Roman" panose="02020603050405020304" pitchFamily="18" charset="0"/>
-              <a:cs typeface="Times New Roman" panose="02020603050405020304" pitchFamily="18" charset="0"/>
-            </a:endParaRPr>
-          </a:p>
-          <a:p>
-            <a:pPr marL="342900" indent="-342900" algn="l">
-              <a:buFont typeface="+mj-lt"/>
-              <a:buAutoNum type="arabicPeriod"/>
-            </a:pPr>
+              <a:t>Электронный ресурс</a:t>
+            </a:r>
+            <a:r>
+              <a:rPr lang="en-US" sz="2400" dirty="0">
+                <a:latin typeface="Times New Roman" panose="02020603050405020304" pitchFamily="18" charset="0"/>
+                <a:cs typeface="Times New Roman" panose="02020603050405020304" pitchFamily="18" charset="0"/>
+              </a:rPr>
+              <a:t>]. </a:t>
+            </a:r>
             <a:r>
               <a:rPr lang="ru-RU" sz="2400" dirty="0">
                 <a:latin typeface="Times New Roman" panose="02020603050405020304" pitchFamily="18" charset="0"/>
                 <a:cs typeface="Times New Roman" panose="02020603050405020304" pitchFamily="18" charset="0"/>
               </a:rPr>
-              <a:t>Н.В. </a:t>
-            </a:r>
-            <a:r>
-              <a:rPr lang="ru-RU" sz="2400" dirty="0" err="1">
-                <a:latin typeface="Times New Roman" panose="02020603050405020304" pitchFamily="18" charset="0"/>
-                <a:cs typeface="Times New Roman" panose="02020603050405020304" pitchFamily="18" charset="0"/>
-              </a:rPr>
-              <a:t>Пизова</a:t>
+              <a:t>Режим доступа:</a:t>
+            </a:r>
+            <a:r>
+              <a:rPr lang="en-US" sz="2400" dirty="0">
+                <a:latin typeface="Times New Roman" panose="02020603050405020304" pitchFamily="18" charset="0"/>
+                <a:cs typeface="Times New Roman" panose="02020603050405020304" pitchFamily="18" charset="0"/>
+              </a:rPr>
+              <a:t> </a:t>
+            </a:r>
+            <a:r>
+              <a:rPr lang="en-US" sz="2400" dirty="0">
+                <a:latin typeface="Times New Roman" panose="02020603050405020304" pitchFamily="18" charset="0"/>
+                <a:cs typeface="Times New Roman" panose="02020603050405020304" pitchFamily="18" charset="0"/>
+                <a:hlinkClick r:id="rId2"/>
+              </a:rPr>
+              <a:t>https://www.hse.gov.uk/statistics/overall/hssh1718.pdf</a:t>
+            </a:r>
+            <a:r>
+              <a:rPr lang="en-US" sz="2400" dirty="0">
+                <a:latin typeface="Times New Roman" panose="02020603050405020304" pitchFamily="18" charset="0"/>
+                <a:cs typeface="Times New Roman" panose="02020603050405020304" pitchFamily="18" charset="0"/>
+              </a:rPr>
+              <a:t> (</a:t>
             </a:r>
             <a:r>
               <a:rPr lang="ru-RU" sz="2400" dirty="0">
                 <a:latin typeface="Times New Roman" panose="02020603050405020304" pitchFamily="18" charset="0"/>
                 <a:cs typeface="Times New Roman" panose="02020603050405020304" pitchFamily="18" charset="0"/>
               </a:rPr>
-              <a:t> А.В. </a:t>
-            </a:r>
-            <a:r>
-              <a:rPr lang="ru-RU" sz="2400" dirty="0" err="1">
-                <a:latin typeface="Times New Roman" panose="02020603050405020304" pitchFamily="18" charset="0"/>
-                <a:cs typeface="Times New Roman" panose="02020603050405020304" pitchFamily="18" charset="0"/>
-              </a:rPr>
-              <a:t>Пизов</a:t>
-            </a:r>
-            <a:r>
-              <a:rPr lang="ru-RU" sz="2400" dirty="0">
-                <a:latin typeface="Times New Roman" panose="02020603050405020304" pitchFamily="18" charset="0"/>
-                <a:cs typeface="Times New Roman" panose="02020603050405020304" pitchFamily="18" charset="0"/>
-              </a:rPr>
-              <a:t>. Когнитивные нарушения и синдром хронической усталости // Нервные болезни. 2021. № 3. С. 10–16.</a:t>
-            </a:r>
-            <a:endParaRPr lang="en-US" sz="2400" dirty="0">
-              <a:latin typeface="Times New Roman" panose="02020603050405020304" pitchFamily="18" charset="0"/>
-              <a:cs typeface="Times New Roman" panose="02020603050405020304" pitchFamily="18" charset="0"/>
-            </a:endParaRPr>
-          </a:p>
-          <a:p>
-            <a:pPr marL="342900" indent="-342900" algn="l">
-              <a:buFont typeface="+mj-lt"/>
-              <a:buAutoNum type="arabicPeriod"/>
-            </a:pPr>
-            <a:r>
-              <a:rPr lang="ru-RU" sz="2400" dirty="0" err="1">
-                <a:latin typeface="Times New Roman" panose="02020603050405020304" pitchFamily="18" charset="0"/>
-                <a:cs typeface="Times New Roman" panose="02020603050405020304" pitchFamily="18" charset="0"/>
-              </a:rPr>
-              <a:t>Долбышев</a:t>
-            </a:r>
-            <a:r>
-              <a:rPr lang="ru-RU" sz="2400" dirty="0">
-                <a:latin typeface="Times New Roman" panose="02020603050405020304" pitchFamily="18" charset="0"/>
-                <a:cs typeface="Times New Roman" panose="02020603050405020304" pitchFamily="18" charset="0"/>
-              </a:rPr>
-              <a:t> А.В. Нейрофизиологические механизмы стресса // </a:t>
-            </a:r>
-            <a:r>
-              <a:rPr lang="ru-RU" sz="2400" dirty="0" err="1">
-                <a:latin typeface="Times New Roman" panose="02020603050405020304" pitchFamily="18" charset="0"/>
-                <a:cs typeface="Times New Roman" panose="02020603050405020304" pitchFamily="18" charset="0"/>
-              </a:rPr>
-              <a:t>StudNet</a:t>
-            </a:r>
-            <a:r>
-              <a:rPr lang="ru-RU" sz="2400" dirty="0">
-                <a:latin typeface="Times New Roman" panose="02020603050405020304" pitchFamily="18" charset="0"/>
-                <a:cs typeface="Times New Roman" panose="02020603050405020304" pitchFamily="18" charset="0"/>
-              </a:rPr>
-              <a:t>.</a:t>
-            </a:r>
-            <a:r>
-              <a:rPr lang="en-US" sz="2400" dirty="0">
-                <a:latin typeface="Times New Roman" panose="02020603050405020304" pitchFamily="18" charset="0"/>
-                <a:cs typeface="Times New Roman" panose="02020603050405020304" pitchFamily="18" charset="0"/>
-              </a:rPr>
-              <a:t> </a:t>
-            </a:r>
-            <a:r>
-              <a:rPr lang="ru-RU" sz="2400" dirty="0">
-                <a:latin typeface="Times New Roman" panose="02020603050405020304" pitchFamily="18" charset="0"/>
-                <a:cs typeface="Times New Roman" panose="02020603050405020304" pitchFamily="18" charset="0"/>
-              </a:rPr>
-              <a:t>2020. № 7. С. 163–167.</a:t>
+              <a:t>дата обращения 02.04.2022).</a:t>
             </a:r>
           </a:p>
         </p:txBody>
@@ -5400,7 +5553,7 @@
           <a:p>
             <a:fld id="{356812A1-C132-42AC-87BC-7262BD3AB593}" type="slidenum">
               <a:rPr lang="ru-RU" smtClean="0"/>
-              <a:t>7</a:t>
+              <a:t>6</a:t>
             </a:fld>
             <a:endParaRPr lang="ru-RU"/>
           </a:p>

</xml_diff>

<commit_message>
ADD: starts of presentation
</commit_message>
<xml_diff>
--- a/Presentation/presentation.pptx
+++ b/Presentation/presentation.pptx
@@ -4,13 +4,24 @@
   <p:sldMasterIdLst>
     <p:sldMasterId id="2147483648" r:id="rId1"/>
   </p:sldMasterIdLst>
+  <p:notesMasterIdLst>
+    <p:notesMasterId r:id="rId16"/>
+  </p:notesMasterIdLst>
   <p:sldIdLst>
     <p:sldId id="256" r:id="rId2"/>
     <p:sldId id="257" r:id="rId3"/>
-    <p:sldId id="266" r:id="rId4"/>
-    <p:sldId id="273" r:id="rId5"/>
-    <p:sldId id="274" r:id="rId6"/>
-    <p:sldId id="272" r:id="rId7"/>
+    <p:sldId id="273" r:id="rId4"/>
+    <p:sldId id="274" r:id="rId5"/>
+    <p:sldId id="279" r:id="rId6"/>
+    <p:sldId id="287" r:id="rId7"/>
+    <p:sldId id="275" r:id="rId8"/>
+    <p:sldId id="276" r:id="rId9"/>
+    <p:sldId id="277" r:id="rId10"/>
+    <p:sldId id="281" r:id="rId11"/>
+    <p:sldId id="282" r:id="rId12"/>
+    <p:sldId id="283" r:id="rId13"/>
+    <p:sldId id="284" r:id="rId14"/>
+    <p:sldId id="285" r:id="rId15"/>
   </p:sldIdLst>
   <p:sldSz cx="12192000" cy="6858000"/>
   <p:notesSz cx="6858000" cy="9144000"/>
@@ -117,985 +128,353 @@
 </p:presentation>
 </file>
 
-<file path=ppt/charts/chart1.xml><?xml version="1.0" encoding="utf-8"?>
-<c:chartSpace xmlns:c="http://schemas.openxmlformats.org/drawingml/2006/chart" xmlns:a="http://schemas.openxmlformats.org/drawingml/2006/main" xmlns:r="http://schemas.openxmlformats.org/officeDocument/2006/relationships" xmlns:c16r2="http://schemas.microsoft.com/office/drawing/2015/06/chart">
-  <c:date1904 val="0"/>
-  <c:lang val="ru-RU"/>
-  <c:roundedCorners val="0"/>
-  <mc:AlternateContent xmlns:mc="http://schemas.openxmlformats.org/markup-compatibility/2006">
-    <mc:Choice xmlns:c14="http://schemas.microsoft.com/office/drawing/2007/8/2/chart" Requires="c14">
-      <c14:style val="102"/>
-    </mc:Choice>
-    <mc:Fallback>
-      <c:style val="2"/>
-    </mc:Fallback>
-  </mc:AlternateContent>
-  <c:chart>
-    <c:title>
-      <c:tx>
-        <c:rich>
-          <a:bodyPr rot="0" spcFirstLastPara="1" vertOverflow="ellipsis" vert="horz" wrap="square" anchor="ctr" anchorCtr="1"/>
-          <a:lstStyle/>
-          <a:p>
-            <a:pPr>
-              <a:defRPr sz="1862" b="1" i="0" u="none" strike="noStrike" kern="1200" cap="all" spc="50" baseline="0">
-                <a:solidFill>
-                  <a:schemeClr val="tx1">
-                    <a:lumMod val="65000"/>
-                    <a:lumOff val="35000"/>
-                  </a:schemeClr>
-                </a:solidFill>
-                <a:latin typeface="+mn-lt"/>
-                <a:ea typeface="+mn-ea"/>
-                <a:cs typeface="+mn-cs"/>
-              </a:defRPr>
-            </a:pPr>
-            <a:r>
-              <a:rPr lang="ru-RU"/>
-              <a:t>Причины стресса на рабочем месте </a:t>
-            </a:r>
-            <a:r>
-              <a:rPr lang="en-US"/>
-              <a:t>[1]</a:t>
-            </a:r>
+<file path=ppt/notesMasters/notesMaster1.xml><?xml version="1.0" encoding="utf-8"?>
+<p:notesMaster xmlns:a="http://schemas.openxmlformats.org/drawingml/2006/main" xmlns:r="http://schemas.openxmlformats.org/officeDocument/2006/relationships" xmlns:p="http://schemas.openxmlformats.org/presentationml/2006/main">
+  <p:cSld>
+    <p:bg>
+      <p:bgRef idx="1001">
+        <a:schemeClr val="bg1"/>
+      </p:bgRef>
+    </p:bg>
+    <p:spTree>
+      <p:nvGrpSpPr>
+        <p:cNvPr id="1" name=""/>
+        <p:cNvGrpSpPr/>
+        <p:nvPr/>
+      </p:nvGrpSpPr>
+      <p:grpSpPr>
+        <a:xfrm>
+          <a:off x="0" y="0"/>
+          <a:ext cx="0" cy="0"/>
+          <a:chOff x="0" y="0"/>
+          <a:chExt cx="0" cy="0"/>
+        </a:xfrm>
+      </p:grpSpPr>
+      <p:sp>
+        <p:nvSpPr>
+          <p:cNvPr id="2" name="Верхний колонтитул 1"/>
+          <p:cNvSpPr>
+            <a:spLocks noGrp="1"/>
+          </p:cNvSpPr>
+          <p:nvPr>
+            <p:ph type="hdr" sz="quarter"/>
+          </p:nvPr>
+        </p:nvSpPr>
+        <p:spPr>
+          <a:xfrm>
+            <a:off x="0" y="0"/>
+            <a:ext cx="2971800" cy="458788"/>
+          </a:xfrm>
+          <a:prstGeom prst="rect">
+            <a:avLst/>
+          </a:prstGeom>
+        </p:spPr>
+        <p:txBody>
+          <a:bodyPr vert="horz" lIns="91440" tIns="45720" rIns="91440" bIns="45720" rtlCol="0"/>
+          <a:lstStyle>
+            <a:lvl1pPr algn="l">
+              <a:defRPr sz="1200"/>
+            </a:lvl1pPr>
+          </a:lstStyle>
+          <a:p>
             <a:endParaRPr lang="ru-RU"/>
           </a:p>
-        </c:rich>
-      </c:tx>
-      <c:overlay val="0"/>
-      <c:spPr>
-        <a:noFill/>
-        <a:ln>
+        </p:txBody>
+      </p:sp>
+      <p:sp>
+        <p:nvSpPr>
+          <p:cNvPr id="3" name="Дата 2"/>
+          <p:cNvSpPr>
+            <a:spLocks noGrp="1"/>
+          </p:cNvSpPr>
+          <p:nvPr>
+            <p:ph type="dt" idx="1"/>
+          </p:nvPr>
+        </p:nvSpPr>
+        <p:spPr>
+          <a:xfrm>
+            <a:off x="3884613" y="0"/>
+            <a:ext cx="2971800" cy="458788"/>
+          </a:xfrm>
+          <a:prstGeom prst="rect">
+            <a:avLst/>
+          </a:prstGeom>
+        </p:spPr>
+        <p:txBody>
+          <a:bodyPr vert="horz" lIns="91440" tIns="45720" rIns="91440" bIns="45720" rtlCol="0"/>
+          <a:lstStyle>
+            <a:lvl1pPr algn="r">
+              <a:defRPr sz="1200"/>
+            </a:lvl1pPr>
+          </a:lstStyle>
+          <a:p>
+            <a:fld id="{9AD2A09B-D952-4383-A48E-27C117CB15C8}" type="datetimeFigureOut">
+              <a:rPr lang="ru-RU" smtClean="0"/>
+              <a:t>24.05.2022</a:t>
+            </a:fld>
+            <a:endParaRPr lang="ru-RU"/>
+          </a:p>
+        </p:txBody>
+      </p:sp>
+      <p:sp>
+        <p:nvSpPr>
+          <p:cNvPr id="4" name="Образ слайда 3"/>
+          <p:cNvSpPr>
+            <a:spLocks noGrp="1" noRot="1" noChangeAspect="1"/>
+          </p:cNvSpPr>
+          <p:nvPr>
+            <p:ph type="sldImg" idx="2"/>
+          </p:nvPr>
+        </p:nvSpPr>
+        <p:spPr>
+          <a:xfrm>
+            <a:off x="685800" y="1143000"/>
+            <a:ext cx="5486400" cy="3086100"/>
+          </a:xfrm>
+          <a:prstGeom prst="rect">
+            <a:avLst/>
+          </a:prstGeom>
           <a:noFill/>
-        </a:ln>
-        <a:effectLst/>
-      </c:spPr>
-      <c:txPr>
-        <a:bodyPr rot="0" spcFirstLastPara="1" vertOverflow="ellipsis" vert="horz" wrap="square" anchor="ctr" anchorCtr="1"/>
-        <a:lstStyle/>
-        <a:p>
-          <a:pPr>
-            <a:defRPr sz="1862" b="1" i="0" u="none" strike="noStrike" kern="1200" cap="all" spc="50" baseline="0">
-              <a:solidFill>
-                <a:schemeClr val="tx1">
-                  <a:lumMod val="65000"/>
-                  <a:lumOff val="35000"/>
-                </a:schemeClr>
-              </a:solidFill>
-              <a:latin typeface="+mn-lt"/>
-              <a:ea typeface="+mn-ea"/>
-              <a:cs typeface="+mn-cs"/>
-            </a:defRPr>
-          </a:pPr>
-          <a:endParaRPr lang="ru-RU"/>
-        </a:p>
-      </c:txPr>
-    </c:title>
-    <c:autoTitleDeleted val="0"/>
-    <c:plotArea>
-      <c:layout/>
-      <c:pieChart>
-        <c:varyColors val="1"/>
-        <c:ser>
-          <c:idx val="0"/>
-          <c:order val="0"/>
-          <c:tx>
-            <c:strRef>
-              <c:f>Лист1!$B$1</c:f>
-              <c:strCache>
-                <c:ptCount val="1"/>
-                <c:pt idx="0">
-                  <c:v>Процент респондентов</c:v>
-                </c:pt>
-              </c:strCache>
-            </c:strRef>
-          </c:tx>
-          <c:dPt>
-            <c:idx val="0"/>
-            <c:bubble3D val="0"/>
-            <c:spPr>
-              <a:solidFill>
-                <a:schemeClr val="accent1"/>
-              </a:solidFill>
-              <a:ln>
-                <a:noFill/>
-              </a:ln>
-              <a:effectLst/>
-              <a:scene3d>
-                <a:camera prst="orthographicFront"/>
-                <a:lightRig rig="brightRoom" dir="t"/>
-              </a:scene3d>
-              <a:sp3d prstMaterial="flat">
-                <a:bevelT w="50800" h="101600" prst="angle"/>
-                <a:contourClr>
-                  <a:srgbClr val="000000"/>
-                </a:contourClr>
-              </a:sp3d>
-            </c:spPr>
-            <c:extLst>
-              <c:ext xmlns:c16="http://schemas.microsoft.com/office/drawing/2014/chart" uri="{C3380CC4-5D6E-409C-BE32-E72D297353CC}">
-                <c16:uniqueId val="{00000001-375B-453A-B91D-9C2D525E6137}"/>
-              </c:ext>
-            </c:extLst>
-          </c:dPt>
-          <c:dPt>
-            <c:idx val="1"/>
-            <c:bubble3D val="0"/>
-            <c:spPr>
-              <a:solidFill>
-                <a:schemeClr val="accent2"/>
-              </a:solidFill>
-              <a:ln>
-                <a:noFill/>
-              </a:ln>
-              <a:effectLst/>
-              <a:scene3d>
-                <a:camera prst="orthographicFront"/>
-                <a:lightRig rig="brightRoom" dir="t"/>
-              </a:scene3d>
-              <a:sp3d prstMaterial="flat">
-                <a:bevelT w="50800" h="101600" prst="angle"/>
-                <a:contourClr>
-                  <a:srgbClr val="000000"/>
-                </a:contourClr>
-              </a:sp3d>
-            </c:spPr>
-            <c:extLst>
-              <c:ext xmlns:c16="http://schemas.microsoft.com/office/drawing/2014/chart" uri="{C3380CC4-5D6E-409C-BE32-E72D297353CC}">
-                <c16:uniqueId val="{00000003-375B-453A-B91D-9C2D525E6137}"/>
-              </c:ext>
-            </c:extLst>
-          </c:dPt>
-          <c:dPt>
-            <c:idx val="2"/>
-            <c:bubble3D val="0"/>
-            <c:spPr>
-              <a:solidFill>
-                <a:schemeClr val="accent3"/>
-              </a:solidFill>
-              <a:ln>
-                <a:noFill/>
-              </a:ln>
-              <a:effectLst/>
-              <a:scene3d>
-                <a:camera prst="orthographicFront"/>
-                <a:lightRig rig="brightRoom" dir="t"/>
-              </a:scene3d>
-              <a:sp3d prstMaterial="flat">
-                <a:bevelT w="50800" h="101600" prst="angle"/>
-                <a:contourClr>
-                  <a:srgbClr val="000000"/>
-                </a:contourClr>
-              </a:sp3d>
-            </c:spPr>
-            <c:extLst>
-              <c:ext xmlns:c16="http://schemas.microsoft.com/office/drawing/2014/chart" uri="{C3380CC4-5D6E-409C-BE32-E72D297353CC}">
-                <c16:uniqueId val="{00000005-375B-453A-B91D-9C2D525E6137}"/>
-              </c:ext>
-            </c:extLst>
-          </c:dPt>
-          <c:dPt>
-            <c:idx val="3"/>
-            <c:bubble3D val="0"/>
-            <c:spPr>
-              <a:solidFill>
-                <a:schemeClr val="accent4"/>
-              </a:solidFill>
-              <a:ln>
-                <a:noFill/>
-              </a:ln>
-              <a:effectLst/>
-              <a:scene3d>
-                <a:camera prst="orthographicFront"/>
-                <a:lightRig rig="brightRoom" dir="t"/>
-              </a:scene3d>
-              <a:sp3d prstMaterial="flat">
-                <a:bevelT w="50800" h="101600" prst="angle"/>
-                <a:contourClr>
-                  <a:srgbClr val="000000"/>
-                </a:contourClr>
-              </a:sp3d>
-            </c:spPr>
-            <c:extLst>
-              <c:ext xmlns:c16="http://schemas.microsoft.com/office/drawing/2014/chart" uri="{C3380CC4-5D6E-409C-BE32-E72D297353CC}">
-                <c16:uniqueId val="{00000007-375B-453A-B91D-9C2D525E6137}"/>
-              </c:ext>
-            </c:extLst>
-          </c:dPt>
-          <c:dPt>
-            <c:idx val="4"/>
-            <c:bubble3D val="0"/>
-            <c:spPr>
-              <a:solidFill>
-                <a:schemeClr val="accent5"/>
-              </a:solidFill>
-              <a:ln>
-                <a:noFill/>
-              </a:ln>
-              <a:effectLst/>
-              <a:scene3d>
-                <a:camera prst="orthographicFront"/>
-                <a:lightRig rig="brightRoom" dir="t"/>
-              </a:scene3d>
-              <a:sp3d prstMaterial="flat">
-                <a:bevelT w="50800" h="101600" prst="angle"/>
-                <a:contourClr>
-                  <a:srgbClr val="000000"/>
-                </a:contourClr>
-              </a:sp3d>
-            </c:spPr>
-            <c:extLst>
-              <c:ext xmlns:c16="http://schemas.microsoft.com/office/drawing/2014/chart" uri="{C3380CC4-5D6E-409C-BE32-E72D297353CC}">
-                <c16:uniqueId val="{00000009-375B-453A-B91D-9C2D525E6137}"/>
-              </c:ext>
-            </c:extLst>
-          </c:dPt>
-          <c:dLbls>
-            <c:spPr>
-              <a:noFill/>
-              <a:ln>
-                <a:noFill/>
-              </a:ln>
-              <a:effectLst/>
-            </c:spPr>
-            <c:txPr>
-              <a:bodyPr rot="0" spcFirstLastPara="1" vertOverflow="ellipsis" vert="horz" wrap="square" lIns="38100" tIns="19050" rIns="38100" bIns="19050" anchor="ctr" anchorCtr="1">
-                <a:spAutoFit/>
-              </a:bodyPr>
-              <a:lstStyle/>
-              <a:p>
-                <a:pPr>
-                  <a:defRPr sz="1197" b="1" i="0" u="none" strike="noStrike" kern="1200" baseline="0">
-                    <a:solidFill>
-                      <a:schemeClr val="lt1"/>
-                    </a:solidFill>
-                    <a:latin typeface="+mn-lt"/>
-                    <a:ea typeface="+mn-ea"/>
-                    <a:cs typeface="+mn-cs"/>
-                  </a:defRPr>
-                </a:pPr>
-                <a:endParaRPr lang="ru-RU"/>
-              </a:p>
-            </c:txPr>
-            <c:dLblPos val="inEnd"/>
-            <c:showLegendKey val="0"/>
-            <c:showVal val="0"/>
-            <c:showCatName val="0"/>
-            <c:showSerName val="0"/>
-            <c:showPercent val="1"/>
-            <c:showBubbleSize val="0"/>
-            <c:showLeaderLines val="1"/>
-            <c:leaderLines>
-              <c:spPr>
-                <a:ln w="9525" cap="flat" cmpd="sng" algn="ctr">
-                  <a:solidFill>
-                    <a:schemeClr val="tx1">
-                      <a:lumMod val="35000"/>
-                      <a:lumOff val="65000"/>
-                    </a:schemeClr>
-                  </a:solidFill>
-                  <a:round/>
-                </a:ln>
-                <a:effectLst/>
-              </c:spPr>
-            </c:leaderLines>
-            <c:extLst>
-              <c:ext xmlns:c15="http://schemas.microsoft.com/office/drawing/2012/chart" uri="{CE6537A1-D6FC-4f65-9D91-7224C49458BB}"/>
-            </c:extLst>
-          </c:dLbls>
-          <c:cat>
-            <c:strRef>
-              <c:f>Лист1!$A$2:$A$6</c:f>
-              <c:strCache>
-                <c:ptCount val="5"/>
-                <c:pt idx="0">
-                  <c:v>Рабочая нагрузка</c:v>
-                </c:pt>
-                <c:pt idx="1">
-                  <c:v>Недостаток поддержки</c:v>
-                </c:pt>
-                <c:pt idx="2">
-                  <c:v>Жестокое обращение</c:v>
-                </c:pt>
-                <c:pt idx="3">
-                  <c:v>Перемены в рабочем процессе</c:v>
-                </c:pt>
-                <c:pt idx="4">
-                  <c:v>Другое</c:v>
-                </c:pt>
-              </c:strCache>
-            </c:strRef>
-          </c:cat>
-          <c:val>
-            <c:numRef>
-              <c:f>Лист1!$B$2:$B$6</c:f>
-              <c:numCache>
-                <c:formatCode>General</c:formatCode>
-                <c:ptCount val="5"/>
-                <c:pt idx="0">
-                  <c:v>44</c:v>
-                </c:pt>
-                <c:pt idx="1">
-                  <c:v>14</c:v>
-                </c:pt>
-                <c:pt idx="2">
-                  <c:v>13</c:v>
-                </c:pt>
-                <c:pt idx="3">
-                  <c:v>8</c:v>
-                </c:pt>
-                <c:pt idx="4">
-                  <c:v>21</c:v>
-                </c:pt>
-              </c:numCache>
-            </c:numRef>
-          </c:val>
-          <c:extLst>
-            <c:ext xmlns:c16="http://schemas.microsoft.com/office/drawing/2014/chart" uri="{C3380CC4-5D6E-409C-BE32-E72D297353CC}">
-              <c16:uniqueId val="{00000000-4016-4918-ADEF-42B6DCD3708F}"/>
-            </c:ext>
-          </c:extLst>
-        </c:ser>
-        <c:dLbls>
-          <c:dLblPos val="inEnd"/>
-          <c:showLegendKey val="0"/>
-          <c:showVal val="0"/>
-          <c:showCatName val="0"/>
-          <c:showSerName val="0"/>
-          <c:showPercent val="1"/>
-          <c:showBubbleSize val="0"/>
-          <c:showLeaderLines val="1"/>
-        </c:dLbls>
-        <c:firstSliceAng val="0"/>
-      </c:pieChart>
-      <c:spPr>
-        <a:noFill/>
-        <a:ln>
-          <a:noFill/>
-        </a:ln>
-        <a:effectLst/>
-      </c:spPr>
-    </c:plotArea>
-    <c:legend>
-      <c:legendPos val="t"/>
-      <c:overlay val="0"/>
-      <c:spPr>
-        <a:noFill/>
-        <a:ln>
-          <a:noFill/>
-        </a:ln>
-        <a:effectLst/>
-      </c:spPr>
-      <c:txPr>
-        <a:bodyPr rot="0" spcFirstLastPara="1" vertOverflow="ellipsis" vert="horz" wrap="square" anchor="ctr" anchorCtr="1"/>
-        <a:lstStyle/>
-        <a:p>
-          <a:pPr>
-            <a:defRPr sz="1197" b="0" i="0" u="none" strike="noStrike" kern="1200" baseline="0">
-              <a:solidFill>
-                <a:schemeClr val="tx1">
-                  <a:lumMod val="65000"/>
-                  <a:lumOff val="35000"/>
-                </a:schemeClr>
-              </a:solidFill>
-              <a:latin typeface="+mn-lt"/>
-              <a:ea typeface="+mn-ea"/>
-              <a:cs typeface="+mn-cs"/>
-            </a:defRPr>
-          </a:pPr>
-          <a:endParaRPr lang="ru-RU"/>
-        </a:p>
-      </c:txPr>
-    </c:legend>
-    <c:plotVisOnly val="1"/>
-    <c:dispBlanksAs val="gap"/>
-    <c:extLst>
-      <c:ext xmlns:c16r3="http://schemas.microsoft.com/office/drawing/2017/03/chart" uri="{56B9EC1D-385E-4148-901F-78D8002777C0}">
-        <c16r3:dataDisplayOptions16>
-          <c16r3:dispNaAsBlank val="1"/>
-        </c16r3:dataDisplayOptions16>
-      </c:ext>
-    </c:extLst>
-    <c:showDLblsOverMax val="0"/>
-  </c:chart>
-  <c:spPr>
-    <a:noFill/>
-    <a:ln>
-      <a:noFill/>
-    </a:ln>
-    <a:effectLst/>
-  </c:spPr>
-  <c:txPr>
-    <a:bodyPr/>
-    <a:lstStyle/>
-    <a:p>
-      <a:pPr>
-        <a:defRPr/>
-      </a:pPr>
-      <a:endParaRPr lang="ru-RU"/>
-    </a:p>
-  </c:txPr>
-  <c:externalData r:id="rId3">
-    <c:autoUpdate val="0"/>
-  </c:externalData>
-</c:chartSpace>
-</file>
-
-<file path=ppt/charts/colors1.xml><?xml version="1.0" encoding="utf-8"?>
-<cs:colorStyle xmlns:cs="http://schemas.microsoft.com/office/drawing/2012/chartStyle" xmlns:a="http://schemas.openxmlformats.org/drawingml/2006/main" meth="cycle" id="10">
-  <a:schemeClr val="accent1"/>
-  <a:schemeClr val="accent2"/>
-  <a:schemeClr val="accent3"/>
-  <a:schemeClr val="accent4"/>
-  <a:schemeClr val="accent5"/>
-  <a:schemeClr val="accent6"/>
-  <cs:variation/>
-  <cs:variation>
-    <a:lumMod val="60000"/>
-  </cs:variation>
-  <cs:variation>
-    <a:lumMod val="80000"/>
-    <a:lumOff val="20000"/>
-  </cs:variation>
-  <cs:variation>
-    <a:lumMod val="80000"/>
-  </cs:variation>
-  <cs:variation>
-    <a:lumMod val="60000"/>
-    <a:lumOff val="40000"/>
-  </cs:variation>
-  <cs:variation>
-    <a:lumMod val="50000"/>
-  </cs:variation>
-  <cs:variation>
-    <a:lumMod val="70000"/>
-    <a:lumOff val="30000"/>
-  </cs:variation>
-  <cs:variation>
-    <a:lumMod val="70000"/>
-  </cs:variation>
-  <cs:variation>
-    <a:lumMod val="50000"/>
-    <a:lumOff val="50000"/>
-  </cs:variation>
-</cs:colorStyle>
-</file>
-
-<file path=ppt/charts/style1.xml><?xml version="1.0" encoding="utf-8"?>
-<cs:chartStyle xmlns:cs="http://schemas.microsoft.com/office/drawing/2012/chartStyle" xmlns:a="http://schemas.openxmlformats.org/drawingml/2006/main" id="258">
-  <cs:axisTitle>
-    <cs:lnRef idx="0"/>
-    <cs:fillRef idx="0"/>
-    <cs:effectRef idx="0"/>
-    <cs:fontRef idx="minor">
-      <a:schemeClr val="tx1">
-        <a:lumMod val="65000"/>
-        <a:lumOff val="35000"/>
-      </a:schemeClr>
-    </cs:fontRef>
-    <cs:defRPr sz="1197" kern="1200"/>
-  </cs:axisTitle>
-  <cs:categoryAxis>
-    <cs:lnRef idx="0"/>
-    <cs:fillRef idx="0"/>
-    <cs:effectRef idx="0"/>
-    <cs:fontRef idx="minor">
-      <a:schemeClr val="tx1">
-        <a:lumMod val="65000"/>
-        <a:lumOff val="35000"/>
-      </a:schemeClr>
-    </cs:fontRef>
-    <cs:defRPr sz="1197" kern="1200"/>
-  </cs:categoryAxis>
-  <cs:chartArea mods="allowNoFillOverride allowNoLineOverride">
-    <cs:lnRef idx="0"/>
-    <cs:fillRef idx="0"/>
-    <cs:effectRef idx="0"/>
-    <cs:fontRef idx="minor">
-      <a:schemeClr val="tx1"/>
-    </cs:fontRef>
-    <cs:spPr>
-      <a:solidFill>
-        <a:schemeClr val="bg1"/>
-      </a:solidFill>
-      <a:ln w="9525" cap="flat" cmpd="sng" algn="ctr">
+          <a:ln w="12700">
+            <a:solidFill>
+              <a:prstClr val="black"/>
+            </a:solidFill>
+          </a:ln>
+        </p:spPr>
+        <p:txBody>
+          <a:bodyPr vert="horz" lIns="91440" tIns="45720" rIns="91440" bIns="45720" rtlCol="0" anchor="ctr"/>
+          <a:lstStyle/>
+          <a:p>
+            <a:endParaRPr lang="ru-RU"/>
+          </a:p>
+        </p:txBody>
+      </p:sp>
+      <p:sp>
+        <p:nvSpPr>
+          <p:cNvPr id="5" name="Заметки 4"/>
+          <p:cNvSpPr>
+            <a:spLocks noGrp="1"/>
+          </p:cNvSpPr>
+          <p:nvPr>
+            <p:ph type="body" sz="quarter" idx="3"/>
+          </p:nvPr>
+        </p:nvSpPr>
+        <p:spPr>
+          <a:xfrm>
+            <a:off x="685800" y="4400550"/>
+            <a:ext cx="5486400" cy="3600450"/>
+          </a:xfrm>
+          <a:prstGeom prst="rect">
+            <a:avLst/>
+          </a:prstGeom>
+        </p:spPr>
+        <p:txBody>
+          <a:bodyPr vert="horz" lIns="91440" tIns="45720" rIns="91440" bIns="45720" rtlCol="0"/>
+          <a:lstStyle/>
+          <a:p>
+            <a:pPr lvl="0"/>
+            <a:r>
+              <a:rPr lang="ru-RU"/>
+              <a:t>Образец текста</a:t>
+            </a:r>
+          </a:p>
+          <a:p>
+            <a:pPr lvl="1"/>
+            <a:r>
+              <a:rPr lang="ru-RU"/>
+              <a:t>Второй уровень</a:t>
+            </a:r>
+          </a:p>
+          <a:p>
+            <a:pPr lvl="2"/>
+            <a:r>
+              <a:rPr lang="ru-RU"/>
+              <a:t>Третий уровень</a:t>
+            </a:r>
+          </a:p>
+          <a:p>
+            <a:pPr lvl="3"/>
+            <a:r>
+              <a:rPr lang="ru-RU"/>
+              <a:t>Четвертый уровень</a:t>
+            </a:r>
+          </a:p>
+          <a:p>
+            <a:pPr lvl="4"/>
+            <a:r>
+              <a:rPr lang="ru-RU"/>
+              <a:t>Пятый уровень</a:t>
+            </a:r>
+          </a:p>
+        </p:txBody>
+      </p:sp>
+      <p:sp>
+        <p:nvSpPr>
+          <p:cNvPr id="6" name="Нижний колонтитул 5"/>
+          <p:cNvSpPr>
+            <a:spLocks noGrp="1"/>
+          </p:cNvSpPr>
+          <p:nvPr>
+            <p:ph type="ftr" sz="quarter" idx="4"/>
+          </p:nvPr>
+        </p:nvSpPr>
+        <p:spPr>
+          <a:xfrm>
+            <a:off x="0" y="8685213"/>
+            <a:ext cx="2971800" cy="458787"/>
+          </a:xfrm>
+          <a:prstGeom prst="rect">
+            <a:avLst/>
+          </a:prstGeom>
+        </p:spPr>
+        <p:txBody>
+          <a:bodyPr vert="horz" lIns="91440" tIns="45720" rIns="91440" bIns="45720" rtlCol="0" anchor="b"/>
+          <a:lstStyle>
+            <a:lvl1pPr algn="l">
+              <a:defRPr sz="1200"/>
+            </a:lvl1pPr>
+          </a:lstStyle>
+          <a:p>
+            <a:endParaRPr lang="ru-RU"/>
+          </a:p>
+        </p:txBody>
+      </p:sp>
+      <p:sp>
+        <p:nvSpPr>
+          <p:cNvPr id="7" name="Номер слайда 6"/>
+          <p:cNvSpPr>
+            <a:spLocks noGrp="1"/>
+          </p:cNvSpPr>
+          <p:nvPr>
+            <p:ph type="sldNum" sz="quarter" idx="5"/>
+          </p:nvPr>
+        </p:nvSpPr>
+        <p:spPr>
+          <a:xfrm>
+            <a:off x="3884613" y="8685213"/>
+            <a:ext cx="2971800" cy="458787"/>
+          </a:xfrm>
+          <a:prstGeom prst="rect">
+            <a:avLst/>
+          </a:prstGeom>
+        </p:spPr>
+        <p:txBody>
+          <a:bodyPr vert="horz" lIns="91440" tIns="45720" rIns="91440" bIns="45720" rtlCol="0" anchor="b"/>
+          <a:lstStyle>
+            <a:lvl1pPr algn="r">
+              <a:defRPr sz="1200"/>
+            </a:lvl1pPr>
+          </a:lstStyle>
+          <a:p>
+            <a:fld id="{E218A35C-009A-4690-875A-C24C402031AA}" type="slidenum">
+              <a:rPr lang="ru-RU" smtClean="0"/>
+              <a:t>‹#›</a:t>
+            </a:fld>
+            <a:endParaRPr lang="ru-RU"/>
+          </a:p>
+        </p:txBody>
+      </p:sp>
+    </p:spTree>
+    <p:extLst>
+      <p:ext uri="{BB962C8B-B14F-4D97-AF65-F5344CB8AC3E}">
+        <p14:creationId xmlns:p14="http://schemas.microsoft.com/office/powerpoint/2010/main" val="3310100665"/>
+      </p:ext>
+    </p:extLst>
+  </p:cSld>
+  <p:clrMap bg1="lt1" tx1="dk1" bg2="lt2" tx2="dk2" accent1="accent1" accent2="accent2" accent3="accent3" accent4="accent4" accent5="accent5" accent6="accent6" hlink="hlink" folHlink="folHlink"/>
+  <p:notesStyle>
+    <a:lvl1pPr marL="0" algn="l" defTabSz="914400" rtl="0" eaLnBrk="1" latinLnBrk="0" hangingPunct="1">
+      <a:defRPr sz="1200" kern="1200">
         <a:solidFill>
-          <a:schemeClr val="tx1">
-            <a:lumMod val="15000"/>
-            <a:lumOff val="85000"/>
-          </a:schemeClr>
+          <a:schemeClr val="tx1"/>
         </a:solidFill>
-        <a:round/>
-      </a:ln>
-    </cs:spPr>
-    <cs:defRPr sz="1197" kern="1200"/>
-  </cs:chartArea>
-  <cs:dataLabel>
-    <cs:lnRef idx="0"/>
-    <cs:fillRef idx="0"/>
-    <cs:effectRef idx="0"/>
-    <cs:fontRef idx="minor">
-      <a:schemeClr val="lt1"/>
-    </cs:fontRef>
-    <cs:defRPr sz="1197" b="1" kern="1200"/>
-  </cs:dataLabel>
-  <cs:dataLabelCallout>
-    <cs:lnRef idx="0"/>
-    <cs:fillRef idx="0"/>
-    <cs:effectRef idx="0"/>
-    <cs:fontRef idx="minor">
-      <a:schemeClr val="dk1">
-        <a:lumMod val="65000"/>
-        <a:lumOff val="35000"/>
-      </a:schemeClr>
-    </cs:fontRef>
-    <cs:spPr>
-      <a:solidFill>
-        <a:schemeClr val="lt1"/>
-      </a:solidFill>
-      <a:ln>
+        <a:latin typeface="+mn-lt"/>
+        <a:ea typeface="+mn-ea"/>
+        <a:cs typeface="+mn-cs"/>
+      </a:defRPr>
+    </a:lvl1pPr>
+    <a:lvl2pPr marL="457200" algn="l" defTabSz="914400" rtl="0" eaLnBrk="1" latinLnBrk="0" hangingPunct="1">
+      <a:defRPr sz="1200" kern="1200">
         <a:solidFill>
-          <a:schemeClr val="dk1">
-            <a:lumMod val="25000"/>
-            <a:lumOff val="75000"/>
-          </a:schemeClr>
+          <a:schemeClr val="tx1"/>
         </a:solidFill>
-      </a:ln>
-    </cs:spPr>
-    <cs:defRPr sz="1197" kern="1200"/>
-    <cs:bodyPr rot="0" spcFirstLastPara="1" vertOverflow="clip" horzOverflow="clip" vert="horz" wrap="square" lIns="36576" tIns="18288" rIns="36576" bIns="18288" anchor="ctr" anchorCtr="1">
-      <a:spAutoFit/>
-    </cs:bodyPr>
-  </cs:dataLabelCallout>
-  <cs:dataPoint>
-    <cs:lnRef idx="0"/>
-    <cs:fillRef idx="0">
-      <cs:styleClr val="auto"/>
-    </cs:fillRef>
-    <cs:effectRef idx="0"/>
-    <cs:fontRef idx="minor">
-      <a:schemeClr val="tx1"/>
-    </cs:fontRef>
-    <cs:spPr>
-      <a:solidFill>
-        <a:schemeClr val="phClr"/>
-      </a:solidFill>
-      <a:scene3d>
-        <a:camera prst="orthographicFront"/>
-        <a:lightRig rig="brightRoom" dir="t"/>
-      </a:scene3d>
-      <a:sp3d prstMaterial="flat">
-        <a:bevelT w="50800" h="101600" prst="angle"/>
-        <a:contourClr>
-          <a:srgbClr val="000000"/>
-        </a:contourClr>
-      </a:sp3d>
-    </cs:spPr>
-  </cs:dataPoint>
-  <cs:dataPoint3D>
-    <cs:lnRef idx="0"/>
-    <cs:fillRef idx="0">
-      <cs:styleClr val="auto"/>
-    </cs:fillRef>
-    <cs:effectRef idx="0"/>
-    <cs:fontRef idx="minor">
-      <a:schemeClr val="tx1"/>
-    </cs:fontRef>
-    <cs:spPr>
-      <a:solidFill>
-        <a:schemeClr val="phClr"/>
-      </a:solidFill>
-      <a:ln w="19050">
+        <a:latin typeface="+mn-lt"/>
+        <a:ea typeface="+mn-ea"/>
+        <a:cs typeface="+mn-cs"/>
+      </a:defRPr>
+    </a:lvl2pPr>
+    <a:lvl3pPr marL="914400" algn="l" defTabSz="914400" rtl="0" eaLnBrk="1" latinLnBrk="0" hangingPunct="1">
+      <a:defRPr sz="1200" kern="1200">
         <a:solidFill>
-          <a:schemeClr val="lt1"/>
+          <a:schemeClr val="tx1"/>
         </a:solidFill>
-      </a:ln>
-    </cs:spPr>
-  </cs:dataPoint3D>
-  <cs:dataPointLine>
-    <cs:lnRef idx="0">
-      <cs:styleClr val="auto"/>
-    </cs:lnRef>
-    <cs:fillRef idx="0"/>
-    <cs:effectRef idx="0"/>
-    <cs:fontRef idx="minor">
-      <a:schemeClr val="tx1"/>
-    </cs:fontRef>
-    <cs:spPr>
-      <a:ln w="28575" cap="rnd">
+        <a:latin typeface="+mn-lt"/>
+        <a:ea typeface="+mn-ea"/>
+        <a:cs typeface="+mn-cs"/>
+      </a:defRPr>
+    </a:lvl3pPr>
+    <a:lvl4pPr marL="1371600" algn="l" defTabSz="914400" rtl="0" eaLnBrk="1" latinLnBrk="0" hangingPunct="1">
+      <a:defRPr sz="1200" kern="1200">
         <a:solidFill>
-          <a:schemeClr val="phClr"/>
+          <a:schemeClr val="tx1"/>
         </a:solidFill>
-        <a:round/>
-      </a:ln>
-    </cs:spPr>
-  </cs:dataPointLine>
-  <cs:dataPointMarker>
-    <cs:lnRef idx="0"/>
-    <cs:fillRef idx="0">
-      <cs:styleClr val="auto"/>
-    </cs:fillRef>
-    <cs:effectRef idx="0"/>
-    <cs:fontRef idx="minor">
-      <a:schemeClr val="tx1"/>
-    </cs:fontRef>
-    <cs:spPr>
-      <a:solidFill>
-        <a:schemeClr val="phClr"/>
-      </a:solidFill>
-      <a:ln w="9525">
+        <a:latin typeface="+mn-lt"/>
+        <a:ea typeface="+mn-ea"/>
+        <a:cs typeface="+mn-cs"/>
+      </a:defRPr>
+    </a:lvl4pPr>
+    <a:lvl5pPr marL="1828800" algn="l" defTabSz="914400" rtl="0" eaLnBrk="1" latinLnBrk="0" hangingPunct="1">
+      <a:defRPr sz="1200" kern="1200">
         <a:solidFill>
-          <a:schemeClr val="lt1"/>
+          <a:schemeClr val="tx1"/>
         </a:solidFill>
-      </a:ln>
-    </cs:spPr>
-  </cs:dataPointMarker>
-  <cs:dataPointMarkerLayout symbol="circle" size="6"/>
-  <cs:dataPointWireframe>
-    <cs:lnRef idx="0">
-      <cs:styleClr val="auto"/>
-    </cs:lnRef>
-    <cs:fillRef idx="0"/>
-    <cs:effectRef idx="0"/>
-    <cs:fontRef idx="minor">
-      <a:schemeClr val="tx1"/>
-    </cs:fontRef>
-    <cs:spPr>
-      <a:ln w="9525" cap="rnd">
+        <a:latin typeface="+mn-lt"/>
+        <a:ea typeface="+mn-ea"/>
+        <a:cs typeface="+mn-cs"/>
+      </a:defRPr>
+    </a:lvl5pPr>
+    <a:lvl6pPr marL="2286000" algn="l" defTabSz="914400" rtl="0" eaLnBrk="1" latinLnBrk="0" hangingPunct="1">
+      <a:defRPr sz="1200" kern="1200">
         <a:solidFill>
-          <a:schemeClr val="phClr"/>
+          <a:schemeClr val="tx1"/>
         </a:solidFill>
-        <a:round/>
-      </a:ln>
-    </cs:spPr>
-  </cs:dataPointWireframe>
-  <cs:dataTable>
-    <cs:lnRef idx="0"/>
-    <cs:fillRef idx="0"/>
-    <cs:effectRef idx="0"/>
-    <cs:fontRef idx="minor">
-      <a:schemeClr val="tx1">
-        <a:lumMod val="65000"/>
-        <a:lumOff val="35000"/>
-      </a:schemeClr>
-    </cs:fontRef>
-    <cs:spPr>
-      <a:noFill/>
-      <a:ln w="9525" cap="flat" cmpd="sng" algn="ctr">
+        <a:latin typeface="+mn-lt"/>
+        <a:ea typeface="+mn-ea"/>
+        <a:cs typeface="+mn-cs"/>
+      </a:defRPr>
+    </a:lvl6pPr>
+    <a:lvl7pPr marL="2743200" algn="l" defTabSz="914400" rtl="0" eaLnBrk="1" latinLnBrk="0" hangingPunct="1">
+      <a:defRPr sz="1200" kern="1200">
         <a:solidFill>
-          <a:schemeClr val="tx1">
-            <a:lumMod val="15000"/>
-            <a:lumOff val="85000"/>
-          </a:schemeClr>
+          <a:schemeClr val="tx1"/>
         </a:solidFill>
-        <a:round/>
-      </a:ln>
-    </cs:spPr>
-    <cs:defRPr sz="1197" kern="1200"/>
-  </cs:dataTable>
-  <cs:downBar>
-    <cs:lnRef idx="0"/>
-    <cs:fillRef idx="0"/>
-    <cs:effectRef idx="0"/>
-    <cs:fontRef idx="minor">
-      <a:schemeClr val="tx1"/>
-    </cs:fontRef>
-    <cs:spPr>
-      <a:solidFill>
-        <a:schemeClr val="dk1">
-          <a:lumMod val="75000"/>
-          <a:lumOff val="25000"/>
-        </a:schemeClr>
-      </a:solidFill>
-      <a:ln w="9525" cap="flat" cmpd="sng" algn="ctr">
+        <a:latin typeface="+mn-lt"/>
+        <a:ea typeface="+mn-ea"/>
+        <a:cs typeface="+mn-cs"/>
+      </a:defRPr>
+    </a:lvl7pPr>
+    <a:lvl8pPr marL="3200400" algn="l" defTabSz="914400" rtl="0" eaLnBrk="1" latinLnBrk="0" hangingPunct="1">
+      <a:defRPr sz="1200" kern="1200">
         <a:solidFill>
-          <a:schemeClr val="tx1">
-            <a:lumMod val="65000"/>
-            <a:lumOff val="35000"/>
-          </a:schemeClr>
+          <a:schemeClr val="tx1"/>
         </a:solidFill>
-        <a:round/>
-      </a:ln>
-    </cs:spPr>
-  </cs:downBar>
-  <cs:dropLine>
-    <cs:lnRef idx="0"/>
-    <cs:fillRef idx="0"/>
-    <cs:effectRef idx="0"/>
-    <cs:fontRef idx="minor">
-      <a:schemeClr val="tx1"/>
-    </cs:fontRef>
-    <cs:spPr>
-      <a:ln w="9525" cap="flat" cmpd="sng" algn="ctr">
+        <a:latin typeface="+mn-lt"/>
+        <a:ea typeface="+mn-ea"/>
+        <a:cs typeface="+mn-cs"/>
+      </a:defRPr>
+    </a:lvl8pPr>
+    <a:lvl9pPr marL="3657600" algn="l" defTabSz="914400" rtl="0" eaLnBrk="1" latinLnBrk="0" hangingPunct="1">
+      <a:defRPr sz="1200" kern="1200">
         <a:solidFill>
-          <a:schemeClr val="tx1">
-            <a:lumMod val="35000"/>
-            <a:lumOff val="65000"/>
-          </a:schemeClr>
+          <a:schemeClr val="tx1"/>
         </a:solidFill>
-        <a:round/>
-      </a:ln>
-    </cs:spPr>
-  </cs:dropLine>
-  <cs:errorBar>
-    <cs:lnRef idx="0"/>
-    <cs:fillRef idx="0"/>
-    <cs:effectRef idx="0"/>
-    <cs:fontRef idx="minor">
-      <a:schemeClr val="tx1"/>
-    </cs:fontRef>
-    <cs:spPr>
-      <a:ln w="9525" cap="flat" cmpd="sng" algn="ctr">
-        <a:solidFill>
-          <a:schemeClr val="tx1">
-            <a:lumMod val="65000"/>
-            <a:lumOff val="35000"/>
-          </a:schemeClr>
-        </a:solidFill>
-        <a:round/>
-      </a:ln>
-    </cs:spPr>
-  </cs:errorBar>
-  <cs:floor>
-    <cs:lnRef idx="0"/>
-    <cs:fillRef idx="0"/>
-    <cs:effectRef idx="0"/>
-    <cs:fontRef idx="minor">
-      <a:schemeClr val="tx1"/>
-    </cs:fontRef>
-    <cs:spPr>
-      <a:noFill/>
-      <a:ln>
-        <a:noFill/>
-      </a:ln>
-    </cs:spPr>
-  </cs:floor>
-  <cs:gridlineMajor>
-    <cs:lnRef idx="0"/>
-    <cs:fillRef idx="0"/>
-    <cs:effectRef idx="0"/>
-    <cs:fontRef idx="minor">
-      <a:schemeClr val="tx1"/>
-    </cs:fontRef>
-    <cs:spPr>
-      <a:ln w="9525" cap="flat" cmpd="sng" algn="ctr">
-        <a:solidFill>
-          <a:schemeClr val="tx1">
-            <a:lumMod val="15000"/>
-            <a:lumOff val="85000"/>
-          </a:schemeClr>
-        </a:solidFill>
-        <a:round/>
-      </a:ln>
-    </cs:spPr>
-  </cs:gridlineMajor>
-  <cs:gridlineMinor>
-    <cs:lnRef idx="0"/>
-    <cs:fillRef idx="0"/>
-    <cs:effectRef idx="0"/>
-    <cs:fontRef idx="minor">
-      <a:schemeClr val="tx1"/>
-    </cs:fontRef>
-    <cs:spPr>
-      <a:ln w="9525" cap="flat" cmpd="sng" algn="ctr">
-        <a:solidFill>
-          <a:schemeClr val="tx1">
-            <a:lumMod val="5000"/>
-            <a:lumOff val="95000"/>
-          </a:schemeClr>
-        </a:solidFill>
-        <a:round/>
-      </a:ln>
-    </cs:spPr>
-  </cs:gridlineMinor>
-  <cs:hiLoLine>
-    <cs:lnRef idx="0"/>
-    <cs:fillRef idx="0"/>
-    <cs:effectRef idx="0"/>
-    <cs:fontRef idx="minor">
-      <a:schemeClr val="tx1"/>
-    </cs:fontRef>
-    <cs:spPr>
-      <a:ln w="9525" cap="flat" cmpd="sng" algn="ctr">
-        <a:solidFill>
-          <a:schemeClr val="tx1">
-            <a:lumMod val="50000"/>
-            <a:lumOff val="50000"/>
-          </a:schemeClr>
-        </a:solidFill>
-        <a:round/>
-      </a:ln>
-    </cs:spPr>
-  </cs:hiLoLine>
-  <cs:leaderLine>
-    <cs:lnRef idx="0"/>
-    <cs:fillRef idx="0"/>
-    <cs:effectRef idx="0"/>
-    <cs:fontRef idx="minor">
-      <a:schemeClr val="tx1"/>
-    </cs:fontRef>
-    <cs:spPr>
-      <a:ln w="9525" cap="flat" cmpd="sng" algn="ctr">
-        <a:solidFill>
-          <a:schemeClr val="tx1">
-            <a:lumMod val="35000"/>
-            <a:lumOff val="65000"/>
-          </a:schemeClr>
-        </a:solidFill>
-        <a:round/>
-      </a:ln>
-    </cs:spPr>
-  </cs:leaderLine>
-  <cs:legend>
-    <cs:lnRef idx="0"/>
-    <cs:fillRef idx="0"/>
-    <cs:effectRef idx="0"/>
-    <cs:fontRef idx="minor">
-      <a:schemeClr val="tx1">
-        <a:lumMod val="65000"/>
-        <a:lumOff val="35000"/>
-      </a:schemeClr>
-    </cs:fontRef>
-    <cs:defRPr sz="1197" kern="1200"/>
-  </cs:legend>
-  <cs:plotArea mods="allowNoFillOverride allowNoLineOverride">
-    <cs:lnRef idx="0"/>
-    <cs:fillRef idx="0"/>
-    <cs:effectRef idx="0"/>
-    <cs:fontRef idx="minor">
-      <a:schemeClr val="tx1"/>
-    </cs:fontRef>
-  </cs:plotArea>
-  <cs:plotArea3D mods="allowNoFillOverride allowNoLineOverride">
-    <cs:lnRef idx="0"/>
-    <cs:fillRef idx="0"/>
-    <cs:effectRef idx="0"/>
-    <cs:fontRef idx="minor">
-      <a:schemeClr val="tx1"/>
-    </cs:fontRef>
-  </cs:plotArea3D>
-  <cs:seriesAxis>
-    <cs:lnRef idx="0"/>
-    <cs:fillRef idx="0"/>
-    <cs:effectRef idx="0"/>
-    <cs:fontRef idx="minor">
-      <a:schemeClr val="tx1">
-        <a:lumMod val="65000"/>
-        <a:lumOff val="35000"/>
-      </a:schemeClr>
-    </cs:fontRef>
-    <cs:defRPr sz="1197" kern="1200"/>
-  </cs:seriesAxis>
-  <cs:seriesLine>
-    <cs:lnRef idx="0"/>
-    <cs:fillRef idx="0"/>
-    <cs:effectRef idx="0"/>
-    <cs:fontRef idx="minor">
-      <a:schemeClr val="tx1"/>
-    </cs:fontRef>
-    <cs:spPr>
-      <a:ln w="9525" cap="flat" cmpd="sng" algn="ctr">
-        <a:solidFill>
-          <a:schemeClr val="tx1">
-            <a:lumMod val="35000"/>
-            <a:lumOff val="65000"/>
-          </a:schemeClr>
-        </a:solidFill>
-        <a:round/>
-      </a:ln>
-    </cs:spPr>
-  </cs:seriesLine>
-  <cs:title>
-    <cs:lnRef idx="0"/>
-    <cs:fillRef idx="0"/>
-    <cs:effectRef idx="0"/>
-    <cs:fontRef idx="minor">
-      <a:schemeClr val="tx1">
-        <a:lumMod val="65000"/>
-        <a:lumOff val="35000"/>
-      </a:schemeClr>
-    </cs:fontRef>
-    <cs:defRPr sz="1862" b="1" i="0" kern="1200" cap="all" spc="50" baseline="0"/>
-  </cs:title>
-  <cs:trendline>
-    <cs:lnRef idx="0">
-      <cs:styleClr val="auto"/>
-    </cs:lnRef>
-    <cs:fillRef idx="0"/>
-    <cs:effectRef idx="0"/>
-    <cs:fontRef idx="minor">
-      <a:schemeClr val="tx1"/>
-    </cs:fontRef>
-    <cs:spPr>
-      <a:ln w="19050" cap="rnd">
-        <a:solidFill>
-          <a:schemeClr val="phClr"/>
-        </a:solidFill>
-        <a:prstDash val="sysDash"/>
-      </a:ln>
-    </cs:spPr>
-  </cs:trendline>
-  <cs:trendlineLabel>
-    <cs:lnRef idx="0"/>
-    <cs:fillRef idx="0"/>
-    <cs:effectRef idx="0"/>
-    <cs:fontRef idx="minor">
-      <a:schemeClr val="tx1">
-        <a:lumMod val="65000"/>
-        <a:lumOff val="35000"/>
-      </a:schemeClr>
-    </cs:fontRef>
-    <cs:defRPr sz="1197" kern="1200"/>
-  </cs:trendlineLabel>
-  <cs:upBar>
-    <cs:lnRef idx="0"/>
-    <cs:fillRef idx="0"/>
-    <cs:effectRef idx="0"/>
-    <cs:fontRef idx="minor">
-      <a:schemeClr val="tx1"/>
-    </cs:fontRef>
-    <cs:spPr>
-      <a:solidFill>
-        <a:schemeClr val="lt1"/>
-      </a:solidFill>
-      <a:ln w="9525" cap="flat" cmpd="sng" algn="ctr">
-        <a:solidFill>
-          <a:schemeClr val="tx1">
-            <a:lumMod val="65000"/>
-            <a:lumOff val="35000"/>
-          </a:schemeClr>
-        </a:solidFill>
-        <a:round/>
-      </a:ln>
-    </cs:spPr>
-  </cs:upBar>
-  <cs:valueAxis>
-    <cs:lnRef idx="0"/>
-    <cs:fillRef idx="0"/>
-    <cs:effectRef idx="0"/>
-    <cs:fontRef idx="minor">
-      <a:schemeClr val="tx1">
-        <a:lumMod val="65000"/>
-        <a:lumOff val="35000"/>
-      </a:schemeClr>
-    </cs:fontRef>
-    <cs:defRPr sz="1197" kern="1200"/>
-  </cs:valueAxis>
-  <cs:wall>
-    <cs:lnRef idx="0"/>
-    <cs:fillRef idx="0"/>
-    <cs:effectRef idx="0"/>
-    <cs:fontRef idx="minor">
-      <a:schemeClr val="tx1"/>
-    </cs:fontRef>
-    <cs:spPr>
-      <a:noFill/>
-      <a:ln>
-        <a:noFill/>
-      </a:ln>
-    </cs:spPr>
-  </cs:wall>
-</cs:chartStyle>
+        <a:latin typeface="+mn-lt"/>
+        <a:ea typeface="+mn-ea"/>
+        <a:cs typeface="+mn-cs"/>
+      </a:defRPr>
+    </a:lvl9pPr>
+  </p:notesStyle>
+</p:notesMaster>
 </file>
 
 <file path=ppt/slideLayouts/slideLayout1.xml><?xml version="1.0" encoding="utf-8"?>
@@ -1243,9 +622,9 @@
           <a:bodyPr/>
           <a:lstStyle/>
           <a:p>
-            <a:fld id="{A0EE6EE7-36DE-4D2C-AF3C-F3A52CFDA6D2}" type="datetimeFigureOut">
+            <a:fld id="{15988D4F-E58D-4CDE-A3D0-F6AD327AEC56}" type="datetime1">
               <a:rPr lang="ru-RU" smtClean="0"/>
-              <a:t>02.04.2022</a:t>
+              <a:t>24.05.2022</a:t>
             </a:fld>
             <a:endParaRPr lang="ru-RU"/>
           </a:p>
@@ -1441,9 +820,9 @@
           <a:bodyPr/>
           <a:lstStyle/>
           <a:p>
-            <a:fld id="{A0EE6EE7-36DE-4D2C-AF3C-F3A52CFDA6D2}" type="datetimeFigureOut">
+            <a:fld id="{CE1E2A47-57B7-4CF1-A92E-49D63AEE96D5}" type="datetime1">
               <a:rPr lang="ru-RU" smtClean="0"/>
-              <a:t>02.04.2022</a:t>
+              <a:t>24.05.2022</a:t>
             </a:fld>
             <a:endParaRPr lang="ru-RU"/>
           </a:p>
@@ -1649,9 +1028,9 @@
           <a:bodyPr/>
           <a:lstStyle/>
           <a:p>
-            <a:fld id="{A0EE6EE7-36DE-4D2C-AF3C-F3A52CFDA6D2}" type="datetimeFigureOut">
+            <a:fld id="{CA81ACF7-CEE3-4A9F-B718-A470CCA653C5}" type="datetime1">
               <a:rPr lang="ru-RU" smtClean="0"/>
-              <a:t>02.04.2022</a:t>
+              <a:t>24.05.2022</a:t>
             </a:fld>
             <a:endParaRPr lang="ru-RU"/>
           </a:p>
@@ -1847,9 +1226,9 @@
           <a:bodyPr/>
           <a:lstStyle/>
           <a:p>
-            <a:fld id="{A0EE6EE7-36DE-4D2C-AF3C-F3A52CFDA6D2}" type="datetimeFigureOut">
+            <a:fld id="{5E37AE04-DA44-410C-A175-FF6C781BC876}" type="datetime1">
               <a:rPr lang="ru-RU" smtClean="0"/>
-              <a:t>02.04.2022</a:t>
+              <a:t>24.05.2022</a:t>
             </a:fld>
             <a:endParaRPr lang="ru-RU"/>
           </a:p>
@@ -2122,9 +1501,9 @@
           <a:bodyPr/>
           <a:lstStyle/>
           <a:p>
-            <a:fld id="{A0EE6EE7-36DE-4D2C-AF3C-F3A52CFDA6D2}" type="datetimeFigureOut">
+            <a:fld id="{E32C54E3-AF17-448A-9297-44EF357EABC1}" type="datetime1">
               <a:rPr lang="ru-RU" smtClean="0"/>
-              <a:t>02.04.2022</a:t>
+              <a:t>24.05.2022</a:t>
             </a:fld>
             <a:endParaRPr lang="ru-RU"/>
           </a:p>
@@ -2387,9 +1766,9 @@
           <a:bodyPr/>
           <a:lstStyle/>
           <a:p>
-            <a:fld id="{A0EE6EE7-36DE-4D2C-AF3C-F3A52CFDA6D2}" type="datetimeFigureOut">
+            <a:fld id="{6955E014-4D2F-48F0-99F5-18541DD4F253}" type="datetime1">
               <a:rPr lang="ru-RU" smtClean="0"/>
-              <a:t>02.04.2022</a:t>
+              <a:t>24.05.2022</a:t>
             </a:fld>
             <a:endParaRPr lang="ru-RU"/>
           </a:p>
@@ -2799,9 +2178,9 @@
           <a:bodyPr/>
           <a:lstStyle/>
           <a:p>
-            <a:fld id="{A0EE6EE7-36DE-4D2C-AF3C-F3A52CFDA6D2}" type="datetimeFigureOut">
+            <a:fld id="{E7E8D56A-792C-4904-9EB1-6F8EF41EE765}" type="datetime1">
               <a:rPr lang="ru-RU" smtClean="0"/>
-              <a:t>02.04.2022</a:t>
+              <a:t>24.05.2022</a:t>
             </a:fld>
             <a:endParaRPr lang="ru-RU"/>
           </a:p>
@@ -2940,9 +2319,9 @@
           <a:bodyPr/>
           <a:lstStyle/>
           <a:p>
-            <a:fld id="{A0EE6EE7-36DE-4D2C-AF3C-F3A52CFDA6D2}" type="datetimeFigureOut">
+            <a:fld id="{7065F927-12B6-4A7B-B3A2-7352DF6A122F}" type="datetime1">
               <a:rPr lang="ru-RU" smtClean="0"/>
-              <a:t>02.04.2022</a:t>
+              <a:t>24.05.2022</a:t>
             </a:fld>
             <a:endParaRPr lang="ru-RU"/>
           </a:p>
@@ -3053,9 +2432,9 @@
           <a:bodyPr/>
           <a:lstStyle/>
           <a:p>
-            <a:fld id="{A0EE6EE7-36DE-4D2C-AF3C-F3A52CFDA6D2}" type="datetimeFigureOut">
+            <a:fld id="{AAFF6416-B84E-492F-BBC6-38E032565367}" type="datetime1">
               <a:rPr lang="ru-RU" smtClean="0"/>
-              <a:t>02.04.2022</a:t>
+              <a:t>24.05.2022</a:t>
             </a:fld>
             <a:endParaRPr lang="ru-RU"/>
           </a:p>
@@ -3364,9 +2743,9 @@
           <a:bodyPr/>
           <a:lstStyle/>
           <a:p>
-            <a:fld id="{A0EE6EE7-36DE-4D2C-AF3C-F3A52CFDA6D2}" type="datetimeFigureOut">
+            <a:fld id="{F0BD601D-7324-4D41-B3DA-86B4FCF095DB}" type="datetime1">
               <a:rPr lang="ru-RU" smtClean="0"/>
-              <a:t>02.04.2022</a:t>
+              <a:t>24.05.2022</a:t>
             </a:fld>
             <a:endParaRPr lang="ru-RU"/>
           </a:p>
@@ -3652,9 +3031,9 @@
           <a:bodyPr/>
           <a:lstStyle/>
           <a:p>
-            <a:fld id="{A0EE6EE7-36DE-4D2C-AF3C-F3A52CFDA6D2}" type="datetimeFigureOut">
+            <a:fld id="{91160DCC-CAF3-4180-8270-9561E69073DD}" type="datetime1">
               <a:rPr lang="ru-RU" smtClean="0"/>
-              <a:t>02.04.2022</a:t>
+              <a:t>24.05.2022</a:t>
             </a:fld>
             <a:endParaRPr lang="ru-RU"/>
           </a:p>
@@ -3893,9 +3272,9 @@
             </a:lvl1pPr>
           </a:lstStyle>
           <a:p>
-            <a:fld id="{A0EE6EE7-36DE-4D2C-AF3C-F3A52CFDA6D2}" type="datetimeFigureOut">
+            <a:fld id="{A366973F-C059-4909-8C8C-5ED2D1FD3A9E}" type="datetime1">
               <a:rPr lang="ru-RU" smtClean="0"/>
-              <a:t>02.04.2022</a:t>
+              <a:t>24.05.2022</a:t>
             </a:fld>
             <a:endParaRPr lang="ru-RU"/>
           </a:p>
@@ -4012,6 +3391,7 @@
     <p:sldLayoutId id="2147483658" r:id="rId10"/>
     <p:sldLayoutId id="2147483659" r:id="rId11"/>
   </p:sldLayoutIdLst>
+  <p:hf hdr="0" ftr="0" dt="0"/>
   <p:txStyles>
     <p:titleStyle>
       <a:lvl1pPr algn="l" defTabSz="914400" rtl="0" eaLnBrk="1" latinLnBrk="0" hangingPunct="1">
@@ -4378,6 +3758,7 @@
           </a:bodyPr>
           <a:lstStyle/>
           <a:p>
+            <a:pPr algn="l"/>
             <a:r>
               <a:rPr lang="ru-RU" dirty="0">
                 <a:latin typeface="Times New Roman" panose="02020603050405020304" pitchFamily="18" charset="0"/>
@@ -4387,6 +3768,7 @@
             </a:r>
           </a:p>
           <a:p>
+            <a:pPr algn="l"/>
             <a:r>
               <a:rPr lang="ru-RU" dirty="0">
                 <a:latin typeface="Times New Roman" panose="02020603050405020304" pitchFamily="18" charset="0"/>
@@ -4414,6 +3796,7 @@
             </a:endParaRPr>
           </a:p>
           <a:p>
+            <a:pPr algn="l"/>
             <a:r>
               <a:rPr lang="ru-RU" dirty="0">
                 <a:latin typeface="Times New Roman" panose="02020603050405020304" pitchFamily="18" charset="0"/>
@@ -4423,12 +3806,13 @@
             </a:r>
           </a:p>
           <a:p>
+            <a:pPr algn="l"/>
             <a:r>
               <a:rPr lang="ru-RU" dirty="0">
                 <a:latin typeface="Times New Roman" panose="02020603050405020304" pitchFamily="18" charset="0"/>
                 <a:cs typeface="Times New Roman" panose="02020603050405020304" pitchFamily="18" charset="0"/>
               </a:rPr>
-              <a:t>Юрий Владимирович Строганов</a:t>
+              <a:t>	Строганов Юрий Владимирович</a:t>
             </a:r>
           </a:p>
         </p:txBody>
@@ -4447,8 +3831,8 @@
         </p:nvSpPr>
         <p:spPr>
           <a:xfrm>
-            <a:off x="430695" y="206733"/>
-            <a:ext cx="11330609" cy="923330"/>
+            <a:off x="430694" y="71778"/>
+            <a:ext cx="11330609" cy="1477328"/>
           </a:xfrm>
           <a:prstGeom prst="rect">
             <a:avLst/>
@@ -4468,6 +3852,23 @@
                 <a:cs typeface="Times New Roman" panose="02020603050405020304" pitchFamily="18" charset="0"/>
               </a:rPr>
               <a:t>МОСКОВСКИЙ ГОСУДАРСТВЕННЫЙ ТЕХНИЧЕСКИЙ УНИВЕРСИТЕТ ИМЕНИ Н.Э. БАУМАНА (НАЦИОНАЛЬНЫЙ ИССЛЕДОВАТЕЛЬСКИЙ УНИВЕРСИТЕТ)</a:t>
+            </a:r>
+          </a:p>
+          <a:p>
+            <a:pPr algn="ctr"/>
+            <a:endParaRPr lang="en-US" sz="1800" dirty="0">
+              <a:latin typeface="Times New Roman" panose="02020603050405020304" pitchFamily="18" charset="0"/>
+              <a:cs typeface="Times New Roman" panose="02020603050405020304" pitchFamily="18" charset="0"/>
+            </a:endParaRPr>
+          </a:p>
+          <a:p>
+            <a:pPr algn="ctr"/>
+            <a:r>
+              <a:rPr lang="ru-RU" sz="1800" dirty="0">
+                <a:latin typeface="Times New Roman" panose="02020603050405020304" pitchFamily="18" charset="0"/>
+                <a:cs typeface="Times New Roman" panose="02020603050405020304" pitchFamily="18" charset="0"/>
+              </a:rPr>
+              <a:t>Выпускная квалификационная работа бакалавра</a:t>
             </a:r>
             <a:br>
               <a:rPr lang="ru-RU" sz="1800" dirty="0">
@@ -4479,10 +3880,802 @@
           </a:p>
         </p:txBody>
       </p:sp>
+      <p:sp>
+        <p:nvSpPr>
+          <p:cNvPr id="4" name="Номер слайда 3">
+            <a:extLst>
+              <a:ext uri="{FF2B5EF4-FFF2-40B4-BE49-F238E27FC236}">
+                <a16:creationId xmlns:a16="http://schemas.microsoft.com/office/drawing/2014/main" id="{D40E9EB0-B5E5-4DAE-9E06-2DF56554931A}"/>
+              </a:ext>
+            </a:extLst>
+          </p:cNvPr>
+          <p:cNvSpPr>
+            <a:spLocks noGrp="1"/>
+          </p:cNvSpPr>
+          <p:nvPr>
+            <p:ph type="sldNum" sz="quarter" idx="12"/>
+          </p:nvPr>
+        </p:nvSpPr>
+        <p:spPr/>
+        <p:txBody>
+          <a:bodyPr/>
+          <a:lstStyle/>
+          <a:p>
+            <a:fld id="{5AEE0CB1-1A0F-4E9F-8383-D0A68518B020}" type="slidenum">
+              <a:rPr lang="ru-RU" smtClean="0"/>
+              <a:t>1</a:t>
+            </a:fld>
+            <a:endParaRPr lang="ru-RU"/>
+          </a:p>
+        </p:txBody>
+      </p:sp>
     </p:spTree>
     <p:extLst>
       <p:ext uri="{BB962C8B-B14F-4D97-AF65-F5344CB8AC3E}">
         <p14:creationId xmlns:p14="http://schemas.microsoft.com/office/powerpoint/2010/main" val="2125570872"/>
+      </p:ext>
+    </p:extLst>
+  </p:cSld>
+  <p:clrMapOvr>
+    <a:masterClrMapping/>
+  </p:clrMapOvr>
+</p:sld>
+</file>
+
+<file path=ppt/slides/slide10.xml><?xml version="1.0" encoding="utf-8"?>
+<p:sld xmlns:a="http://schemas.openxmlformats.org/drawingml/2006/main" xmlns:r="http://schemas.openxmlformats.org/officeDocument/2006/relationships" xmlns:p="http://schemas.openxmlformats.org/presentationml/2006/main">
+  <p:cSld>
+    <p:spTree>
+      <p:nvGrpSpPr>
+        <p:cNvPr id="1" name=""/>
+        <p:cNvGrpSpPr/>
+        <p:nvPr/>
+      </p:nvGrpSpPr>
+      <p:grpSpPr>
+        <a:xfrm>
+          <a:off x="0" y="0"/>
+          <a:ext cx="0" cy="0"/>
+          <a:chOff x="0" y="0"/>
+          <a:chExt cx="0" cy="0"/>
+        </a:xfrm>
+      </p:grpSpPr>
+      <p:sp>
+        <p:nvSpPr>
+          <p:cNvPr id="2" name="Заголовок 1">
+            <a:extLst>
+              <a:ext uri="{FF2B5EF4-FFF2-40B4-BE49-F238E27FC236}">
+                <a16:creationId xmlns:a16="http://schemas.microsoft.com/office/drawing/2014/main" id="{A8A78197-F0E5-482A-9DF3-DA7661662131}"/>
+              </a:ext>
+            </a:extLst>
+          </p:cNvPr>
+          <p:cNvSpPr>
+            <a:spLocks noGrp="1"/>
+          </p:cNvSpPr>
+          <p:nvPr>
+            <p:ph type="title"/>
+          </p:nvPr>
+        </p:nvSpPr>
+        <p:spPr>
+          <a:xfrm>
+            <a:off x="838200" y="0"/>
+            <a:ext cx="10515600" cy="1325563"/>
+          </a:xfrm>
+        </p:spPr>
+        <p:txBody>
+          <a:bodyPr/>
+          <a:lstStyle/>
+          <a:p>
+            <a:pPr algn="ctr"/>
+            <a:r>
+              <a:rPr lang="ru-RU" dirty="0">
+                <a:latin typeface="Times New Roman" panose="02020603050405020304" pitchFamily="18" charset="0"/>
+                <a:cs typeface="Times New Roman" panose="02020603050405020304" pitchFamily="18" charset="0"/>
+              </a:rPr>
+              <a:t>Сравнение времени исполнения запросов в базы данных </a:t>
+            </a:r>
+            <a:r>
+              <a:rPr lang="en-US" dirty="0">
+                <a:latin typeface="Times New Roman" panose="02020603050405020304" pitchFamily="18" charset="0"/>
+                <a:cs typeface="Times New Roman" panose="02020603050405020304" pitchFamily="18" charset="0"/>
+              </a:rPr>
+              <a:t>Postgres </a:t>
+            </a:r>
+            <a:r>
+              <a:rPr lang="ru-RU" dirty="0">
+                <a:latin typeface="Times New Roman" panose="02020603050405020304" pitchFamily="18" charset="0"/>
+                <a:cs typeface="Times New Roman" panose="02020603050405020304" pitchFamily="18" charset="0"/>
+              </a:rPr>
+              <a:t>и </a:t>
+            </a:r>
+            <a:r>
+              <a:rPr lang="en-US" dirty="0" err="1">
+                <a:latin typeface="Times New Roman" panose="02020603050405020304" pitchFamily="18" charset="0"/>
+                <a:cs typeface="Times New Roman" panose="02020603050405020304" pitchFamily="18" charset="0"/>
+              </a:rPr>
+              <a:t>InfluxDB</a:t>
+            </a:r>
+            <a:endParaRPr lang="ru-RU" dirty="0">
+              <a:latin typeface="Times New Roman" panose="02020603050405020304" pitchFamily="18" charset="0"/>
+              <a:cs typeface="Times New Roman" panose="02020603050405020304" pitchFamily="18" charset="0"/>
+            </a:endParaRPr>
+          </a:p>
+        </p:txBody>
+      </p:sp>
+      <p:sp>
+        <p:nvSpPr>
+          <p:cNvPr id="6" name="Объект 2">
+            <a:extLst>
+              <a:ext uri="{FF2B5EF4-FFF2-40B4-BE49-F238E27FC236}">
+                <a16:creationId xmlns:a16="http://schemas.microsoft.com/office/drawing/2014/main" id="{6D24A5E1-8270-4877-AF66-EC2D6888AE6B}"/>
+              </a:ext>
+            </a:extLst>
+          </p:cNvPr>
+          <p:cNvSpPr>
+            <a:spLocks noGrp="1"/>
+          </p:cNvSpPr>
+          <p:nvPr>
+            <p:ph idx="1"/>
+          </p:nvPr>
+        </p:nvSpPr>
+        <p:spPr>
+          <a:xfrm>
+            <a:off x="838200" y="1325563"/>
+            <a:ext cx="10515600" cy="5117570"/>
+          </a:xfrm>
+        </p:spPr>
+        <p:txBody>
+          <a:bodyPr>
+            <a:normAutofit/>
+          </a:bodyPr>
+          <a:lstStyle/>
+          <a:p>
+            <a:pPr marL="0" indent="0" algn="just">
+              <a:buNone/>
+            </a:pPr>
+            <a:r>
+              <a:rPr lang="ru-RU" dirty="0">
+                <a:latin typeface="Times New Roman" panose="02020603050405020304" pitchFamily="18" charset="0"/>
+                <a:cs typeface="Times New Roman" panose="02020603050405020304" pitchFamily="18" charset="0"/>
+              </a:rPr>
+              <a:t>Таблица, диаграмма из </a:t>
+            </a:r>
+            <a:r>
+              <a:rPr lang="ru-RU" dirty="0" err="1">
+                <a:latin typeface="Times New Roman" panose="02020603050405020304" pitchFamily="18" charset="0"/>
+                <a:cs typeface="Times New Roman" panose="02020603050405020304" pitchFamily="18" charset="0"/>
+              </a:rPr>
+              <a:t>презенташки</a:t>
+            </a:r>
+            <a:r>
+              <a:rPr lang="ru-RU" dirty="0">
+                <a:latin typeface="Times New Roman" panose="02020603050405020304" pitchFamily="18" charset="0"/>
+                <a:cs typeface="Times New Roman" panose="02020603050405020304" pitchFamily="18" charset="0"/>
+              </a:rPr>
+              <a:t> по БД</a:t>
+            </a:r>
+          </a:p>
+        </p:txBody>
+      </p:sp>
+      <p:sp>
+        <p:nvSpPr>
+          <p:cNvPr id="3" name="Номер слайда 2">
+            <a:extLst>
+              <a:ext uri="{FF2B5EF4-FFF2-40B4-BE49-F238E27FC236}">
+                <a16:creationId xmlns:a16="http://schemas.microsoft.com/office/drawing/2014/main" id="{18D02FDB-6FC5-443A-AD14-3C8B3AC22A63}"/>
+              </a:ext>
+            </a:extLst>
+          </p:cNvPr>
+          <p:cNvSpPr>
+            <a:spLocks noGrp="1"/>
+          </p:cNvSpPr>
+          <p:nvPr>
+            <p:ph type="sldNum" sz="quarter" idx="12"/>
+          </p:nvPr>
+        </p:nvSpPr>
+        <p:spPr/>
+        <p:txBody>
+          <a:bodyPr/>
+          <a:lstStyle/>
+          <a:p>
+            <a:fld id="{5AEE0CB1-1A0F-4E9F-8383-D0A68518B020}" type="slidenum">
+              <a:rPr lang="ru-RU" smtClean="0"/>
+              <a:t>10</a:t>
+            </a:fld>
+            <a:endParaRPr lang="ru-RU"/>
+          </a:p>
+        </p:txBody>
+      </p:sp>
+    </p:spTree>
+    <p:extLst>
+      <p:ext uri="{BB962C8B-B14F-4D97-AF65-F5344CB8AC3E}">
+        <p14:creationId xmlns:p14="http://schemas.microsoft.com/office/powerpoint/2010/main" val="3667109297"/>
+      </p:ext>
+    </p:extLst>
+  </p:cSld>
+  <p:clrMapOvr>
+    <a:masterClrMapping/>
+  </p:clrMapOvr>
+</p:sld>
+</file>
+
+<file path=ppt/slides/slide11.xml><?xml version="1.0" encoding="utf-8"?>
+<p:sld xmlns:a="http://schemas.openxmlformats.org/drawingml/2006/main" xmlns:r="http://schemas.openxmlformats.org/officeDocument/2006/relationships" xmlns:p="http://schemas.openxmlformats.org/presentationml/2006/main">
+  <p:cSld>
+    <p:spTree>
+      <p:nvGrpSpPr>
+        <p:cNvPr id="1" name=""/>
+        <p:cNvGrpSpPr/>
+        <p:nvPr/>
+      </p:nvGrpSpPr>
+      <p:grpSpPr>
+        <a:xfrm>
+          <a:off x="0" y="0"/>
+          <a:ext cx="0" cy="0"/>
+          <a:chOff x="0" y="0"/>
+          <a:chExt cx="0" cy="0"/>
+        </a:xfrm>
+      </p:grpSpPr>
+      <p:sp>
+        <p:nvSpPr>
+          <p:cNvPr id="2" name="Заголовок 1">
+            <a:extLst>
+              <a:ext uri="{FF2B5EF4-FFF2-40B4-BE49-F238E27FC236}">
+                <a16:creationId xmlns:a16="http://schemas.microsoft.com/office/drawing/2014/main" id="{A8A78197-F0E5-482A-9DF3-DA7661662131}"/>
+              </a:ext>
+            </a:extLst>
+          </p:cNvPr>
+          <p:cNvSpPr>
+            <a:spLocks noGrp="1"/>
+          </p:cNvSpPr>
+          <p:nvPr>
+            <p:ph type="title"/>
+          </p:nvPr>
+        </p:nvSpPr>
+        <p:spPr>
+          <a:xfrm>
+            <a:off x="838200" y="0"/>
+            <a:ext cx="10515600" cy="1325563"/>
+          </a:xfrm>
+        </p:spPr>
+        <p:txBody>
+          <a:bodyPr>
+            <a:normAutofit fontScale="90000"/>
+          </a:bodyPr>
+          <a:lstStyle/>
+          <a:p>
+            <a:pPr algn="ctr"/>
+            <a:r>
+              <a:rPr lang="ru-RU" dirty="0">
+                <a:latin typeface="Times New Roman" panose="02020603050405020304" pitchFamily="18" charset="0"/>
+                <a:cs typeface="Times New Roman" panose="02020603050405020304" pitchFamily="18" charset="0"/>
+              </a:rPr>
+              <a:t>Сравнение количества успешных определений работоспособности пользователя</a:t>
+            </a:r>
+          </a:p>
+        </p:txBody>
+      </p:sp>
+      <p:sp>
+        <p:nvSpPr>
+          <p:cNvPr id="6" name="Объект 2">
+            <a:extLst>
+              <a:ext uri="{FF2B5EF4-FFF2-40B4-BE49-F238E27FC236}">
+                <a16:creationId xmlns:a16="http://schemas.microsoft.com/office/drawing/2014/main" id="{6D24A5E1-8270-4877-AF66-EC2D6888AE6B}"/>
+              </a:ext>
+            </a:extLst>
+          </p:cNvPr>
+          <p:cNvSpPr>
+            <a:spLocks noGrp="1"/>
+          </p:cNvSpPr>
+          <p:nvPr>
+            <p:ph idx="1"/>
+          </p:nvPr>
+        </p:nvSpPr>
+        <p:spPr>
+          <a:xfrm>
+            <a:off x="838200" y="1325563"/>
+            <a:ext cx="10515600" cy="5117570"/>
+          </a:xfrm>
+        </p:spPr>
+        <p:txBody>
+          <a:bodyPr>
+            <a:normAutofit/>
+          </a:bodyPr>
+          <a:lstStyle/>
+          <a:p>
+            <a:pPr marL="0" indent="0" algn="just">
+              <a:buNone/>
+            </a:pPr>
+            <a:r>
+              <a:rPr lang="ru-RU" dirty="0">
+                <a:latin typeface="Times New Roman" panose="02020603050405020304" pitchFamily="18" charset="0"/>
+                <a:cs typeface="Times New Roman" panose="02020603050405020304" pitchFamily="18" charset="0"/>
+              </a:rPr>
+              <a:t>Говорим о чем-то серьёзном и умалчиваем о том, что студент, над которым ставили опыт, по определению не бывает работоспособным. Рассказываем о тесте с </a:t>
+            </a:r>
+            <a:r>
+              <a:rPr lang="ru-RU" dirty="0" err="1">
+                <a:latin typeface="Times New Roman" panose="02020603050405020304" pitchFamily="18" charset="0"/>
+                <a:cs typeface="Times New Roman" panose="02020603050405020304" pitchFamily="18" charset="0"/>
+              </a:rPr>
+              <a:t>клавой</a:t>
+            </a:r>
+            <a:r>
+              <a:rPr lang="ru-RU" dirty="0">
+                <a:latin typeface="Times New Roman" panose="02020603050405020304" pitchFamily="18" charset="0"/>
+                <a:cs typeface="Times New Roman" panose="02020603050405020304" pitchFamily="18" charset="0"/>
+              </a:rPr>
+              <a:t>.</a:t>
+            </a:r>
+          </a:p>
+        </p:txBody>
+      </p:sp>
+      <p:sp>
+        <p:nvSpPr>
+          <p:cNvPr id="3" name="Номер слайда 2">
+            <a:extLst>
+              <a:ext uri="{FF2B5EF4-FFF2-40B4-BE49-F238E27FC236}">
+                <a16:creationId xmlns:a16="http://schemas.microsoft.com/office/drawing/2014/main" id="{18D02FDB-6FC5-443A-AD14-3C8B3AC22A63}"/>
+              </a:ext>
+            </a:extLst>
+          </p:cNvPr>
+          <p:cNvSpPr>
+            <a:spLocks noGrp="1"/>
+          </p:cNvSpPr>
+          <p:nvPr>
+            <p:ph type="sldNum" sz="quarter" idx="12"/>
+          </p:nvPr>
+        </p:nvSpPr>
+        <p:spPr/>
+        <p:txBody>
+          <a:bodyPr/>
+          <a:lstStyle/>
+          <a:p>
+            <a:fld id="{5AEE0CB1-1A0F-4E9F-8383-D0A68518B020}" type="slidenum">
+              <a:rPr lang="ru-RU" smtClean="0"/>
+              <a:t>11</a:t>
+            </a:fld>
+            <a:endParaRPr lang="ru-RU"/>
+          </a:p>
+        </p:txBody>
+      </p:sp>
+    </p:spTree>
+    <p:extLst>
+      <p:ext uri="{BB962C8B-B14F-4D97-AF65-F5344CB8AC3E}">
+        <p14:creationId xmlns:p14="http://schemas.microsoft.com/office/powerpoint/2010/main" val="2380096890"/>
+      </p:ext>
+    </p:extLst>
+  </p:cSld>
+  <p:clrMapOvr>
+    <a:masterClrMapping/>
+  </p:clrMapOvr>
+</p:sld>
+</file>
+
+<file path=ppt/slides/slide12.xml><?xml version="1.0" encoding="utf-8"?>
+<p:sld xmlns:a="http://schemas.openxmlformats.org/drawingml/2006/main" xmlns:r="http://schemas.openxmlformats.org/officeDocument/2006/relationships" xmlns:p="http://schemas.openxmlformats.org/presentationml/2006/main">
+  <p:cSld>
+    <p:spTree>
+      <p:nvGrpSpPr>
+        <p:cNvPr id="1" name=""/>
+        <p:cNvGrpSpPr/>
+        <p:nvPr/>
+      </p:nvGrpSpPr>
+      <p:grpSpPr>
+        <a:xfrm>
+          <a:off x="0" y="0"/>
+          <a:ext cx="0" cy="0"/>
+          <a:chOff x="0" y="0"/>
+          <a:chExt cx="0" cy="0"/>
+        </a:xfrm>
+      </p:grpSpPr>
+      <p:sp>
+        <p:nvSpPr>
+          <p:cNvPr id="2" name="Заголовок 1">
+            <a:extLst>
+              <a:ext uri="{FF2B5EF4-FFF2-40B4-BE49-F238E27FC236}">
+                <a16:creationId xmlns:a16="http://schemas.microsoft.com/office/drawing/2014/main" id="{A8A78197-F0E5-482A-9DF3-DA7661662131}"/>
+              </a:ext>
+            </a:extLst>
+          </p:cNvPr>
+          <p:cNvSpPr>
+            <a:spLocks noGrp="1"/>
+          </p:cNvSpPr>
+          <p:nvPr>
+            <p:ph type="title"/>
+          </p:nvPr>
+        </p:nvSpPr>
+        <p:spPr>
+          <a:xfrm>
+            <a:off x="838200" y="0"/>
+            <a:ext cx="10515600" cy="1325563"/>
+          </a:xfrm>
+        </p:spPr>
+        <p:txBody>
+          <a:bodyPr>
+            <a:normAutofit fontScale="90000"/>
+          </a:bodyPr>
+          <a:lstStyle/>
+          <a:p>
+            <a:pPr algn="ctr"/>
+            <a:r>
+              <a:rPr lang="ru-RU" dirty="0">
+                <a:latin typeface="Times New Roman" panose="02020603050405020304" pitchFamily="18" charset="0"/>
+                <a:cs typeface="Times New Roman" panose="02020603050405020304" pitchFamily="18" charset="0"/>
+              </a:rPr>
+              <a:t>Сравнение количества успешных определений работоспособности пользователя</a:t>
+            </a:r>
+          </a:p>
+        </p:txBody>
+      </p:sp>
+      <p:sp>
+        <p:nvSpPr>
+          <p:cNvPr id="6" name="Объект 2">
+            <a:extLst>
+              <a:ext uri="{FF2B5EF4-FFF2-40B4-BE49-F238E27FC236}">
+                <a16:creationId xmlns:a16="http://schemas.microsoft.com/office/drawing/2014/main" id="{6D24A5E1-8270-4877-AF66-EC2D6888AE6B}"/>
+              </a:ext>
+            </a:extLst>
+          </p:cNvPr>
+          <p:cNvSpPr>
+            <a:spLocks noGrp="1"/>
+          </p:cNvSpPr>
+          <p:nvPr>
+            <p:ph idx="1"/>
+          </p:nvPr>
+        </p:nvSpPr>
+        <p:spPr>
+          <a:xfrm>
+            <a:off x="838200" y="1325563"/>
+            <a:ext cx="10515600" cy="5117570"/>
+          </a:xfrm>
+        </p:spPr>
+        <p:txBody>
+          <a:bodyPr>
+            <a:normAutofit/>
+          </a:bodyPr>
+          <a:lstStyle/>
+          <a:p>
+            <a:pPr marL="0" indent="0" algn="just">
+              <a:buNone/>
+            </a:pPr>
+            <a:r>
+              <a:rPr lang="ru-RU" dirty="0">
+                <a:latin typeface="Times New Roman" panose="02020603050405020304" pitchFamily="18" charset="0"/>
+                <a:cs typeface="Times New Roman" panose="02020603050405020304" pitchFamily="18" charset="0"/>
+              </a:rPr>
+              <a:t>Эй, речь всё ещё обо мне. Тут говорим, что </a:t>
+            </a:r>
+            <a:r>
+              <a:rPr lang="ru-RU" dirty="0" err="1">
+                <a:latin typeface="Times New Roman" panose="02020603050405020304" pitchFamily="18" charset="0"/>
+                <a:cs typeface="Times New Roman" panose="02020603050405020304" pitchFamily="18" charset="0"/>
+              </a:rPr>
+              <a:t>потестили</a:t>
+            </a:r>
+            <a:r>
+              <a:rPr lang="ru-RU" dirty="0">
+                <a:latin typeface="Times New Roman" panose="02020603050405020304" pitchFamily="18" charset="0"/>
+                <a:cs typeface="Times New Roman" panose="02020603050405020304" pitchFamily="18" charset="0"/>
+              </a:rPr>
+              <a:t> и на мышке.</a:t>
+            </a:r>
+          </a:p>
+        </p:txBody>
+      </p:sp>
+      <p:sp>
+        <p:nvSpPr>
+          <p:cNvPr id="3" name="Номер слайда 2">
+            <a:extLst>
+              <a:ext uri="{FF2B5EF4-FFF2-40B4-BE49-F238E27FC236}">
+                <a16:creationId xmlns:a16="http://schemas.microsoft.com/office/drawing/2014/main" id="{18D02FDB-6FC5-443A-AD14-3C8B3AC22A63}"/>
+              </a:ext>
+            </a:extLst>
+          </p:cNvPr>
+          <p:cNvSpPr>
+            <a:spLocks noGrp="1"/>
+          </p:cNvSpPr>
+          <p:nvPr>
+            <p:ph type="sldNum" sz="quarter" idx="12"/>
+          </p:nvPr>
+        </p:nvSpPr>
+        <p:spPr/>
+        <p:txBody>
+          <a:bodyPr/>
+          <a:lstStyle/>
+          <a:p>
+            <a:fld id="{5AEE0CB1-1A0F-4E9F-8383-D0A68518B020}" type="slidenum">
+              <a:rPr lang="ru-RU" smtClean="0"/>
+              <a:t>12</a:t>
+            </a:fld>
+            <a:endParaRPr lang="ru-RU"/>
+          </a:p>
+        </p:txBody>
+      </p:sp>
+    </p:spTree>
+    <p:extLst>
+      <p:ext uri="{BB962C8B-B14F-4D97-AF65-F5344CB8AC3E}">
+        <p14:creationId xmlns:p14="http://schemas.microsoft.com/office/powerpoint/2010/main" val="413523053"/>
+      </p:ext>
+    </p:extLst>
+  </p:cSld>
+  <p:clrMapOvr>
+    <a:masterClrMapping/>
+  </p:clrMapOvr>
+</p:sld>
+</file>
+
+<file path=ppt/slides/slide13.xml><?xml version="1.0" encoding="utf-8"?>
+<p:sld xmlns:a="http://schemas.openxmlformats.org/drawingml/2006/main" xmlns:r="http://schemas.openxmlformats.org/officeDocument/2006/relationships" xmlns:p="http://schemas.openxmlformats.org/presentationml/2006/main">
+  <p:cSld>
+    <p:spTree>
+      <p:nvGrpSpPr>
+        <p:cNvPr id="1" name=""/>
+        <p:cNvGrpSpPr/>
+        <p:nvPr/>
+      </p:nvGrpSpPr>
+      <p:grpSpPr>
+        <a:xfrm>
+          <a:off x="0" y="0"/>
+          <a:ext cx="0" cy="0"/>
+          <a:chOff x="0" y="0"/>
+          <a:chExt cx="0" cy="0"/>
+        </a:xfrm>
+      </p:grpSpPr>
+      <p:sp>
+        <p:nvSpPr>
+          <p:cNvPr id="2" name="Заголовок 1">
+            <a:extLst>
+              <a:ext uri="{FF2B5EF4-FFF2-40B4-BE49-F238E27FC236}">
+                <a16:creationId xmlns:a16="http://schemas.microsoft.com/office/drawing/2014/main" id="{A8A78197-F0E5-482A-9DF3-DA7661662131}"/>
+              </a:ext>
+            </a:extLst>
+          </p:cNvPr>
+          <p:cNvSpPr>
+            <a:spLocks noGrp="1"/>
+          </p:cNvSpPr>
+          <p:nvPr>
+            <p:ph type="title"/>
+          </p:nvPr>
+        </p:nvSpPr>
+        <p:spPr>
+          <a:xfrm>
+            <a:off x="838200" y="0"/>
+            <a:ext cx="10515600" cy="1325563"/>
+          </a:xfrm>
+        </p:spPr>
+        <p:txBody>
+          <a:bodyPr/>
+          <a:lstStyle/>
+          <a:p>
+            <a:pPr algn="ctr"/>
+            <a:r>
+              <a:rPr lang="ru-RU" dirty="0">
+                <a:latin typeface="Times New Roman" panose="02020603050405020304" pitchFamily="18" charset="0"/>
+                <a:cs typeface="Times New Roman" panose="02020603050405020304" pitchFamily="18" charset="0"/>
+              </a:rPr>
+              <a:t>Заключение</a:t>
+            </a:r>
+          </a:p>
+        </p:txBody>
+      </p:sp>
+      <p:sp>
+        <p:nvSpPr>
+          <p:cNvPr id="6" name="Объект 2">
+            <a:extLst>
+              <a:ext uri="{FF2B5EF4-FFF2-40B4-BE49-F238E27FC236}">
+                <a16:creationId xmlns:a16="http://schemas.microsoft.com/office/drawing/2014/main" id="{6D24A5E1-8270-4877-AF66-EC2D6888AE6B}"/>
+              </a:ext>
+            </a:extLst>
+          </p:cNvPr>
+          <p:cNvSpPr>
+            <a:spLocks noGrp="1"/>
+          </p:cNvSpPr>
+          <p:nvPr>
+            <p:ph idx="1"/>
+          </p:nvPr>
+        </p:nvSpPr>
+        <p:spPr>
+          <a:xfrm>
+            <a:off x="838200" y="1325563"/>
+            <a:ext cx="10515600" cy="5117570"/>
+          </a:xfrm>
+        </p:spPr>
+        <p:txBody>
+          <a:bodyPr>
+            <a:normAutofit/>
+          </a:bodyPr>
+          <a:lstStyle/>
+          <a:p>
+            <a:pPr marL="0" indent="0" algn="just">
+              <a:buNone/>
+            </a:pPr>
+            <a:r>
+              <a:rPr lang="ru-RU" dirty="0" err="1">
+                <a:latin typeface="Times New Roman" panose="02020603050405020304" pitchFamily="18" charset="0"/>
+                <a:cs typeface="Times New Roman" panose="02020603050405020304" pitchFamily="18" charset="0"/>
+              </a:rPr>
+              <a:t>Бла-бла-бла</a:t>
+            </a:r>
+            <a:r>
+              <a:rPr lang="ru-RU" dirty="0">
+                <a:latin typeface="Times New Roman" panose="02020603050405020304" pitchFamily="18" charset="0"/>
+                <a:cs typeface="Times New Roman" panose="02020603050405020304" pitchFamily="18" charset="0"/>
+              </a:rPr>
+              <a:t>, поставьте троечку, я хочу домой</a:t>
+            </a:r>
+          </a:p>
+        </p:txBody>
+      </p:sp>
+      <p:sp>
+        <p:nvSpPr>
+          <p:cNvPr id="3" name="Номер слайда 2">
+            <a:extLst>
+              <a:ext uri="{FF2B5EF4-FFF2-40B4-BE49-F238E27FC236}">
+                <a16:creationId xmlns:a16="http://schemas.microsoft.com/office/drawing/2014/main" id="{18D02FDB-6FC5-443A-AD14-3C8B3AC22A63}"/>
+              </a:ext>
+            </a:extLst>
+          </p:cNvPr>
+          <p:cNvSpPr>
+            <a:spLocks noGrp="1"/>
+          </p:cNvSpPr>
+          <p:nvPr>
+            <p:ph type="sldNum" sz="quarter" idx="12"/>
+          </p:nvPr>
+        </p:nvSpPr>
+        <p:spPr/>
+        <p:txBody>
+          <a:bodyPr/>
+          <a:lstStyle/>
+          <a:p>
+            <a:fld id="{5AEE0CB1-1A0F-4E9F-8383-D0A68518B020}" type="slidenum">
+              <a:rPr lang="ru-RU" smtClean="0"/>
+              <a:t>13</a:t>
+            </a:fld>
+            <a:endParaRPr lang="ru-RU"/>
+          </a:p>
+        </p:txBody>
+      </p:sp>
+    </p:spTree>
+    <p:extLst>
+      <p:ext uri="{BB962C8B-B14F-4D97-AF65-F5344CB8AC3E}">
+        <p14:creationId xmlns:p14="http://schemas.microsoft.com/office/powerpoint/2010/main" val="1284806075"/>
+      </p:ext>
+    </p:extLst>
+  </p:cSld>
+  <p:clrMapOvr>
+    <a:masterClrMapping/>
+  </p:clrMapOvr>
+</p:sld>
+</file>
+
+<file path=ppt/slides/slide14.xml><?xml version="1.0" encoding="utf-8"?>
+<p:sld xmlns:a="http://schemas.openxmlformats.org/drawingml/2006/main" xmlns:r="http://schemas.openxmlformats.org/officeDocument/2006/relationships" xmlns:p="http://schemas.openxmlformats.org/presentationml/2006/main">
+  <p:cSld>
+    <p:spTree>
+      <p:nvGrpSpPr>
+        <p:cNvPr id="1" name=""/>
+        <p:cNvGrpSpPr/>
+        <p:nvPr/>
+      </p:nvGrpSpPr>
+      <p:grpSpPr>
+        <a:xfrm>
+          <a:off x="0" y="0"/>
+          <a:ext cx="0" cy="0"/>
+          <a:chOff x="0" y="0"/>
+          <a:chExt cx="0" cy="0"/>
+        </a:xfrm>
+      </p:grpSpPr>
+      <p:sp>
+        <p:nvSpPr>
+          <p:cNvPr id="2" name="Заголовок 1">
+            <a:extLst>
+              <a:ext uri="{FF2B5EF4-FFF2-40B4-BE49-F238E27FC236}">
+                <a16:creationId xmlns:a16="http://schemas.microsoft.com/office/drawing/2014/main" id="{A8A78197-F0E5-482A-9DF3-DA7661662131}"/>
+              </a:ext>
+            </a:extLst>
+          </p:cNvPr>
+          <p:cNvSpPr>
+            <a:spLocks noGrp="1"/>
+          </p:cNvSpPr>
+          <p:nvPr>
+            <p:ph type="title"/>
+          </p:nvPr>
+        </p:nvSpPr>
+        <p:spPr>
+          <a:xfrm>
+            <a:off x="838200" y="0"/>
+            <a:ext cx="10515600" cy="1325563"/>
+          </a:xfrm>
+        </p:spPr>
+        <p:txBody>
+          <a:bodyPr/>
+          <a:lstStyle/>
+          <a:p>
+            <a:pPr algn="ctr"/>
+            <a:r>
+              <a:rPr lang="ru-RU" dirty="0">
+                <a:latin typeface="Times New Roman" panose="02020603050405020304" pitchFamily="18" charset="0"/>
+                <a:cs typeface="Times New Roman" panose="02020603050405020304" pitchFamily="18" charset="0"/>
+              </a:rPr>
+              <a:t>Дальнейшее развитие</a:t>
+            </a:r>
+          </a:p>
+        </p:txBody>
+      </p:sp>
+      <p:sp>
+        <p:nvSpPr>
+          <p:cNvPr id="6" name="Объект 2">
+            <a:extLst>
+              <a:ext uri="{FF2B5EF4-FFF2-40B4-BE49-F238E27FC236}">
+                <a16:creationId xmlns:a16="http://schemas.microsoft.com/office/drawing/2014/main" id="{6D24A5E1-8270-4877-AF66-EC2D6888AE6B}"/>
+              </a:ext>
+            </a:extLst>
+          </p:cNvPr>
+          <p:cNvSpPr>
+            <a:spLocks noGrp="1"/>
+          </p:cNvSpPr>
+          <p:nvPr>
+            <p:ph idx="1"/>
+          </p:nvPr>
+        </p:nvSpPr>
+        <p:spPr>
+          <a:xfrm>
+            <a:off x="838200" y="1325563"/>
+            <a:ext cx="10515600" cy="5117570"/>
+          </a:xfrm>
+        </p:spPr>
+        <p:txBody>
+          <a:bodyPr>
+            <a:normAutofit/>
+          </a:bodyPr>
+          <a:lstStyle/>
+          <a:p>
+            <a:pPr marL="0" indent="0" algn="just">
+              <a:buNone/>
+            </a:pPr>
+            <a:r>
+              <a:rPr lang="ru-RU" dirty="0">
+                <a:latin typeface="Times New Roman" panose="02020603050405020304" pitchFamily="18" charset="0"/>
+                <a:cs typeface="Times New Roman" panose="02020603050405020304" pitchFamily="18" charset="0"/>
+              </a:rPr>
+              <a:t>АХАХАХАХАХАХАХАХАХАХАХАХАХХАХАХАХАХАХАХ</a:t>
+            </a:r>
+          </a:p>
+        </p:txBody>
+      </p:sp>
+      <p:sp>
+        <p:nvSpPr>
+          <p:cNvPr id="3" name="Номер слайда 2">
+            <a:extLst>
+              <a:ext uri="{FF2B5EF4-FFF2-40B4-BE49-F238E27FC236}">
+                <a16:creationId xmlns:a16="http://schemas.microsoft.com/office/drawing/2014/main" id="{18D02FDB-6FC5-443A-AD14-3C8B3AC22A63}"/>
+              </a:ext>
+            </a:extLst>
+          </p:cNvPr>
+          <p:cNvSpPr>
+            <a:spLocks noGrp="1"/>
+          </p:cNvSpPr>
+          <p:nvPr>
+            <p:ph type="sldNum" sz="quarter" idx="12"/>
+          </p:nvPr>
+        </p:nvSpPr>
+        <p:spPr/>
+        <p:txBody>
+          <a:bodyPr/>
+          <a:lstStyle/>
+          <a:p>
+            <a:fld id="{5AEE0CB1-1A0F-4E9F-8383-D0A68518B020}" type="slidenum">
+              <a:rPr lang="ru-RU" smtClean="0"/>
+              <a:t>14</a:t>
+            </a:fld>
+            <a:endParaRPr lang="ru-RU"/>
+          </a:p>
+        </p:txBody>
+      </p:sp>
+    </p:spTree>
+    <p:extLst>
+      <p:ext uri="{BB962C8B-B14F-4D97-AF65-F5344CB8AC3E}">
+        <p14:creationId xmlns:p14="http://schemas.microsoft.com/office/powerpoint/2010/main" val="4218635422"/>
       </p:ext>
     </p:extLst>
   </p:cSld>
@@ -4536,7 +4729,7 @@
                 <a:latin typeface="Times New Roman" panose="02020603050405020304" pitchFamily="18" charset="0"/>
                 <a:cs typeface="Times New Roman" panose="02020603050405020304" pitchFamily="18" charset="0"/>
               </a:rPr>
-              <a:t>Цель и задачи</a:t>
+              <a:t>Цель и задачи работы</a:t>
             </a:r>
           </a:p>
         </p:txBody>
@@ -4584,7 +4777,21 @@
                 <a:latin typeface="Times New Roman" panose="02020603050405020304" pitchFamily="18" charset="0"/>
                 <a:cs typeface="Times New Roman" panose="02020603050405020304" pitchFamily="18" charset="0"/>
               </a:rPr>
-              <a:t>– описать метод распознавания усталости пользователя на автоматизированном рабочем месте (АРМ) с использованием доступных технологий определения усталости, построенных на анализе отдельных характеристик и действий.</a:t>
+              <a:t>– </a:t>
+            </a:r>
+            <a:r>
+              <a:rPr lang="en-US" sz="2400" dirty="0">
+                <a:latin typeface="Times New Roman" panose="02020603050405020304" pitchFamily="18" charset="0"/>
+                <a:cs typeface="Times New Roman" panose="02020603050405020304" pitchFamily="18" charset="0"/>
+              </a:rPr>
+              <a:t>xxx</a:t>
+            </a:r>
+            <a:r>
+              <a:rPr lang="ru-RU" sz="2400" dirty="0">
+                <a:latin typeface="Times New Roman" panose="02020603050405020304" pitchFamily="18" charset="0"/>
+                <a:cs typeface="Times New Roman" panose="02020603050405020304" pitchFamily="18" charset="0"/>
+              </a:rPr>
+              <a:t>.</a:t>
             </a:r>
             <a:r>
               <a:rPr lang="ru-RU" sz="2400" b="1" dirty="0">
@@ -4613,66 +4820,11 @@
           <a:p>
             <a:pPr algn="just"/>
             <a:r>
-              <a:rPr lang="ru-RU" sz="2400" dirty="0">
+              <a:rPr lang="en-US" sz="2400" dirty="0" err="1">
                 <a:latin typeface="Times New Roman" panose="02020603050405020304" pitchFamily="18" charset="0"/>
                 <a:cs typeface="Times New Roman" panose="02020603050405020304" pitchFamily="18" charset="0"/>
               </a:rPr>
-              <a:t>провести анализ существующих методов определения усталости</a:t>
-            </a:r>
-            <a:r>
-              <a:rPr lang="en-US" sz="2400" dirty="0">
-                <a:latin typeface="Times New Roman" panose="02020603050405020304" pitchFamily="18" charset="0"/>
-                <a:cs typeface="Times New Roman" panose="02020603050405020304" pitchFamily="18" charset="0"/>
-              </a:rPr>
-              <a:t>;</a:t>
-            </a:r>
-          </a:p>
-          <a:p>
-            <a:pPr algn="just"/>
-            <a:r>
-              <a:rPr lang="ru-RU" sz="2400" dirty="0">
-                <a:latin typeface="Times New Roman" panose="02020603050405020304" pitchFamily="18" charset="0"/>
-                <a:cs typeface="Times New Roman" panose="02020603050405020304" pitchFamily="18" charset="0"/>
-              </a:rPr>
-              <a:t>провести анализ действий и характеристик, позволяющих определить усталость пользователя АРМ</a:t>
-            </a:r>
-            <a:r>
-              <a:rPr lang="en-US" sz="2400" dirty="0">
-                <a:latin typeface="Times New Roman" panose="02020603050405020304" pitchFamily="18" charset="0"/>
-                <a:cs typeface="Times New Roman" panose="02020603050405020304" pitchFamily="18" charset="0"/>
-              </a:rPr>
-              <a:t>;</a:t>
-            </a:r>
-            <a:endParaRPr lang="ru-RU" sz="2400" dirty="0">
-              <a:latin typeface="Times New Roman" panose="02020603050405020304" pitchFamily="18" charset="0"/>
-              <a:cs typeface="Times New Roman" panose="02020603050405020304" pitchFamily="18" charset="0"/>
-            </a:endParaRPr>
-          </a:p>
-          <a:p>
-            <a:pPr algn="just"/>
-            <a:r>
-              <a:rPr lang="ru-RU" sz="2400" dirty="0">
-                <a:latin typeface="Times New Roman" panose="02020603050405020304" pitchFamily="18" charset="0"/>
-                <a:cs typeface="Times New Roman" panose="02020603050405020304" pitchFamily="18" charset="0"/>
-              </a:rPr>
-              <a:t>определить методы снятия выделенных действий и характеристик</a:t>
-            </a:r>
-            <a:r>
-              <a:rPr lang="en-US" sz="2400" dirty="0">
-                <a:latin typeface="Times New Roman" panose="02020603050405020304" pitchFamily="18" charset="0"/>
-                <a:cs typeface="Times New Roman" panose="02020603050405020304" pitchFamily="18" charset="0"/>
-              </a:rPr>
-              <a:t>;</a:t>
-            </a:r>
-          </a:p>
-          <a:p>
-            <a:pPr algn="just"/>
-            <a:r>
-              <a:rPr lang="ru-RU" sz="2400" dirty="0">
-                <a:latin typeface="Times New Roman" panose="02020603050405020304" pitchFamily="18" charset="0"/>
-                <a:cs typeface="Times New Roman" panose="02020603050405020304" pitchFamily="18" charset="0"/>
-              </a:rPr>
-              <a:t>описать работу системы распознавания усталости (СРУ) пользователя АРМ</a:t>
+              <a:t>fff</a:t>
             </a:r>
             <a:r>
               <a:rPr lang="en-US" sz="2400" dirty="0">
@@ -4752,7 +4904,7 @@
           <p:cNvPr id="2" name="Заголовок 1">
             <a:extLst>
               <a:ext uri="{FF2B5EF4-FFF2-40B4-BE49-F238E27FC236}">
-                <a16:creationId xmlns:a16="http://schemas.microsoft.com/office/drawing/2014/main" id="{12282183-8C79-48B4-ACCA-29F61EC95C08}"/>
+                <a16:creationId xmlns:a16="http://schemas.microsoft.com/office/drawing/2014/main" id="{A8A78197-F0E5-482A-9DF3-DA7661662131}"/>
               </a:ext>
             </a:extLst>
           </p:cNvPr>
@@ -4763,7 +4915,12 @@
             <p:ph type="title"/>
           </p:nvPr>
         </p:nvSpPr>
-        <p:spPr/>
+        <p:spPr>
+          <a:xfrm>
+            <a:off x="838200" y="0"/>
+            <a:ext cx="10515600" cy="1325563"/>
+          </a:xfrm>
+        </p:spPr>
         <p:txBody>
           <a:bodyPr/>
           <a:lstStyle/>
@@ -4774,17 +4931,17 @@
                 <a:latin typeface="Times New Roman" panose="02020603050405020304" pitchFamily="18" charset="0"/>
                 <a:cs typeface="Times New Roman" panose="02020603050405020304" pitchFamily="18" charset="0"/>
               </a:rPr>
-              <a:t>Актуальность</a:t>
-            </a:r>
-          </a:p>
-        </p:txBody>
-      </p:sp>
-      <p:sp>
-        <p:nvSpPr>
-          <p:cNvPr id="3" name="Объект 2">
-            <a:extLst>
-              <a:ext uri="{FF2B5EF4-FFF2-40B4-BE49-F238E27FC236}">
-                <a16:creationId xmlns:a16="http://schemas.microsoft.com/office/drawing/2014/main" id="{4326DA48-DB22-4385-B4DB-57824046568A}"/>
+              <a:t>Существующие подходы к решению задачи распознавания усталости</a:t>
+            </a:r>
+          </a:p>
+        </p:txBody>
+      </p:sp>
+      <p:sp>
+        <p:nvSpPr>
+          <p:cNvPr id="6" name="Объект 2">
+            <a:extLst>
+              <a:ext uri="{FF2B5EF4-FFF2-40B4-BE49-F238E27FC236}">
+                <a16:creationId xmlns:a16="http://schemas.microsoft.com/office/drawing/2014/main" id="{6D24A5E1-8270-4877-AF66-EC2D6888AE6B}"/>
               </a:ext>
             </a:extLst>
           </p:cNvPr>
@@ -4797,13 +4954,13 @@
         </p:nvSpPr>
         <p:spPr>
           <a:xfrm>
-            <a:off x="838200" y="1825625"/>
-            <a:ext cx="5257800" cy="4351338"/>
+            <a:off x="838200" y="1325563"/>
+            <a:ext cx="10515600" cy="5117570"/>
           </a:xfrm>
         </p:spPr>
         <p:txBody>
           <a:bodyPr>
-            <a:normAutofit fontScale="92500" lnSpcReduction="10000"/>
+            <a:normAutofit/>
           </a:bodyPr>
           <a:lstStyle/>
           <a:p>
@@ -4815,71 +4972,17 @@
                 <a:latin typeface="Times New Roman" panose="02020603050405020304" pitchFamily="18" charset="0"/>
                 <a:cs typeface="Times New Roman" panose="02020603050405020304" pitchFamily="18" charset="0"/>
               </a:rPr>
-              <a:t>В 2018 году в результате опроса 600 тысяч человек в Великобритании </a:t>
-            </a:r>
-            <a:r>
-              <a:rPr lang="en-US" dirty="0">
-                <a:latin typeface="Times New Roman" panose="02020603050405020304" pitchFamily="18" charset="0"/>
-                <a:cs typeface="Times New Roman" panose="02020603050405020304" pitchFamily="18" charset="0"/>
-              </a:rPr>
-              <a:t>[1]</a:t>
-            </a:r>
-            <a:r>
-              <a:rPr lang="ru-RU" dirty="0">
-                <a:latin typeface="Times New Roman" panose="02020603050405020304" pitchFamily="18" charset="0"/>
-                <a:cs typeface="Times New Roman" panose="02020603050405020304" pitchFamily="18" charset="0"/>
-              </a:rPr>
-              <a:t> стало известно, что </a:t>
-            </a:r>
-            <a:r>
-              <a:rPr lang="en-US" dirty="0">
-                <a:latin typeface="Times New Roman" panose="02020603050405020304" pitchFamily="18" charset="0"/>
-                <a:cs typeface="Times New Roman" panose="02020603050405020304" pitchFamily="18" charset="0"/>
-              </a:rPr>
-              <a:t>595 </a:t>
-            </a:r>
-            <a:r>
-              <a:rPr lang="ru-RU" dirty="0">
-                <a:latin typeface="Times New Roman" panose="02020603050405020304" pitchFamily="18" charset="0"/>
-                <a:cs typeface="Times New Roman" panose="02020603050405020304" pitchFamily="18" charset="0"/>
-              </a:rPr>
-              <a:t>тысяч опрошенных испытывают тревогу и депрессивные состояния в связи с их работой, причем 239 тысяч опрошенных страдают от депрессии.</a:t>
-            </a:r>
-          </a:p>
-          <a:p>
-            <a:pPr marL="0" indent="0" algn="just">
-              <a:buNone/>
-            </a:pPr>
-            <a:r>
-              <a:rPr lang="ru-RU" dirty="0">
-                <a:latin typeface="Times New Roman" panose="02020603050405020304" pitchFamily="18" charset="0"/>
-                <a:cs typeface="Times New Roman" panose="02020603050405020304" pitchFamily="18" charset="0"/>
-              </a:rPr>
-              <a:t>Больше всего жалоб от респондентов поступило по причине высокой рабочей нагрузки (44%) </a:t>
-            </a:r>
-            <a:r>
-              <a:rPr lang="en-US" dirty="0">
-                <a:latin typeface="Times New Roman" panose="02020603050405020304" pitchFamily="18" charset="0"/>
-                <a:cs typeface="Times New Roman" panose="02020603050405020304" pitchFamily="18" charset="0"/>
-              </a:rPr>
-              <a:t>[1]</a:t>
-            </a:r>
-            <a:r>
-              <a:rPr lang="ru-RU" dirty="0">
-                <a:latin typeface="Times New Roman" panose="02020603050405020304" pitchFamily="18" charset="0"/>
-                <a:cs typeface="Times New Roman" panose="02020603050405020304" pitchFamily="18" charset="0"/>
-              </a:rPr>
-              <a:t>.</a:t>
-            </a:r>
-          </a:p>
-        </p:txBody>
-      </p:sp>
-      <p:sp>
-        <p:nvSpPr>
-          <p:cNvPr id="4" name="Номер слайда 3">
-            <a:extLst>
-              <a:ext uri="{FF2B5EF4-FFF2-40B4-BE49-F238E27FC236}">
-                <a16:creationId xmlns:a16="http://schemas.microsoft.com/office/drawing/2014/main" id="{8323610E-C707-4F7D-AF57-1BCE159B30BA}"/>
+              <a:t>Говорим о том, что можно пользоваться внешними устройствами, а они там уже подразделяются на средства ввода, смарт-часики и мед. оборудование</a:t>
+            </a:r>
+          </a:p>
+        </p:txBody>
+      </p:sp>
+      <p:sp>
+        <p:nvSpPr>
+          <p:cNvPr id="3" name="Номер слайда 2">
+            <a:extLst>
+              <a:ext uri="{FF2B5EF4-FFF2-40B4-BE49-F238E27FC236}">
+                <a16:creationId xmlns:a16="http://schemas.microsoft.com/office/drawing/2014/main" id="{8FC6C078-0922-4A9F-92F0-C08027605F51}"/>
               </a:ext>
             </a:extLst>
           </p:cNvPr>
@@ -4895,7 +4998,7 @@
           <a:bodyPr/>
           <a:lstStyle/>
           <a:p>
-            <a:fld id="{356812A1-C132-42AC-87BC-7262BD3AB593}" type="slidenum">
+            <a:fld id="{5AEE0CB1-1A0F-4E9F-8383-D0A68518B020}" type="slidenum">
               <a:rPr lang="ru-RU" smtClean="0"/>
               <a:t>3</a:t>
             </a:fld>
@@ -4903,38 +5006,10 @@
           </a:p>
         </p:txBody>
       </p:sp>
-      <p:graphicFrame>
-        <p:nvGraphicFramePr>
-          <p:cNvPr id="7" name="Диаграмма 6">
-            <a:extLst>
-              <a:ext uri="{FF2B5EF4-FFF2-40B4-BE49-F238E27FC236}">
-                <a16:creationId xmlns:a16="http://schemas.microsoft.com/office/drawing/2014/main" id="{47302104-2C21-4ADD-B382-2E1154D64C64}"/>
-              </a:ext>
-            </a:extLst>
-          </p:cNvPr>
-          <p:cNvGraphicFramePr/>
-          <p:nvPr>
-            <p:extLst>
-              <p:ext uri="{D42A27DB-BD31-4B8C-83A1-F6EECF244321}">
-                <p14:modId xmlns:p14="http://schemas.microsoft.com/office/powerpoint/2010/main" val="770538443"/>
-              </p:ext>
-            </p:extLst>
-          </p:nvPr>
-        </p:nvGraphicFramePr>
-        <p:xfrm>
-          <a:off x="6096000" y="1937279"/>
-          <a:ext cx="6039374" cy="4128030"/>
-        </p:xfrm>
-        <a:graphic>
-          <a:graphicData uri="http://schemas.openxmlformats.org/drawingml/2006/chart">
-            <c:chart xmlns:c="http://schemas.openxmlformats.org/drawingml/2006/chart" xmlns:r="http://schemas.openxmlformats.org/officeDocument/2006/relationships" r:id="rId2"/>
-          </a:graphicData>
-        </a:graphic>
-      </p:graphicFrame>
     </p:spTree>
     <p:extLst>
       <p:ext uri="{BB962C8B-B14F-4D97-AF65-F5344CB8AC3E}">
-        <p14:creationId xmlns:p14="http://schemas.microsoft.com/office/powerpoint/2010/main" val="164073558"/>
+        <p14:creationId xmlns:p14="http://schemas.microsoft.com/office/powerpoint/2010/main" val="1721109683"/>
       </p:ext>
     </p:extLst>
   </p:cSld>
@@ -4993,7 +5068,7 @@
                 <a:latin typeface="Times New Roman" panose="02020603050405020304" pitchFamily="18" charset="0"/>
                 <a:cs typeface="Times New Roman" panose="02020603050405020304" pitchFamily="18" charset="0"/>
               </a:rPr>
-              <a:t>Последствия стресса</a:t>
+              <a:t>Включаемые в метод характеристики</a:t>
             </a:r>
           </a:p>
         </p:txBody>
@@ -5022,140 +5097,91 @@
         </p:spPr>
         <p:txBody>
           <a:bodyPr>
-            <a:normAutofit fontScale="92500"/>
+            <a:normAutofit/>
           </a:bodyPr>
           <a:lstStyle/>
           <a:p>
-            <a:pPr algn="just"/>
+            <a:pPr marL="0" indent="0" algn="just">
+              <a:buNone/>
+            </a:pPr>
             <a:r>
               <a:rPr lang="ru-RU" dirty="0">
                 <a:latin typeface="Times New Roman" panose="02020603050405020304" pitchFamily="18" charset="0"/>
                 <a:cs typeface="Times New Roman" panose="02020603050405020304" pitchFamily="18" charset="0"/>
               </a:rPr>
-              <a:t>низкая эффективность работы</a:t>
-            </a:r>
-            <a:r>
-              <a:rPr lang="en-US" dirty="0">
+              <a:t>Так и так, нас все опрокинули, статью не опубликовали, спец. операции проводить начали, китайцы нам больше не друзья, пользуемся только </a:t>
+            </a:r>
+            <a:r>
+              <a:rPr lang="ru-RU" dirty="0" err="1">
                 <a:latin typeface="Times New Roman" panose="02020603050405020304" pitchFamily="18" charset="0"/>
                 <a:cs typeface="Times New Roman" panose="02020603050405020304" pitchFamily="18" charset="0"/>
               </a:rPr>
-              <a:t>;</a:t>
-            </a:r>
+              <a:t>клавой</a:t>
+            </a:r>
+            <a:r>
+              <a:rPr lang="ru-RU" dirty="0">
+                <a:latin typeface="Times New Roman" panose="02020603050405020304" pitchFamily="18" charset="0"/>
+                <a:cs typeface="Times New Roman" panose="02020603050405020304" pitchFamily="18" charset="0"/>
+              </a:rPr>
+              <a:t> и мышью.</a:t>
+            </a:r>
+          </a:p>
+          <a:p>
+            <a:pPr marL="0" indent="0" algn="just">
+              <a:buNone/>
+            </a:pPr>
             <a:endParaRPr lang="ru-RU" dirty="0">
               <a:latin typeface="Times New Roman" panose="02020603050405020304" pitchFamily="18" charset="0"/>
               <a:cs typeface="Times New Roman" panose="02020603050405020304" pitchFamily="18" charset="0"/>
             </a:endParaRPr>
           </a:p>
           <a:p>
-            <a:pPr algn="just"/>
+            <a:pPr marL="0" indent="0" algn="just">
+              <a:buNone/>
+            </a:pPr>
             <a:r>
               <a:rPr lang="ru-RU" dirty="0">
                 <a:latin typeface="Times New Roman" panose="02020603050405020304" pitchFamily="18" charset="0"/>
                 <a:cs typeface="Times New Roman" panose="02020603050405020304" pitchFamily="18" charset="0"/>
               </a:rPr>
-              <a:t>апатичность</a:t>
-            </a:r>
-            <a:r>
-              <a:rPr lang="en-US" dirty="0">
-                <a:latin typeface="Times New Roman" panose="02020603050405020304" pitchFamily="18" charset="0"/>
-                <a:cs typeface="Times New Roman" panose="02020603050405020304" pitchFamily="18" charset="0"/>
-              </a:rPr>
-              <a:t>;</a:t>
-            </a:r>
-          </a:p>
-          <a:p>
-            <a:pPr algn="just"/>
-            <a:r>
-              <a:rPr lang="ru-RU" dirty="0">
-                <a:latin typeface="Times New Roman" panose="02020603050405020304" pitchFamily="18" charset="0"/>
-                <a:cs typeface="Times New Roman" panose="02020603050405020304" pitchFamily="18" charset="0"/>
-              </a:rPr>
-              <a:t>консерватизм</a:t>
-            </a:r>
-            <a:r>
-              <a:rPr lang="en-US" dirty="0">
-                <a:latin typeface="Times New Roman" panose="02020603050405020304" pitchFamily="18" charset="0"/>
-                <a:cs typeface="Times New Roman" panose="02020603050405020304" pitchFamily="18" charset="0"/>
-              </a:rPr>
-              <a:t>;</a:t>
-            </a:r>
-          </a:p>
-          <a:p>
-            <a:pPr algn="just"/>
-            <a:r>
-              <a:rPr lang="ru-RU" dirty="0">
-                <a:latin typeface="Times New Roman" panose="02020603050405020304" pitchFamily="18" charset="0"/>
-                <a:cs typeface="Times New Roman" panose="02020603050405020304" pitchFamily="18" charset="0"/>
-              </a:rPr>
-              <a:t>пессимистичность</a:t>
-            </a:r>
-            <a:r>
-              <a:rPr lang="en-US" dirty="0">
-                <a:latin typeface="Times New Roman" panose="02020603050405020304" pitchFamily="18" charset="0"/>
-                <a:cs typeface="Times New Roman" panose="02020603050405020304" pitchFamily="18" charset="0"/>
-              </a:rPr>
-              <a:t>;</a:t>
-            </a:r>
-          </a:p>
-          <a:p>
-            <a:pPr algn="just"/>
-            <a:r>
-              <a:rPr lang="ru-RU" dirty="0">
-                <a:latin typeface="Times New Roman" panose="02020603050405020304" pitchFamily="18" charset="0"/>
-                <a:cs typeface="Times New Roman" panose="02020603050405020304" pitchFamily="18" charset="0"/>
-              </a:rPr>
-              <a:t>избегание коммуникаций</a:t>
-            </a:r>
-            <a:r>
-              <a:rPr lang="en-US" dirty="0">
-                <a:latin typeface="Times New Roman" panose="02020603050405020304" pitchFamily="18" charset="0"/>
-                <a:cs typeface="Times New Roman" panose="02020603050405020304" pitchFamily="18" charset="0"/>
-              </a:rPr>
-              <a:t>;</a:t>
-            </a:r>
-          </a:p>
-          <a:p>
-            <a:pPr algn="just"/>
-            <a:r>
-              <a:rPr lang="ru-RU" dirty="0">
-                <a:latin typeface="Times New Roman" panose="02020603050405020304" pitchFamily="18" charset="0"/>
-                <a:cs typeface="Times New Roman" panose="02020603050405020304" pitchFamily="18" charset="0"/>
-              </a:rPr>
-              <a:t>физическое истощение и болезненность.</a:t>
-            </a:r>
-          </a:p>
-          <a:p>
-            <a:pPr algn="just"/>
-            <a:endParaRPr lang="ru-RU" dirty="0">
-              <a:latin typeface="Times New Roman" panose="02020603050405020304" pitchFamily="18" charset="0"/>
-              <a:cs typeface="Times New Roman" panose="02020603050405020304" pitchFamily="18" charset="0"/>
-            </a:endParaRPr>
-          </a:p>
-          <a:p>
-            <a:pPr algn="just"/>
-            <a:endParaRPr lang="ru-RU" dirty="0">
-              <a:latin typeface="Times New Roman" panose="02020603050405020304" pitchFamily="18" charset="0"/>
-              <a:cs typeface="Times New Roman" panose="02020603050405020304" pitchFamily="18" charset="0"/>
-            </a:endParaRPr>
-          </a:p>
-          <a:p>
-            <a:pPr marL="0" indent="0" algn="just">
-              <a:buNone/>
-            </a:pPr>
-            <a:r>
-              <a:rPr lang="ru-RU" dirty="0">
-                <a:latin typeface="Times New Roman" panose="02020603050405020304" pitchFamily="18" charset="0"/>
-                <a:cs typeface="Times New Roman" panose="02020603050405020304" pitchFamily="18" charset="0"/>
-              </a:rPr>
-              <a:t>Последствия стресса носят как физиологический, так и психологический характер. Предупреждение наступления стадии истощения может позволить сохранить здоровье и работоспособность трудящихся.</a:t>
-            </a:r>
+              <a:t>Скорее всего таблица, мол, вот это подошло, а это – нет по таким-то причинам. Можно даже привести причины того, почему что-то подошло.</a:t>
+            </a:r>
+          </a:p>
+        </p:txBody>
+      </p:sp>
+      <p:sp>
+        <p:nvSpPr>
+          <p:cNvPr id="3" name="Номер слайда 2">
+            <a:extLst>
+              <a:ext uri="{FF2B5EF4-FFF2-40B4-BE49-F238E27FC236}">
+                <a16:creationId xmlns:a16="http://schemas.microsoft.com/office/drawing/2014/main" id="{18D02FDB-6FC5-443A-AD14-3C8B3AC22A63}"/>
+              </a:ext>
+            </a:extLst>
+          </p:cNvPr>
+          <p:cNvSpPr>
+            <a:spLocks noGrp="1"/>
+          </p:cNvSpPr>
+          <p:nvPr>
+            <p:ph type="sldNum" sz="quarter" idx="12"/>
+          </p:nvPr>
+        </p:nvSpPr>
+        <p:spPr/>
+        <p:txBody>
+          <a:bodyPr/>
+          <a:lstStyle/>
+          <a:p>
+            <a:fld id="{5AEE0CB1-1A0F-4E9F-8383-D0A68518B020}" type="slidenum">
+              <a:rPr lang="ru-RU" smtClean="0"/>
+              <a:t>4</a:t>
+            </a:fld>
+            <a:endParaRPr lang="ru-RU"/>
           </a:p>
         </p:txBody>
       </p:sp>
     </p:spTree>
     <p:extLst>
       <p:ext uri="{BB962C8B-B14F-4D97-AF65-F5344CB8AC3E}">
-        <p14:creationId xmlns:p14="http://schemas.microsoft.com/office/powerpoint/2010/main" val="1721109683"/>
+        <p14:creationId xmlns:p14="http://schemas.microsoft.com/office/powerpoint/2010/main" val="3751860465"/>
       </p:ext>
     </p:extLst>
   </p:cSld>
@@ -5214,7 +5240,7 @@
                 <a:latin typeface="Times New Roman" panose="02020603050405020304" pitchFamily="18" charset="0"/>
                 <a:cs typeface="Times New Roman" panose="02020603050405020304" pitchFamily="18" charset="0"/>
               </a:rPr>
-              <a:t>Классификация методов распознавания усталости за АРМ</a:t>
+              <a:t>Метод распознавания усталости</a:t>
             </a:r>
           </a:p>
         </p:txBody>
@@ -5249,137 +5275,52 @@
           <a:p>
             <a:pPr algn="just"/>
             <a:r>
-              <a:rPr lang="ru-RU" dirty="0">
-                <a:latin typeface="Times New Roman" panose="02020603050405020304" pitchFamily="18" charset="0"/>
-                <a:cs typeface="Times New Roman" panose="02020603050405020304" pitchFamily="18" charset="0"/>
-              </a:rPr>
-              <a:t>с использованием устройств ввода:</a:t>
-            </a:r>
-          </a:p>
-          <a:p>
-            <a:pPr lvl="1" algn="just"/>
-            <a:r>
-              <a:rPr lang="ru-RU" dirty="0">
-                <a:latin typeface="Times New Roman" panose="02020603050405020304" pitchFamily="18" charset="0"/>
-                <a:cs typeface="Times New Roman" panose="02020603050405020304" pitchFamily="18" charset="0"/>
-              </a:rPr>
-              <a:t>клавиатуры,</a:t>
-            </a:r>
-            <a:endParaRPr lang="en-US" dirty="0">
-              <a:latin typeface="Times New Roman" panose="02020603050405020304" pitchFamily="18" charset="0"/>
-              <a:cs typeface="Times New Roman" panose="02020603050405020304" pitchFamily="18" charset="0"/>
-            </a:endParaRPr>
-          </a:p>
-          <a:p>
-            <a:pPr lvl="1" algn="just"/>
-            <a:r>
-              <a:rPr lang="ru-RU" dirty="0">
-                <a:latin typeface="Times New Roman" panose="02020603050405020304" pitchFamily="18" charset="0"/>
-                <a:cs typeface="Times New Roman" panose="02020603050405020304" pitchFamily="18" charset="0"/>
-              </a:rPr>
-              <a:t>мыши,</a:t>
-            </a:r>
-            <a:endParaRPr lang="en-US" dirty="0">
-              <a:latin typeface="Times New Roman" panose="02020603050405020304" pitchFamily="18" charset="0"/>
-              <a:cs typeface="Times New Roman" panose="02020603050405020304" pitchFamily="18" charset="0"/>
-            </a:endParaRPr>
-          </a:p>
-          <a:p>
-            <a:pPr lvl="1" algn="just"/>
-            <a:r>
-              <a:rPr lang="ru-RU" dirty="0">
-                <a:latin typeface="Times New Roman" panose="02020603050405020304" pitchFamily="18" charset="0"/>
-                <a:cs typeface="Times New Roman" panose="02020603050405020304" pitchFamily="18" charset="0"/>
-              </a:rPr>
-              <a:t>веб-камеры,</a:t>
-            </a:r>
-            <a:endParaRPr lang="en-US" dirty="0">
-              <a:latin typeface="Times New Roman" panose="02020603050405020304" pitchFamily="18" charset="0"/>
-              <a:cs typeface="Times New Roman" panose="02020603050405020304" pitchFamily="18" charset="0"/>
-            </a:endParaRPr>
-          </a:p>
-          <a:p>
-            <a:pPr lvl="1" algn="just"/>
-            <a:r>
-              <a:rPr lang="ru-RU" dirty="0">
-                <a:latin typeface="Times New Roman" panose="02020603050405020304" pitchFamily="18" charset="0"/>
-                <a:cs typeface="Times New Roman" panose="02020603050405020304" pitchFamily="18" charset="0"/>
-              </a:rPr>
-              <a:t>микрофона</a:t>
-            </a:r>
-            <a:r>
               <a:rPr lang="en-US" dirty="0">
                 <a:latin typeface="Times New Roman" panose="02020603050405020304" pitchFamily="18" charset="0"/>
                 <a:cs typeface="Times New Roman" panose="02020603050405020304" pitchFamily="18" charset="0"/>
               </a:rPr>
-              <a:t>;</a:t>
+              <a:t>IDEF0</a:t>
             </a:r>
             <a:endParaRPr lang="ru-RU" dirty="0">
               <a:latin typeface="Times New Roman" panose="02020603050405020304" pitchFamily="18" charset="0"/>
               <a:cs typeface="Times New Roman" panose="02020603050405020304" pitchFamily="18" charset="0"/>
             </a:endParaRPr>
           </a:p>
-          <a:p>
-            <a:pPr algn="just"/>
-            <a:r>
-              <a:rPr lang="ru-RU" dirty="0">
-                <a:latin typeface="Times New Roman" panose="02020603050405020304" pitchFamily="18" charset="0"/>
-                <a:cs typeface="Times New Roman" panose="02020603050405020304" pitchFamily="18" charset="0"/>
-              </a:rPr>
-              <a:t>с использованием иных внешних устройств:</a:t>
-            </a:r>
-          </a:p>
-          <a:p>
-            <a:pPr lvl="1" algn="just"/>
-            <a:r>
-              <a:rPr lang="ru-RU" dirty="0">
-                <a:latin typeface="Times New Roman" panose="02020603050405020304" pitchFamily="18" charset="0"/>
-                <a:cs typeface="Times New Roman" panose="02020603050405020304" pitchFamily="18" charset="0"/>
-              </a:rPr>
-              <a:t>пульсометра</a:t>
-            </a:r>
-            <a:r>
-              <a:rPr lang="en-US" dirty="0">
-                <a:latin typeface="Times New Roman" panose="02020603050405020304" pitchFamily="18" charset="0"/>
-                <a:cs typeface="Times New Roman" panose="02020603050405020304" pitchFamily="18" charset="0"/>
-              </a:rPr>
-              <a:t>,</a:t>
-            </a:r>
-          </a:p>
-          <a:p>
-            <a:pPr lvl="1" algn="just"/>
-            <a:r>
-              <a:rPr lang="ru-RU">
-                <a:latin typeface="Times New Roman" panose="02020603050405020304" pitchFamily="18" charset="0"/>
-                <a:cs typeface="Times New Roman" panose="02020603050405020304" pitchFamily="18" charset="0"/>
-              </a:rPr>
-              <a:t>специальных </a:t>
-            </a:r>
-            <a:r>
-              <a:rPr lang="ru-RU" dirty="0">
-                <a:latin typeface="Times New Roman" panose="02020603050405020304" pitchFamily="18" charset="0"/>
-                <a:cs typeface="Times New Roman" panose="02020603050405020304" pitchFamily="18" charset="0"/>
-              </a:rPr>
-              <a:t>или специализированных устройств</a:t>
-            </a:r>
-            <a:r>
-              <a:rPr lang="en-US" dirty="0">
-                <a:latin typeface="Times New Roman" panose="02020603050405020304" pitchFamily="18" charset="0"/>
-                <a:cs typeface="Times New Roman" panose="02020603050405020304" pitchFamily="18" charset="0"/>
-              </a:rPr>
-              <a:t>;</a:t>
-            </a:r>
-            <a:endParaRPr lang="ru-RU" dirty="0">
-              <a:latin typeface="Times New Roman" panose="02020603050405020304" pitchFamily="18" charset="0"/>
-              <a:cs typeface="Times New Roman" panose="02020603050405020304" pitchFamily="18" charset="0"/>
-            </a:endParaRPr>
+        </p:txBody>
+      </p:sp>
+      <p:sp>
+        <p:nvSpPr>
+          <p:cNvPr id="3" name="Номер слайда 2">
+            <a:extLst>
+              <a:ext uri="{FF2B5EF4-FFF2-40B4-BE49-F238E27FC236}">
+                <a16:creationId xmlns:a16="http://schemas.microsoft.com/office/drawing/2014/main" id="{18D02FDB-6FC5-443A-AD14-3C8B3AC22A63}"/>
+              </a:ext>
+            </a:extLst>
+          </p:cNvPr>
+          <p:cNvSpPr>
+            <a:spLocks noGrp="1"/>
+          </p:cNvSpPr>
+          <p:nvPr>
+            <p:ph type="sldNum" sz="quarter" idx="12"/>
+          </p:nvPr>
+        </p:nvSpPr>
+        <p:spPr/>
+        <p:txBody>
+          <a:bodyPr/>
+          <a:lstStyle/>
+          <a:p>
+            <a:fld id="{5AEE0CB1-1A0F-4E9F-8383-D0A68518B020}" type="slidenum">
+              <a:rPr lang="ru-RU" smtClean="0"/>
+              <a:t>5</a:t>
+            </a:fld>
+            <a:endParaRPr lang="ru-RU"/>
           </a:p>
         </p:txBody>
       </p:sp>
     </p:spTree>
     <p:extLst>
       <p:ext uri="{BB962C8B-B14F-4D97-AF65-F5344CB8AC3E}">
-        <p14:creationId xmlns:p14="http://schemas.microsoft.com/office/powerpoint/2010/main" val="3751860465"/>
+        <p14:creationId xmlns:p14="http://schemas.microsoft.com/office/powerpoint/2010/main" val="600028141"/>
       </p:ext>
     </p:extLst>
   </p:cSld>
@@ -5411,7 +5352,7 @@
           <p:cNvPr id="2" name="Заголовок 1">
             <a:extLst>
               <a:ext uri="{FF2B5EF4-FFF2-40B4-BE49-F238E27FC236}">
-                <a16:creationId xmlns:a16="http://schemas.microsoft.com/office/drawing/2014/main" id="{4657FF81-6D4A-4638-BC86-A0828019E589}"/>
+                <a16:creationId xmlns:a16="http://schemas.microsoft.com/office/drawing/2014/main" id="{A8A78197-F0E5-482A-9DF3-DA7661662131}"/>
               </a:ext>
             </a:extLst>
           </p:cNvPr>
@@ -5422,7 +5363,12 @@
             <p:ph type="title"/>
           </p:nvPr>
         </p:nvSpPr>
-        <p:spPr/>
+        <p:spPr>
+          <a:xfrm>
+            <a:off x="838200" y="0"/>
+            <a:ext cx="10515600" cy="1325563"/>
+          </a:xfrm>
+        </p:spPr>
         <p:txBody>
           <a:bodyPr/>
           <a:lstStyle/>
@@ -5433,17 +5379,17 @@
                 <a:latin typeface="Times New Roman" panose="02020603050405020304" pitchFamily="18" charset="0"/>
                 <a:cs typeface="Times New Roman" panose="02020603050405020304" pitchFamily="18" charset="0"/>
               </a:rPr>
-              <a:t>Список использованных источников</a:t>
-            </a:r>
-          </a:p>
-        </p:txBody>
-      </p:sp>
-      <p:sp>
-        <p:nvSpPr>
-          <p:cNvPr id="3" name="Объект 2">
-            <a:extLst>
-              <a:ext uri="{FF2B5EF4-FFF2-40B4-BE49-F238E27FC236}">
-                <a16:creationId xmlns:a16="http://schemas.microsoft.com/office/drawing/2014/main" id="{FDD43540-1B9B-4A74-801C-CD9551E40431}"/>
+              <a:t>Метод распознавания усталости</a:t>
+            </a:r>
+          </a:p>
+        </p:txBody>
+      </p:sp>
+      <p:sp>
+        <p:nvSpPr>
+          <p:cNvPr id="6" name="Объект 2">
+            <a:extLst>
+              <a:ext uri="{FF2B5EF4-FFF2-40B4-BE49-F238E27FC236}">
+                <a16:creationId xmlns:a16="http://schemas.microsoft.com/office/drawing/2014/main" id="{6D24A5E1-8270-4877-AF66-EC2D6888AE6B}"/>
               </a:ext>
             </a:extLst>
           </p:cNvPr>
@@ -5456,86 +5402,35 @@
         </p:nvSpPr>
         <p:spPr>
           <a:xfrm>
-            <a:off x="838200" y="1690688"/>
-            <a:ext cx="10515600" cy="4802187"/>
+            <a:off x="838200" y="1325563"/>
+            <a:ext cx="10515600" cy="5117570"/>
           </a:xfrm>
         </p:spPr>
         <p:txBody>
-          <a:bodyPr anchor="ctr">
+          <a:bodyPr>
             <a:normAutofit/>
           </a:bodyPr>
           <a:lstStyle/>
           <a:p>
-            <a:pPr marL="342900" indent="-342900" algn="just">
-              <a:buFont typeface="+mj-lt"/>
-              <a:buAutoNum type="arabicPeriod"/>
+            <a:pPr marL="0" indent="0" algn="just">
+              <a:buNone/>
             </a:pPr>
             <a:r>
-              <a:rPr lang="en-US" sz="2400" dirty="0">
+              <a:rPr lang="ru-RU" dirty="0">
                 <a:latin typeface="Times New Roman" panose="02020603050405020304" pitchFamily="18" charset="0"/>
                 <a:cs typeface="Times New Roman" panose="02020603050405020304" pitchFamily="18" charset="0"/>
               </a:rPr>
-              <a:t>Health and safety at work – Summary statistics for Great Britain 2018 [</a:t>
-            </a:r>
-            <a:r>
-              <a:rPr lang="ru-RU" sz="2400" dirty="0">
-                <a:latin typeface="Times New Roman" panose="02020603050405020304" pitchFamily="18" charset="0"/>
-                <a:cs typeface="Times New Roman" panose="02020603050405020304" pitchFamily="18" charset="0"/>
-              </a:rPr>
-              <a:t>Электронный ресурс</a:t>
-            </a:r>
-            <a:r>
-              <a:rPr lang="en-US" sz="2400" dirty="0">
-                <a:latin typeface="Times New Roman" panose="02020603050405020304" pitchFamily="18" charset="0"/>
-                <a:cs typeface="Times New Roman" panose="02020603050405020304" pitchFamily="18" charset="0"/>
-              </a:rPr>
-              <a:t>]. </a:t>
-            </a:r>
-            <a:r>
-              <a:rPr lang="ru-RU" sz="2400" dirty="0">
-                <a:latin typeface="Times New Roman" panose="02020603050405020304" pitchFamily="18" charset="0"/>
-                <a:cs typeface="Times New Roman" panose="02020603050405020304" pitchFamily="18" charset="0"/>
-              </a:rPr>
-              <a:t>Режим доступа:</a:t>
-            </a:r>
-            <a:r>
-              <a:rPr lang="en-US" sz="2400" dirty="0">
-                <a:latin typeface="Times New Roman" panose="02020603050405020304" pitchFamily="18" charset="0"/>
-                <a:cs typeface="Times New Roman" panose="02020603050405020304" pitchFamily="18" charset="0"/>
-              </a:rPr>
-              <a:t> </a:t>
-            </a:r>
-            <a:r>
-              <a:rPr lang="en-US" sz="2400" dirty="0">
-                <a:latin typeface="Times New Roman" panose="02020603050405020304" pitchFamily="18" charset="0"/>
-                <a:cs typeface="Times New Roman" panose="02020603050405020304" pitchFamily="18" charset="0"/>
-                <a:hlinkClick r:id="rId2"/>
-              </a:rPr>
-              <a:t>https://www.hse.gov.uk/statistics/overall/hssh1718.pdf</a:t>
-            </a:r>
-            <a:r>
-              <a:rPr lang="en-US" sz="2400" dirty="0">
-                <a:latin typeface="Times New Roman" panose="02020603050405020304" pitchFamily="18" charset="0"/>
-                <a:cs typeface="Times New Roman" panose="02020603050405020304" pitchFamily="18" charset="0"/>
-              </a:rPr>
-              <a:t> (</a:t>
-            </a:r>
-            <a:r>
-              <a:rPr lang="ru-RU" sz="2400" dirty="0">
-                <a:latin typeface="Times New Roman" panose="02020603050405020304" pitchFamily="18" charset="0"/>
-                <a:cs typeface="Times New Roman" panose="02020603050405020304" pitchFamily="18" charset="0"/>
-              </a:rPr>
-              <a:t>дата обращения 02.04.2022).</a:t>
-            </a:r>
-          </a:p>
-        </p:txBody>
-      </p:sp>
-      <p:sp>
-        <p:nvSpPr>
-          <p:cNvPr id="5" name="Номер слайда 4">
-            <a:extLst>
-              <a:ext uri="{FF2B5EF4-FFF2-40B4-BE49-F238E27FC236}">
-                <a16:creationId xmlns:a16="http://schemas.microsoft.com/office/drawing/2014/main" id="{911599AE-B3EE-4F75-82FB-BC55E4531C36}"/>
+              <a:t>Описываем этот опус, говорим о том, что подразделяется на две задачи, короче всё из РПЗ</a:t>
+            </a:r>
+          </a:p>
+        </p:txBody>
+      </p:sp>
+      <p:sp>
+        <p:nvSpPr>
+          <p:cNvPr id="3" name="Номер слайда 2">
+            <a:extLst>
+              <a:ext uri="{FF2B5EF4-FFF2-40B4-BE49-F238E27FC236}">
+                <a16:creationId xmlns:a16="http://schemas.microsoft.com/office/drawing/2014/main" id="{18D02FDB-6FC5-443A-AD14-3C8B3AC22A63}"/>
               </a:ext>
             </a:extLst>
           </p:cNvPr>
@@ -5551,7 +5446,7 @@
           <a:bodyPr/>
           <a:lstStyle/>
           <a:p>
-            <a:fld id="{356812A1-C132-42AC-87BC-7262BD3AB593}" type="slidenum">
+            <a:fld id="{5AEE0CB1-1A0F-4E9F-8383-D0A68518B020}" type="slidenum">
               <a:rPr lang="ru-RU" smtClean="0"/>
               <a:t>6</a:t>
             </a:fld>
@@ -5562,7 +5457,474 @@
     </p:spTree>
     <p:extLst>
       <p:ext uri="{BB962C8B-B14F-4D97-AF65-F5344CB8AC3E}">
-        <p14:creationId xmlns:p14="http://schemas.microsoft.com/office/powerpoint/2010/main" val="2765727373"/>
+        <p14:creationId xmlns:p14="http://schemas.microsoft.com/office/powerpoint/2010/main" val="2911664787"/>
+      </p:ext>
+    </p:extLst>
+  </p:cSld>
+  <p:clrMapOvr>
+    <a:masterClrMapping/>
+  </p:clrMapOvr>
+</p:sld>
+</file>
+
+<file path=ppt/slides/slide7.xml><?xml version="1.0" encoding="utf-8"?>
+<p:sld xmlns:a="http://schemas.openxmlformats.org/drawingml/2006/main" xmlns:r="http://schemas.openxmlformats.org/officeDocument/2006/relationships" xmlns:p="http://schemas.openxmlformats.org/presentationml/2006/main">
+  <p:cSld>
+    <p:spTree>
+      <p:nvGrpSpPr>
+        <p:cNvPr id="1" name=""/>
+        <p:cNvGrpSpPr/>
+        <p:nvPr/>
+      </p:nvGrpSpPr>
+      <p:grpSpPr>
+        <a:xfrm>
+          <a:off x="0" y="0"/>
+          <a:ext cx="0" cy="0"/>
+          <a:chOff x="0" y="0"/>
+          <a:chExt cx="0" cy="0"/>
+        </a:xfrm>
+      </p:grpSpPr>
+      <p:sp>
+        <p:nvSpPr>
+          <p:cNvPr id="2" name="Заголовок 1">
+            <a:extLst>
+              <a:ext uri="{FF2B5EF4-FFF2-40B4-BE49-F238E27FC236}">
+                <a16:creationId xmlns:a16="http://schemas.microsoft.com/office/drawing/2014/main" id="{A8A78197-F0E5-482A-9DF3-DA7661662131}"/>
+              </a:ext>
+            </a:extLst>
+          </p:cNvPr>
+          <p:cNvSpPr>
+            <a:spLocks noGrp="1"/>
+          </p:cNvSpPr>
+          <p:nvPr>
+            <p:ph type="title"/>
+          </p:nvPr>
+        </p:nvSpPr>
+        <p:spPr>
+          <a:xfrm>
+            <a:off x="838200" y="0"/>
+            <a:ext cx="10515600" cy="1325563"/>
+          </a:xfrm>
+        </p:spPr>
+        <p:txBody>
+          <a:bodyPr/>
+          <a:lstStyle/>
+          <a:p>
+            <a:pPr algn="ctr"/>
+            <a:r>
+              <a:rPr lang="ru-RU" dirty="0">
+                <a:latin typeface="Times New Roman" panose="02020603050405020304" pitchFamily="18" charset="0"/>
+                <a:cs typeface="Times New Roman" panose="02020603050405020304" pitchFamily="18" charset="0"/>
+              </a:rPr>
+              <a:t>Формат и метод сбора данных</a:t>
+            </a:r>
+          </a:p>
+        </p:txBody>
+      </p:sp>
+      <p:sp>
+        <p:nvSpPr>
+          <p:cNvPr id="6" name="Объект 2">
+            <a:extLst>
+              <a:ext uri="{FF2B5EF4-FFF2-40B4-BE49-F238E27FC236}">
+                <a16:creationId xmlns:a16="http://schemas.microsoft.com/office/drawing/2014/main" id="{6D24A5E1-8270-4877-AF66-EC2D6888AE6B}"/>
+              </a:ext>
+            </a:extLst>
+          </p:cNvPr>
+          <p:cNvSpPr>
+            <a:spLocks noGrp="1"/>
+          </p:cNvSpPr>
+          <p:nvPr>
+            <p:ph idx="1"/>
+          </p:nvPr>
+        </p:nvSpPr>
+        <p:spPr>
+          <a:xfrm>
+            <a:off x="838200" y="1325563"/>
+            <a:ext cx="10515600" cy="5117570"/>
+          </a:xfrm>
+        </p:spPr>
+        <p:txBody>
+          <a:bodyPr>
+            <a:normAutofit/>
+          </a:bodyPr>
+          <a:lstStyle/>
+          <a:p>
+            <a:pPr marL="0" indent="0" algn="just">
+              <a:buNone/>
+            </a:pPr>
+            <a:r>
+              <a:rPr lang="ru-RU" dirty="0">
+                <a:latin typeface="Times New Roman" panose="02020603050405020304" pitchFamily="18" charset="0"/>
+                <a:cs typeface="Times New Roman" panose="02020603050405020304" pitchFamily="18" charset="0"/>
+              </a:rPr>
+              <a:t>Рассказываем о логгере, можно сказать, что тестировали на детях, чтобы нас точно посадили. Можно даже сказать, что оружие протестировать не удалось, так как кто-то играл в мертвого, а кто-то играл в дурака</a:t>
+            </a:r>
+          </a:p>
+        </p:txBody>
+      </p:sp>
+      <p:sp>
+        <p:nvSpPr>
+          <p:cNvPr id="3" name="Номер слайда 2">
+            <a:extLst>
+              <a:ext uri="{FF2B5EF4-FFF2-40B4-BE49-F238E27FC236}">
+                <a16:creationId xmlns:a16="http://schemas.microsoft.com/office/drawing/2014/main" id="{18D02FDB-6FC5-443A-AD14-3C8B3AC22A63}"/>
+              </a:ext>
+            </a:extLst>
+          </p:cNvPr>
+          <p:cNvSpPr>
+            <a:spLocks noGrp="1"/>
+          </p:cNvSpPr>
+          <p:nvPr>
+            <p:ph type="sldNum" sz="quarter" idx="12"/>
+          </p:nvPr>
+        </p:nvSpPr>
+        <p:spPr/>
+        <p:txBody>
+          <a:bodyPr/>
+          <a:lstStyle/>
+          <a:p>
+            <a:fld id="{5AEE0CB1-1A0F-4E9F-8383-D0A68518B020}" type="slidenum">
+              <a:rPr lang="ru-RU" smtClean="0"/>
+              <a:t>7</a:t>
+            </a:fld>
+            <a:endParaRPr lang="ru-RU"/>
+          </a:p>
+        </p:txBody>
+      </p:sp>
+    </p:spTree>
+    <p:extLst>
+      <p:ext uri="{BB962C8B-B14F-4D97-AF65-F5344CB8AC3E}">
+        <p14:creationId xmlns:p14="http://schemas.microsoft.com/office/powerpoint/2010/main" val="351711022"/>
+      </p:ext>
+    </p:extLst>
+  </p:cSld>
+  <p:clrMapOvr>
+    <a:masterClrMapping/>
+  </p:clrMapOvr>
+</p:sld>
+</file>
+
+<file path=ppt/slides/slide8.xml><?xml version="1.0" encoding="utf-8"?>
+<p:sld xmlns:a="http://schemas.openxmlformats.org/drawingml/2006/main" xmlns:r="http://schemas.openxmlformats.org/officeDocument/2006/relationships" xmlns:p="http://schemas.openxmlformats.org/presentationml/2006/main">
+  <p:cSld>
+    <p:spTree>
+      <p:nvGrpSpPr>
+        <p:cNvPr id="1" name=""/>
+        <p:cNvGrpSpPr/>
+        <p:nvPr/>
+      </p:nvGrpSpPr>
+      <p:grpSpPr>
+        <a:xfrm>
+          <a:off x="0" y="0"/>
+          <a:ext cx="0" cy="0"/>
+          <a:chOff x="0" y="0"/>
+          <a:chExt cx="0" cy="0"/>
+        </a:xfrm>
+      </p:grpSpPr>
+      <p:sp>
+        <p:nvSpPr>
+          <p:cNvPr id="2" name="Заголовок 1">
+            <a:extLst>
+              <a:ext uri="{FF2B5EF4-FFF2-40B4-BE49-F238E27FC236}">
+                <a16:creationId xmlns:a16="http://schemas.microsoft.com/office/drawing/2014/main" id="{A8A78197-F0E5-482A-9DF3-DA7661662131}"/>
+              </a:ext>
+            </a:extLst>
+          </p:cNvPr>
+          <p:cNvSpPr>
+            <a:spLocks noGrp="1"/>
+          </p:cNvSpPr>
+          <p:nvPr>
+            <p:ph type="title"/>
+          </p:nvPr>
+        </p:nvSpPr>
+        <p:spPr>
+          <a:xfrm>
+            <a:off x="838200" y="0"/>
+            <a:ext cx="10515600" cy="1325563"/>
+          </a:xfrm>
+        </p:spPr>
+        <p:txBody>
+          <a:bodyPr/>
+          <a:lstStyle/>
+          <a:p>
+            <a:pPr algn="ctr"/>
+            <a:r>
+              <a:rPr lang="ru-RU" dirty="0">
+                <a:latin typeface="Times New Roman" panose="02020603050405020304" pitchFamily="18" charset="0"/>
+                <a:cs typeface="Times New Roman" panose="02020603050405020304" pitchFamily="18" charset="0"/>
+              </a:rPr>
+              <a:t>Декомпозиция системы</a:t>
+            </a:r>
+          </a:p>
+        </p:txBody>
+      </p:sp>
+      <p:sp>
+        <p:nvSpPr>
+          <p:cNvPr id="6" name="Объект 2">
+            <a:extLst>
+              <a:ext uri="{FF2B5EF4-FFF2-40B4-BE49-F238E27FC236}">
+                <a16:creationId xmlns:a16="http://schemas.microsoft.com/office/drawing/2014/main" id="{6D24A5E1-8270-4877-AF66-EC2D6888AE6B}"/>
+              </a:ext>
+            </a:extLst>
+          </p:cNvPr>
+          <p:cNvSpPr>
+            <a:spLocks noGrp="1"/>
+          </p:cNvSpPr>
+          <p:nvPr>
+            <p:ph idx="1"/>
+          </p:nvPr>
+        </p:nvSpPr>
+        <p:spPr>
+          <a:xfrm>
+            <a:off x="838200" y="1325563"/>
+            <a:ext cx="10515600" cy="5117570"/>
+          </a:xfrm>
+        </p:spPr>
+        <p:txBody>
+          <a:bodyPr>
+            <a:normAutofit/>
+          </a:bodyPr>
+          <a:lstStyle/>
+          <a:p>
+            <a:pPr marL="0" indent="0" algn="just">
+              <a:buNone/>
+            </a:pPr>
+            <a:r>
+              <a:rPr lang="ru-RU" dirty="0">
+                <a:latin typeface="Times New Roman" panose="02020603050405020304" pitchFamily="18" charset="0"/>
+                <a:cs typeface="Times New Roman" panose="02020603050405020304" pitchFamily="18" charset="0"/>
+              </a:rPr>
+              <a:t>Тут </a:t>
+            </a:r>
+            <a:r>
+              <a:rPr lang="en-US" dirty="0">
+                <a:latin typeface="Times New Roman" panose="02020603050405020304" pitchFamily="18" charset="0"/>
+                <a:cs typeface="Times New Roman" panose="02020603050405020304" pitchFamily="18" charset="0"/>
+              </a:rPr>
+              <a:t>use-case </a:t>
+            </a:r>
+            <a:r>
+              <a:rPr lang="ru-RU" dirty="0">
+                <a:latin typeface="Times New Roman" panose="02020603050405020304" pitchFamily="18" charset="0"/>
+                <a:cs typeface="Times New Roman" panose="02020603050405020304" pitchFamily="18" charset="0"/>
+              </a:rPr>
+              <a:t>диаграммы и схема работы сервера. Обо всём по паре слов, не забыть сказать, мол, «Да у меня сервер работает на собственном протоколе </a:t>
+            </a:r>
+            <a:r>
+              <a:rPr lang="en-US" dirty="0">
+                <a:latin typeface="Times New Roman" panose="02020603050405020304" pitchFamily="18" charset="0"/>
+                <a:cs typeface="Times New Roman" panose="02020603050405020304" pitchFamily="18" charset="0"/>
+              </a:rPr>
+              <a:t>YDVP, </a:t>
+            </a:r>
+            <a:r>
+              <a:rPr lang="ru-RU" dirty="0">
+                <a:latin typeface="Times New Roman" panose="02020603050405020304" pitchFamily="18" charset="0"/>
+                <a:cs typeface="Times New Roman" panose="02020603050405020304" pitchFamily="18" charset="0"/>
+              </a:rPr>
+              <a:t>нас даже пентагон хрен взломает, пока не догадается, что это копирка </a:t>
+            </a:r>
+            <a:r>
+              <a:rPr lang="en-US" dirty="0">
+                <a:latin typeface="Times New Roman" panose="02020603050405020304" pitchFamily="18" charset="0"/>
+                <a:cs typeface="Times New Roman" panose="02020603050405020304" pitchFamily="18" charset="0"/>
+              </a:rPr>
+              <a:t>HTTP</a:t>
+            </a:r>
+            <a:r>
+              <a:rPr lang="ru-RU" dirty="0">
+                <a:latin typeface="Times New Roman" panose="02020603050405020304" pitchFamily="18" charset="0"/>
+                <a:cs typeface="Times New Roman" panose="02020603050405020304" pitchFamily="18" charset="0"/>
+              </a:rPr>
+              <a:t>»</a:t>
+            </a:r>
+          </a:p>
+        </p:txBody>
+      </p:sp>
+      <p:sp>
+        <p:nvSpPr>
+          <p:cNvPr id="3" name="Номер слайда 2">
+            <a:extLst>
+              <a:ext uri="{FF2B5EF4-FFF2-40B4-BE49-F238E27FC236}">
+                <a16:creationId xmlns:a16="http://schemas.microsoft.com/office/drawing/2014/main" id="{18D02FDB-6FC5-443A-AD14-3C8B3AC22A63}"/>
+              </a:ext>
+            </a:extLst>
+          </p:cNvPr>
+          <p:cNvSpPr>
+            <a:spLocks noGrp="1"/>
+          </p:cNvSpPr>
+          <p:nvPr>
+            <p:ph type="sldNum" sz="quarter" idx="12"/>
+          </p:nvPr>
+        </p:nvSpPr>
+        <p:spPr/>
+        <p:txBody>
+          <a:bodyPr/>
+          <a:lstStyle/>
+          <a:p>
+            <a:fld id="{5AEE0CB1-1A0F-4E9F-8383-D0A68518B020}" type="slidenum">
+              <a:rPr lang="ru-RU" smtClean="0"/>
+              <a:t>8</a:t>
+            </a:fld>
+            <a:endParaRPr lang="ru-RU"/>
+          </a:p>
+        </p:txBody>
+      </p:sp>
+    </p:spTree>
+    <p:extLst>
+      <p:ext uri="{BB962C8B-B14F-4D97-AF65-F5344CB8AC3E}">
+        <p14:creationId xmlns:p14="http://schemas.microsoft.com/office/powerpoint/2010/main" val="3624538576"/>
+      </p:ext>
+    </p:extLst>
+  </p:cSld>
+  <p:clrMapOvr>
+    <a:masterClrMapping/>
+  </p:clrMapOvr>
+</p:sld>
+</file>
+
+<file path=ppt/slides/slide9.xml><?xml version="1.0" encoding="utf-8"?>
+<p:sld xmlns:a="http://schemas.openxmlformats.org/drawingml/2006/main" xmlns:r="http://schemas.openxmlformats.org/officeDocument/2006/relationships" xmlns:p="http://schemas.openxmlformats.org/presentationml/2006/main">
+  <p:cSld>
+    <p:spTree>
+      <p:nvGrpSpPr>
+        <p:cNvPr id="1" name=""/>
+        <p:cNvGrpSpPr/>
+        <p:nvPr/>
+      </p:nvGrpSpPr>
+      <p:grpSpPr>
+        <a:xfrm>
+          <a:off x="0" y="0"/>
+          <a:ext cx="0" cy="0"/>
+          <a:chOff x="0" y="0"/>
+          <a:chExt cx="0" cy="0"/>
+        </a:xfrm>
+      </p:grpSpPr>
+      <p:sp>
+        <p:nvSpPr>
+          <p:cNvPr id="2" name="Заголовок 1">
+            <a:extLst>
+              <a:ext uri="{FF2B5EF4-FFF2-40B4-BE49-F238E27FC236}">
+                <a16:creationId xmlns:a16="http://schemas.microsoft.com/office/drawing/2014/main" id="{A8A78197-F0E5-482A-9DF3-DA7661662131}"/>
+              </a:ext>
+            </a:extLst>
+          </p:cNvPr>
+          <p:cNvSpPr>
+            <a:spLocks noGrp="1"/>
+          </p:cNvSpPr>
+          <p:nvPr>
+            <p:ph type="title"/>
+          </p:nvPr>
+        </p:nvSpPr>
+        <p:spPr>
+          <a:xfrm>
+            <a:off x="838200" y="0"/>
+            <a:ext cx="10515600" cy="1325563"/>
+          </a:xfrm>
+        </p:spPr>
+        <p:txBody>
+          <a:bodyPr/>
+          <a:lstStyle/>
+          <a:p>
+            <a:pPr algn="ctr"/>
+            <a:r>
+              <a:rPr lang="ru-RU" dirty="0">
+                <a:latin typeface="Times New Roman" panose="02020603050405020304" pitchFamily="18" charset="0"/>
+                <a:cs typeface="Times New Roman" panose="02020603050405020304" pitchFamily="18" charset="0"/>
+              </a:rPr>
+              <a:t>Алгоритмы кластеризации</a:t>
+            </a:r>
+          </a:p>
+        </p:txBody>
+      </p:sp>
+      <p:sp>
+        <p:nvSpPr>
+          <p:cNvPr id="6" name="Объект 2">
+            <a:extLst>
+              <a:ext uri="{FF2B5EF4-FFF2-40B4-BE49-F238E27FC236}">
+                <a16:creationId xmlns:a16="http://schemas.microsoft.com/office/drawing/2014/main" id="{6D24A5E1-8270-4877-AF66-EC2D6888AE6B}"/>
+              </a:ext>
+            </a:extLst>
+          </p:cNvPr>
+          <p:cNvSpPr>
+            <a:spLocks noGrp="1"/>
+          </p:cNvSpPr>
+          <p:nvPr>
+            <p:ph idx="1"/>
+          </p:nvPr>
+        </p:nvSpPr>
+        <p:spPr>
+          <a:xfrm>
+            <a:off x="838200" y="1325563"/>
+            <a:ext cx="10515600" cy="5117570"/>
+          </a:xfrm>
+        </p:spPr>
+        <p:txBody>
+          <a:bodyPr>
+            <a:normAutofit/>
+          </a:bodyPr>
+          <a:lstStyle/>
+          <a:p>
+            <a:pPr marL="0" indent="0" algn="just">
+              <a:buNone/>
+            </a:pPr>
+            <a:r>
+              <a:rPr lang="ru-RU" dirty="0">
+                <a:latin typeface="Times New Roman" panose="02020603050405020304" pitchFamily="18" charset="0"/>
+                <a:cs typeface="Times New Roman" panose="02020603050405020304" pitchFamily="18" charset="0"/>
+              </a:rPr>
+              <a:t>Я ничего в этом не понимаю. Могу только объяснить, почему нам нужна нечеткая кластеризация. </a:t>
+            </a:r>
+            <a:r>
+              <a:rPr lang="ru-RU" dirty="0" err="1">
+                <a:latin typeface="Times New Roman" panose="02020603050405020304" pitchFamily="18" charset="0"/>
+                <a:cs typeface="Times New Roman" panose="02020603050405020304" pitchFamily="18" charset="0"/>
+              </a:rPr>
+              <a:t>Формулов</a:t>
+            </a:r>
+            <a:r>
+              <a:rPr lang="ru-RU" dirty="0">
+                <a:latin typeface="Times New Roman" panose="02020603050405020304" pitchFamily="18" charset="0"/>
+                <a:cs typeface="Times New Roman" panose="02020603050405020304" pitchFamily="18" charset="0"/>
+              </a:rPr>
+              <a:t> вот этих ваших я не понимаю, с математикой не дружу.</a:t>
+            </a:r>
+          </a:p>
+        </p:txBody>
+      </p:sp>
+      <p:sp>
+        <p:nvSpPr>
+          <p:cNvPr id="3" name="Номер слайда 2">
+            <a:extLst>
+              <a:ext uri="{FF2B5EF4-FFF2-40B4-BE49-F238E27FC236}">
+                <a16:creationId xmlns:a16="http://schemas.microsoft.com/office/drawing/2014/main" id="{18D02FDB-6FC5-443A-AD14-3C8B3AC22A63}"/>
+              </a:ext>
+            </a:extLst>
+          </p:cNvPr>
+          <p:cNvSpPr>
+            <a:spLocks noGrp="1"/>
+          </p:cNvSpPr>
+          <p:nvPr>
+            <p:ph type="sldNum" sz="quarter" idx="12"/>
+          </p:nvPr>
+        </p:nvSpPr>
+        <p:spPr/>
+        <p:txBody>
+          <a:bodyPr/>
+          <a:lstStyle/>
+          <a:p>
+            <a:fld id="{5AEE0CB1-1A0F-4E9F-8383-D0A68518B020}" type="slidenum">
+              <a:rPr lang="ru-RU" smtClean="0"/>
+              <a:t>9</a:t>
+            </a:fld>
+            <a:endParaRPr lang="ru-RU"/>
+          </a:p>
+        </p:txBody>
+      </p:sp>
+    </p:spTree>
+    <p:extLst>
+      <p:ext uri="{BB962C8B-B14F-4D97-AF65-F5344CB8AC3E}">
+        <p14:creationId xmlns:p14="http://schemas.microsoft.com/office/powerpoint/2010/main" val="3551560708"/>
       </p:ext>
     </p:extLst>
   </p:cSld>
@@ -5865,4 +6227,299 @@
     </a:ext>
   </a:extLst>
 </a:theme>
+</file>
+
+<file path=ppt/theme/theme2.xml><?xml version="1.0" encoding="utf-8"?>
+<a:theme xmlns:a="http://schemas.openxmlformats.org/drawingml/2006/main" name="Тема Office">
+  <a:themeElements>
+    <a:clrScheme name="Стандартная">
+      <a:dk1>
+        <a:sysClr val="windowText" lastClr="000000"/>
+      </a:dk1>
+      <a:lt1>
+        <a:sysClr val="window" lastClr="FFFFFF"/>
+      </a:lt1>
+      <a:dk2>
+        <a:srgbClr val="44546A"/>
+      </a:dk2>
+      <a:lt2>
+        <a:srgbClr val="E7E6E6"/>
+      </a:lt2>
+      <a:accent1>
+        <a:srgbClr val="4472C4"/>
+      </a:accent1>
+      <a:accent2>
+        <a:srgbClr val="ED7D31"/>
+      </a:accent2>
+      <a:accent3>
+        <a:srgbClr val="A5A5A5"/>
+      </a:accent3>
+      <a:accent4>
+        <a:srgbClr val="FFC000"/>
+      </a:accent4>
+      <a:accent5>
+        <a:srgbClr val="5B9BD5"/>
+      </a:accent5>
+      <a:accent6>
+        <a:srgbClr val="70AD47"/>
+      </a:accent6>
+      <a:hlink>
+        <a:srgbClr val="0563C1"/>
+      </a:hlink>
+      <a:folHlink>
+        <a:srgbClr val="954F72"/>
+      </a:folHlink>
+    </a:clrScheme>
+    <a:fontScheme name="Стандартная">
+      <a:majorFont>
+        <a:latin typeface="Calibri Light" panose="020F0302020204030204"/>
+        <a:ea typeface=""/>
+        <a:cs typeface=""/>
+        <a:font script="Jpan" typeface="游ゴシック Light"/>
+        <a:font script="Hang" typeface="맑은 고딕"/>
+        <a:font script="Hans" typeface="等线 Light"/>
+        <a:font script="Hant" typeface="新細明體"/>
+        <a:font script="Arab" typeface="Times New Roman"/>
+        <a:font script="Hebr" typeface="Times New Roman"/>
+        <a:font script="Thai" typeface="Angsana New"/>
+        <a:font script="Ethi" typeface="Nyala"/>
+        <a:font script="Beng" typeface="Vrinda"/>
+        <a:font script="Gujr" typeface="Shruti"/>
+        <a:font script="Khmr" typeface="MoolBoran"/>
+        <a:font script="Knda" typeface="Tunga"/>
+        <a:font script="Guru" typeface="Raavi"/>
+        <a:font script="Cans" typeface="Euphemia"/>
+        <a:font script="Cher" typeface="Plantagenet Cherokee"/>
+        <a:font script="Yiii" typeface="Microsoft Yi Baiti"/>
+        <a:font script="Tibt" typeface="Microsoft Himalaya"/>
+        <a:font script="Thaa" typeface="MV Boli"/>
+        <a:font script="Deva" typeface="Mangal"/>
+        <a:font script="Telu" typeface="Gautami"/>
+        <a:font script="Taml" typeface="Latha"/>
+        <a:font script="Syrc" typeface="Estrangelo Edessa"/>
+        <a:font script="Orya" typeface="Kalinga"/>
+        <a:font script="Mlym" typeface="Kartika"/>
+        <a:font script="Laoo" typeface="DokChampa"/>
+        <a:font script="Sinh" typeface="Iskoola Pota"/>
+        <a:font script="Mong" typeface="Mongolian Baiti"/>
+        <a:font script="Viet" typeface="Times New Roman"/>
+        <a:font script="Uigh" typeface="Microsoft Uighur"/>
+        <a:font script="Geor" typeface="Sylfaen"/>
+        <a:font script="Armn" typeface="Arial"/>
+        <a:font script="Bugi" typeface="Leelawadee UI"/>
+        <a:font script="Bopo" typeface="Microsoft JhengHei"/>
+        <a:font script="Java" typeface="Javanese Text"/>
+        <a:font script="Lisu" typeface="Segoe UI"/>
+        <a:font script="Mymr" typeface="Myanmar Text"/>
+        <a:font script="Nkoo" typeface="Ebrima"/>
+        <a:font script="Olck" typeface="Nirmala UI"/>
+        <a:font script="Osma" typeface="Ebrima"/>
+        <a:font script="Phag" typeface="Phagspa"/>
+        <a:font script="Syrn" typeface="Estrangelo Edessa"/>
+        <a:font script="Syrj" typeface="Estrangelo Edessa"/>
+        <a:font script="Syre" typeface="Estrangelo Edessa"/>
+        <a:font script="Sora" typeface="Nirmala UI"/>
+        <a:font script="Tale" typeface="Microsoft Tai Le"/>
+        <a:font script="Talu" typeface="Microsoft New Tai Lue"/>
+        <a:font script="Tfng" typeface="Ebrima"/>
+      </a:majorFont>
+      <a:minorFont>
+        <a:latin typeface="Calibri" panose="020F0502020204030204"/>
+        <a:ea typeface=""/>
+        <a:cs typeface=""/>
+        <a:font script="Jpan" typeface="游ゴシック"/>
+        <a:font script="Hang" typeface="맑은 고딕"/>
+        <a:font script="Hans" typeface="等线"/>
+        <a:font script="Hant" typeface="新細明體"/>
+        <a:font script="Arab" typeface="Arial"/>
+        <a:font script="Hebr" typeface="Arial"/>
+        <a:font script="Thai" typeface="Cordia New"/>
+        <a:font script="Ethi" typeface="Nyala"/>
+        <a:font script="Beng" typeface="Vrinda"/>
+        <a:font script="Gujr" typeface="Shruti"/>
+        <a:font script="Khmr" typeface="DaunPenh"/>
+        <a:font script="Knda" typeface="Tunga"/>
+        <a:font script="Guru" typeface="Raavi"/>
+        <a:font script="Cans" typeface="Euphemia"/>
+        <a:font script="Cher" typeface="Plantagenet Cherokee"/>
+        <a:font script="Yiii" typeface="Microsoft Yi Baiti"/>
+        <a:font script="Tibt" typeface="Microsoft Himalaya"/>
+        <a:font script="Thaa" typeface="MV Boli"/>
+        <a:font script="Deva" typeface="Mangal"/>
+        <a:font script="Telu" typeface="Gautami"/>
+        <a:font script="Taml" typeface="Latha"/>
+        <a:font script="Syrc" typeface="Estrangelo Edessa"/>
+        <a:font script="Orya" typeface="Kalinga"/>
+        <a:font script="Mlym" typeface="Kartika"/>
+        <a:font script="Laoo" typeface="DokChampa"/>
+        <a:font script="Sinh" typeface="Iskoola Pota"/>
+        <a:font script="Mong" typeface="Mongolian Baiti"/>
+        <a:font script="Viet" typeface="Arial"/>
+        <a:font script="Uigh" typeface="Microsoft Uighur"/>
+        <a:font script="Geor" typeface="Sylfaen"/>
+        <a:font script="Armn" typeface="Arial"/>
+        <a:font script="Bugi" typeface="Leelawadee UI"/>
+        <a:font script="Bopo" typeface="Microsoft JhengHei"/>
+        <a:font script="Java" typeface="Javanese Text"/>
+        <a:font script="Lisu" typeface="Segoe UI"/>
+        <a:font script="Mymr" typeface="Myanmar Text"/>
+        <a:font script="Nkoo" typeface="Ebrima"/>
+        <a:font script="Olck" typeface="Nirmala UI"/>
+        <a:font script="Osma" typeface="Ebrima"/>
+        <a:font script="Phag" typeface="Phagspa"/>
+        <a:font script="Syrn" typeface="Estrangelo Edessa"/>
+        <a:font script="Syrj" typeface="Estrangelo Edessa"/>
+        <a:font script="Syre" typeface="Estrangelo Edessa"/>
+        <a:font script="Sora" typeface="Nirmala UI"/>
+        <a:font script="Tale" typeface="Microsoft Tai Le"/>
+        <a:font script="Talu" typeface="Microsoft New Tai Lue"/>
+        <a:font script="Tfng" typeface="Ebrima"/>
+      </a:minorFont>
+    </a:fontScheme>
+    <a:fmtScheme name="Стандартная">
+      <a:fillStyleLst>
+        <a:solidFill>
+          <a:schemeClr val="phClr"/>
+        </a:solidFill>
+        <a:gradFill rotWithShape="1">
+          <a:gsLst>
+            <a:gs pos="0">
+              <a:schemeClr val="phClr">
+                <a:lumMod val="110000"/>
+                <a:satMod val="105000"/>
+                <a:tint val="67000"/>
+              </a:schemeClr>
+            </a:gs>
+            <a:gs pos="50000">
+              <a:schemeClr val="phClr">
+                <a:lumMod val="105000"/>
+                <a:satMod val="103000"/>
+                <a:tint val="73000"/>
+              </a:schemeClr>
+            </a:gs>
+            <a:gs pos="100000">
+              <a:schemeClr val="phClr">
+                <a:lumMod val="105000"/>
+                <a:satMod val="109000"/>
+                <a:tint val="81000"/>
+              </a:schemeClr>
+            </a:gs>
+          </a:gsLst>
+          <a:lin ang="5400000" scaled="0"/>
+        </a:gradFill>
+        <a:gradFill rotWithShape="1">
+          <a:gsLst>
+            <a:gs pos="0">
+              <a:schemeClr val="phClr">
+                <a:satMod val="103000"/>
+                <a:lumMod val="102000"/>
+                <a:tint val="94000"/>
+              </a:schemeClr>
+            </a:gs>
+            <a:gs pos="50000">
+              <a:schemeClr val="phClr">
+                <a:satMod val="110000"/>
+                <a:lumMod val="100000"/>
+                <a:shade val="100000"/>
+              </a:schemeClr>
+            </a:gs>
+            <a:gs pos="100000">
+              <a:schemeClr val="phClr">
+                <a:lumMod val="99000"/>
+                <a:satMod val="120000"/>
+                <a:shade val="78000"/>
+              </a:schemeClr>
+            </a:gs>
+          </a:gsLst>
+          <a:lin ang="5400000" scaled="0"/>
+        </a:gradFill>
+      </a:fillStyleLst>
+      <a:lnStyleLst>
+        <a:ln w="6350" cap="flat" cmpd="sng" algn="ctr">
+          <a:solidFill>
+            <a:schemeClr val="phClr"/>
+          </a:solidFill>
+          <a:prstDash val="solid"/>
+          <a:miter lim="800000"/>
+        </a:ln>
+        <a:ln w="12700" cap="flat" cmpd="sng" algn="ctr">
+          <a:solidFill>
+            <a:schemeClr val="phClr"/>
+          </a:solidFill>
+          <a:prstDash val="solid"/>
+          <a:miter lim="800000"/>
+        </a:ln>
+        <a:ln w="19050" cap="flat" cmpd="sng" algn="ctr">
+          <a:solidFill>
+            <a:schemeClr val="phClr"/>
+          </a:solidFill>
+          <a:prstDash val="solid"/>
+          <a:miter lim="800000"/>
+        </a:ln>
+      </a:lnStyleLst>
+      <a:effectStyleLst>
+        <a:effectStyle>
+          <a:effectLst/>
+        </a:effectStyle>
+        <a:effectStyle>
+          <a:effectLst/>
+        </a:effectStyle>
+        <a:effectStyle>
+          <a:effectLst>
+            <a:outerShdw blurRad="57150" dist="19050" dir="5400000" algn="ctr" rotWithShape="0">
+              <a:srgbClr val="000000">
+                <a:alpha val="63000"/>
+              </a:srgbClr>
+            </a:outerShdw>
+          </a:effectLst>
+        </a:effectStyle>
+      </a:effectStyleLst>
+      <a:bgFillStyleLst>
+        <a:solidFill>
+          <a:schemeClr val="phClr"/>
+        </a:solidFill>
+        <a:solidFill>
+          <a:schemeClr val="phClr">
+            <a:tint val="95000"/>
+            <a:satMod val="170000"/>
+          </a:schemeClr>
+        </a:solidFill>
+        <a:gradFill rotWithShape="1">
+          <a:gsLst>
+            <a:gs pos="0">
+              <a:schemeClr val="phClr">
+                <a:tint val="93000"/>
+                <a:satMod val="150000"/>
+                <a:shade val="98000"/>
+                <a:lumMod val="102000"/>
+              </a:schemeClr>
+            </a:gs>
+            <a:gs pos="50000">
+              <a:schemeClr val="phClr">
+                <a:tint val="98000"/>
+                <a:satMod val="130000"/>
+                <a:shade val="90000"/>
+                <a:lumMod val="103000"/>
+              </a:schemeClr>
+            </a:gs>
+            <a:gs pos="100000">
+              <a:schemeClr val="phClr">
+                <a:shade val="63000"/>
+                <a:satMod val="120000"/>
+              </a:schemeClr>
+            </a:gs>
+          </a:gsLst>
+          <a:lin ang="5400000" scaled="0"/>
+        </a:gradFill>
+      </a:bgFillStyleLst>
+    </a:fmtScheme>
+  </a:themeElements>
+  <a:objectDefaults/>
+  <a:extraClrSchemeLst/>
+  <a:extLst>
+    <a:ext uri="{05A4C25C-085E-4340-85A3-A5531E510DB2}">
+      <thm15:themeFamily xmlns:thm15="http://schemas.microsoft.com/office/thememl/2012/main" name="Office Theme" id="{62F939B6-93AF-4DB8-9C6B-D6C7DFDC589F}" vid="{4A3C46E8-61CC-4603-A589-7422A47A8E4A}"/>
+    </a:ext>
+  </a:extLst>
+</a:theme>
 </file>
</xml_diff>